<commit_message>
Finished writing purpose, relevant implications for project.
</commit_message>
<xml_diff>
--- a/AS91903_91906_Evidence_Joaquin_Badenas.pptx
+++ b/AS91903_91906_Evidence_Joaquin_Badenas.pptx
@@ -142,7 +142,7 @@
 <file path=ppt/revisionInfo.xml><?xml version="1.0" encoding="utf-8"?>
 <p1510:revInfo xmlns:a="http://schemas.openxmlformats.org/drawingml/2006/main" xmlns:r="http://schemas.openxmlformats.org/officeDocument/2006/relationships" xmlns:p1510="http://schemas.microsoft.com/office/powerpoint/2015/10/main">
   <p1510:revLst>
-    <p1510:client id="{500FE1CA-8DB6-43A6-98B3-F9E028A878AF}" v="13" dt="2024-05-26T23:41:07.760"/>
+    <p1510:client id="{500FE1CA-8DB6-43A6-98B3-F9E028A878AF}" v="37" dt="2024-06-21T07:48:50.514"/>
   </p1510:revLst>
 </p1510:revInfo>
 </file>
@@ -285,18 +285,18 @@
   <pc:docChgLst>
     <pc:chgData name="Joaquin Badenas" userId="5cb29fd719aebf04" providerId="LiveId" clId="{500FE1CA-8DB6-43A6-98B3-F9E028A878AF}"/>
     <pc:docChg chg="undo redo custSel addSld modSld sldOrd">
-      <pc:chgData name="Joaquin Badenas" userId="5cb29fd719aebf04" providerId="LiveId" clId="{500FE1CA-8DB6-43A6-98B3-F9E028A878AF}" dt="2024-06-10T21:33:09.515" v="3760" actId="20577"/>
+      <pc:chgData name="Joaquin Badenas" userId="5cb29fd719aebf04" providerId="LiveId" clId="{500FE1CA-8DB6-43A6-98B3-F9E028A878AF}" dt="2024-06-21T07:49:06.611" v="4047" actId="167"/>
       <pc:docMkLst>
         <pc:docMk/>
       </pc:docMkLst>
       <pc:sldChg chg="modSp mod">
-        <pc:chgData name="Joaquin Badenas" userId="5cb29fd719aebf04" providerId="LiveId" clId="{500FE1CA-8DB6-43A6-98B3-F9E028A878AF}" dt="2024-05-26T23:41:30.693" v="2695" actId="1076"/>
+        <pc:chgData name="Joaquin Badenas" userId="5cb29fd719aebf04" providerId="LiveId" clId="{500FE1CA-8DB6-43A6-98B3-F9E028A878AF}" dt="2024-06-20T23:47:34.027" v="3789" actId="2711"/>
         <pc:sldMkLst>
           <pc:docMk/>
           <pc:sldMk cId="1451040387" sldId="256"/>
         </pc:sldMkLst>
         <pc:spChg chg="mod">
-          <ac:chgData name="Joaquin Badenas" userId="5cb29fd719aebf04" providerId="LiveId" clId="{500FE1CA-8DB6-43A6-98B3-F9E028A878AF}" dt="2024-05-26T23:41:07.760" v="2688"/>
+          <ac:chgData name="Joaquin Badenas" userId="5cb29fd719aebf04" providerId="LiveId" clId="{500FE1CA-8DB6-43A6-98B3-F9E028A878AF}" dt="2024-06-20T23:47:34.027" v="3789" actId="2711"/>
           <ac:spMkLst>
             <pc:docMk/>
             <pc:sldMk cId="1451040387" sldId="256"/>
@@ -313,13 +313,13 @@
         </pc:graphicFrameChg>
       </pc:sldChg>
       <pc:sldChg chg="addSp delSp modSp mod setBg">
-        <pc:chgData name="Joaquin Badenas" userId="5cb29fd719aebf04" providerId="LiveId" clId="{500FE1CA-8DB6-43A6-98B3-F9E028A878AF}" dt="2024-05-27T00:13:21.659" v="2741" actId="1076"/>
+        <pc:chgData name="Joaquin Badenas" userId="5cb29fd719aebf04" providerId="LiveId" clId="{500FE1CA-8DB6-43A6-98B3-F9E028A878AF}" dt="2024-06-20T23:47:42.284" v="3791" actId="2711"/>
         <pc:sldMkLst>
           <pc:docMk/>
           <pc:sldMk cId="3780887099" sldId="257"/>
         </pc:sldMkLst>
         <pc:spChg chg="mod">
-          <ac:chgData name="Joaquin Badenas" userId="5cb29fd719aebf04" providerId="LiveId" clId="{500FE1CA-8DB6-43A6-98B3-F9E028A878AF}" dt="2024-05-27T00:12:57.727" v="2699" actId="26606"/>
+          <ac:chgData name="Joaquin Badenas" userId="5cb29fd719aebf04" providerId="LiveId" clId="{500FE1CA-8DB6-43A6-98B3-F9E028A878AF}" dt="2024-06-20T23:47:42.284" v="3791" actId="2711"/>
           <ac:spMkLst>
             <pc:docMk/>
             <pc:sldMk cId="3780887099" sldId="257"/>
@@ -376,13 +376,13 @@
         </pc:picChg>
       </pc:sldChg>
       <pc:sldChg chg="modSp mod">
-        <pc:chgData name="Joaquin Badenas" userId="5cb29fd719aebf04" providerId="LiveId" clId="{500FE1CA-8DB6-43A6-98B3-F9E028A878AF}" dt="2024-05-26T23:41:07.836" v="2690" actId="27636"/>
+        <pc:chgData name="Joaquin Badenas" userId="5cb29fd719aebf04" providerId="LiveId" clId="{500FE1CA-8DB6-43A6-98B3-F9E028A878AF}" dt="2024-06-20T23:48:15.606" v="3797" actId="1076"/>
         <pc:sldMkLst>
           <pc:docMk/>
           <pc:sldMk cId="3513481437" sldId="261"/>
         </pc:sldMkLst>
         <pc:spChg chg="mod">
-          <ac:chgData name="Joaquin Badenas" userId="5cb29fd719aebf04" providerId="LiveId" clId="{500FE1CA-8DB6-43A6-98B3-F9E028A878AF}" dt="2024-05-26T23:41:07.760" v="2688"/>
+          <ac:chgData name="Joaquin Badenas" userId="5cb29fd719aebf04" providerId="LiveId" clId="{500FE1CA-8DB6-43A6-98B3-F9E028A878AF}" dt="2024-06-20T23:48:10.484" v="3796" actId="2711"/>
           <ac:spMkLst>
             <pc:docMk/>
             <pc:sldMk cId="3513481437" sldId="261"/>
@@ -390,22 +390,30 @@
           </ac:spMkLst>
         </pc:spChg>
         <pc:spChg chg="mod">
-          <ac:chgData name="Joaquin Badenas" userId="5cb29fd719aebf04" providerId="LiveId" clId="{500FE1CA-8DB6-43A6-98B3-F9E028A878AF}" dt="2024-05-26T23:41:07.836" v="2690" actId="27636"/>
+          <ac:chgData name="Joaquin Badenas" userId="5cb29fd719aebf04" providerId="LiveId" clId="{500FE1CA-8DB6-43A6-98B3-F9E028A878AF}" dt="2024-06-20T23:48:10.484" v="3796" actId="2711"/>
           <ac:spMkLst>
             <pc:docMk/>
             <pc:sldMk cId="3513481437" sldId="261"/>
             <ac:spMk id="3" creationId="{00000000-0000-0000-0000-000000000000}"/>
           </ac:spMkLst>
         </pc:spChg>
+        <pc:spChg chg="mod">
+          <ac:chgData name="Joaquin Badenas" userId="5cb29fd719aebf04" providerId="LiveId" clId="{500FE1CA-8DB6-43A6-98B3-F9E028A878AF}" dt="2024-06-20T23:48:15.606" v="3797" actId="1076"/>
+          <ac:spMkLst>
+            <pc:docMk/>
+            <pc:sldMk cId="3513481437" sldId="261"/>
+            <ac:spMk id="4" creationId="{00000000-0000-0000-0000-000000000000}"/>
+          </ac:spMkLst>
+        </pc:spChg>
       </pc:sldChg>
-      <pc:sldChg chg="modSp">
-        <pc:chgData name="Joaquin Badenas" userId="5cb29fd719aebf04" providerId="LiveId" clId="{500FE1CA-8DB6-43A6-98B3-F9E028A878AF}" dt="2024-05-26T23:41:07.760" v="2688"/>
+      <pc:sldChg chg="modSp mod">
+        <pc:chgData name="Joaquin Badenas" userId="5cb29fd719aebf04" providerId="LiveId" clId="{500FE1CA-8DB6-43A6-98B3-F9E028A878AF}" dt="2024-06-20T23:48:47.598" v="3803" actId="2711"/>
         <pc:sldMkLst>
           <pc:docMk/>
           <pc:sldMk cId="895423612" sldId="264"/>
         </pc:sldMkLst>
         <pc:spChg chg="mod">
-          <ac:chgData name="Joaquin Badenas" userId="5cb29fd719aebf04" providerId="LiveId" clId="{500FE1CA-8DB6-43A6-98B3-F9E028A878AF}" dt="2024-05-26T23:41:07.760" v="2688"/>
+          <ac:chgData name="Joaquin Badenas" userId="5cb29fd719aebf04" providerId="LiveId" clId="{500FE1CA-8DB6-43A6-98B3-F9E028A878AF}" dt="2024-06-20T23:48:47.598" v="3803" actId="2711"/>
           <ac:spMkLst>
             <pc:docMk/>
             <pc:sldMk cId="895423612" sldId="264"/>
@@ -413,7 +421,7 @@
           </ac:spMkLst>
         </pc:spChg>
         <pc:spChg chg="mod">
-          <ac:chgData name="Joaquin Badenas" userId="5cb29fd719aebf04" providerId="LiveId" clId="{500FE1CA-8DB6-43A6-98B3-F9E028A878AF}" dt="2024-05-26T23:41:07.760" v="2688"/>
+          <ac:chgData name="Joaquin Badenas" userId="5cb29fd719aebf04" providerId="LiveId" clId="{500FE1CA-8DB6-43A6-98B3-F9E028A878AF}" dt="2024-06-20T23:48:47.598" v="3803" actId="2711"/>
           <ac:spMkLst>
             <pc:docMk/>
             <pc:sldMk cId="895423612" sldId="264"/>
@@ -421,14 +429,14 @@
           </ac:spMkLst>
         </pc:spChg>
       </pc:sldChg>
-      <pc:sldChg chg="modSp">
-        <pc:chgData name="Joaquin Badenas" userId="5cb29fd719aebf04" providerId="LiveId" clId="{500FE1CA-8DB6-43A6-98B3-F9E028A878AF}" dt="2024-05-26T23:41:07.760" v="2688"/>
+      <pc:sldChg chg="modSp mod">
+        <pc:chgData name="Joaquin Badenas" userId="5cb29fd719aebf04" providerId="LiveId" clId="{500FE1CA-8DB6-43A6-98B3-F9E028A878AF}" dt="2024-06-20T23:49:55.659" v="3816" actId="2711"/>
         <pc:sldMkLst>
           <pc:docMk/>
           <pc:sldMk cId="559411755" sldId="265"/>
         </pc:sldMkLst>
         <pc:spChg chg="mod">
-          <ac:chgData name="Joaquin Badenas" userId="5cb29fd719aebf04" providerId="LiveId" clId="{500FE1CA-8DB6-43A6-98B3-F9E028A878AF}" dt="2024-05-26T23:41:07.760" v="2688"/>
+          <ac:chgData name="Joaquin Badenas" userId="5cb29fd719aebf04" providerId="LiveId" clId="{500FE1CA-8DB6-43A6-98B3-F9E028A878AF}" dt="2024-06-20T23:49:55.659" v="3816" actId="2711"/>
           <ac:spMkLst>
             <pc:docMk/>
             <pc:sldMk cId="559411755" sldId="265"/>
@@ -436,7 +444,7 @@
           </ac:spMkLst>
         </pc:spChg>
         <pc:spChg chg="mod">
-          <ac:chgData name="Joaquin Badenas" userId="5cb29fd719aebf04" providerId="LiveId" clId="{500FE1CA-8DB6-43A6-98B3-F9E028A878AF}" dt="2024-05-26T23:41:07.760" v="2688"/>
+          <ac:chgData name="Joaquin Badenas" userId="5cb29fd719aebf04" providerId="LiveId" clId="{500FE1CA-8DB6-43A6-98B3-F9E028A878AF}" dt="2024-06-20T23:49:55.659" v="3816" actId="2711"/>
           <ac:spMkLst>
             <pc:docMk/>
             <pc:sldMk cId="559411755" sldId="265"/>
@@ -444,14 +452,14 @@
           </ac:spMkLst>
         </pc:spChg>
       </pc:sldChg>
-      <pc:sldChg chg="modSp">
-        <pc:chgData name="Joaquin Badenas" userId="5cb29fd719aebf04" providerId="LiveId" clId="{500FE1CA-8DB6-43A6-98B3-F9E028A878AF}" dt="2024-05-26T23:41:07.760" v="2688"/>
+      <pc:sldChg chg="modSp mod">
+        <pc:chgData name="Joaquin Badenas" userId="5cb29fd719aebf04" providerId="LiveId" clId="{500FE1CA-8DB6-43A6-98B3-F9E028A878AF}" dt="2024-06-20T23:49:41.463" v="3813" actId="2711"/>
         <pc:sldMkLst>
           <pc:docMk/>
           <pc:sldMk cId="2562898663" sldId="266"/>
         </pc:sldMkLst>
         <pc:spChg chg="mod">
-          <ac:chgData name="Joaquin Badenas" userId="5cb29fd719aebf04" providerId="LiveId" clId="{500FE1CA-8DB6-43A6-98B3-F9E028A878AF}" dt="2024-05-26T23:41:07.760" v="2688"/>
+          <ac:chgData name="Joaquin Badenas" userId="5cb29fd719aebf04" providerId="LiveId" clId="{500FE1CA-8DB6-43A6-98B3-F9E028A878AF}" dt="2024-06-20T23:49:41.463" v="3813" actId="2711"/>
           <ac:spMkLst>
             <pc:docMk/>
             <pc:sldMk cId="2562898663" sldId="266"/>
@@ -459,7 +467,7 @@
           </ac:spMkLst>
         </pc:spChg>
         <pc:spChg chg="mod">
-          <ac:chgData name="Joaquin Badenas" userId="5cb29fd719aebf04" providerId="LiveId" clId="{500FE1CA-8DB6-43A6-98B3-F9E028A878AF}" dt="2024-05-26T23:41:07.760" v="2688"/>
+          <ac:chgData name="Joaquin Badenas" userId="5cb29fd719aebf04" providerId="LiveId" clId="{500FE1CA-8DB6-43A6-98B3-F9E028A878AF}" dt="2024-06-20T23:49:41.463" v="3813" actId="2711"/>
           <ac:spMkLst>
             <pc:docMk/>
             <pc:sldMk cId="2562898663" sldId="266"/>
@@ -468,13 +476,13 @@
         </pc:spChg>
       </pc:sldChg>
       <pc:sldChg chg="addSp delSp modSp mod setBg delDesignElem">
-        <pc:chgData name="Joaquin Badenas" userId="5cb29fd719aebf04" providerId="LiveId" clId="{500FE1CA-8DB6-43A6-98B3-F9E028A878AF}" dt="2024-05-26T23:41:24.138" v="2694" actId="1076"/>
+        <pc:chgData name="Joaquin Badenas" userId="5cb29fd719aebf04" providerId="LiveId" clId="{500FE1CA-8DB6-43A6-98B3-F9E028A878AF}" dt="2024-06-20T23:47:37.569" v="3790" actId="2711"/>
         <pc:sldMkLst>
           <pc:docMk/>
           <pc:sldMk cId="4179150339" sldId="270"/>
         </pc:sldMkLst>
         <pc:spChg chg="mod">
-          <ac:chgData name="Joaquin Badenas" userId="5cb29fd719aebf04" providerId="LiveId" clId="{500FE1CA-8DB6-43A6-98B3-F9E028A878AF}" dt="2024-05-26T23:41:24.138" v="2694" actId="1076"/>
+          <ac:chgData name="Joaquin Badenas" userId="5cb29fd719aebf04" providerId="LiveId" clId="{500FE1CA-8DB6-43A6-98B3-F9E028A878AF}" dt="2024-06-20T23:47:37.569" v="3790" actId="2711"/>
           <ac:spMkLst>
             <pc:docMk/>
             <pc:sldMk cId="4179150339" sldId="270"/>
@@ -562,14 +570,14 @@
           </ac:cxnSpMkLst>
         </pc:cxnChg>
       </pc:sldChg>
-      <pc:sldChg chg="modSp">
-        <pc:chgData name="Joaquin Badenas" userId="5cb29fd719aebf04" providerId="LiveId" clId="{500FE1CA-8DB6-43A6-98B3-F9E028A878AF}" dt="2024-05-26T23:41:07.760" v="2688"/>
+      <pc:sldChg chg="modSp mod">
+        <pc:chgData name="Joaquin Badenas" userId="5cb29fd719aebf04" providerId="LiveId" clId="{500FE1CA-8DB6-43A6-98B3-F9E028A878AF}" dt="2024-06-20T23:49:25.204" v="3810" actId="2711"/>
         <pc:sldMkLst>
           <pc:docMk/>
           <pc:sldMk cId="2873264670" sldId="271"/>
         </pc:sldMkLst>
         <pc:spChg chg="mod">
-          <ac:chgData name="Joaquin Badenas" userId="5cb29fd719aebf04" providerId="LiveId" clId="{500FE1CA-8DB6-43A6-98B3-F9E028A878AF}" dt="2024-05-26T23:41:07.760" v="2688"/>
+          <ac:chgData name="Joaquin Badenas" userId="5cb29fd719aebf04" providerId="LiveId" clId="{500FE1CA-8DB6-43A6-98B3-F9E028A878AF}" dt="2024-06-20T23:49:25.204" v="3810" actId="2711"/>
           <ac:spMkLst>
             <pc:docMk/>
             <pc:sldMk cId="2873264670" sldId="271"/>
@@ -577,7 +585,7 @@
           </ac:spMkLst>
         </pc:spChg>
         <pc:spChg chg="mod">
-          <ac:chgData name="Joaquin Badenas" userId="5cb29fd719aebf04" providerId="LiveId" clId="{500FE1CA-8DB6-43A6-98B3-F9E028A878AF}" dt="2024-05-26T23:41:07.760" v="2688"/>
+          <ac:chgData name="Joaquin Badenas" userId="5cb29fd719aebf04" providerId="LiveId" clId="{500FE1CA-8DB6-43A6-98B3-F9E028A878AF}" dt="2024-06-20T23:49:25.204" v="3810" actId="2711"/>
           <ac:spMkLst>
             <pc:docMk/>
             <pc:sldMk cId="2873264670" sldId="271"/>
@@ -585,14 +593,22 @@
           </ac:spMkLst>
         </pc:spChg>
       </pc:sldChg>
-      <pc:sldChg chg="modSp">
-        <pc:chgData name="Joaquin Badenas" userId="5cb29fd719aebf04" providerId="LiveId" clId="{500FE1CA-8DB6-43A6-98B3-F9E028A878AF}" dt="2024-05-26T23:41:07.760" v="2688"/>
+      <pc:sldChg chg="modSp mod">
+        <pc:chgData name="Joaquin Badenas" userId="5cb29fd719aebf04" providerId="LiveId" clId="{500FE1CA-8DB6-43A6-98B3-F9E028A878AF}" dt="2024-06-20T23:48:41.909" v="3802" actId="2711"/>
         <pc:sldMkLst>
           <pc:docMk/>
           <pc:sldMk cId="140956991" sldId="272"/>
         </pc:sldMkLst>
         <pc:spChg chg="mod">
-          <ac:chgData name="Joaquin Badenas" userId="5cb29fd719aebf04" providerId="LiveId" clId="{500FE1CA-8DB6-43A6-98B3-F9E028A878AF}" dt="2024-05-26T23:41:07.760" v="2688"/>
+          <ac:chgData name="Joaquin Badenas" userId="5cb29fd719aebf04" providerId="LiveId" clId="{500FE1CA-8DB6-43A6-98B3-F9E028A878AF}" dt="2024-06-20T23:48:41.909" v="3802" actId="2711"/>
+          <ac:spMkLst>
+            <pc:docMk/>
+            <pc:sldMk cId="140956991" sldId="272"/>
+            <ac:spMk id="2" creationId="{00000000-0000-0000-0000-000000000000}"/>
+          </ac:spMkLst>
+        </pc:spChg>
+        <pc:spChg chg="mod">
+          <ac:chgData name="Joaquin Badenas" userId="5cb29fd719aebf04" providerId="LiveId" clId="{500FE1CA-8DB6-43A6-98B3-F9E028A878AF}" dt="2024-06-20T23:48:41.909" v="3802" actId="2711"/>
           <ac:spMkLst>
             <pc:docMk/>
             <pc:sldMk cId="140956991" sldId="272"/>
@@ -600,14 +616,14 @@
           </ac:spMkLst>
         </pc:spChg>
       </pc:sldChg>
-      <pc:sldChg chg="modSp">
-        <pc:chgData name="Joaquin Badenas" userId="5cb29fd719aebf04" providerId="LiveId" clId="{500FE1CA-8DB6-43A6-98B3-F9E028A878AF}" dt="2024-05-26T23:41:07.760" v="2688"/>
+      <pc:sldChg chg="modSp mod">
+        <pc:chgData name="Joaquin Badenas" userId="5cb29fd719aebf04" providerId="LiveId" clId="{500FE1CA-8DB6-43A6-98B3-F9E028A878AF}" dt="2024-06-20T23:49:30.661" v="3811" actId="2711"/>
         <pc:sldMkLst>
           <pc:docMk/>
           <pc:sldMk cId="1831671313" sldId="273"/>
         </pc:sldMkLst>
         <pc:spChg chg="mod">
-          <ac:chgData name="Joaquin Badenas" userId="5cb29fd719aebf04" providerId="LiveId" clId="{500FE1CA-8DB6-43A6-98B3-F9E028A878AF}" dt="2024-05-26T23:41:07.760" v="2688"/>
+          <ac:chgData name="Joaquin Badenas" userId="5cb29fd719aebf04" providerId="LiveId" clId="{500FE1CA-8DB6-43A6-98B3-F9E028A878AF}" dt="2024-06-20T23:49:30.661" v="3811" actId="2711"/>
           <ac:spMkLst>
             <pc:docMk/>
             <pc:sldMk cId="1831671313" sldId="273"/>
@@ -615,7 +631,7 @@
           </ac:spMkLst>
         </pc:spChg>
         <pc:spChg chg="mod">
-          <ac:chgData name="Joaquin Badenas" userId="5cb29fd719aebf04" providerId="LiveId" clId="{500FE1CA-8DB6-43A6-98B3-F9E028A878AF}" dt="2024-05-26T23:41:07.760" v="2688"/>
+          <ac:chgData name="Joaquin Badenas" userId="5cb29fd719aebf04" providerId="LiveId" clId="{500FE1CA-8DB6-43A6-98B3-F9E028A878AF}" dt="2024-06-20T23:49:30.661" v="3811" actId="2711"/>
           <ac:spMkLst>
             <pc:docMk/>
             <pc:sldMk cId="1831671313" sldId="273"/>
@@ -624,13 +640,13 @@
         </pc:spChg>
       </pc:sldChg>
       <pc:sldChg chg="modSp mod">
-        <pc:chgData name="Joaquin Badenas" userId="5cb29fd719aebf04" providerId="LiveId" clId="{500FE1CA-8DB6-43A6-98B3-F9E028A878AF}" dt="2024-05-26T23:41:07.760" v="2688"/>
+        <pc:chgData name="Joaquin Badenas" userId="5cb29fd719aebf04" providerId="LiveId" clId="{500FE1CA-8DB6-43A6-98B3-F9E028A878AF}" dt="2024-06-20T23:49:35.553" v="3812" actId="2711"/>
         <pc:sldMkLst>
           <pc:docMk/>
           <pc:sldMk cId="2290261641" sldId="274"/>
         </pc:sldMkLst>
         <pc:spChg chg="mod">
-          <ac:chgData name="Joaquin Badenas" userId="5cb29fd719aebf04" providerId="LiveId" clId="{500FE1CA-8DB6-43A6-98B3-F9E028A878AF}" dt="2024-05-26T23:41:07.760" v="2688"/>
+          <ac:chgData name="Joaquin Badenas" userId="5cb29fd719aebf04" providerId="LiveId" clId="{500FE1CA-8DB6-43A6-98B3-F9E028A878AF}" dt="2024-06-20T23:49:35.553" v="3812" actId="2711"/>
           <ac:spMkLst>
             <pc:docMk/>
             <pc:sldMk cId="2290261641" sldId="274"/>
@@ -638,7 +654,7 @@
           </ac:spMkLst>
         </pc:spChg>
         <pc:spChg chg="mod">
-          <ac:chgData name="Joaquin Badenas" userId="5cb29fd719aebf04" providerId="LiveId" clId="{500FE1CA-8DB6-43A6-98B3-F9E028A878AF}" dt="2024-05-26T23:41:07.760" v="2688"/>
+          <ac:chgData name="Joaquin Badenas" userId="5cb29fd719aebf04" providerId="LiveId" clId="{500FE1CA-8DB6-43A6-98B3-F9E028A878AF}" dt="2024-06-20T23:49:35.553" v="3812" actId="2711"/>
           <ac:spMkLst>
             <pc:docMk/>
             <pc:sldMk cId="2290261641" sldId="274"/>
@@ -646,14 +662,14 @@
           </ac:spMkLst>
         </pc:spChg>
       </pc:sldChg>
-      <pc:sldChg chg="modSp">
-        <pc:chgData name="Joaquin Badenas" userId="5cb29fd719aebf04" providerId="LiveId" clId="{500FE1CA-8DB6-43A6-98B3-F9E028A878AF}" dt="2024-05-26T23:41:07.760" v="2688"/>
+      <pc:sldChg chg="modSp mod">
+        <pc:chgData name="Joaquin Badenas" userId="5cb29fd719aebf04" providerId="LiveId" clId="{500FE1CA-8DB6-43A6-98B3-F9E028A878AF}" dt="2024-06-20T23:49:45.581" v="3814" actId="2711"/>
         <pc:sldMkLst>
           <pc:docMk/>
           <pc:sldMk cId="2812247241" sldId="275"/>
         </pc:sldMkLst>
         <pc:spChg chg="mod">
-          <ac:chgData name="Joaquin Badenas" userId="5cb29fd719aebf04" providerId="LiveId" clId="{500FE1CA-8DB6-43A6-98B3-F9E028A878AF}" dt="2024-05-26T23:41:07.760" v="2688"/>
+          <ac:chgData name="Joaquin Badenas" userId="5cb29fd719aebf04" providerId="LiveId" clId="{500FE1CA-8DB6-43A6-98B3-F9E028A878AF}" dt="2024-06-20T23:49:45.581" v="3814" actId="2711"/>
           <ac:spMkLst>
             <pc:docMk/>
             <pc:sldMk cId="2812247241" sldId="275"/>
@@ -661,7 +677,7 @@
           </ac:spMkLst>
         </pc:spChg>
         <pc:spChg chg="mod">
-          <ac:chgData name="Joaquin Badenas" userId="5cb29fd719aebf04" providerId="LiveId" clId="{500FE1CA-8DB6-43A6-98B3-F9E028A878AF}" dt="2024-05-26T23:41:07.760" v="2688"/>
+          <ac:chgData name="Joaquin Badenas" userId="5cb29fd719aebf04" providerId="LiveId" clId="{500FE1CA-8DB6-43A6-98B3-F9E028A878AF}" dt="2024-06-20T23:49:45.581" v="3814" actId="2711"/>
           <ac:spMkLst>
             <pc:docMk/>
             <pc:sldMk cId="2812247241" sldId="275"/>
@@ -670,13 +686,13 @@
         </pc:spChg>
       </pc:sldChg>
       <pc:sldChg chg="modSp mod">
-        <pc:chgData name="Joaquin Badenas" userId="5cb29fd719aebf04" providerId="LiveId" clId="{500FE1CA-8DB6-43A6-98B3-F9E028A878AF}" dt="2024-05-26T23:41:07.826" v="2689" actId="27636"/>
+        <pc:chgData name="Joaquin Badenas" userId="5cb29fd719aebf04" providerId="LiveId" clId="{500FE1CA-8DB6-43A6-98B3-F9E028A878AF}" dt="2024-06-20T23:47:52.733" v="3794" actId="27636"/>
         <pc:sldMkLst>
           <pc:docMk/>
           <pc:sldMk cId="202757184" sldId="277"/>
         </pc:sldMkLst>
         <pc:spChg chg="mod">
-          <ac:chgData name="Joaquin Badenas" userId="5cb29fd719aebf04" providerId="LiveId" clId="{500FE1CA-8DB6-43A6-98B3-F9E028A878AF}" dt="2024-05-26T23:41:07.826" v="2689" actId="27636"/>
+          <ac:chgData name="Joaquin Badenas" userId="5cb29fd719aebf04" providerId="LiveId" clId="{500FE1CA-8DB6-43A6-98B3-F9E028A878AF}" dt="2024-06-20T23:47:52.733" v="3794" actId="27636"/>
           <ac:spMkLst>
             <pc:docMk/>
             <pc:sldMk cId="202757184" sldId="277"/>
@@ -684,7 +700,7 @@
           </ac:spMkLst>
         </pc:spChg>
         <pc:spChg chg="mod">
-          <ac:chgData name="Joaquin Badenas" userId="5cb29fd719aebf04" providerId="LiveId" clId="{500FE1CA-8DB6-43A6-98B3-F9E028A878AF}" dt="2024-05-26T23:41:07.760" v="2688"/>
+          <ac:chgData name="Joaquin Badenas" userId="5cb29fd719aebf04" providerId="LiveId" clId="{500FE1CA-8DB6-43A6-98B3-F9E028A878AF}" dt="2024-06-20T23:47:52.666" v="3793" actId="2711"/>
           <ac:spMkLst>
             <pc:docMk/>
             <pc:sldMk cId="202757184" sldId="277"/>
@@ -693,13 +709,13 @@
         </pc:spChg>
       </pc:sldChg>
       <pc:sldChg chg="modSp mod">
-        <pc:chgData name="Joaquin Badenas" userId="5cb29fd719aebf04" providerId="LiveId" clId="{500FE1CA-8DB6-43A6-98B3-F9E028A878AF}" dt="2024-05-27T21:49:07.109" v="2743" actId="1076"/>
+        <pc:chgData name="Joaquin Badenas" userId="5cb29fd719aebf04" providerId="LiveId" clId="{500FE1CA-8DB6-43A6-98B3-F9E028A878AF}" dt="2024-06-20T23:47:46.505" v="3792" actId="2711"/>
         <pc:sldMkLst>
           <pc:docMk/>
           <pc:sldMk cId="4265713020" sldId="278"/>
         </pc:sldMkLst>
         <pc:spChg chg="mod">
-          <ac:chgData name="Joaquin Badenas" userId="5cb29fd719aebf04" providerId="LiveId" clId="{500FE1CA-8DB6-43A6-98B3-F9E028A878AF}" dt="2024-05-26T23:41:07.760" v="2688"/>
+          <ac:chgData name="Joaquin Badenas" userId="5cb29fd719aebf04" providerId="LiveId" clId="{500FE1CA-8DB6-43A6-98B3-F9E028A878AF}" dt="2024-06-20T23:47:46.505" v="3792" actId="2711"/>
           <ac:spMkLst>
             <pc:docMk/>
             <pc:sldMk cId="4265713020" sldId="278"/>
@@ -724,13 +740,13 @@
         </pc:picChg>
       </pc:sldChg>
       <pc:sldChg chg="modSp mod">
-        <pc:chgData name="Joaquin Badenas" userId="5cb29fd719aebf04" providerId="LiveId" clId="{500FE1CA-8DB6-43A6-98B3-F9E028A878AF}" dt="2024-06-05T22:43:55.468" v="3043" actId="20577"/>
+        <pc:chgData name="Joaquin Badenas" userId="5cb29fd719aebf04" providerId="LiveId" clId="{500FE1CA-8DB6-43A6-98B3-F9E028A878AF}" dt="2024-06-20T23:48:21.579" v="3798" actId="2711"/>
         <pc:sldMkLst>
           <pc:docMk/>
           <pc:sldMk cId="1772023908" sldId="279"/>
         </pc:sldMkLst>
         <pc:spChg chg="mod">
-          <ac:chgData name="Joaquin Badenas" userId="5cb29fd719aebf04" providerId="LiveId" clId="{500FE1CA-8DB6-43A6-98B3-F9E028A878AF}" dt="2024-05-26T23:41:07.760" v="2688"/>
+          <ac:chgData name="Joaquin Badenas" userId="5cb29fd719aebf04" providerId="LiveId" clId="{500FE1CA-8DB6-43A6-98B3-F9E028A878AF}" dt="2024-06-20T23:48:21.579" v="3798" actId="2711"/>
           <ac:spMkLst>
             <pc:docMk/>
             <pc:sldMk cId="1772023908" sldId="279"/>
@@ -738,7 +754,7 @@
           </ac:spMkLst>
         </pc:spChg>
         <pc:spChg chg="mod">
-          <ac:chgData name="Joaquin Badenas" userId="5cb29fd719aebf04" providerId="LiveId" clId="{500FE1CA-8DB6-43A6-98B3-F9E028A878AF}" dt="2024-06-05T22:43:55.468" v="3043" actId="20577"/>
+          <ac:chgData name="Joaquin Badenas" userId="5cb29fd719aebf04" providerId="LiveId" clId="{500FE1CA-8DB6-43A6-98B3-F9E028A878AF}" dt="2024-06-20T23:48:21.579" v="3798" actId="2711"/>
           <ac:spMkLst>
             <pc:docMk/>
             <pc:sldMk cId="1772023908" sldId="279"/>
@@ -747,13 +763,13 @@
         </pc:spChg>
       </pc:sldChg>
       <pc:sldChg chg="modSp mod">
-        <pc:chgData name="Joaquin Badenas" userId="5cb29fd719aebf04" providerId="LiveId" clId="{500FE1CA-8DB6-43A6-98B3-F9E028A878AF}" dt="2024-06-10T21:33:09.515" v="3760" actId="20577"/>
+        <pc:chgData name="Joaquin Badenas" userId="5cb29fd719aebf04" providerId="LiveId" clId="{500FE1CA-8DB6-43A6-98B3-F9E028A878AF}" dt="2024-06-20T23:48:27.366" v="3799" actId="2711"/>
         <pc:sldMkLst>
           <pc:docMk/>
           <pc:sldMk cId="1347273260" sldId="280"/>
         </pc:sldMkLst>
         <pc:spChg chg="mod">
-          <ac:chgData name="Joaquin Badenas" userId="5cb29fd719aebf04" providerId="LiveId" clId="{500FE1CA-8DB6-43A6-98B3-F9E028A878AF}" dt="2024-05-26T23:41:07.760" v="2688"/>
+          <ac:chgData name="Joaquin Badenas" userId="5cb29fd719aebf04" providerId="LiveId" clId="{500FE1CA-8DB6-43A6-98B3-F9E028A878AF}" dt="2024-06-20T23:48:27.366" v="3799" actId="2711"/>
           <ac:spMkLst>
             <pc:docMk/>
             <pc:sldMk cId="1347273260" sldId="280"/>
@@ -761,7 +777,7 @@
           </ac:spMkLst>
         </pc:spChg>
         <pc:spChg chg="mod">
-          <ac:chgData name="Joaquin Badenas" userId="5cb29fd719aebf04" providerId="LiveId" clId="{500FE1CA-8DB6-43A6-98B3-F9E028A878AF}" dt="2024-06-10T21:33:09.515" v="3760" actId="20577"/>
+          <ac:chgData name="Joaquin Badenas" userId="5cb29fd719aebf04" providerId="LiveId" clId="{500FE1CA-8DB6-43A6-98B3-F9E028A878AF}" dt="2024-06-20T23:48:27.366" v="3799" actId="2711"/>
           <ac:spMkLst>
             <pc:docMk/>
             <pc:sldMk cId="1347273260" sldId="280"/>
@@ -770,13 +786,13 @@
         </pc:spChg>
       </pc:sldChg>
       <pc:sldChg chg="modSp mod">
-        <pc:chgData name="Joaquin Badenas" userId="5cb29fd719aebf04" providerId="LiveId" clId="{500FE1CA-8DB6-43A6-98B3-F9E028A878AF}" dt="2024-06-05T22:59:49.580" v="3380" actId="20577"/>
+        <pc:chgData name="Joaquin Badenas" userId="5cb29fd719aebf04" providerId="LiveId" clId="{500FE1CA-8DB6-43A6-98B3-F9E028A878AF}" dt="2024-06-20T23:48:32.147" v="3800" actId="2711"/>
         <pc:sldMkLst>
           <pc:docMk/>
           <pc:sldMk cId="3884377122" sldId="281"/>
         </pc:sldMkLst>
         <pc:spChg chg="mod">
-          <ac:chgData name="Joaquin Badenas" userId="5cb29fd719aebf04" providerId="LiveId" clId="{500FE1CA-8DB6-43A6-98B3-F9E028A878AF}" dt="2024-06-05T22:53:20.541" v="3300" actId="20577"/>
+          <ac:chgData name="Joaquin Badenas" userId="5cb29fd719aebf04" providerId="LiveId" clId="{500FE1CA-8DB6-43A6-98B3-F9E028A878AF}" dt="2024-06-20T23:48:32.147" v="3800" actId="2711"/>
           <ac:spMkLst>
             <pc:docMk/>
             <pc:sldMk cId="3884377122" sldId="281"/>
@@ -784,7 +800,7 @@
           </ac:spMkLst>
         </pc:spChg>
         <pc:spChg chg="mod">
-          <ac:chgData name="Joaquin Badenas" userId="5cb29fd719aebf04" providerId="LiveId" clId="{500FE1CA-8DB6-43A6-98B3-F9E028A878AF}" dt="2024-06-05T22:59:49.580" v="3380" actId="20577"/>
+          <ac:chgData name="Joaquin Badenas" userId="5cb29fd719aebf04" providerId="LiveId" clId="{500FE1CA-8DB6-43A6-98B3-F9E028A878AF}" dt="2024-06-20T23:48:32.147" v="3800" actId="2711"/>
           <ac:spMkLst>
             <pc:docMk/>
             <pc:sldMk cId="3884377122" sldId="281"/>
@@ -792,14 +808,14 @@
           </ac:spMkLst>
         </pc:spChg>
       </pc:sldChg>
-      <pc:sldChg chg="modSp">
-        <pc:chgData name="Joaquin Badenas" userId="5cb29fd719aebf04" providerId="LiveId" clId="{500FE1CA-8DB6-43A6-98B3-F9E028A878AF}" dt="2024-05-26T23:41:07.760" v="2688"/>
+      <pc:sldChg chg="modSp mod">
+        <pc:chgData name="Joaquin Badenas" userId="5cb29fd719aebf04" providerId="LiveId" clId="{500FE1CA-8DB6-43A6-98B3-F9E028A878AF}" dt="2024-06-20T23:48:37.775" v="3801" actId="2711"/>
         <pc:sldMkLst>
           <pc:docMk/>
           <pc:sldMk cId="3828989773" sldId="282"/>
         </pc:sldMkLst>
         <pc:spChg chg="mod">
-          <ac:chgData name="Joaquin Badenas" userId="5cb29fd719aebf04" providerId="LiveId" clId="{500FE1CA-8DB6-43A6-98B3-F9E028A878AF}" dt="2024-05-26T23:41:07.760" v="2688"/>
+          <ac:chgData name="Joaquin Badenas" userId="5cb29fd719aebf04" providerId="LiveId" clId="{500FE1CA-8DB6-43A6-98B3-F9E028A878AF}" dt="2024-06-20T23:48:37.775" v="3801" actId="2711"/>
           <ac:spMkLst>
             <pc:docMk/>
             <pc:sldMk cId="3828989773" sldId="282"/>
@@ -807,7 +823,7 @@
           </ac:spMkLst>
         </pc:spChg>
         <pc:spChg chg="mod">
-          <ac:chgData name="Joaquin Badenas" userId="5cb29fd719aebf04" providerId="LiveId" clId="{500FE1CA-8DB6-43A6-98B3-F9E028A878AF}" dt="2024-05-26T23:41:07.760" v="2688"/>
+          <ac:chgData name="Joaquin Badenas" userId="5cb29fd719aebf04" providerId="LiveId" clId="{500FE1CA-8DB6-43A6-98B3-F9E028A878AF}" dt="2024-06-20T23:48:37.775" v="3801" actId="2711"/>
           <ac:spMkLst>
             <pc:docMk/>
             <pc:sldMk cId="3828989773" sldId="282"/>
@@ -815,14 +831,14 @@
           </ac:spMkLst>
         </pc:spChg>
       </pc:sldChg>
-      <pc:sldChg chg="modSp">
-        <pc:chgData name="Joaquin Badenas" userId="5cb29fd719aebf04" providerId="LiveId" clId="{500FE1CA-8DB6-43A6-98B3-F9E028A878AF}" dt="2024-05-26T23:41:07.760" v="2688"/>
+      <pc:sldChg chg="modSp mod">
+        <pc:chgData name="Joaquin Badenas" userId="5cb29fd719aebf04" providerId="LiveId" clId="{500FE1CA-8DB6-43A6-98B3-F9E028A878AF}" dt="2024-06-20T23:49:50.220" v="3815" actId="2711"/>
         <pc:sldMkLst>
           <pc:docMk/>
           <pc:sldMk cId="1865976428" sldId="283"/>
         </pc:sldMkLst>
         <pc:spChg chg="mod">
-          <ac:chgData name="Joaquin Badenas" userId="5cb29fd719aebf04" providerId="LiveId" clId="{500FE1CA-8DB6-43A6-98B3-F9E028A878AF}" dt="2024-05-26T23:41:07.760" v="2688"/>
+          <ac:chgData name="Joaquin Badenas" userId="5cb29fd719aebf04" providerId="LiveId" clId="{500FE1CA-8DB6-43A6-98B3-F9E028A878AF}" dt="2024-06-20T23:49:50.220" v="3815" actId="2711"/>
           <ac:spMkLst>
             <pc:docMk/>
             <pc:sldMk cId="1865976428" sldId="283"/>
@@ -830,7 +846,7 @@
           </ac:spMkLst>
         </pc:spChg>
         <pc:spChg chg="mod">
-          <ac:chgData name="Joaquin Badenas" userId="5cb29fd719aebf04" providerId="LiveId" clId="{500FE1CA-8DB6-43A6-98B3-F9E028A878AF}" dt="2024-05-26T23:41:07.760" v="2688"/>
+          <ac:chgData name="Joaquin Badenas" userId="5cb29fd719aebf04" providerId="LiveId" clId="{500FE1CA-8DB6-43A6-98B3-F9E028A878AF}" dt="2024-06-20T23:49:50.220" v="3815" actId="2711"/>
           <ac:spMkLst>
             <pc:docMk/>
             <pc:sldMk cId="1865976428" sldId="283"/>
@@ -838,14 +854,14 @@
           </ac:spMkLst>
         </pc:spChg>
       </pc:sldChg>
-      <pc:sldChg chg="modSp">
-        <pc:chgData name="Joaquin Badenas" userId="5cb29fd719aebf04" providerId="LiveId" clId="{500FE1CA-8DB6-43A6-98B3-F9E028A878AF}" dt="2024-05-26T23:41:07.760" v="2688"/>
+      <pc:sldChg chg="modSp mod">
+        <pc:chgData name="Joaquin Badenas" userId="5cb29fd719aebf04" providerId="LiveId" clId="{500FE1CA-8DB6-43A6-98B3-F9E028A878AF}" dt="2024-06-20T23:48:54.447" v="3804" actId="2711"/>
         <pc:sldMkLst>
           <pc:docMk/>
           <pc:sldMk cId="4259607718" sldId="284"/>
         </pc:sldMkLst>
         <pc:spChg chg="mod">
-          <ac:chgData name="Joaquin Badenas" userId="5cb29fd719aebf04" providerId="LiveId" clId="{500FE1CA-8DB6-43A6-98B3-F9E028A878AF}" dt="2024-05-26T23:41:07.760" v="2688"/>
+          <ac:chgData name="Joaquin Badenas" userId="5cb29fd719aebf04" providerId="LiveId" clId="{500FE1CA-8DB6-43A6-98B3-F9E028A878AF}" dt="2024-06-20T23:48:54.447" v="3804" actId="2711"/>
           <ac:spMkLst>
             <pc:docMk/>
             <pc:sldMk cId="4259607718" sldId="284"/>
@@ -853,7 +869,7 @@
           </ac:spMkLst>
         </pc:spChg>
         <pc:spChg chg="mod">
-          <ac:chgData name="Joaquin Badenas" userId="5cb29fd719aebf04" providerId="LiveId" clId="{500FE1CA-8DB6-43A6-98B3-F9E028A878AF}" dt="2024-05-26T23:41:07.760" v="2688"/>
+          <ac:chgData name="Joaquin Badenas" userId="5cb29fd719aebf04" providerId="LiveId" clId="{500FE1CA-8DB6-43A6-98B3-F9E028A878AF}" dt="2024-06-20T23:48:54.447" v="3804" actId="2711"/>
           <ac:spMkLst>
             <pc:docMk/>
             <pc:sldMk cId="4259607718" sldId="284"/>
@@ -861,60 +877,276 @@
           </ac:spMkLst>
         </pc:spChg>
       </pc:sldChg>
-      <pc:sldChg chg="modSp">
-        <pc:chgData name="Joaquin Badenas" userId="5cb29fd719aebf04" providerId="LiveId" clId="{500FE1CA-8DB6-43A6-98B3-F9E028A878AF}" dt="2024-05-26T23:41:07.760" v="2688"/>
+      <pc:sldChg chg="addSp delSp modSp mod setBg">
+        <pc:chgData name="Joaquin Badenas" userId="5cb29fd719aebf04" providerId="LiveId" clId="{500FE1CA-8DB6-43A6-98B3-F9E028A878AF}" dt="2024-06-21T07:49:06.611" v="4047" actId="167"/>
         <pc:sldMkLst>
           <pc:docMk/>
           <pc:sldMk cId="2068048871" sldId="285"/>
         </pc:sldMkLst>
         <pc:spChg chg="mod">
-          <ac:chgData name="Joaquin Badenas" userId="5cb29fd719aebf04" providerId="LiveId" clId="{500FE1CA-8DB6-43A6-98B3-F9E028A878AF}" dt="2024-05-26T23:41:07.760" v="2688"/>
+          <ac:chgData name="Joaquin Badenas" userId="5cb29fd719aebf04" providerId="LiveId" clId="{500FE1CA-8DB6-43A6-98B3-F9E028A878AF}" dt="2024-06-20T23:53:50.733" v="3841" actId="2711"/>
           <ac:spMkLst>
             <pc:docMk/>
             <pc:sldMk cId="2068048871" sldId="285"/>
             <ac:spMk id="2" creationId="{EBE8F3B4-CC3D-4466-40E2-5BC28DD8DF66}"/>
           </ac:spMkLst>
         </pc:spChg>
-        <pc:spChg chg="mod">
-          <ac:chgData name="Joaquin Badenas" userId="5cb29fd719aebf04" providerId="LiveId" clId="{500FE1CA-8DB6-43A6-98B3-F9E028A878AF}" dt="2024-05-26T23:41:07.760" v="2688"/>
+        <pc:spChg chg="del mod">
+          <ac:chgData name="Joaquin Badenas" userId="5cb29fd719aebf04" providerId="LiveId" clId="{500FE1CA-8DB6-43A6-98B3-F9E028A878AF}" dt="2024-06-20T23:50:47.841" v="3818" actId="478"/>
           <ac:spMkLst>
             <pc:docMk/>
             <pc:sldMk cId="2068048871" sldId="285"/>
             <ac:spMk id="3" creationId="{5B68399D-040E-72E1-5BE1-82559BC616F7}"/>
           </ac:spMkLst>
         </pc:spChg>
+        <pc:spChg chg="add mod">
+          <ac:chgData name="Joaquin Badenas" userId="5cb29fd719aebf04" providerId="LiveId" clId="{500FE1CA-8DB6-43A6-98B3-F9E028A878AF}" dt="2024-06-20T23:54:41.607" v="3888" actId="207"/>
+          <ac:spMkLst>
+            <pc:docMk/>
+            <pc:sldMk cId="2068048871" sldId="285"/>
+            <ac:spMk id="4" creationId="{5B069E1F-AA9E-4E42-2862-805AEF54F22E}"/>
+          </ac:spMkLst>
+        </pc:spChg>
+        <pc:spChg chg="add mod">
+          <ac:chgData name="Joaquin Badenas" userId="5cb29fd719aebf04" providerId="LiveId" clId="{500FE1CA-8DB6-43A6-98B3-F9E028A878AF}" dt="2024-06-20T23:59:08.581" v="3991" actId="408"/>
+          <ac:spMkLst>
+            <pc:docMk/>
+            <pc:sldMk cId="2068048871" sldId="285"/>
+            <ac:spMk id="5" creationId="{25A672D9-19B1-39E5-8AE6-0704EDA667E7}"/>
+          </ac:spMkLst>
+        </pc:spChg>
+        <pc:spChg chg="add mod">
+          <ac:chgData name="Joaquin Badenas" userId="5cb29fd719aebf04" providerId="LiveId" clId="{500FE1CA-8DB6-43A6-98B3-F9E028A878AF}" dt="2024-06-20T23:59:08.581" v="3991" actId="408"/>
+          <ac:spMkLst>
+            <pc:docMk/>
+            <pc:sldMk cId="2068048871" sldId="285"/>
+            <ac:spMk id="6" creationId="{F32B7551-97F8-55AF-3CBA-CF904CFC5EC3}"/>
+          </ac:spMkLst>
+        </pc:spChg>
+        <pc:spChg chg="add mod">
+          <ac:chgData name="Joaquin Badenas" userId="5cb29fd719aebf04" providerId="LiveId" clId="{500FE1CA-8DB6-43A6-98B3-F9E028A878AF}" dt="2024-06-20T23:59:08.581" v="3991" actId="408"/>
+          <ac:spMkLst>
+            <pc:docMk/>
+            <pc:sldMk cId="2068048871" sldId="285"/>
+            <ac:spMk id="7" creationId="{ACECDDAF-3F12-5135-6B56-256185038AD5}"/>
+          </ac:spMkLst>
+        </pc:spChg>
+        <pc:spChg chg="add mod">
+          <ac:chgData name="Joaquin Badenas" userId="5cb29fd719aebf04" providerId="LiveId" clId="{500FE1CA-8DB6-43A6-98B3-F9E028A878AF}" dt="2024-06-20T23:59:08.581" v="3991" actId="408"/>
+          <ac:spMkLst>
+            <pc:docMk/>
+            <pc:sldMk cId="2068048871" sldId="285"/>
+            <ac:spMk id="8" creationId="{E2588A0F-81E7-91C8-EDB3-4299A5CE7D73}"/>
+          </ac:spMkLst>
+        </pc:spChg>
+        <pc:spChg chg="add del mod">
+          <ac:chgData name="Joaquin Badenas" userId="5cb29fd719aebf04" providerId="LiveId" clId="{500FE1CA-8DB6-43A6-98B3-F9E028A878AF}" dt="2024-06-20T23:59:08.581" v="3991" actId="408"/>
+          <ac:spMkLst>
+            <pc:docMk/>
+            <pc:sldMk cId="2068048871" sldId="285"/>
+            <ac:spMk id="10" creationId="{96B49C20-EE08-95CB-CBF5-224631B0F3B3}"/>
+          </ac:spMkLst>
+        </pc:spChg>
+        <pc:spChg chg="add mod">
+          <ac:chgData name="Joaquin Badenas" userId="5cb29fd719aebf04" providerId="LiveId" clId="{500FE1CA-8DB6-43A6-98B3-F9E028A878AF}" dt="2024-06-20T23:59:08.581" v="3991" actId="408"/>
+          <ac:spMkLst>
+            <pc:docMk/>
+            <pc:sldMk cId="2068048871" sldId="285"/>
+            <ac:spMk id="11" creationId="{65D80A68-3C75-14AA-8384-9EFAD7AC32BE}"/>
+          </ac:spMkLst>
+        </pc:spChg>
+        <pc:spChg chg="add mod">
+          <ac:chgData name="Joaquin Badenas" userId="5cb29fd719aebf04" providerId="LiveId" clId="{500FE1CA-8DB6-43A6-98B3-F9E028A878AF}" dt="2024-06-20T23:59:08.581" v="3991" actId="408"/>
+          <ac:spMkLst>
+            <pc:docMk/>
+            <pc:sldMk cId="2068048871" sldId="285"/>
+            <ac:spMk id="12" creationId="{57493470-57DD-87D3-4817-6959EFF4A3B3}"/>
+          </ac:spMkLst>
+        </pc:spChg>
+        <pc:spChg chg="add mod">
+          <ac:chgData name="Joaquin Badenas" userId="5cb29fd719aebf04" providerId="LiveId" clId="{500FE1CA-8DB6-43A6-98B3-F9E028A878AF}" dt="2024-06-20T23:59:19.809" v="3999" actId="20577"/>
+          <ac:spMkLst>
+            <pc:docMk/>
+            <pc:sldMk cId="2068048871" sldId="285"/>
+            <ac:spMk id="13" creationId="{D5E3C2D1-3F0B-ABB4-005E-0227E0891A1A}"/>
+          </ac:spMkLst>
+        </pc:spChg>
+        <pc:spChg chg="add mod">
+          <ac:chgData name="Joaquin Badenas" userId="5cb29fd719aebf04" providerId="LiveId" clId="{500FE1CA-8DB6-43A6-98B3-F9E028A878AF}" dt="2024-06-21T00:10:43.628" v="4007" actId="20577"/>
+          <ac:spMkLst>
+            <pc:docMk/>
+            <pc:sldMk cId="2068048871" sldId="285"/>
+            <ac:spMk id="14" creationId="{99C57AEC-A683-39F9-2286-39654D6231EE}"/>
+          </ac:spMkLst>
+        </pc:spChg>
+        <pc:spChg chg="add mod">
+          <ac:chgData name="Joaquin Badenas" userId="5cb29fd719aebf04" providerId="LiveId" clId="{500FE1CA-8DB6-43A6-98B3-F9E028A878AF}" dt="2024-06-21T00:10:45.831" v="4012" actId="20577"/>
+          <ac:spMkLst>
+            <pc:docMk/>
+            <pc:sldMk cId="2068048871" sldId="285"/>
+            <ac:spMk id="15" creationId="{69B5E3E2-C3E1-5964-947E-C0B230424594}"/>
+          </ac:spMkLst>
+        </pc:spChg>
+        <pc:spChg chg="add mod">
+          <ac:chgData name="Joaquin Badenas" userId="5cb29fd719aebf04" providerId="LiveId" clId="{500FE1CA-8DB6-43A6-98B3-F9E028A878AF}" dt="2024-06-21T00:10:47.713" v="4017" actId="20577"/>
+          <ac:spMkLst>
+            <pc:docMk/>
+            <pc:sldMk cId="2068048871" sldId="285"/>
+            <ac:spMk id="16" creationId="{B23CD1CF-428F-B035-41A2-2DC4F206E92A}"/>
+          </ac:spMkLst>
+        </pc:spChg>
+        <pc:grpChg chg="add mod">
+          <ac:chgData name="Joaquin Badenas" userId="5cb29fd719aebf04" providerId="LiveId" clId="{500FE1CA-8DB6-43A6-98B3-F9E028A878AF}" dt="2024-06-20T23:57:30.287" v="3963" actId="164"/>
+          <ac:grpSpMkLst>
+            <pc:docMk/>
+            <pc:sldMk cId="2068048871" sldId="285"/>
+            <ac:grpSpMk id="9" creationId="{108A4C2D-7F9C-E890-DCFA-7E7326DF9296}"/>
+          </ac:grpSpMkLst>
+        </pc:grpChg>
+        <pc:cxnChg chg="add del mod">
+          <ac:chgData name="Joaquin Badenas" userId="5cb29fd719aebf04" providerId="LiveId" clId="{500FE1CA-8DB6-43A6-98B3-F9E028A878AF}" dt="2024-06-21T07:47:56.215" v="4035" actId="478"/>
+          <ac:cxnSpMkLst>
+            <pc:docMk/>
+            <pc:sldMk cId="2068048871" sldId="285"/>
+            <ac:cxnSpMk id="9" creationId="{86FD57E6-E267-D536-DB76-046D23863AF1}"/>
+          </ac:cxnSpMkLst>
+        </pc:cxnChg>
+        <pc:cxnChg chg="add">
+          <ac:chgData name="Joaquin Badenas" userId="5cb29fd719aebf04" providerId="LiveId" clId="{500FE1CA-8DB6-43A6-98B3-F9E028A878AF}" dt="2024-06-21T00:11:02.395" v="4018" actId="11529"/>
+          <ac:cxnSpMkLst>
+            <pc:docMk/>
+            <pc:sldMk cId="2068048871" sldId="285"/>
+            <ac:cxnSpMk id="18" creationId="{49482C3D-18DE-9E2C-54DB-B78C80EEAA27}"/>
+          </ac:cxnSpMkLst>
+        </pc:cxnChg>
+        <pc:cxnChg chg="add mod">
+          <ac:chgData name="Joaquin Badenas" userId="5cb29fd719aebf04" providerId="LiveId" clId="{500FE1CA-8DB6-43A6-98B3-F9E028A878AF}" dt="2024-06-21T00:11:06.770" v="4020" actId="1076"/>
+          <ac:cxnSpMkLst>
+            <pc:docMk/>
+            <pc:sldMk cId="2068048871" sldId="285"/>
+            <ac:cxnSpMk id="19" creationId="{46AB4415-2061-9EC5-B5B7-B64742E3AA4E}"/>
+          </ac:cxnSpMkLst>
+        </pc:cxnChg>
+        <pc:cxnChg chg="add mod">
+          <ac:chgData name="Joaquin Badenas" userId="5cb29fd719aebf04" providerId="LiveId" clId="{500FE1CA-8DB6-43A6-98B3-F9E028A878AF}" dt="2024-06-21T00:11:12.568" v="4022" actId="1076"/>
+          <ac:cxnSpMkLst>
+            <pc:docMk/>
+            <pc:sldMk cId="2068048871" sldId="285"/>
+            <ac:cxnSpMk id="20" creationId="{FC8D4CDD-DC03-770B-75D5-C63C770062C1}"/>
+          </ac:cxnSpMkLst>
+        </pc:cxnChg>
+        <pc:cxnChg chg="add mod">
+          <ac:chgData name="Joaquin Badenas" userId="5cb29fd719aebf04" providerId="LiveId" clId="{500FE1CA-8DB6-43A6-98B3-F9E028A878AF}" dt="2024-06-21T00:11:17.667" v="4024" actId="1076"/>
+          <ac:cxnSpMkLst>
+            <pc:docMk/>
+            <pc:sldMk cId="2068048871" sldId="285"/>
+            <ac:cxnSpMk id="21" creationId="{29347006-1694-F5BB-C98C-8E7C76256CC3}"/>
+          </ac:cxnSpMkLst>
+        </pc:cxnChg>
+        <pc:cxnChg chg="add mod">
+          <ac:chgData name="Joaquin Badenas" userId="5cb29fd719aebf04" providerId="LiveId" clId="{500FE1CA-8DB6-43A6-98B3-F9E028A878AF}" dt="2024-06-21T00:11:21.948" v="4026" actId="1076"/>
+          <ac:cxnSpMkLst>
+            <pc:docMk/>
+            <pc:sldMk cId="2068048871" sldId="285"/>
+            <ac:cxnSpMk id="22" creationId="{EBC94AC5-CC38-C644-2765-81F360177EE2}"/>
+          </ac:cxnSpMkLst>
+        </pc:cxnChg>
+        <pc:cxnChg chg="add mod">
+          <ac:chgData name="Joaquin Badenas" userId="5cb29fd719aebf04" providerId="LiveId" clId="{500FE1CA-8DB6-43A6-98B3-F9E028A878AF}" dt="2024-06-21T00:11:25.806" v="4028" actId="1076"/>
+          <ac:cxnSpMkLst>
+            <pc:docMk/>
+            <pc:sldMk cId="2068048871" sldId="285"/>
+            <ac:cxnSpMk id="23" creationId="{2C674408-5137-F462-4DA8-1952784CC6F4}"/>
+          </ac:cxnSpMkLst>
+        </pc:cxnChg>
+        <pc:cxnChg chg="add mod">
+          <ac:chgData name="Joaquin Badenas" userId="5cb29fd719aebf04" providerId="LiveId" clId="{500FE1CA-8DB6-43A6-98B3-F9E028A878AF}" dt="2024-06-21T00:11:30.071" v="4030" actId="1076"/>
+          <ac:cxnSpMkLst>
+            <pc:docMk/>
+            <pc:sldMk cId="2068048871" sldId="285"/>
+            <ac:cxnSpMk id="24" creationId="{2F25C0BF-594E-409D-A257-1C591B2F7D9F}"/>
+          </ac:cxnSpMkLst>
+        </pc:cxnChg>
+        <pc:cxnChg chg="add del mod">
+          <ac:chgData name="Joaquin Badenas" userId="5cb29fd719aebf04" providerId="LiveId" clId="{500FE1CA-8DB6-43A6-98B3-F9E028A878AF}" dt="2024-06-21T07:47:54.346" v="4034" actId="11529"/>
+          <ac:cxnSpMkLst>
+            <pc:docMk/>
+            <pc:sldMk cId="2068048871" sldId="285"/>
+            <ac:cxnSpMk id="26" creationId="{7B95DFB1-23B9-1046-8698-8A31BAF0F5F0}"/>
+          </ac:cxnSpMkLst>
+        </pc:cxnChg>
+        <pc:cxnChg chg="add">
+          <ac:chgData name="Joaquin Badenas" userId="5cb29fd719aebf04" providerId="LiveId" clId="{500FE1CA-8DB6-43A6-98B3-F9E028A878AF}" dt="2024-06-21T07:48:15.887" v="4036" actId="11529"/>
+          <ac:cxnSpMkLst>
+            <pc:docMk/>
+            <pc:sldMk cId="2068048871" sldId="285"/>
+            <ac:cxnSpMk id="28" creationId="{D7211393-211D-D411-F1FC-563CAFD64E96}"/>
+          </ac:cxnSpMkLst>
+        </pc:cxnChg>
+        <pc:cxnChg chg="add mod ord">
+          <ac:chgData name="Joaquin Badenas" userId="5cb29fd719aebf04" providerId="LiveId" clId="{500FE1CA-8DB6-43A6-98B3-F9E028A878AF}" dt="2024-06-21T07:48:36.294" v="4041" actId="167"/>
+          <ac:cxnSpMkLst>
+            <pc:docMk/>
+            <pc:sldMk cId="2068048871" sldId="285"/>
+            <ac:cxnSpMk id="29" creationId="{40E08647-8363-9237-C04B-E646A0661A90}"/>
+          </ac:cxnSpMkLst>
+        </pc:cxnChg>
+        <pc:cxnChg chg="add">
+          <ac:chgData name="Joaquin Badenas" userId="5cb29fd719aebf04" providerId="LiveId" clId="{500FE1CA-8DB6-43A6-98B3-F9E028A878AF}" dt="2024-06-21T07:48:49.660" v="4042" actId="11529"/>
+          <ac:cxnSpMkLst>
+            <pc:docMk/>
+            <pc:sldMk cId="2068048871" sldId="285"/>
+            <ac:cxnSpMk id="32" creationId="{A31A99A4-8E4F-5862-5138-4B05D3257B85}"/>
+          </ac:cxnSpMkLst>
+        </pc:cxnChg>
+        <pc:cxnChg chg="add mod ord">
+          <ac:chgData name="Joaquin Badenas" userId="5cb29fd719aebf04" providerId="LiveId" clId="{500FE1CA-8DB6-43A6-98B3-F9E028A878AF}" dt="2024-06-21T07:49:06.611" v="4047" actId="167"/>
+          <ac:cxnSpMkLst>
+            <pc:docMk/>
+            <pc:sldMk cId="2068048871" sldId="285"/>
+            <ac:cxnSpMk id="33" creationId="{BF872366-236C-78D6-DF62-1E279E24CF2D}"/>
+          </ac:cxnSpMkLst>
+        </pc:cxnChg>
       </pc:sldChg>
-      <pc:sldChg chg="modSp">
-        <pc:chgData name="Joaquin Badenas" userId="5cb29fd719aebf04" providerId="LiveId" clId="{500FE1CA-8DB6-43A6-98B3-F9E028A878AF}" dt="2024-05-26T23:41:07.760" v="2688"/>
+      <pc:sldChg chg="addSp delSp modSp mod">
+        <pc:chgData name="Joaquin Badenas" userId="5cb29fd719aebf04" providerId="LiveId" clId="{500FE1CA-8DB6-43A6-98B3-F9E028A878AF}" dt="2024-06-20T23:52:30.156" v="3820" actId="478"/>
         <pc:sldMkLst>
           <pc:docMk/>
           <pc:sldMk cId="4107252191" sldId="286"/>
         </pc:sldMkLst>
         <pc:spChg chg="mod">
-          <ac:chgData name="Joaquin Badenas" userId="5cb29fd719aebf04" providerId="LiveId" clId="{500FE1CA-8DB6-43A6-98B3-F9E028A878AF}" dt="2024-05-26T23:41:07.760" v="2688"/>
+          <ac:chgData name="Joaquin Badenas" userId="5cb29fd719aebf04" providerId="LiveId" clId="{500FE1CA-8DB6-43A6-98B3-F9E028A878AF}" dt="2024-06-20T23:49:04.131" v="3806" actId="2711"/>
           <ac:spMkLst>
             <pc:docMk/>
             <pc:sldMk cId="4107252191" sldId="286"/>
             <ac:spMk id="2" creationId="{EBE8F3B4-CC3D-4466-40E2-5BC28DD8DF66}"/>
           </ac:spMkLst>
         </pc:spChg>
-        <pc:spChg chg="mod">
-          <ac:chgData name="Joaquin Badenas" userId="5cb29fd719aebf04" providerId="LiveId" clId="{500FE1CA-8DB6-43A6-98B3-F9E028A878AF}" dt="2024-05-26T23:41:07.760" v="2688"/>
+        <pc:spChg chg="del mod">
+          <ac:chgData name="Joaquin Badenas" userId="5cb29fd719aebf04" providerId="LiveId" clId="{500FE1CA-8DB6-43A6-98B3-F9E028A878AF}" dt="2024-06-20T23:46:22.691" v="3764" actId="478"/>
           <ac:spMkLst>
             <pc:docMk/>
             <pc:sldMk cId="4107252191" sldId="286"/>
             <ac:spMk id="3" creationId="{5B68399D-040E-72E1-5BE1-82559BC616F7}"/>
           </ac:spMkLst>
         </pc:spChg>
+        <pc:spChg chg="add del mod">
+          <ac:chgData name="Joaquin Badenas" userId="5cb29fd719aebf04" providerId="LiveId" clId="{500FE1CA-8DB6-43A6-98B3-F9E028A878AF}" dt="2024-06-20T23:52:30.156" v="3820" actId="478"/>
+          <ac:spMkLst>
+            <pc:docMk/>
+            <pc:sldMk cId="4107252191" sldId="286"/>
+            <ac:spMk id="4" creationId="{0FC669A8-4BA5-FCD6-81C8-351FBCF00119}"/>
+          </ac:spMkLst>
+        </pc:spChg>
       </pc:sldChg>
       <pc:sldChg chg="addSp delSp modSp mod">
-        <pc:chgData name="Joaquin Badenas" userId="5cb29fd719aebf04" providerId="LiveId" clId="{500FE1CA-8DB6-43A6-98B3-F9E028A878AF}" dt="2024-05-26T23:41:07.760" v="2688"/>
+        <pc:chgData name="Joaquin Badenas" userId="5cb29fd719aebf04" providerId="LiveId" clId="{500FE1CA-8DB6-43A6-98B3-F9E028A878AF}" dt="2024-06-20T23:49:15.165" v="3808" actId="2711"/>
         <pc:sldMkLst>
           <pc:docMk/>
           <pc:sldMk cId="2462060945" sldId="287"/>
         </pc:sldMkLst>
         <pc:spChg chg="mod">
-          <ac:chgData name="Joaquin Badenas" userId="5cb29fd719aebf04" providerId="LiveId" clId="{500FE1CA-8DB6-43A6-98B3-F9E028A878AF}" dt="2024-05-26T23:41:07.760" v="2688"/>
+          <ac:chgData name="Joaquin Badenas" userId="5cb29fd719aebf04" providerId="LiveId" clId="{500FE1CA-8DB6-43A6-98B3-F9E028A878AF}" dt="2024-06-20T23:49:15.165" v="3808" actId="2711"/>
           <ac:spMkLst>
             <pc:docMk/>
             <pc:sldMk cId="2462060945" sldId="287"/>
@@ -930,7 +1162,7 @@
           </ac:spMkLst>
         </pc:spChg>
         <pc:picChg chg="add mod">
-          <ac:chgData name="Joaquin Badenas" userId="5cb29fd719aebf04" providerId="LiveId" clId="{500FE1CA-8DB6-43A6-98B3-F9E028A878AF}" dt="2024-05-26T23:41:07.760" v="2688"/>
+          <ac:chgData name="Joaquin Badenas" userId="5cb29fd719aebf04" providerId="LiveId" clId="{500FE1CA-8DB6-43A6-98B3-F9E028A878AF}" dt="2024-06-20T23:49:15.165" v="3808" actId="2711"/>
           <ac:picMkLst>
             <pc:docMk/>
             <pc:sldMk cId="2462060945" sldId="287"/>
@@ -939,13 +1171,13 @@
         </pc:picChg>
       </pc:sldChg>
       <pc:sldChg chg="modSp mod">
-        <pc:chgData name="Joaquin Badenas" userId="5cb29fd719aebf04" providerId="LiveId" clId="{500FE1CA-8DB6-43A6-98B3-F9E028A878AF}" dt="2024-06-10T21:21:26.466" v="3400" actId="20577"/>
+        <pc:chgData name="Joaquin Badenas" userId="5cb29fd719aebf04" providerId="LiveId" clId="{500FE1CA-8DB6-43A6-98B3-F9E028A878AF}" dt="2024-06-20T23:48:03.126" v="3795" actId="2711"/>
         <pc:sldMkLst>
           <pc:docMk/>
           <pc:sldMk cId="4117868110" sldId="288"/>
         </pc:sldMkLst>
         <pc:spChg chg="mod">
-          <ac:chgData name="Joaquin Badenas" userId="5cb29fd719aebf04" providerId="LiveId" clId="{500FE1CA-8DB6-43A6-98B3-F9E028A878AF}" dt="2024-05-26T23:41:07.760" v="2688"/>
+          <ac:chgData name="Joaquin Badenas" userId="5cb29fd719aebf04" providerId="LiveId" clId="{500FE1CA-8DB6-43A6-98B3-F9E028A878AF}" dt="2024-06-20T23:48:03.126" v="3795" actId="2711"/>
           <ac:spMkLst>
             <pc:docMk/>
             <pc:sldMk cId="4117868110" sldId="288"/>
@@ -953,7 +1185,7 @@
           </ac:spMkLst>
         </pc:spChg>
         <pc:spChg chg="mod">
-          <ac:chgData name="Joaquin Badenas" userId="5cb29fd719aebf04" providerId="LiveId" clId="{500FE1CA-8DB6-43A6-98B3-F9E028A878AF}" dt="2024-06-10T21:21:26.466" v="3400" actId="20577"/>
+          <ac:chgData name="Joaquin Badenas" userId="5cb29fd719aebf04" providerId="LiveId" clId="{500FE1CA-8DB6-43A6-98B3-F9E028A878AF}" dt="2024-06-20T23:48:03.126" v="3795" actId="2711"/>
           <ac:spMkLst>
             <pc:docMk/>
             <pc:sldMk cId="4117868110" sldId="288"/>
@@ -962,13 +1194,13 @@
         </pc:spChg>
       </pc:sldChg>
       <pc:sldChg chg="addSp modSp add mod ord">
-        <pc:chgData name="Joaquin Badenas" userId="5cb29fd719aebf04" providerId="LiveId" clId="{500FE1CA-8DB6-43A6-98B3-F9E028A878AF}" dt="2024-05-26T23:41:07.760" v="2688"/>
+        <pc:chgData name="Joaquin Badenas" userId="5cb29fd719aebf04" providerId="LiveId" clId="{500FE1CA-8DB6-43A6-98B3-F9E028A878AF}" dt="2024-06-20T23:49:09.757" v="3807" actId="2711"/>
         <pc:sldMkLst>
           <pc:docMk/>
           <pc:sldMk cId="3446630041" sldId="289"/>
         </pc:sldMkLst>
         <pc:spChg chg="mod">
-          <ac:chgData name="Joaquin Badenas" userId="5cb29fd719aebf04" providerId="LiveId" clId="{500FE1CA-8DB6-43A6-98B3-F9E028A878AF}" dt="2024-05-26T23:41:07.760" v="2688"/>
+          <ac:chgData name="Joaquin Badenas" userId="5cb29fd719aebf04" providerId="LiveId" clId="{500FE1CA-8DB6-43A6-98B3-F9E028A878AF}" dt="2024-06-20T23:49:09.757" v="3807" actId="2711"/>
           <ac:spMkLst>
             <pc:docMk/>
             <pc:sldMk cId="3446630041" sldId="289"/>
@@ -976,7 +1208,7 @@
           </ac:spMkLst>
         </pc:spChg>
         <pc:spChg chg="mod">
-          <ac:chgData name="Joaquin Badenas" userId="5cb29fd719aebf04" providerId="LiveId" clId="{500FE1CA-8DB6-43A6-98B3-F9E028A878AF}" dt="2024-05-26T23:41:07.760" v="2688"/>
+          <ac:chgData name="Joaquin Badenas" userId="5cb29fd719aebf04" providerId="LiveId" clId="{500FE1CA-8DB6-43A6-98B3-F9E028A878AF}" dt="2024-06-20T23:49:09.757" v="3807" actId="2711"/>
           <ac:spMkLst>
             <pc:docMk/>
             <pc:sldMk cId="3446630041" sldId="289"/>
@@ -984,7 +1216,7 @@
           </ac:spMkLst>
         </pc:spChg>
         <pc:picChg chg="add mod">
-          <ac:chgData name="Joaquin Badenas" userId="5cb29fd719aebf04" providerId="LiveId" clId="{500FE1CA-8DB6-43A6-98B3-F9E028A878AF}" dt="2024-05-19T22:31:59.892" v="45" actId="1076"/>
+          <ac:chgData name="Joaquin Badenas" userId="5cb29fd719aebf04" providerId="LiveId" clId="{500FE1CA-8DB6-43A6-98B3-F9E028A878AF}" dt="2024-06-20T23:49:09.757" v="3807" actId="2711"/>
           <ac:picMkLst>
             <pc:docMk/>
             <pc:sldMk cId="3446630041" sldId="289"/>
@@ -993,13 +1225,13 @@
         </pc:picChg>
       </pc:sldChg>
       <pc:sldChg chg="addSp delSp modSp add mod">
-        <pc:chgData name="Joaquin Badenas" userId="5cb29fd719aebf04" providerId="LiveId" clId="{500FE1CA-8DB6-43A6-98B3-F9E028A878AF}" dt="2024-05-26T23:41:07.760" v="2688"/>
+        <pc:chgData name="Joaquin Badenas" userId="5cb29fd719aebf04" providerId="LiveId" clId="{500FE1CA-8DB6-43A6-98B3-F9E028A878AF}" dt="2024-06-20T23:49:19.262" v="3809" actId="2711"/>
         <pc:sldMkLst>
           <pc:docMk/>
           <pc:sldMk cId="3303625023" sldId="290"/>
         </pc:sldMkLst>
         <pc:spChg chg="mod">
-          <ac:chgData name="Joaquin Badenas" userId="5cb29fd719aebf04" providerId="LiveId" clId="{500FE1CA-8DB6-43A6-98B3-F9E028A878AF}" dt="2024-05-26T23:41:07.760" v="2688"/>
+          <ac:chgData name="Joaquin Badenas" userId="5cb29fd719aebf04" providerId="LiveId" clId="{500FE1CA-8DB6-43A6-98B3-F9E028A878AF}" dt="2024-06-20T23:49:19.262" v="3809" actId="2711"/>
           <ac:spMkLst>
             <pc:docMk/>
             <pc:sldMk cId="3303625023" sldId="290"/>
@@ -1007,7 +1239,7 @@
           </ac:spMkLst>
         </pc:spChg>
         <pc:spChg chg="add mod">
-          <ac:chgData name="Joaquin Badenas" userId="5cb29fd719aebf04" providerId="LiveId" clId="{500FE1CA-8DB6-43A6-98B3-F9E028A878AF}" dt="2024-05-26T23:41:07.760" v="2688"/>
+          <ac:chgData name="Joaquin Badenas" userId="5cb29fd719aebf04" providerId="LiveId" clId="{500FE1CA-8DB6-43A6-98B3-F9E028A878AF}" dt="2024-06-20T23:49:19.262" v="3809" actId="2711"/>
           <ac:spMkLst>
             <pc:docMk/>
             <pc:sldMk cId="3303625023" sldId="290"/>
@@ -1023,7 +1255,7 @@
           </ac:picMkLst>
         </pc:picChg>
         <pc:picChg chg="add mod">
-          <ac:chgData name="Joaquin Badenas" userId="5cb29fd719aebf04" providerId="LiveId" clId="{500FE1CA-8DB6-43A6-98B3-F9E028A878AF}" dt="2024-05-19T22:35:09.131" v="73" actId="1076"/>
+          <ac:chgData name="Joaquin Badenas" userId="5cb29fd719aebf04" providerId="LiveId" clId="{500FE1CA-8DB6-43A6-98B3-F9E028A878AF}" dt="2024-06-20T23:49:19.262" v="3809" actId="2711"/>
           <ac:picMkLst>
             <pc:docMk/>
             <pc:sldMk cId="3303625023" sldId="290"/>
@@ -1548,7 +1780,7 @@
           <a:p>
             <a:fld id="{57E58380-3550-4AA1-8DE5-F8A856B30F15}" type="datetimeFigureOut">
               <a:rPr lang="en-NZ" smtClean="0"/>
-              <a:t>11/06/2024</a:t>
+              <a:t>21/06/2024</a:t>
             </a:fld>
             <a:endParaRPr lang="en-NZ"/>
           </a:p>
@@ -1776,7 +2008,7 @@
           <a:p>
             <a:fld id="{57E58380-3550-4AA1-8DE5-F8A856B30F15}" type="datetimeFigureOut">
               <a:rPr lang="en-NZ" smtClean="0"/>
-              <a:t>11/06/2024</a:t>
+              <a:t>21/06/2024</a:t>
             </a:fld>
             <a:endParaRPr lang="en-NZ"/>
           </a:p>
@@ -1956,7 +2188,7 @@
           <a:p>
             <a:fld id="{57E58380-3550-4AA1-8DE5-F8A856B30F15}" type="datetimeFigureOut">
               <a:rPr lang="en-NZ" smtClean="0"/>
-              <a:t>11/06/2024</a:t>
+              <a:t>21/06/2024</a:t>
             </a:fld>
             <a:endParaRPr lang="en-NZ"/>
           </a:p>
@@ -2126,7 +2358,7 @@
           <a:p>
             <a:fld id="{57E58380-3550-4AA1-8DE5-F8A856B30F15}" type="datetimeFigureOut">
               <a:rPr lang="en-NZ" smtClean="0"/>
-              <a:t>11/06/2024</a:t>
+              <a:t>21/06/2024</a:t>
             </a:fld>
             <a:endParaRPr lang="en-NZ"/>
           </a:p>
@@ -2380,7 +2612,7 @@
           <a:p>
             <a:fld id="{57E58380-3550-4AA1-8DE5-F8A856B30F15}" type="datetimeFigureOut">
               <a:rPr lang="en-NZ" smtClean="0"/>
-              <a:t>11/06/2024</a:t>
+              <a:t>21/06/2024</a:t>
             </a:fld>
             <a:endParaRPr lang="en-NZ"/>
           </a:p>
@@ -2706,7 +2938,7 @@
           <a:p>
             <a:fld id="{57E58380-3550-4AA1-8DE5-F8A856B30F15}" type="datetimeFigureOut">
               <a:rPr lang="en-NZ" smtClean="0"/>
-              <a:t>11/06/2024</a:t>
+              <a:t>21/06/2024</a:t>
             </a:fld>
             <a:endParaRPr lang="en-NZ"/>
           </a:p>
@@ -3157,7 +3389,7 @@
           <a:p>
             <a:fld id="{57E58380-3550-4AA1-8DE5-F8A856B30F15}" type="datetimeFigureOut">
               <a:rPr lang="en-NZ" smtClean="0"/>
-              <a:t>11/06/2024</a:t>
+              <a:t>21/06/2024</a:t>
             </a:fld>
             <a:endParaRPr lang="en-NZ"/>
           </a:p>
@@ -3275,7 +3507,7 @@
           <a:p>
             <a:fld id="{57E58380-3550-4AA1-8DE5-F8A856B30F15}" type="datetimeFigureOut">
               <a:rPr lang="en-NZ" smtClean="0"/>
-              <a:t>11/06/2024</a:t>
+              <a:t>21/06/2024</a:t>
             </a:fld>
             <a:endParaRPr lang="en-NZ"/>
           </a:p>
@@ -3370,7 +3602,7 @@
           <a:p>
             <a:fld id="{57E58380-3550-4AA1-8DE5-F8A856B30F15}" type="datetimeFigureOut">
               <a:rPr lang="en-NZ" smtClean="0"/>
-              <a:t>11/06/2024</a:t>
+              <a:t>21/06/2024</a:t>
             </a:fld>
             <a:endParaRPr lang="en-NZ"/>
           </a:p>
@@ -3657,7 +3889,7 @@
           <a:p>
             <a:fld id="{57E58380-3550-4AA1-8DE5-F8A856B30F15}" type="datetimeFigureOut">
               <a:rPr lang="en-NZ" smtClean="0"/>
-              <a:t>11/06/2024</a:t>
+              <a:t>21/06/2024</a:t>
             </a:fld>
             <a:endParaRPr lang="en-NZ"/>
           </a:p>
@@ -3979,7 +4211,7 @@
           <a:p>
             <a:fld id="{57E58380-3550-4AA1-8DE5-F8A856B30F15}" type="datetimeFigureOut">
               <a:rPr lang="en-NZ" smtClean="0"/>
-              <a:t>11/06/2024</a:t>
+              <a:t>21/06/2024</a:t>
             </a:fld>
             <a:endParaRPr lang="en-NZ"/>
           </a:p>
@@ -4233,7 +4465,7 @@
           <a:p>
             <a:fld id="{57E58380-3550-4AA1-8DE5-F8A856B30F15}" type="datetimeFigureOut">
               <a:rPr lang="en-NZ" smtClean="0"/>
-              <a:t>11/06/2024</a:t>
+              <a:t>21/06/2024</a:t>
             </a:fld>
             <a:endParaRPr lang="en-NZ"/>
           </a:p>
@@ -4739,10 +4971,14 @@
           <a:lstStyle/>
           <a:p>
             <a:r>
-              <a:rPr lang="en-US" dirty="0"/>
+              <a:rPr lang="en-US" dirty="0">
+                <a:latin typeface="Abadi" panose="020B0604020104020204" pitchFamily="34" charset="0"/>
+              </a:rPr>
               <a:t>Use complex techniques to develop a digital media outcome</a:t>
             </a:r>
-            <a:endParaRPr lang="en-NZ" dirty="0"/>
+            <a:endParaRPr lang="en-NZ" dirty="0">
+              <a:latin typeface="Abadi" panose="020B0604020104020204" pitchFamily="34" charset="0"/>
+            </a:endParaRPr>
           </a:p>
         </p:txBody>
       </p:sp>
@@ -5064,7 +5300,9 @@
           <a:lstStyle/>
           <a:p>
             <a:r>
-              <a:rPr lang="en-NZ" dirty="0"/>
+              <a:rPr lang="en-NZ" dirty="0">
+                <a:latin typeface="Abadi" panose="020B0604020104020204" pitchFamily="34" charset="0"/>
+              </a:rPr>
               <a:t>Relevant Implications -Usability</a:t>
             </a:r>
           </a:p>
@@ -5092,13 +5330,17 @@
           <a:lstStyle/>
           <a:p>
             <a:r>
-              <a:rPr lang="en-NZ" dirty="0"/>
+              <a:rPr lang="en-NZ" dirty="0">
+                <a:latin typeface="Abadi" panose="020B0604020104020204" pitchFamily="34" charset="0"/>
+              </a:rPr>
               <a:t>Implication 3</a:t>
             </a:r>
           </a:p>
           <a:p>
             <a:r>
-              <a:rPr lang="en-NZ" dirty="0"/>
+              <a:rPr lang="en-NZ" dirty="0">
+                <a:latin typeface="Abadi" panose="020B0604020104020204" pitchFamily="34" charset="0"/>
+              </a:rPr>
               <a:t>Describe the implication?</a:t>
             </a:r>
           </a:p>
@@ -5107,13 +5349,17 @@
               <a:buNone/>
             </a:pPr>
             <a:r>
-              <a:rPr lang="en-NZ" dirty="0"/>
+              <a:rPr lang="en-NZ" dirty="0">
+                <a:latin typeface="Abadi" panose="020B0604020104020204" pitchFamily="34" charset="0"/>
+              </a:rPr>
               <a:t>Usability is about how straightforward it is for a person to be able to use my website. It ensures that my website is not difficult or confusing to navigate.</a:t>
             </a:r>
           </a:p>
           <a:p>
             <a:r>
-              <a:rPr lang="en-NZ" dirty="0"/>
+              <a:rPr lang="en-NZ" dirty="0">
+                <a:latin typeface="Abadi" panose="020B0604020104020204" pitchFamily="34" charset="0"/>
+              </a:rPr>
               <a:t>How does this apply to your project?</a:t>
             </a:r>
           </a:p>
@@ -5122,18 +5368,26 @@
               <a:buNone/>
             </a:pPr>
             <a:r>
-              <a:rPr lang="en-NZ" dirty="0"/>
+              <a:rPr lang="en-NZ" dirty="0">
+                <a:latin typeface="Abadi" panose="020B0604020104020204" pitchFamily="34" charset="0"/>
+              </a:rPr>
               <a:t>My site will be a blog post forum for </a:t>
             </a:r>
             <a:r>
-              <a:rPr lang="en-NZ"/>
+              <a:rPr lang="en-NZ">
+                <a:latin typeface="Abadi" panose="020B0604020104020204" pitchFamily="34" charset="0"/>
+              </a:rPr>
               <a:t>students where they can </a:t>
             </a:r>
-            <a:endParaRPr lang="en-NZ" dirty="0"/>
-          </a:p>
-          <a:p>
-            <a:r>
-              <a:rPr lang="en-NZ" dirty="0"/>
+            <a:endParaRPr lang="en-NZ" dirty="0">
+              <a:latin typeface="Abadi" panose="020B0604020104020204" pitchFamily="34" charset="0"/>
+            </a:endParaRPr>
+          </a:p>
+          <a:p>
+            <a:r>
+              <a:rPr lang="en-NZ" dirty="0">
+                <a:latin typeface="Abadi" panose="020B0604020104020204" pitchFamily="34" charset="0"/>
+              </a:rPr>
               <a:t>How do you plan to address this implication?</a:t>
             </a:r>
           </a:p>
@@ -5193,13 +5447,15 @@
             <a:r>
               <a:rPr lang="en-NZ" sz="4800" dirty="0">
                 <a:effectLst/>
-                <a:latin typeface="Calibri" panose="020F0502020204030204" pitchFamily="34" charset="0"/>
+                <a:latin typeface="Abadi" panose="020B0604020104020204" pitchFamily="34" charset="0"/>
                 <a:ea typeface="Calibri" panose="020F0502020204030204" pitchFamily="34" charset="0"/>
                 <a:cs typeface="Times New Roman" panose="02020603050405020304" pitchFamily="18" charset="0"/>
               </a:rPr>
               <a:t>User Experience Principles </a:t>
             </a:r>
-            <a:endParaRPr lang="en-NZ" dirty="0"/>
+            <a:endParaRPr lang="en-NZ" dirty="0">
+              <a:latin typeface="Abadi" panose="020B0604020104020204" pitchFamily="34" charset="0"/>
+            </a:endParaRPr>
           </a:p>
         </p:txBody>
       </p:sp>
@@ -5225,12 +5481,16 @@
           <a:lstStyle/>
           <a:p>
             <a:r>
-              <a:rPr lang="en-NZ" dirty="0"/>
+              <a:rPr lang="en-NZ" dirty="0">
+                <a:latin typeface="Abadi" panose="020B0604020104020204" pitchFamily="34" charset="0"/>
+              </a:rPr>
               <a:t>Describe the most relevant HCI rules</a:t>
             </a:r>
           </a:p>
           <a:p>
-            <a:endParaRPr lang="en-NZ" dirty="0"/>
+            <a:endParaRPr lang="en-NZ" dirty="0">
+              <a:latin typeface="Abadi" panose="020B0604020104020204" pitchFamily="34" charset="0"/>
+            </a:endParaRPr>
           </a:p>
         </p:txBody>
       </p:sp>
@@ -5323,7 +5583,9 @@
           <a:lstStyle/>
           <a:p>
             <a:r>
-              <a:rPr lang="en-NZ" sz="2800" dirty="0"/>
+              <a:rPr lang="en-NZ" sz="2800" dirty="0">
+                <a:latin typeface="Abadi" panose="020B0604020104020204" pitchFamily="34" charset="0"/>
+              </a:rPr>
               <a:t>HCI</a:t>
             </a:r>
           </a:p>
@@ -5350,7 +5612,9 @@
               <a:buNone/>
             </a:pPr>
             <a:r>
-              <a:rPr lang="en-NZ" sz="2000" dirty="0"/>
+              <a:rPr lang="en-NZ" sz="2000" dirty="0">
+                <a:latin typeface="Abadi" panose="020B0604020104020204" pitchFamily="34" charset="0"/>
+              </a:rPr>
               <a:t>Summarise the most relevant usability rules and how they apply to your project (duplicate slide)</a:t>
             </a:r>
           </a:p>
@@ -5404,7 +5668,9 @@
           <a:lstStyle/>
           <a:p>
             <a:r>
-              <a:rPr lang="en-NZ" sz="2800" dirty="0"/>
+              <a:rPr lang="en-NZ" sz="2800" dirty="0">
+                <a:latin typeface="Abadi" panose="020B0604020104020204" pitchFamily="34" charset="0"/>
+              </a:rPr>
               <a:t>Relevant Conventions</a:t>
             </a:r>
           </a:p>
@@ -5431,7 +5697,9 @@
               <a:buNone/>
             </a:pPr>
             <a:r>
-              <a:rPr lang="en-NZ" sz="2000" dirty="0"/>
+              <a:rPr lang="en-NZ" sz="2000" dirty="0">
+                <a:latin typeface="Abadi" panose="020B0604020104020204" pitchFamily="34" charset="0"/>
+              </a:rPr>
               <a:t>These could include:</a:t>
             </a:r>
           </a:p>
@@ -5440,7 +5708,9 @@
               <a:buNone/>
             </a:pPr>
             <a:r>
-              <a:rPr lang="en-NZ" sz="1800" dirty="0"/>
+              <a:rPr lang="en-NZ" sz="1800" dirty="0">
+                <a:latin typeface="Abadi" panose="020B0604020104020204" pitchFamily="34" charset="0"/>
+              </a:rPr>
               <a:t>Coding conventions – HTML, CSS (validated)</a:t>
             </a:r>
           </a:p>
@@ -5449,7 +5719,9 @@
               <a:buNone/>
             </a:pPr>
             <a:r>
-              <a:rPr lang="en-NZ" sz="1800" dirty="0"/>
+              <a:rPr lang="en-NZ" sz="1800" dirty="0">
+                <a:latin typeface="Abadi" panose="020B0604020104020204" pitchFamily="34" charset="0"/>
+              </a:rPr>
               <a:t>Coding conventions – Python (PEP8)</a:t>
             </a:r>
           </a:p>
@@ -5458,7 +5730,9 @@
               <a:buNone/>
             </a:pPr>
             <a:r>
-              <a:rPr lang="en-NZ" sz="1800" dirty="0"/>
+              <a:rPr lang="en-NZ" sz="1800" dirty="0">
+                <a:latin typeface="Abadi" panose="020B0604020104020204" pitchFamily="34" charset="0"/>
+              </a:rPr>
               <a:t>File Naming  and file management</a:t>
             </a:r>
           </a:p>
@@ -5467,7 +5741,9 @@
               <a:buNone/>
             </a:pPr>
             <a:r>
-              <a:rPr lang="en-NZ" sz="1800" dirty="0"/>
+              <a:rPr lang="en-NZ" sz="1800" dirty="0">
+                <a:latin typeface="Abadi" panose="020B0604020104020204" pitchFamily="34" charset="0"/>
+              </a:rPr>
               <a:t>Web design conventions</a:t>
             </a:r>
           </a:p>
@@ -5476,21 +5752,29 @@
               <a:buNone/>
             </a:pPr>
             <a:r>
-              <a:rPr lang="en-US" sz="1800" dirty="0"/>
+              <a:rPr lang="en-US" sz="1800" dirty="0">
+                <a:latin typeface="Abadi" panose="020B0604020104020204" pitchFamily="34" charset="0"/>
+              </a:rPr>
               <a:t>C</a:t>
             </a:r>
             <a:r>
-              <a:rPr lang="en-NZ" sz="1800" dirty="0" err="1"/>
+              <a:rPr lang="en-NZ" sz="1800" dirty="0" err="1">
+                <a:latin typeface="Abadi" panose="020B0604020104020204" pitchFamily="34" charset="0"/>
+              </a:rPr>
               <a:t>ommenting</a:t>
             </a:r>
-            <a:endParaRPr lang="en-NZ" sz="1800" dirty="0"/>
+            <a:endParaRPr lang="en-NZ" sz="1800" dirty="0">
+              <a:latin typeface="Abadi" panose="020B0604020104020204" pitchFamily="34" charset="0"/>
+            </a:endParaRPr>
           </a:p>
           <a:p>
             <a:pPr marL="0" indent="0">
               <a:buNone/>
             </a:pPr>
             <a:r>
-              <a:rPr lang="en-NZ" sz="1800" dirty="0"/>
+              <a:rPr lang="en-NZ" sz="1800" dirty="0">
+                <a:latin typeface="Abadi" panose="020B0604020104020204" pitchFamily="34" charset="0"/>
+              </a:rPr>
               <a:t>Usability Heuristics</a:t>
             </a:r>
           </a:p>
@@ -5499,7 +5783,9 @@
               <a:buNone/>
             </a:pPr>
             <a:r>
-              <a:rPr lang="en-NZ" sz="1800" dirty="0"/>
+              <a:rPr lang="en-NZ" sz="1800" dirty="0">
+                <a:latin typeface="Abadi" panose="020B0604020104020204" pitchFamily="34" charset="0"/>
+              </a:rPr>
               <a:t>Visual Hierarchy</a:t>
             </a:r>
           </a:p>
@@ -5507,7 +5793,9 @@
             <a:pPr marL="0" indent="0">
               <a:buNone/>
             </a:pPr>
-            <a:endParaRPr lang="en-NZ" dirty="0"/>
+            <a:endParaRPr lang="en-NZ" dirty="0">
+              <a:latin typeface="Abadi" panose="020B0604020104020204" pitchFamily="34" charset="0"/>
+            </a:endParaRPr>
           </a:p>
         </p:txBody>
       </p:sp>
@@ -5563,10 +5851,14 @@
           <a:lstStyle/>
           <a:p>
             <a:r>
-              <a:rPr lang="en-NZ" sz="4800" dirty="0"/>
+              <a:rPr lang="en-NZ" sz="4800" dirty="0">
+                <a:latin typeface="Abadi" panose="020B0604020104020204" pitchFamily="34" charset="0"/>
+              </a:rPr>
               <a:t>Relevant Conventions</a:t>
             </a:r>
-            <a:endParaRPr lang="en-NZ" dirty="0"/>
+            <a:endParaRPr lang="en-NZ" dirty="0">
+              <a:latin typeface="Abadi" panose="020B0604020104020204" pitchFamily="34" charset="0"/>
+            </a:endParaRPr>
           </a:p>
         </p:txBody>
       </p:sp>
@@ -5595,7 +5887,9 @@
               <a:buNone/>
             </a:pPr>
             <a:r>
-              <a:rPr lang="en-NZ" sz="2000" dirty="0"/>
+              <a:rPr lang="en-NZ" sz="2000" dirty="0">
+                <a:latin typeface="Abadi" panose="020B0604020104020204" pitchFamily="34" charset="0"/>
+              </a:rPr>
               <a:t>Discuss how you plan to apply relevant conventions to improve the quality of your outcome.</a:t>
             </a:r>
           </a:p>
@@ -5631,6 +5925,83 @@
           <a:chExt cx="0" cy="0"/>
         </a:xfrm>
       </p:grpSpPr>
+      <p:cxnSp>
+        <p:nvCxnSpPr>
+          <p:cNvPr id="33" name="Connector: Elbow 32">
+            <a:extLst>
+              <a:ext uri="{FF2B5EF4-FFF2-40B4-BE49-F238E27FC236}">
+                <a16:creationId xmlns:a16="http://schemas.microsoft.com/office/drawing/2014/main" id="{BF872366-236C-78D6-DF62-1E279E24CF2D}"/>
+              </a:ext>
+            </a:extLst>
+          </p:cNvPr>
+          <p:cNvCxnSpPr>
+            <a:cxnSpLocks/>
+            <a:endCxn id="8" idx="0"/>
+          </p:cNvCxnSpPr>
+          <p:nvPr/>
+        </p:nvCxnSpPr>
+        <p:spPr>
+          <a:xfrm>
+            <a:off x="5652991" y="2719069"/>
+            <a:ext cx="3493294" cy="175897"/>
+          </a:xfrm>
+          <a:prstGeom prst="bentConnector2">
+            <a:avLst/>
+          </a:prstGeom>
+        </p:spPr>
+        <p:style>
+          <a:lnRef idx="1">
+            <a:schemeClr val="accent1"/>
+          </a:lnRef>
+          <a:fillRef idx="0">
+            <a:schemeClr val="accent1"/>
+          </a:fillRef>
+          <a:effectRef idx="0">
+            <a:schemeClr val="accent1"/>
+          </a:effectRef>
+          <a:fontRef idx="minor">
+            <a:schemeClr val="tx1"/>
+          </a:fontRef>
+        </p:style>
+      </p:cxnSp>
+      <p:cxnSp>
+        <p:nvCxnSpPr>
+          <p:cNvPr id="29" name="Connector: Elbow 28">
+            <a:extLst>
+              <a:ext uri="{FF2B5EF4-FFF2-40B4-BE49-F238E27FC236}">
+                <a16:creationId xmlns:a16="http://schemas.microsoft.com/office/drawing/2014/main" id="{40E08647-8363-9237-C04B-E646A0661A90}"/>
+              </a:ext>
+            </a:extLst>
+          </p:cNvPr>
+          <p:cNvCxnSpPr>
+            <a:cxnSpLocks/>
+          </p:cNvCxnSpPr>
+          <p:nvPr/>
+        </p:nvCxnSpPr>
+        <p:spPr>
+          <a:xfrm rot="10800000" flipV="1">
+            <a:off x="2138031" y="2719070"/>
+            <a:ext cx="3493295" cy="341746"/>
+          </a:xfrm>
+          <a:prstGeom prst="bentConnector2">
+            <a:avLst/>
+          </a:prstGeom>
+        </p:spPr>
+        <p:style>
+          <a:lnRef idx="1">
+            <a:schemeClr val="accent1"/>
+          </a:lnRef>
+          <a:fillRef idx="0">
+            <a:schemeClr val="accent1"/>
+          </a:fillRef>
+          <a:effectRef idx="0">
+            <a:schemeClr val="accent1"/>
+          </a:effectRef>
+          <a:fontRef idx="minor">
+            <a:schemeClr val="tx1"/>
+          </a:fontRef>
+        </p:style>
+      </p:cxnSp>
       <p:sp>
         <p:nvSpPr>
           <p:cNvPr id="2" name="Title 1">
@@ -5653,7 +6024,9 @@
           <a:lstStyle/>
           <a:p>
             <a:r>
-              <a:rPr lang="en-NZ" dirty="0"/>
+              <a:rPr lang="en-NZ" dirty="0">
+                <a:latin typeface="Abadi" panose="020B0604020104020204" pitchFamily="34" charset="0"/>
+              </a:rPr>
               <a:t>Design Drawings</a:t>
             </a:r>
           </a:p>
@@ -5661,32 +6034,1081 @@
       </p:sp>
       <p:sp>
         <p:nvSpPr>
-          <p:cNvPr id="3" name="Content Placeholder 2">
+          <p:cNvPr id="4" name="Rectangle: Rounded Corners 3">
             <a:extLst>
               <a:ext uri="{FF2B5EF4-FFF2-40B4-BE49-F238E27FC236}">
-                <a16:creationId xmlns:a16="http://schemas.microsoft.com/office/drawing/2014/main" id="{5B68399D-040E-72E1-5BE1-82559BC616F7}"/>
+                <a16:creationId xmlns:a16="http://schemas.microsoft.com/office/drawing/2014/main" id="{5B069E1F-AA9E-4E42-2862-805AEF54F22E}"/>
               </a:ext>
             </a:extLst>
           </p:cNvPr>
-          <p:cNvSpPr>
-            <a:spLocks noGrp="1"/>
-          </p:cNvSpPr>
-          <p:nvPr>
-            <p:ph idx="1"/>
-          </p:nvPr>
-        </p:nvSpPr>
-        <p:spPr/>
-        <p:txBody>
-          <a:bodyPr/>
+          <p:cNvSpPr/>
+          <p:nvPr/>
+        </p:nvSpPr>
+        <p:spPr>
+          <a:xfrm>
+            <a:off x="1261871" y="2043113"/>
+            <a:ext cx="8782241" cy="500062"/>
+          </a:xfrm>
+          <a:prstGeom prst="roundRect">
+            <a:avLst/>
+          </a:prstGeom>
+          <a:solidFill>
+            <a:schemeClr val="bg2"/>
+          </a:solidFill>
+          <a:ln>
+            <a:solidFill>
+              <a:schemeClr val="tx1"/>
+            </a:solidFill>
+          </a:ln>
+        </p:spPr>
+        <p:style>
+          <a:lnRef idx="2">
+            <a:schemeClr val="accent1">
+              <a:shade val="15000"/>
+            </a:schemeClr>
+          </a:lnRef>
+          <a:fillRef idx="1">
+            <a:schemeClr val="accent1"/>
+          </a:fillRef>
+          <a:effectRef idx="0">
+            <a:schemeClr val="accent1"/>
+          </a:effectRef>
+          <a:fontRef idx="minor">
+            <a:schemeClr val="lt1"/>
+          </a:fontRef>
+        </p:style>
+        <p:txBody>
+          <a:bodyPr rtlCol="0" anchor="ctr"/>
           <a:lstStyle/>
           <a:p>
-            <a:r>
-              <a:rPr lang="en-NZ" dirty="0"/>
-              <a:t>Site Map</a:t>
-            </a:r>
-          </a:p>
-        </p:txBody>
-      </p:sp>
+            <a:pPr algn="ctr"/>
+            <a:r>
+              <a:rPr lang="en-NZ" dirty="0">
+                <a:solidFill>
+                  <a:schemeClr val="tx1"/>
+                </a:solidFill>
+                <a:latin typeface="Abadi" panose="020B0604020104020204" pitchFamily="34" charset="0"/>
+              </a:rPr>
+              <a:t>Home – SMC Forum Website</a:t>
+            </a:r>
+          </a:p>
+        </p:txBody>
+      </p:sp>
+      <p:sp>
+        <p:nvSpPr>
+          <p:cNvPr id="5" name="Rectangle: Rounded Corners 4">
+            <a:extLst>
+              <a:ext uri="{FF2B5EF4-FFF2-40B4-BE49-F238E27FC236}">
+                <a16:creationId xmlns:a16="http://schemas.microsoft.com/office/drawing/2014/main" id="{25A672D9-19B1-39E5-8AE6-0704EDA667E7}"/>
+              </a:ext>
+            </a:extLst>
+          </p:cNvPr>
+          <p:cNvSpPr/>
+          <p:nvPr/>
+        </p:nvSpPr>
+        <p:spPr>
+          <a:xfrm>
+            <a:off x="1261872" y="2894966"/>
+            <a:ext cx="1795653" cy="500062"/>
+          </a:xfrm>
+          <a:prstGeom prst="roundRect">
+            <a:avLst/>
+          </a:prstGeom>
+          <a:solidFill>
+            <a:schemeClr val="bg2"/>
+          </a:solidFill>
+          <a:ln>
+            <a:solidFill>
+              <a:schemeClr val="tx1"/>
+            </a:solidFill>
+          </a:ln>
+        </p:spPr>
+        <p:style>
+          <a:lnRef idx="2">
+            <a:schemeClr val="accent1">
+              <a:shade val="15000"/>
+            </a:schemeClr>
+          </a:lnRef>
+          <a:fillRef idx="1">
+            <a:schemeClr val="accent1"/>
+          </a:fillRef>
+          <a:effectRef idx="0">
+            <a:schemeClr val="accent1"/>
+          </a:effectRef>
+          <a:fontRef idx="minor">
+            <a:schemeClr val="lt1"/>
+          </a:fontRef>
+        </p:style>
+        <p:txBody>
+          <a:bodyPr rtlCol="0" anchor="ctr"/>
+          <a:lstStyle/>
+          <a:p>
+            <a:pPr algn="ctr"/>
+            <a:r>
+              <a:rPr lang="en-NZ" dirty="0">
+                <a:solidFill>
+                  <a:schemeClr val="tx1"/>
+                </a:solidFill>
+                <a:latin typeface="Abadi" panose="020B0604020104020204" pitchFamily="34" charset="0"/>
+              </a:rPr>
+              <a:t>NCEA Level 1</a:t>
+            </a:r>
+          </a:p>
+        </p:txBody>
+      </p:sp>
+      <p:sp>
+        <p:nvSpPr>
+          <p:cNvPr id="6" name="Rectangle: Rounded Corners 5">
+            <a:extLst>
+              <a:ext uri="{FF2B5EF4-FFF2-40B4-BE49-F238E27FC236}">
+                <a16:creationId xmlns:a16="http://schemas.microsoft.com/office/drawing/2014/main" id="{F32B7551-97F8-55AF-3CBA-CF904CFC5EC3}"/>
+              </a:ext>
+            </a:extLst>
+          </p:cNvPr>
+          <p:cNvSpPr/>
+          <p:nvPr/>
+        </p:nvSpPr>
+        <p:spPr>
+          <a:xfrm>
+            <a:off x="3612884" y="2894966"/>
+            <a:ext cx="1795654" cy="500062"/>
+          </a:xfrm>
+          <a:prstGeom prst="roundRect">
+            <a:avLst/>
+          </a:prstGeom>
+          <a:solidFill>
+            <a:schemeClr val="bg2"/>
+          </a:solidFill>
+          <a:ln>
+            <a:solidFill>
+              <a:schemeClr val="tx1"/>
+            </a:solidFill>
+          </a:ln>
+        </p:spPr>
+        <p:style>
+          <a:lnRef idx="2">
+            <a:schemeClr val="accent1">
+              <a:shade val="15000"/>
+            </a:schemeClr>
+          </a:lnRef>
+          <a:fillRef idx="1">
+            <a:schemeClr val="accent1"/>
+          </a:fillRef>
+          <a:effectRef idx="0">
+            <a:schemeClr val="accent1"/>
+          </a:effectRef>
+          <a:fontRef idx="minor">
+            <a:schemeClr val="lt1"/>
+          </a:fontRef>
+        </p:style>
+        <p:txBody>
+          <a:bodyPr rtlCol="0" anchor="ctr"/>
+          <a:lstStyle/>
+          <a:p>
+            <a:pPr algn="ctr"/>
+            <a:r>
+              <a:rPr lang="en-NZ" dirty="0">
+                <a:solidFill>
+                  <a:schemeClr val="tx1"/>
+                </a:solidFill>
+                <a:latin typeface="Abadi" panose="020B0604020104020204" pitchFamily="34" charset="0"/>
+              </a:rPr>
+              <a:t>NCEA Level 2</a:t>
+            </a:r>
+          </a:p>
+        </p:txBody>
+      </p:sp>
+      <p:sp>
+        <p:nvSpPr>
+          <p:cNvPr id="7" name="Rectangle: Rounded Corners 6">
+            <a:extLst>
+              <a:ext uri="{FF2B5EF4-FFF2-40B4-BE49-F238E27FC236}">
+                <a16:creationId xmlns:a16="http://schemas.microsoft.com/office/drawing/2014/main" id="{ACECDDAF-3F12-5135-6B56-256185038AD5}"/>
+              </a:ext>
+            </a:extLst>
+          </p:cNvPr>
+          <p:cNvSpPr/>
+          <p:nvPr/>
+        </p:nvSpPr>
+        <p:spPr>
+          <a:xfrm>
+            <a:off x="5963898" y="2894966"/>
+            <a:ext cx="1795653" cy="500062"/>
+          </a:xfrm>
+          <a:prstGeom prst="roundRect">
+            <a:avLst/>
+          </a:prstGeom>
+          <a:solidFill>
+            <a:schemeClr val="bg2"/>
+          </a:solidFill>
+          <a:ln>
+            <a:solidFill>
+              <a:schemeClr val="tx1"/>
+            </a:solidFill>
+          </a:ln>
+        </p:spPr>
+        <p:style>
+          <a:lnRef idx="2">
+            <a:schemeClr val="accent1">
+              <a:shade val="15000"/>
+            </a:schemeClr>
+          </a:lnRef>
+          <a:fillRef idx="1">
+            <a:schemeClr val="accent1"/>
+          </a:fillRef>
+          <a:effectRef idx="0">
+            <a:schemeClr val="accent1"/>
+          </a:effectRef>
+          <a:fontRef idx="minor">
+            <a:schemeClr val="lt1"/>
+          </a:fontRef>
+        </p:style>
+        <p:txBody>
+          <a:bodyPr rtlCol="0" anchor="ctr"/>
+          <a:lstStyle/>
+          <a:p>
+            <a:pPr algn="ctr"/>
+            <a:r>
+              <a:rPr lang="en-NZ" dirty="0">
+                <a:solidFill>
+                  <a:schemeClr val="tx1"/>
+                </a:solidFill>
+                <a:latin typeface="Abadi" panose="020B0604020104020204" pitchFamily="34" charset="0"/>
+              </a:rPr>
+              <a:t>NCEA Level 3</a:t>
+            </a:r>
+          </a:p>
+        </p:txBody>
+      </p:sp>
+      <p:sp>
+        <p:nvSpPr>
+          <p:cNvPr id="8" name="Rectangle: Rounded Corners 7">
+            <a:extLst>
+              <a:ext uri="{FF2B5EF4-FFF2-40B4-BE49-F238E27FC236}">
+                <a16:creationId xmlns:a16="http://schemas.microsoft.com/office/drawing/2014/main" id="{E2588A0F-81E7-91C8-EDB3-4299A5CE7D73}"/>
+              </a:ext>
+            </a:extLst>
+          </p:cNvPr>
+          <p:cNvSpPr/>
+          <p:nvPr/>
+        </p:nvSpPr>
+        <p:spPr>
+          <a:xfrm>
+            <a:off x="8248458" y="2894966"/>
+            <a:ext cx="1795653" cy="500062"/>
+          </a:xfrm>
+          <a:prstGeom prst="roundRect">
+            <a:avLst/>
+          </a:prstGeom>
+          <a:solidFill>
+            <a:schemeClr val="bg2"/>
+          </a:solidFill>
+          <a:ln>
+            <a:solidFill>
+              <a:schemeClr val="tx1"/>
+            </a:solidFill>
+          </a:ln>
+        </p:spPr>
+        <p:style>
+          <a:lnRef idx="2">
+            <a:schemeClr val="accent1">
+              <a:shade val="15000"/>
+            </a:schemeClr>
+          </a:lnRef>
+          <a:fillRef idx="1">
+            <a:schemeClr val="accent1"/>
+          </a:fillRef>
+          <a:effectRef idx="0">
+            <a:schemeClr val="accent1"/>
+          </a:effectRef>
+          <a:fontRef idx="minor">
+            <a:schemeClr val="lt1"/>
+          </a:fontRef>
+        </p:style>
+        <p:txBody>
+          <a:bodyPr rtlCol="0" anchor="ctr"/>
+          <a:lstStyle/>
+          <a:p>
+            <a:pPr algn="ctr"/>
+            <a:r>
+              <a:rPr lang="en-NZ" dirty="0">
+                <a:solidFill>
+                  <a:schemeClr val="tx1"/>
+                </a:solidFill>
+                <a:latin typeface="Abadi" panose="020B0604020104020204" pitchFamily="34" charset="0"/>
+              </a:rPr>
+              <a:t>Account</a:t>
+            </a:r>
+          </a:p>
+        </p:txBody>
+      </p:sp>
+      <p:sp>
+        <p:nvSpPr>
+          <p:cNvPr id="10" name="Rectangle: Rounded Corners 9">
+            <a:extLst>
+              <a:ext uri="{FF2B5EF4-FFF2-40B4-BE49-F238E27FC236}">
+                <a16:creationId xmlns:a16="http://schemas.microsoft.com/office/drawing/2014/main" id="{96B49C20-EE08-95CB-CBF5-224631B0F3B3}"/>
+              </a:ext>
+            </a:extLst>
+          </p:cNvPr>
+          <p:cNvSpPr/>
+          <p:nvPr/>
+        </p:nvSpPr>
+        <p:spPr>
+          <a:xfrm>
+            <a:off x="1261872" y="3743261"/>
+            <a:ext cx="1795653" cy="500062"/>
+          </a:xfrm>
+          <a:prstGeom prst="roundRect">
+            <a:avLst/>
+          </a:prstGeom>
+          <a:solidFill>
+            <a:schemeClr val="bg2"/>
+          </a:solidFill>
+          <a:ln>
+            <a:solidFill>
+              <a:schemeClr val="tx1"/>
+            </a:solidFill>
+          </a:ln>
+        </p:spPr>
+        <p:style>
+          <a:lnRef idx="2">
+            <a:schemeClr val="accent1">
+              <a:shade val="15000"/>
+            </a:schemeClr>
+          </a:lnRef>
+          <a:fillRef idx="1">
+            <a:schemeClr val="accent1"/>
+          </a:fillRef>
+          <a:effectRef idx="0">
+            <a:schemeClr val="accent1"/>
+          </a:effectRef>
+          <a:fontRef idx="minor">
+            <a:schemeClr val="lt1"/>
+          </a:fontRef>
+        </p:style>
+        <p:txBody>
+          <a:bodyPr rtlCol="0" anchor="ctr"/>
+          <a:lstStyle/>
+          <a:p>
+            <a:pPr algn="ctr"/>
+            <a:r>
+              <a:rPr lang="en-NZ" dirty="0">
+                <a:solidFill>
+                  <a:schemeClr val="tx1"/>
+                </a:solidFill>
+                <a:latin typeface="Abadi" panose="020B0604020104020204" pitchFamily="34" charset="0"/>
+              </a:rPr>
+              <a:t>Subjects</a:t>
+            </a:r>
+          </a:p>
+        </p:txBody>
+      </p:sp>
+      <p:sp>
+        <p:nvSpPr>
+          <p:cNvPr id="11" name="Rectangle: Rounded Corners 10">
+            <a:extLst>
+              <a:ext uri="{FF2B5EF4-FFF2-40B4-BE49-F238E27FC236}">
+                <a16:creationId xmlns:a16="http://schemas.microsoft.com/office/drawing/2014/main" id="{65D80A68-3C75-14AA-8384-9EFAD7AC32BE}"/>
+              </a:ext>
+            </a:extLst>
+          </p:cNvPr>
+          <p:cNvSpPr/>
+          <p:nvPr/>
+        </p:nvSpPr>
+        <p:spPr>
+          <a:xfrm>
+            <a:off x="3612884" y="3743261"/>
+            <a:ext cx="1795653" cy="500062"/>
+          </a:xfrm>
+          <a:prstGeom prst="roundRect">
+            <a:avLst/>
+          </a:prstGeom>
+          <a:solidFill>
+            <a:schemeClr val="bg2"/>
+          </a:solidFill>
+          <a:ln>
+            <a:solidFill>
+              <a:schemeClr val="tx1"/>
+            </a:solidFill>
+          </a:ln>
+        </p:spPr>
+        <p:style>
+          <a:lnRef idx="2">
+            <a:schemeClr val="accent1">
+              <a:shade val="15000"/>
+            </a:schemeClr>
+          </a:lnRef>
+          <a:fillRef idx="1">
+            <a:schemeClr val="accent1"/>
+          </a:fillRef>
+          <a:effectRef idx="0">
+            <a:schemeClr val="accent1"/>
+          </a:effectRef>
+          <a:fontRef idx="minor">
+            <a:schemeClr val="lt1"/>
+          </a:fontRef>
+        </p:style>
+        <p:txBody>
+          <a:bodyPr rtlCol="0" anchor="ctr"/>
+          <a:lstStyle/>
+          <a:p>
+            <a:pPr algn="ctr"/>
+            <a:r>
+              <a:rPr lang="en-NZ" dirty="0">
+                <a:solidFill>
+                  <a:schemeClr val="tx1"/>
+                </a:solidFill>
+                <a:latin typeface="Abadi" panose="020B0604020104020204" pitchFamily="34" charset="0"/>
+              </a:rPr>
+              <a:t>Subjects</a:t>
+            </a:r>
+          </a:p>
+        </p:txBody>
+      </p:sp>
+      <p:sp>
+        <p:nvSpPr>
+          <p:cNvPr id="12" name="Rectangle: Rounded Corners 11">
+            <a:extLst>
+              <a:ext uri="{FF2B5EF4-FFF2-40B4-BE49-F238E27FC236}">
+                <a16:creationId xmlns:a16="http://schemas.microsoft.com/office/drawing/2014/main" id="{57493470-57DD-87D3-4817-6959EFF4A3B3}"/>
+              </a:ext>
+            </a:extLst>
+          </p:cNvPr>
+          <p:cNvSpPr/>
+          <p:nvPr/>
+        </p:nvSpPr>
+        <p:spPr>
+          <a:xfrm>
+            <a:off x="5963898" y="3743261"/>
+            <a:ext cx="1795653" cy="500062"/>
+          </a:xfrm>
+          <a:prstGeom prst="roundRect">
+            <a:avLst/>
+          </a:prstGeom>
+          <a:solidFill>
+            <a:schemeClr val="bg2"/>
+          </a:solidFill>
+          <a:ln>
+            <a:solidFill>
+              <a:schemeClr val="tx1"/>
+            </a:solidFill>
+          </a:ln>
+        </p:spPr>
+        <p:style>
+          <a:lnRef idx="2">
+            <a:schemeClr val="accent1">
+              <a:shade val="15000"/>
+            </a:schemeClr>
+          </a:lnRef>
+          <a:fillRef idx="1">
+            <a:schemeClr val="accent1"/>
+          </a:fillRef>
+          <a:effectRef idx="0">
+            <a:schemeClr val="accent1"/>
+          </a:effectRef>
+          <a:fontRef idx="minor">
+            <a:schemeClr val="lt1"/>
+          </a:fontRef>
+        </p:style>
+        <p:txBody>
+          <a:bodyPr rtlCol="0" anchor="ctr"/>
+          <a:lstStyle/>
+          <a:p>
+            <a:pPr algn="ctr"/>
+            <a:r>
+              <a:rPr lang="en-NZ" dirty="0">
+                <a:solidFill>
+                  <a:schemeClr val="tx1"/>
+                </a:solidFill>
+                <a:latin typeface="Abadi" panose="020B0604020104020204" pitchFamily="34" charset="0"/>
+              </a:rPr>
+              <a:t>Subjects</a:t>
+            </a:r>
+          </a:p>
+        </p:txBody>
+      </p:sp>
+      <p:sp>
+        <p:nvSpPr>
+          <p:cNvPr id="13" name="Rectangle: Rounded Corners 12">
+            <a:extLst>
+              <a:ext uri="{FF2B5EF4-FFF2-40B4-BE49-F238E27FC236}">
+                <a16:creationId xmlns:a16="http://schemas.microsoft.com/office/drawing/2014/main" id="{D5E3C2D1-3F0B-ABB4-005E-0227E0891A1A}"/>
+              </a:ext>
+            </a:extLst>
+          </p:cNvPr>
+          <p:cNvSpPr/>
+          <p:nvPr/>
+        </p:nvSpPr>
+        <p:spPr>
+          <a:xfrm>
+            <a:off x="8248459" y="3743261"/>
+            <a:ext cx="1795653" cy="500062"/>
+          </a:xfrm>
+          <a:prstGeom prst="roundRect">
+            <a:avLst/>
+          </a:prstGeom>
+          <a:solidFill>
+            <a:schemeClr val="bg2"/>
+          </a:solidFill>
+          <a:ln>
+            <a:solidFill>
+              <a:schemeClr val="tx1"/>
+            </a:solidFill>
+          </a:ln>
+        </p:spPr>
+        <p:style>
+          <a:lnRef idx="2">
+            <a:schemeClr val="accent1">
+              <a:shade val="15000"/>
+            </a:schemeClr>
+          </a:lnRef>
+          <a:fillRef idx="1">
+            <a:schemeClr val="accent1"/>
+          </a:fillRef>
+          <a:effectRef idx="0">
+            <a:schemeClr val="accent1"/>
+          </a:effectRef>
+          <a:fontRef idx="minor">
+            <a:schemeClr val="lt1"/>
+          </a:fontRef>
+        </p:style>
+        <p:txBody>
+          <a:bodyPr rtlCol="0" anchor="ctr"/>
+          <a:lstStyle/>
+          <a:p>
+            <a:pPr algn="ctr"/>
+            <a:r>
+              <a:rPr lang="en-NZ" dirty="0">
+                <a:solidFill>
+                  <a:schemeClr val="tx1"/>
+                </a:solidFill>
+                <a:latin typeface="Abadi" panose="020B0604020104020204" pitchFamily="34" charset="0"/>
+              </a:rPr>
+              <a:t>Settings</a:t>
+            </a:r>
+          </a:p>
+        </p:txBody>
+      </p:sp>
+      <p:sp>
+        <p:nvSpPr>
+          <p:cNvPr id="14" name="Rectangle: Rounded Corners 13">
+            <a:extLst>
+              <a:ext uri="{FF2B5EF4-FFF2-40B4-BE49-F238E27FC236}">
+                <a16:creationId xmlns:a16="http://schemas.microsoft.com/office/drawing/2014/main" id="{99C57AEC-A683-39F9-2286-39654D6231EE}"/>
+              </a:ext>
+            </a:extLst>
+          </p:cNvPr>
+          <p:cNvSpPr/>
+          <p:nvPr/>
+        </p:nvSpPr>
+        <p:spPr>
+          <a:xfrm>
+            <a:off x="1261872" y="4591556"/>
+            <a:ext cx="1795653" cy="500062"/>
+          </a:xfrm>
+          <a:prstGeom prst="roundRect">
+            <a:avLst/>
+          </a:prstGeom>
+          <a:solidFill>
+            <a:schemeClr val="bg2"/>
+          </a:solidFill>
+          <a:ln>
+            <a:solidFill>
+              <a:schemeClr val="tx1"/>
+            </a:solidFill>
+          </a:ln>
+        </p:spPr>
+        <p:style>
+          <a:lnRef idx="2">
+            <a:schemeClr val="accent1">
+              <a:shade val="15000"/>
+            </a:schemeClr>
+          </a:lnRef>
+          <a:fillRef idx="1">
+            <a:schemeClr val="accent1"/>
+          </a:fillRef>
+          <a:effectRef idx="0">
+            <a:schemeClr val="accent1"/>
+          </a:effectRef>
+          <a:fontRef idx="minor">
+            <a:schemeClr val="lt1"/>
+          </a:fontRef>
+        </p:style>
+        <p:txBody>
+          <a:bodyPr rtlCol="0" anchor="ctr"/>
+          <a:lstStyle/>
+          <a:p>
+            <a:pPr algn="ctr"/>
+            <a:r>
+              <a:rPr lang="en-NZ" dirty="0">
+                <a:solidFill>
+                  <a:schemeClr val="tx1"/>
+                </a:solidFill>
+                <a:latin typeface="Abadi" panose="020B0604020104020204" pitchFamily="34" charset="0"/>
+              </a:rPr>
+              <a:t>Posts</a:t>
+            </a:r>
+          </a:p>
+        </p:txBody>
+      </p:sp>
+      <p:sp>
+        <p:nvSpPr>
+          <p:cNvPr id="15" name="Rectangle: Rounded Corners 14">
+            <a:extLst>
+              <a:ext uri="{FF2B5EF4-FFF2-40B4-BE49-F238E27FC236}">
+                <a16:creationId xmlns:a16="http://schemas.microsoft.com/office/drawing/2014/main" id="{69B5E3E2-C3E1-5964-947E-C0B230424594}"/>
+              </a:ext>
+            </a:extLst>
+          </p:cNvPr>
+          <p:cNvSpPr/>
+          <p:nvPr/>
+        </p:nvSpPr>
+        <p:spPr>
+          <a:xfrm>
+            <a:off x="3612884" y="4591556"/>
+            <a:ext cx="1795653" cy="500062"/>
+          </a:xfrm>
+          <a:prstGeom prst="roundRect">
+            <a:avLst/>
+          </a:prstGeom>
+          <a:solidFill>
+            <a:schemeClr val="bg2"/>
+          </a:solidFill>
+          <a:ln>
+            <a:solidFill>
+              <a:schemeClr val="tx1"/>
+            </a:solidFill>
+          </a:ln>
+        </p:spPr>
+        <p:style>
+          <a:lnRef idx="2">
+            <a:schemeClr val="accent1">
+              <a:shade val="15000"/>
+            </a:schemeClr>
+          </a:lnRef>
+          <a:fillRef idx="1">
+            <a:schemeClr val="accent1"/>
+          </a:fillRef>
+          <a:effectRef idx="0">
+            <a:schemeClr val="accent1"/>
+          </a:effectRef>
+          <a:fontRef idx="minor">
+            <a:schemeClr val="lt1"/>
+          </a:fontRef>
+        </p:style>
+        <p:txBody>
+          <a:bodyPr rtlCol="0" anchor="ctr"/>
+          <a:lstStyle/>
+          <a:p>
+            <a:pPr algn="ctr"/>
+            <a:r>
+              <a:rPr lang="en-NZ" dirty="0">
+                <a:solidFill>
+                  <a:schemeClr val="tx1"/>
+                </a:solidFill>
+                <a:latin typeface="Abadi" panose="020B0604020104020204" pitchFamily="34" charset="0"/>
+              </a:rPr>
+              <a:t>Posts</a:t>
+            </a:r>
+          </a:p>
+        </p:txBody>
+      </p:sp>
+      <p:sp>
+        <p:nvSpPr>
+          <p:cNvPr id="16" name="Rectangle: Rounded Corners 15">
+            <a:extLst>
+              <a:ext uri="{FF2B5EF4-FFF2-40B4-BE49-F238E27FC236}">
+                <a16:creationId xmlns:a16="http://schemas.microsoft.com/office/drawing/2014/main" id="{B23CD1CF-428F-B035-41A2-2DC4F206E92A}"/>
+              </a:ext>
+            </a:extLst>
+          </p:cNvPr>
+          <p:cNvSpPr/>
+          <p:nvPr/>
+        </p:nvSpPr>
+        <p:spPr>
+          <a:xfrm>
+            <a:off x="5963898" y="4591556"/>
+            <a:ext cx="1795653" cy="500062"/>
+          </a:xfrm>
+          <a:prstGeom prst="roundRect">
+            <a:avLst/>
+          </a:prstGeom>
+          <a:solidFill>
+            <a:schemeClr val="bg2"/>
+          </a:solidFill>
+          <a:ln>
+            <a:solidFill>
+              <a:schemeClr val="tx1"/>
+            </a:solidFill>
+          </a:ln>
+        </p:spPr>
+        <p:style>
+          <a:lnRef idx="2">
+            <a:schemeClr val="accent1">
+              <a:shade val="15000"/>
+            </a:schemeClr>
+          </a:lnRef>
+          <a:fillRef idx="1">
+            <a:schemeClr val="accent1"/>
+          </a:fillRef>
+          <a:effectRef idx="0">
+            <a:schemeClr val="accent1"/>
+          </a:effectRef>
+          <a:fontRef idx="minor">
+            <a:schemeClr val="lt1"/>
+          </a:fontRef>
+        </p:style>
+        <p:txBody>
+          <a:bodyPr rtlCol="0" anchor="ctr"/>
+          <a:lstStyle/>
+          <a:p>
+            <a:pPr algn="ctr"/>
+            <a:r>
+              <a:rPr lang="en-NZ" dirty="0">
+                <a:solidFill>
+                  <a:schemeClr val="tx1"/>
+                </a:solidFill>
+                <a:latin typeface="Abadi" panose="020B0604020104020204" pitchFamily="34" charset="0"/>
+              </a:rPr>
+              <a:t>Posts</a:t>
+            </a:r>
+          </a:p>
+        </p:txBody>
+      </p:sp>
+      <p:cxnSp>
+        <p:nvCxnSpPr>
+          <p:cNvPr id="18" name="Straight Connector 17">
+            <a:extLst>
+              <a:ext uri="{FF2B5EF4-FFF2-40B4-BE49-F238E27FC236}">
+                <a16:creationId xmlns:a16="http://schemas.microsoft.com/office/drawing/2014/main" id="{49482C3D-18DE-9E2C-54DB-B78C80EEAA27}"/>
+              </a:ext>
+            </a:extLst>
+          </p:cNvPr>
+          <p:cNvCxnSpPr>
+            <a:stCxn id="5" idx="2"/>
+            <a:endCxn id="10" idx="0"/>
+          </p:cNvCxnSpPr>
+          <p:nvPr/>
+        </p:nvCxnSpPr>
+        <p:spPr>
+          <a:xfrm>
+            <a:off x="2159699" y="3395028"/>
+            <a:ext cx="0" cy="348233"/>
+          </a:xfrm>
+          <a:prstGeom prst="line">
+            <a:avLst/>
+          </a:prstGeom>
+        </p:spPr>
+        <p:style>
+          <a:lnRef idx="1">
+            <a:schemeClr val="accent1"/>
+          </a:lnRef>
+          <a:fillRef idx="0">
+            <a:schemeClr val="accent1"/>
+          </a:fillRef>
+          <a:effectRef idx="0">
+            <a:schemeClr val="accent1"/>
+          </a:effectRef>
+          <a:fontRef idx="minor">
+            <a:schemeClr val="tx1"/>
+          </a:fontRef>
+        </p:style>
+      </p:cxnSp>
+      <p:cxnSp>
+        <p:nvCxnSpPr>
+          <p:cNvPr id="19" name="Straight Connector 18">
+            <a:extLst>
+              <a:ext uri="{FF2B5EF4-FFF2-40B4-BE49-F238E27FC236}">
+                <a16:creationId xmlns:a16="http://schemas.microsoft.com/office/drawing/2014/main" id="{46AB4415-2061-9EC5-B5B7-B64742E3AA4E}"/>
+              </a:ext>
+            </a:extLst>
+          </p:cNvPr>
+          <p:cNvCxnSpPr/>
+          <p:nvPr/>
+        </p:nvCxnSpPr>
+        <p:spPr>
+          <a:xfrm>
+            <a:off x="2138031" y="4243323"/>
+            <a:ext cx="0" cy="348233"/>
+          </a:xfrm>
+          <a:prstGeom prst="line">
+            <a:avLst/>
+          </a:prstGeom>
+        </p:spPr>
+        <p:style>
+          <a:lnRef idx="1">
+            <a:schemeClr val="accent1"/>
+          </a:lnRef>
+          <a:fillRef idx="0">
+            <a:schemeClr val="accent1"/>
+          </a:fillRef>
+          <a:effectRef idx="0">
+            <a:schemeClr val="accent1"/>
+          </a:effectRef>
+          <a:fontRef idx="minor">
+            <a:schemeClr val="tx1"/>
+          </a:fontRef>
+        </p:style>
+      </p:cxnSp>
+      <p:cxnSp>
+        <p:nvCxnSpPr>
+          <p:cNvPr id="20" name="Straight Connector 19">
+            <a:extLst>
+              <a:ext uri="{FF2B5EF4-FFF2-40B4-BE49-F238E27FC236}">
+                <a16:creationId xmlns:a16="http://schemas.microsoft.com/office/drawing/2014/main" id="{FC8D4CDD-DC03-770B-75D5-C63C770062C1}"/>
+              </a:ext>
+            </a:extLst>
+          </p:cNvPr>
+          <p:cNvCxnSpPr/>
+          <p:nvPr/>
+        </p:nvCxnSpPr>
+        <p:spPr>
+          <a:xfrm>
+            <a:off x="4528664" y="4243323"/>
+            <a:ext cx="0" cy="348233"/>
+          </a:xfrm>
+          <a:prstGeom prst="line">
+            <a:avLst/>
+          </a:prstGeom>
+        </p:spPr>
+        <p:style>
+          <a:lnRef idx="1">
+            <a:schemeClr val="accent1"/>
+          </a:lnRef>
+          <a:fillRef idx="0">
+            <a:schemeClr val="accent1"/>
+          </a:fillRef>
+          <a:effectRef idx="0">
+            <a:schemeClr val="accent1"/>
+          </a:effectRef>
+          <a:fontRef idx="minor">
+            <a:schemeClr val="tx1"/>
+          </a:fontRef>
+        </p:style>
+      </p:cxnSp>
+      <p:cxnSp>
+        <p:nvCxnSpPr>
+          <p:cNvPr id="21" name="Straight Connector 20">
+            <a:extLst>
+              <a:ext uri="{FF2B5EF4-FFF2-40B4-BE49-F238E27FC236}">
+                <a16:creationId xmlns:a16="http://schemas.microsoft.com/office/drawing/2014/main" id="{29347006-1694-F5BB-C98C-8E7C76256CC3}"/>
+              </a:ext>
+            </a:extLst>
+          </p:cNvPr>
+          <p:cNvCxnSpPr/>
+          <p:nvPr/>
+        </p:nvCxnSpPr>
+        <p:spPr>
+          <a:xfrm>
+            <a:off x="4528546" y="3429000"/>
+            <a:ext cx="0" cy="348233"/>
+          </a:xfrm>
+          <a:prstGeom prst="line">
+            <a:avLst/>
+          </a:prstGeom>
+        </p:spPr>
+        <p:style>
+          <a:lnRef idx="1">
+            <a:schemeClr val="accent1"/>
+          </a:lnRef>
+          <a:fillRef idx="0">
+            <a:schemeClr val="accent1"/>
+          </a:fillRef>
+          <a:effectRef idx="0">
+            <a:schemeClr val="accent1"/>
+          </a:effectRef>
+          <a:fontRef idx="minor">
+            <a:schemeClr val="tx1"/>
+          </a:fontRef>
+        </p:style>
+      </p:cxnSp>
+      <p:cxnSp>
+        <p:nvCxnSpPr>
+          <p:cNvPr id="22" name="Straight Connector 21">
+            <a:extLst>
+              <a:ext uri="{FF2B5EF4-FFF2-40B4-BE49-F238E27FC236}">
+                <a16:creationId xmlns:a16="http://schemas.microsoft.com/office/drawing/2014/main" id="{EBC94AC5-CC38-C644-2765-81F360177EE2}"/>
+              </a:ext>
+            </a:extLst>
+          </p:cNvPr>
+          <p:cNvCxnSpPr/>
+          <p:nvPr/>
+        </p:nvCxnSpPr>
+        <p:spPr>
+          <a:xfrm>
+            <a:off x="6878236" y="3395028"/>
+            <a:ext cx="0" cy="348233"/>
+          </a:xfrm>
+          <a:prstGeom prst="line">
+            <a:avLst/>
+          </a:prstGeom>
+        </p:spPr>
+        <p:style>
+          <a:lnRef idx="1">
+            <a:schemeClr val="accent1"/>
+          </a:lnRef>
+          <a:fillRef idx="0">
+            <a:schemeClr val="accent1"/>
+          </a:fillRef>
+          <a:effectRef idx="0">
+            <a:schemeClr val="accent1"/>
+          </a:effectRef>
+          <a:fontRef idx="minor">
+            <a:schemeClr val="tx1"/>
+          </a:fontRef>
+        </p:style>
+      </p:cxnSp>
+      <p:cxnSp>
+        <p:nvCxnSpPr>
+          <p:cNvPr id="23" name="Straight Connector 22">
+            <a:extLst>
+              <a:ext uri="{FF2B5EF4-FFF2-40B4-BE49-F238E27FC236}">
+                <a16:creationId xmlns:a16="http://schemas.microsoft.com/office/drawing/2014/main" id="{2C674408-5137-F462-4DA8-1952784CC6F4}"/>
+              </a:ext>
+            </a:extLst>
+          </p:cNvPr>
+          <p:cNvCxnSpPr/>
+          <p:nvPr/>
+        </p:nvCxnSpPr>
+        <p:spPr>
+          <a:xfrm>
+            <a:off x="6878236" y="4243323"/>
+            <a:ext cx="0" cy="348233"/>
+          </a:xfrm>
+          <a:prstGeom prst="line">
+            <a:avLst/>
+          </a:prstGeom>
+        </p:spPr>
+        <p:style>
+          <a:lnRef idx="1">
+            <a:schemeClr val="accent1"/>
+          </a:lnRef>
+          <a:fillRef idx="0">
+            <a:schemeClr val="accent1"/>
+          </a:fillRef>
+          <a:effectRef idx="0">
+            <a:schemeClr val="accent1"/>
+          </a:effectRef>
+          <a:fontRef idx="minor">
+            <a:schemeClr val="tx1"/>
+          </a:fontRef>
+        </p:style>
+      </p:cxnSp>
+      <p:cxnSp>
+        <p:nvCxnSpPr>
+          <p:cNvPr id="24" name="Straight Connector 23">
+            <a:extLst>
+              <a:ext uri="{FF2B5EF4-FFF2-40B4-BE49-F238E27FC236}">
+                <a16:creationId xmlns:a16="http://schemas.microsoft.com/office/drawing/2014/main" id="{2F25C0BF-594E-409D-A257-1C591B2F7D9F}"/>
+              </a:ext>
+            </a:extLst>
+          </p:cNvPr>
+          <p:cNvCxnSpPr/>
+          <p:nvPr/>
+        </p:nvCxnSpPr>
+        <p:spPr>
+          <a:xfrm>
+            <a:off x="9132392" y="3429000"/>
+            <a:ext cx="0" cy="348233"/>
+          </a:xfrm>
+          <a:prstGeom prst="line">
+            <a:avLst/>
+          </a:prstGeom>
+        </p:spPr>
+        <p:style>
+          <a:lnRef idx="1">
+            <a:schemeClr val="accent1"/>
+          </a:lnRef>
+          <a:fillRef idx="0">
+            <a:schemeClr val="accent1"/>
+          </a:fillRef>
+          <a:effectRef idx="0">
+            <a:schemeClr val="accent1"/>
+          </a:effectRef>
+          <a:fontRef idx="minor">
+            <a:schemeClr val="tx1"/>
+          </a:fontRef>
+        </p:style>
+      </p:cxnSp>
+      <p:cxnSp>
+        <p:nvCxnSpPr>
+          <p:cNvPr id="28" name="Connector: Elbow 27">
+            <a:extLst>
+              <a:ext uri="{FF2B5EF4-FFF2-40B4-BE49-F238E27FC236}">
+                <a16:creationId xmlns:a16="http://schemas.microsoft.com/office/drawing/2014/main" id="{D7211393-211D-D411-F1FC-563CAFD64E96}"/>
+              </a:ext>
+            </a:extLst>
+          </p:cNvPr>
+          <p:cNvCxnSpPr>
+            <a:stCxn id="4" idx="2"/>
+            <a:endCxn id="6" idx="0"/>
+          </p:cNvCxnSpPr>
+          <p:nvPr/>
+        </p:nvCxnSpPr>
+        <p:spPr>
+          <a:xfrm rot="5400000">
+            <a:off x="4905957" y="2147930"/>
+            <a:ext cx="351791" cy="1142281"/>
+          </a:xfrm>
+          <a:prstGeom prst="bentConnector3">
+            <a:avLst/>
+          </a:prstGeom>
+        </p:spPr>
+        <p:style>
+          <a:lnRef idx="1">
+            <a:schemeClr val="accent1"/>
+          </a:lnRef>
+          <a:fillRef idx="0">
+            <a:schemeClr val="accent1"/>
+          </a:fillRef>
+          <a:effectRef idx="0">
+            <a:schemeClr val="accent1"/>
+          </a:effectRef>
+          <a:fontRef idx="minor">
+            <a:schemeClr val="tx1"/>
+          </a:fontRef>
+        </p:style>
+      </p:cxnSp>
+      <p:cxnSp>
+        <p:nvCxnSpPr>
+          <p:cNvPr id="32" name="Connector: Elbow 31">
+            <a:extLst>
+              <a:ext uri="{FF2B5EF4-FFF2-40B4-BE49-F238E27FC236}">
+                <a16:creationId xmlns:a16="http://schemas.microsoft.com/office/drawing/2014/main" id="{A31A99A4-8E4F-5862-5138-4B05D3257B85}"/>
+              </a:ext>
+            </a:extLst>
+          </p:cNvPr>
+          <p:cNvCxnSpPr>
+            <a:stCxn id="4" idx="2"/>
+            <a:endCxn id="7" idx="0"/>
+          </p:cNvCxnSpPr>
+          <p:nvPr/>
+        </p:nvCxnSpPr>
+        <p:spPr>
+          <a:xfrm rot="16200000" flipH="1">
+            <a:off x="6081463" y="2114703"/>
+            <a:ext cx="351791" cy="1208733"/>
+          </a:xfrm>
+          <a:prstGeom prst="bentConnector3">
+            <a:avLst/>
+          </a:prstGeom>
+        </p:spPr>
+        <p:style>
+          <a:lnRef idx="1">
+            <a:schemeClr val="accent1"/>
+          </a:lnRef>
+          <a:fillRef idx="0">
+            <a:schemeClr val="accent1"/>
+          </a:fillRef>
+          <a:effectRef idx="0">
+            <a:schemeClr val="accent1"/>
+          </a:effectRef>
+          <a:fontRef idx="minor">
+            <a:schemeClr val="tx1"/>
+          </a:fontRef>
+        </p:style>
+      </p:cxnSp>
     </p:spTree>
     <p:extLst>
       <p:ext uri="{BB962C8B-B14F-4D97-AF65-F5344CB8AC3E}">
@@ -5733,42 +7155,21 @@
             <p:ph type="title"/>
           </p:nvPr>
         </p:nvSpPr>
-        <p:spPr/>
+        <p:spPr>
+          <a:xfrm>
+            <a:off x="713232" y="15082"/>
+            <a:ext cx="9692640" cy="1325562"/>
+          </a:xfrm>
+        </p:spPr>
         <p:txBody>
           <a:bodyPr/>
           <a:lstStyle/>
           <a:p>
             <a:r>
-              <a:rPr lang="en-NZ" dirty="0"/>
-              <a:t>Design Drawings</a:t>
-            </a:r>
-          </a:p>
-        </p:txBody>
-      </p:sp>
-      <p:sp>
-        <p:nvSpPr>
-          <p:cNvPr id="3" name="Content Placeholder 2">
-            <a:extLst>
-              <a:ext uri="{FF2B5EF4-FFF2-40B4-BE49-F238E27FC236}">
-                <a16:creationId xmlns:a16="http://schemas.microsoft.com/office/drawing/2014/main" id="{5B68399D-040E-72E1-5BE1-82559BC616F7}"/>
-              </a:ext>
-            </a:extLst>
-          </p:cNvPr>
-          <p:cNvSpPr>
-            <a:spLocks noGrp="1"/>
-          </p:cNvSpPr>
-          <p:nvPr>
-            <p:ph idx="1"/>
-          </p:nvPr>
-        </p:nvSpPr>
-        <p:spPr/>
-        <p:txBody>
-          <a:bodyPr/>
-          <a:lstStyle/>
-          <a:p>
-            <a:r>
-              <a:rPr lang="en-NZ" dirty="0"/>
-              <a:t>Database Plan</a:t>
+              <a:rPr lang="en-NZ" dirty="0">
+                <a:latin typeface="Abadi" panose="020B0604020104020204" pitchFamily="34" charset="0"/>
+              </a:rPr>
+              <a:t>Design Drawings (Database Plan)</a:t>
             </a:r>
           </a:p>
         </p:txBody>
@@ -5825,7 +7226,9 @@
           <a:lstStyle/>
           <a:p>
             <a:r>
-              <a:rPr lang="en-NZ" dirty="0"/>
+              <a:rPr lang="en-NZ" dirty="0">
+                <a:latin typeface="Abadi" panose="020B0604020104020204" pitchFamily="34" charset="0"/>
+              </a:rPr>
               <a:t>Design Drawings (Home Page)</a:t>
             </a:r>
           </a:p>
@@ -5852,7 +7255,9 @@
           <a:bodyPr/>
           <a:lstStyle/>
           <a:p>
-            <a:endParaRPr lang="en-NZ" dirty="0"/>
+            <a:endParaRPr lang="en-NZ" dirty="0">
+              <a:latin typeface="Abadi" panose="020B0604020104020204" pitchFamily="34" charset="0"/>
+            </a:endParaRPr>
           </a:p>
         </p:txBody>
       </p:sp>
@@ -5955,7 +7360,9 @@
           <a:lstStyle/>
           <a:p>
             <a:r>
-              <a:rPr lang="en-NZ" dirty="0"/>
+              <a:rPr lang="en-NZ" dirty="0">
+                <a:latin typeface="Abadi" panose="020B0604020104020204" pitchFamily="34" charset="0"/>
+              </a:rPr>
               <a:t>Design Drawings (Subjects Page)</a:t>
             </a:r>
           </a:p>
@@ -6061,7 +7468,9 @@
           <a:lstStyle/>
           <a:p>
             <a:r>
-              <a:rPr lang="en-NZ" dirty="0"/>
+              <a:rPr lang="en-NZ" dirty="0">
+                <a:latin typeface="Abadi" panose="020B0604020104020204" pitchFamily="34" charset="0"/>
+              </a:rPr>
               <a:t>Design Drawings (Forum/Posts Page)</a:t>
             </a:r>
           </a:p>
@@ -6088,7 +7497,9 @@
           <a:bodyPr/>
           <a:lstStyle/>
           <a:p>
-            <a:endParaRPr lang="en-NZ"/>
+            <a:endParaRPr lang="en-NZ">
+              <a:latin typeface="Abadi" panose="020B0604020104020204" pitchFamily="34" charset="0"/>
+            </a:endParaRPr>
           </a:p>
         </p:txBody>
       </p:sp>
@@ -6192,7 +7603,9 @@
           <a:lstStyle/>
           <a:p>
             <a:r>
-              <a:rPr lang="en-NZ" dirty="0"/>
+              <a:rPr lang="en-NZ" dirty="0">
+                <a:latin typeface="Abadi" panose="020B0604020104020204" pitchFamily="34" charset="0"/>
+              </a:rPr>
               <a:t>Use complex programming techniques to develop a computer program</a:t>
             </a:r>
           </a:p>
@@ -6537,7 +7950,9 @@
           <a:lstStyle/>
           <a:p>
             <a:r>
-              <a:rPr lang="en-NZ" sz="2800" dirty="0"/>
+              <a:rPr lang="en-NZ" sz="2800" dirty="0">
+                <a:latin typeface="Abadi" panose="020B0604020104020204" pitchFamily="34" charset="0"/>
+              </a:rPr>
               <a:t>Test Plan</a:t>
             </a:r>
           </a:p>
@@ -6562,66 +7977,87 @@
               <a:buNone/>
             </a:pPr>
             <a:r>
-              <a:rPr lang="en-NZ" sz="2000" dirty="0"/>
+              <a:rPr lang="en-NZ" sz="2000" dirty="0">
+                <a:latin typeface="Abadi" panose="020B0604020104020204" pitchFamily="34" charset="0"/>
+              </a:rPr>
               <a:t>How are you going test your program</a:t>
             </a:r>
           </a:p>
           <a:p>
             <a:pPr lvl="0"/>
             <a:r>
-              <a:rPr lang="en-NZ" sz="2000" dirty="0"/>
+              <a:rPr lang="en-NZ" sz="2000" dirty="0">
+                <a:latin typeface="Abadi" panose="020B0604020104020204" pitchFamily="34" charset="0"/>
+              </a:rPr>
               <a:t>to ensure it functions correctly</a:t>
             </a:r>
             <a:endParaRPr lang="en-NZ" sz="2000" dirty="0">
               <a:effectLst/>
+              <a:latin typeface="Abadi" panose="020B0604020104020204" pitchFamily="34" charset="0"/>
             </a:endParaRPr>
           </a:p>
           <a:p>
             <a:pPr lvl="0"/>
             <a:r>
-              <a:rPr lang="en-NZ" sz="2000" dirty="0"/>
+              <a:rPr lang="en-NZ" sz="2000" dirty="0">
+                <a:latin typeface="Abadi" panose="020B0604020104020204" pitchFamily="34" charset="0"/>
+              </a:rPr>
               <a:t>That the python code is PEP8 compliant</a:t>
             </a:r>
             <a:endParaRPr lang="en-NZ" sz="2000" dirty="0">
               <a:effectLst/>
+              <a:latin typeface="Abadi" panose="020B0604020104020204" pitchFamily="34" charset="0"/>
             </a:endParaRPr>
           </a:p>
           <a:p>
             <a:pPr lvl="0"/>
             <a:r>
-              <a:rPr lang="en-NZ" sz="2000" dirty="0"/>
+              <a:rPr lang="en-NZ" sz="2000" dirty="0">
+                <a:latin typeface="Abadi" panose="020B0604020104020204" pitchFamily="34" charset="0"/>
+              </a:rPr>
               <a:t>for validation and error correction</a:t>
             </a:r>
           </a:p>
           <a:p>
             <a:pPr lvl="0"/>
             <a:r>
-              <a:rPr lang="en-NZ" sz="2000" dirty="0"/>
+              <a:rPr lang="en-NZ" sz="2000" dirty="0">
+                <a:latin typeface="Abadi" panose="020B0604020104020204" pitchFamily="34" charset="0"/>
+              </a:rPr>
               <a:t>Is well structured </a:t>
             </a:r>
             <a:endParaRPr lang="en-NZ" sz="2000" dirty="0">
               <a:effectLst/>
+              <a:latin typeface="Abadi" panose="020B0604020104020204" pitchFamily="34" charset="0"/>
             </a:endParaRPr>
           </a:p>
           <a:p>
             <a:pPr lvl="0"/>
             <a:r>
-              <a:rPr lang="en-NZ" sz="2000" dirty="0"/>
+              <a:rPr lang="en-NZ" sz="2000" dirty="0">
+                <a:latin typeface="Abadi" panose="020B0604020104020204" pitchFamily="34" charset="0"/>
+              </a:rPr>
               <a:t>Is flexible and robust</a:t>
             </a:r>
           </a:p>
           <a:p>
             <a:pPr lvl="0"/>
             <a:r>
-              <a:rPr lang="en-US" sz="2000" dirty="0"/>
+              <a:rPr lang="en-US" sz="2000" dirty="0">
+                <a:latin typeface="Abadi" panose="020B0604020104020204" pitchFamily="34" charset="0"/>
+              </a:rPr>
               <a:t>C</a:t>
             </a:r>
             <a:r>
-              <a:rPr lang="en-NZ" sz="2000" dirty="0" err="1"/>
+              <a:rPr lang="en-NZ" sz="2000" dirty="0" err="1">
+                <a:latin typeface="Abadi" panose="020B0604020104020204" pitchFamily="34" charset="0"/>
+              </a:rPr>
               <a:t>omprehensively</a:t>
             </a:r>
             <a:r>
-              <a:rPr lang="en-NZ" sz="2000" dirty="0"/>
+              <a:rPr lang="en-NZ" sz="2000" dirty="0">
+                <a:latin typeface="Abadi" panose="020B0604020104020204" pitchFamily="34" charset="0"/>
+              </a:rPr>
               <a:t> tested and debugged</a:t>
             </a:r>
           </a:p>
@@ -6629,7 +8065,9 @@
             <a:pPr marL="0" indent="0">
               <a:buNone/>
             </a:pPr>
-            <a:endParaRPr lang="en-NZ" dirty="0"/>
+            <a:endParaRPr lang="en-NZ" dirty="0">
+              <a:latin typeface="Abadi" panose="020B0604020104020204" pitchFamily="34" charset="0"/>
+            </a:endParaRPr>
           </a:p>
         </p:txBody>
       </p:sp>
@@ -6681,7 +8119,9 @@
           <a:lstStyle/>
           <a:p>
             <a:r>
-              <a:rPr lang="en-NZ" sz="2800" dirty="0"/>
+              <a:rPr lang="en-NZ" sz="2800" dirty="0">
+                <a:latin typeface="Abadi" panose="020B0604020104020204" pitchFamily="34" charset="0"/>
+              </a:rPr>
               <a:t>Test results</a:t>
             </a:r>
           </a:p>
@@ -6708,7 +8148,9 @@
               <a:buNone/>
             </a:pPr>
             <a:r>
-              <a:rPr lang="en-NZ" sz="2000" dirty="0"/>
+              <a:rPr lang="en-NZ" sz="2000" dirty="0">
+                <a:latin typeface="Abadi" panose="020B0604020104020204" pitchFamily="34" charset="0"/>
+              </a:rPr>
               <a:t>Summarise the results of your testing and how you addressed any issues or problems that arise during testing. Make sure you get others to test your site and get feedback.</a:t>
             </a:r>
           </a:p>
@@ -6760,13 +8202,19 @@
           <a:lstStyle/>
           <a:p>
             <a:r>
-              <a:rPr lang="en-NZ" sz="2800" dirty="0"/>
+              <a:rPr lang="en-NZ" sz="2800" dirty="0">
+                <a:latin typeface="Abadi" panose="020B0604020104020204" pitchFamily="34" charset="0"/>
+              </a:rPr>
               <a:t>Describe the end user requirements</a:t>
             </a:r>
             <a:br>
-              <a:rPr lang="en-NZ" dirty="0"/>
+              <a:rPr lang="en-NZ" dirty="0">
+                <a:latin typeface="Abadi" panose="020B0604020104020204" pitchFamily="34" charset="0"/>
+              </a:rPr>
             </a:br>
-            <a:endParaRPr lang="en-NZ" dirty="0"/>
+            <a:endParaRPr lang="en-NZ" dirty="0">
+              <a:latin typeface="Abadi" panose="020B0604020104020204" pitchFamily="34" charset="0"/>
+            </a:endParaRPr>
           </a:p>
         </p:txBody>
       </p:sp>
@@ -6791,7 +8239,9 @@
               <a:buNone/>
             </a:pPr>
             <a:r>
-              <a:rPr lang="en-NZ" sz="2000" dirty="0"/>
+              <a:rPr lang="en-NZ" sz="2000" dirty="0">
+                <a:latin typeface="Abadi" panose="020B0604020104020204" pitchFamily="34" charset="0"/>
+              </a:rPr>
               <a:t>Describe how the chosen tools and techniques to develop the website were appropriate for the purpose and end users. </a:t>
             </a:r>
           </a:p>
@@ -6845,7 +8295,9 @@
           <a:lstStyle/>
           <a:p>
             <a:r>
-              <a:rPr lang="en-NZ" sz="2800" dirty="0"/>
+              <a:rPr lang="en-NZ" sz="2800" dirty="0">
+                <a:latin typeface="Abadi" panose="020B0604020104020204" pitchFamily="34" charset="0"/>
+              </a:rPr>
               <a:t>Iterative Improvement</a:t>
             </a:r>
           </a:p>
@@ -6872,7 +8324,9 @@
               <a:buNone/>
             </a:pPr>
             <a:r>
-              <a:rPr lang="en-NZ" sz="2000" dirty="0"/>
+              <a:rPr lang="en-NZ" sz="2000" dirty="0">
+                <a:latin typeface="Abadi" panose="020B0604020104020204" pitchFamily="34" charset="0"/>
+              </a:rPr>
               <a:t>Show how you have used iterative improvement throughout the design, development and testing process to produce a high-quality outcome. (through providing screenshots/a screencast) </a:t>
             </a:r>
           </a:p>
@@ -6926,7 +8380,9 @@
           <a:lstStyle/>
           <a:p>
             <a:r>
-              <a:rPr lang="en-NZ" sz="2800" dirty="0"/>
+              <a:rPr lang="en-NZ" sz="2800" dirty="0">
+                <a:latin typeface="Abadi" panose="020B0604020104020204" pitchFamily="34" charset="0"/>
+              </a:rPr>
               <a:t>Version Control</a:t>
             </a:r>
           </a:p>
@@ -6953,7 +8409,9 @@
               <a:buNone/>
             </a:pPr>
             <a:r>
-              <a:rPr lang="en-NZ" sz="2000" dirty="0"/>
+              <a:rPr lang="en-NZ" sz="2000" dirty="0">
+                <a:latin typeface="Abadi" panose="020B0604020104020204" pitchFamily="34" charset="0"/>
+              </a:rPr>
               <a:t>Show how you have used version control throughout the design, development, and testing process.</a:t>
             </a:r>
           </a:p>
@@ -7007,7 +8465,9 @@
           <a:lstStyle/>
           <a:p>
             <a:r>
-              <a:rPr lang="en-NZ" sz="2800" dirty="0"/>
+              <a:rPr lang="en-NZ" sz="2800" dirty="0">
+                <a:latin typeface="Abadi" panose="020B0604020104020204" pitchFamily="34" charset="0"/>
+              </a:rPr>
               <a:t>GitHub Commits</a:t>
             </a:r>
           </a:p>
@@ -7034,7 +8494,9 @@
               <a:buNone/>
             </a:pPr>
             <a:r>
-              <a:rPr lang="en-NZ" sz="2000" dirty="0"/>
+              <a:rPr lang="en-NZ" sz="2000" dirty="0">
+                <a:latin typeface="Abadi" panose="020B0604020104020204" pitchFamily="34" charset="0"/>
+              </a:rPr>
               <a:t>Show how you have used GitHub throughout the design, development, and testing process.</a:t>
             </a:r>
           </a:p>
@@ -7088,7 +8550,9 @@
           <a:lstStyle/>
           <a:p>
             <a:r>
-              <a:rPr lang="en-NZ" sz="2800" dirty="0"/>
+              <a:rPr lang="en-NZ" sz="2800" dirty="0">
+                <a:latin typeface="Abadi" panose="020B0604020104020204" pitchFamily="34" charset="0"/>
+              </a:rPr>
               <a:t>Addressing Relevant Implications</a:t>
             </a:r>
           </a:p>
@@ -7115,7 +8579,9 @@
               <a:buNone/>
             </a:pPr>
             <a:r>
-              <a:rPr lang="en-NZ" sz="2000" dirty="0"/>
+              <a:rPr lang="en-NZ" sz="2000" dirty="0">
+                <a:latin typeface="Abadi" panose="020B0604020104020204" pitchFamily="34" charset="0"/>
+              </a:rPr>
               <a:t>Discuss how have you addressed relevant implications?</a:t>
             </a:r>
           </a:p>
@@ -7570,7 +9036,9 @@
               </a:lnSpc>
             </a:pPr>
             <a:r>
-              <a:rPr lang="en-US" sz="5400"/>
+              <a:rPr lang="en-US" sz="5400" dirty="0">
+                <a:latin typeface="Abadi" panose="020B0604020104020204" pitchFamily="34" charset="0"/>
+              </a:rPr>
               <a:t>Project Management - Planning</a:t>
             </a:r>
           </a:p>
@@ -7688,7 +9156,9 @@
           <a:lstStyle/>
           <a:p>
             <a:r>
-              <a:rPr lang="en-NZ" dirty="0"/>
+              <a:rPr lang="en-NZ" dirty="0">
+                <a:latin typeface="Abadi" panose="020B0604020104020204" pitchFamily="34" charset="0"/>
+              </a:rPr>
               <a:t>Project Management - Planning</a:t>
             </a:r>
           </a:p>
@@ -7795,18 +9265,24 @@
         <p:spPr/>
         <p:txBody>
           <a:bodyPr>
-            <a:normAutofit fontScale="90000"/>
+            <a:normAutofit/>
           </a:bodyPr>
           <a:lstStyle/>
           <a:p>
             <a:r>
-              <a:rPr lang="en-NZ" sz="3100" dirty="0"/>
+              <a:rPr lang="en-NZ" sz="3100" dirty="0">
+                <a:latin typeface="Abadi" panose="020B0604020104020204" pitchFamily="34" charset="0"/>
+              </a:rPr>
               <a:t>Describe the purpose and target audience of your website</a:t>
             </a:r>
             <a:br>
-              <a:rPr lang="en-NZ" dirty="0"/>
+              <a:rPr lang="en-NZ" dirty="0">
+                <a:latin typeface="Abadi" panose="020B0604020104020204" pitchFamily="34" charset="0"/>
+              </a:rPr>
             </a:br>
-            <a:endParaRPr lang="en-NZ" dirty="0"/>
+            <a:endParaRPr lang="en-NZ" dirty="0">
+              <a:latin typeface="Abadi" panose="020B0604020104020204" pitchFamily="34" charset="0"/>
+            </a:endParaRPr>
           </a:p>
         </p:txBody>
       </p:sp>
@@ -7829,7 +9305,9 @@
               <a:buNone/>
             </a:pPr>
             <a:r>
-              <a:rPr lang="en-NZ" sz="2000" dirty="0"/>
+              <a:rPr lang="en-NZ" sz="2000" dirty="0">
+                <a:latin typeface="Abadi" panose="020B0604020104020204" pitchFamily="34" charset="0"/>
+              </a:rPr>
               <a:t>Describe the purpose of your website?</a:t>
             </a:r>
           </a:p>
@@ -7839,7 +9317,9 @@
               <a:buChar char="q"/>
             </a:pPr>
             <a:r>
-              <a:rPr lang="en-NZ" dirty="0"/>
+              <a:rPr lang="en-NZ" dirty="0">
+                <a:latin typeface="Abadi" panose="020B0604020104020204" pitchFamily="34" charset="0"/>
+              </a:rPr>
               <a:t> Purpose of my website is for students to be able to post questions of any subject that may be confused in. </a:t>
             </a:r>
           </a:p>
@@ -7849,17 +9329,23 @@
               <a:buChar char="q"/>
             </a:pPr>
             <a:r>
-              <a:rPr lang="en-NZ" dirty="0"/>
+              <a:rPr lang="en-NZ" dirty="0">
+                <a:latin typeface="Abadi" panose="020B0604020104020204" pitchFamily="34" charset="0"/>
+              </a:rPr>
               <a:t> This will then allow other students and teachers to be able to comment underneath their post answering their question. </a:t>
             </a:r>
-            <a:endParaRPr lang="en-NZ" sz="2000" dirty="0"/>
+            <a:endParaRPr lang="en-NZ" sz="2000" dirty="0">
+              <a:latin typeface="Abadi" panose="020B0604020104020204" pitchFamily="34" charset="0"/>
+            </a:endParaRPr>
           </a:p>
           <a:p>
             <a:pPr marL="0" indent="0">
               <a:buNone/>
             </a:pPr>
             <a:r>
-              <a:rPr lang="en-NZ" sz="2000" dirty="0"/>
+              <a:rPr lang="en-NZ" sz="2000" dirty="0">
+                <a:latin typeface="Abadi" panose="020B0604020104020204" pitchFamily="34" charset="0"/>
+              </a:rPr>
               <a:t>Describe who the target audience are?</a:t>
             </a:r>
           </a:p>
@@ -7869,11 +9355,15 @@
               <a:buChar char="q"/>
             </a:pPr>
             <a:r>
-              <a:rPr lang="en-NZ" sz="2000" dirty="0"/>
+              <a:rPr lang="en-NZ" sz="2000" dirty="0">
+                <a:latin typeface="Abadi" panose="020B0604020104020204" pitchFamily="34" charset="0"/>
+              </a:rPr>
               <a:t> </a:t>
             </a:r>
             <a:r>
-              <a:rPr lang="en-NZ" dirty="0"/>
+              <a:rPr lang="en-NZ" dirty="0">
+                <a:latin typeface="Abadi" panose="020B0604020104020204" pitchFamily="34" charset="0"/>
+              </a:rPr>
               <a:t>Target audience are senior students (Years 11-13) in Sancta Maria College that are doing NCEA. </a:t>
             </a:r>
           </a:p>
@@ -7883,26 +9373,36 @@
               <a:buChar char="q"/>
             </a:pPr>
             <a:r>
-              <a:rPr lang="en-NZ" sz="2000" dirty="0"/>
+              <a:rPr lang="en-NZ" sz="2000" dirty="0">
+                <a:latin typeface="Abadi" panose="020B0604020104020204" pitchFamily="34" charset="0"/>
+              </a:rPr>
               <a:t> </a:t>
             </a:r>
             <a:r>
-              <a:rPr lang="en-NZ" dirty="0"/>
+              <a:rPr lang="en-NZ" dirty="0">
+                <a:latin typeface="Abadi" panose="020B0604020104020204" pitchFamily="34" charset="0"/>
+              </a:rPr>
               <a:t>This type of website will be most beneficial to these students. </a:t>
             </a:r>
-            <a:endParaRPr lang="en-NZ" sz="2000" dirty="0"/>
+            <a:endParaRPr lang="en-NZ" sz="2000" dirty="0">
+              <a:latin typeface="Abadi" panose="020B0604020104020204" pitchFamily="34" charset="0"/>
+            </a:endParaRPr>
           </a:p>
           <a:p>
             <a:pPr marL="0" indent="0">
               <a:buNone/>
             </a:pPr>
-            <a:endParaRPr lang="en-NZ" sz="2000" dirty="0"/>
+            <a:endParaRPr lang="en-NZ" sz="2000" dirty="0">
+              <a:latin typeface="Abadi" panose="020B0604020104020204" pitchFamily="34" charset="0"/>
+            </a:endParaRPr>
           </a:p>
           <a:p>
             <a:pPr marL="0" indent="0">
               <a:buNone/>
             </a:pPr>
-            <a:endParaRPr lang="en-NZ" dirty="0"/>
+            <a:endParaRPr lang="en-NZ" dirty="0">
+              <a:latin typeface="Abadi" panose="020B0604020104020204" pitchFamily="34" charset="0"/>
+            </a:endParaRPr>
           </a:p>
         </p:txBody>
       </p:sp>
@@ -7959,11 +9459,14 @@
           <a:p>
             <a:r>
               <a:rPr lang="en-US" dirty="0">
+                <a:latin typeface="Abadi" panose="020B0604020104020204" pitchFamily="34" charset="0"/>
                 <a:cs typeface="Calibri Light"/>
               </a:rPr>
               <a:t>Initial Specifications</a:t>
             </a:r>
-            <a:endParaRPr lang="en-US" dirty="0"/>
+            <a:endParaRPr lang="en-US" dirty="0">
+              <a:latin typeface="Abadi" panose="020B0604020104020204" pitchFamily="34" charset="0"/>
+            </a:endParaRPr>
           </a:p>
         </p:txBody>
       </p:sp>
@@ -7992,6 +9495,7 @@
           <a:p>
             <a:r>
               <a:rPr lang="en-US" dirty="0">
+                <a:latin typeface="Abadi" panose="020B0604020104020204" pitchFamily="34" charset="0"/>
                 <a:cs typeface="Calibri"/>
               </a:rPr>
               <a:t>What are the specifications of your project (must haves). You can add to these as you develop your project.</a:t>
@@ -8008,7 +9512,7 @@
                   <a:srgbClr val="000000"/>
                 </a:solidFill>
                 <a:effectLst/>
-                <a:latin typeface="Montserrat" panose="00000500000000000000" pitchFamily="2" charset="0"/>
+                <a:latin typeface="Abadi" panose="020B0604020104020204" pitchFamily="34" charset="0"/>
               </a:rPr>
               <a:t>Q&amp;A/Forum Website</a:t>
             </a:r>
@@ -8018,7 +9522,7 @@
                   <a:srgbClr val="000000"/>
                 </a:solidFill>
                 <a:effectLst/>
-                <a:latin typeface="Montserrat" panose="00000500000000000000" pitchFamily="2" charset="0"/>
+                <a:latin typeface="Abadi" panose="020B0604020104020204" pitchFamily="34" charset="0"/>
               </a:rPr>
               <a:t>​</a:t>
             </a:r>
@@ -8027,7 +9531,7 @@
                 <a:srgbClr val="000000"/>
               </a:solidFill>
               <a:effectLst/>
-              <a:latin typeface="Arial" panose="020B0604020202020204" pitchFamily="34" charset="0"/>
+              <a:latin typeface="Abadi" panose="020B0604020104020204" pitchFamily="34" charset="0"/>
             </a:endParaRPr>
           </a:p>
           <a:p>
@@ -8041,7 +9545,7 @@
                   <a:srgbClr val="000000"/>
                 </a:solidFill>
                 <a:effectLst/>
-                <a:latin typeface="Montserrat" panose="00000500000000000000" pitchFamily="2" charset="0"/>
+                <a:latin typeface="Abadi" panose="020B0604020104020204" pitchFamily="34" charset="0"/>
               </a:rPr>
               <a:t>Students can post questions about a particular subject.</a:t>
             </a:r>
@@ -8051,7 +9555,7 @@
                   <a:srgbClr val="000000"/>
                 </a:solidFill>
                 <a:effectLst/>
-                <a:latin typeface="Montserrat" panose="00000500000000000000" pitchFamily="2" charset="0"/>
+                <a:latin typeface="Abadi" panose="020B0604020104020204" pitchFamily="34" charset="0"/>
               </a:rPr>
               <a:t>​</a:t>
             </a:r>
@@ -8060,7 +9564,7 @@
                 <a:srgbClr val="000000"/>
               </a:solidFill>
               <a:effectLst/>
-              <a:latin typeface="Arial" panose="020B0604020202020204" pitchFamily="34" charset="0"/>
+              <a:latin typeface="Abadi" panose="020B0604020104020204" pitchFamily="34" charset="0"/>
             </a:endParaRPr>
           </a:p>
           <a:p>
@@ -8074,7 +9578,7 @@
                   <a:srgbClr val="000000"/>
                 </a:solidFill>
                 <a:effectLst/>
-                <a:latin typeface="Montserrat" panose="00000500000000000000" pitchFamily="2" charset="0"/>
+                <a:latin typeface="Abadi" panose="020B0604020104020204" pitchFamily="34" charset="0"/>
               </a:rPr>
               <a:t>Teachers and other students will post their comments </a:t>
             </a:r>
@@ -8084,7 +9588,7 @@
                   <a:srgbClr val="000000"/>
                 </a:solidFill>
                 <a:effectLst/>
-                <a:latin typeface="Montserrat" panose="00000500000000000000" pitchFamily="2" charset="0"/>
+                <a:latin typeface="Abadi" panose="020B0604020104020204" pitchFamily="34" charset="0"/>
               </a:rPr>
               <a:t>​</a:t>
             </a:r>
@@ -8093,7 +9597,7 @@
                 <a:srgbClr val="000000"/>
               </a:solidFill>
               <a:effectLst/>
-              <a:latin typeface="Arial" panose="020B0604020202020204" pitchFamily="34" charset="0"/>
+              <a:latin typeface="Abadi" panose="020B0604020104020204" pitchFamily="34" charset="0"/>
             </a:endParaRPr>
           </a:p>
           <a:p>
@@ -8107,7 +9611,7 @@
                   <a:srgbClr val="000000"/>
                 </a:solidFill>
                 <a:effectLst/>
-                <a:latin typeface="Montserrat" panose="00000500000000000000" pitchFamily="2" charset="0"/>
+                <a:latin typeface="Abadi" panose="020B0604020104020204" pitchFamily="34" charset="0"/>
               </a:rPr>
               <a:t>Database will store questions and comments </a:t>
             </a:r>
@@ -8122,7 +9626,7 @@
                 <a:solidFill>
                   <a:srgbClr val="000000"/>
                 </a:solidFill>
-                <a:latin typeface="Montserrat" panose="00000500000000000000" pitchFamily="2" charset="0"/>
+                <a:latin typeface="Abadi" panose="020B0604020104020204" pitchFamily="34" charset="0"/>
               </a:rPr>
               <a:t>Signup/login</a:t>
             </a:r>
@@ -8137,7 +9641,7 @@
                 <a:solidFill>
                   <a:srgbClr val="000000"/>
                 </a:solidFill>
-                <a:latin typeface="Montserrat" panose="00000500000000000000" pitchFamily="2" charset="0"/>
+                <a:latin typeface="Abadi" panose="020B0604020104020204" pitchFamily="34" charset="0"/>
               </a:rPr>
               <a:t>Be able to edit or delete their own posts. </a:t>
             </a:r>
@@ -8153,7 +9657,7 @@
                   <a:srgbClr val="000000"/>
                 </a:solidFill>
                 <a:effectLst/>
-                <a:latin typeface="Montserrat" panose="00000500000000000000" pitchFamily="2" charset="0"/>
+                <a:latin typeface="Abadi" panose="020B0604020104020204" pitchFamily="34" charset="0"/>
               </a:rPr>
               <a:t>Be responsive (display content effectively on wide and narrow screens). </a:t>
             </a:r>
@@ -8162,7 +9666,7 @@
                 <a:srgbClr val="000000"/>
               </a:solidFill>
               <a:effectLst/>
-              <a:latin typeface="Arial" panose="020B0604020202020204" pitchFamily="34" charset="0"/>
+              <a:latin typeface="Abadi" panose="020B0604020104020204" pitchFamily="34" charset="0"/>
             </a:endParaRPr>
           </a:p>
           <a:p>
@@ -8170,6 +9674,7 @@
               <a:buNone/>
             </a:pPr>
             <a:endParaRPr lang="en-US" dirty="0">
+              <a:latin typeface="Abadi" panose="020B0604020104020204" pitchFamily="34" charset="0"/>
               <a:cs typeface="Calibri"/>
             </a:endParaRPr>
           </a:p>
@@ -8223,7 +9728,9 @@
           <a:lstStyle/>
           <a:p>
             <a:r>
-              <a:rPr lang="en-NZ" sz="2800" dirty="0"/>
+              <a:rPr lang="en-NZ" sz="2800" dirty="0">
+                <a:latin typeface="Abadi" panose="020B0604020104020204" pitchFamily="34" charset="0"/>
+              </a:rPr>
               <a:t>Explain the relevant implications (at least 3) Duplicate this slide.</a:t>
             </a:r>
           </a:p>
@@ -8250,7 +9757,9 @@
               <a:buNone/>
             </a:pPr>
             <a:r>
-              <a:rPr lang="en-NZ" dirty="0"/>
+              <a:rPr lang="en-NZ" dirty="0">
+                <a:latin typeface="Abadi" panose="020B0604020104020204" pitchFamily="34" charset="0"/>
+              </a:rPr>
               <a:t>Examples of relevant implications include:</a:t>
             </a:r>
           </a:p>
@@ -8259,7 +9768,9 @@
               <a:buNone/>
             </a:pPr>
             <a:r>
-              <a:rPr lang="en-NZ" dirty="0"/>
+              <a:rPr lang="en-NZ" dirty="0">
+                <a:latin typeface="Abadi" panose="020B0604020104020204" pitchFamily="34" charset="0"/>
+              </a:rPr>
               <a:t>● social</a:t>
             </a:r>
           </a:p>
@@ -8268,7 +9779,9 @@
               <a:buNone/>
             </a:pPr>
             <a:r>
-              <a:rPr lang="en-NZ" dirty="0"/>
+              <a:rPr lang="en-NZ" dirty="0">
+                <a:latin typeface="Abadi" panose="020B0604020104020204" pitchFamily="34" charset="0"/>
+              </a:rPr>
               <a:t>● cultural</a:t>
             </a:r>
           </a:p>
@@ -8277,7 +9790,9 @@
               <a:buNone/>
             </a:pPr>
             <a:r>
-              <a:rPr lang="en-NZ" dirty="0"/>
+              <a:rPr lang="en-NZ" dirty="0">
+                <a:latin typeface="Abadi" panose="020B0604020104020204" pitchFamily="34" charset="0"/>
+              </a:rPr>
               <a:t>● legal</a:t>
             </a:r>
           </a:p>
@@ -8286,7 +9801,9 @@
               <a:buNone/>
             </a:pPr>
             <a:r>
-              <a:rPr lang="en-NZ" dirty="0"/>
+              <a:rPr lang="en-NZ" dirty="0">
+                <a:latin typeface="Abadi" panose="020B0604020104020204" pitchFamily="34" charset="0"/>
+              </a:rPr>
               <a:t>● ethical</a:t>
             </a:r>
           </a:p>
@@ -8295,7 +9812,9 @@
               <a:buNone/>
             </a:pPr>
             <a:r>
-              <a:rPr lang="en-NZ" dirty="0"/>
+              <a:rPr lang="en-NZ" dirty="0">
+                <a:latin typeface="Abadi" panose="020B0604020104020204" pitchFamily="34" charset="0"/>
+              </a:rPr>
               <a:t>● intellectual property</a:t>
             </a:r>
           </a:p>
@@ -8304,7 +9823,9 @@
               <a:buNone/>
             </a:pPr>
             <a:r>
-              <a:rPr lang="en-NZ" dirty="0"/>
+              <a:rPr lang="en-NZ" dirty="0">
+                <a:latin typeface="Abadi" panose="020B0604020104020204" pitchFamily="34" charset="0"/>
+              </a:rPr>
               <a:t>● privacy</a:t>
             </a:r>
           </a:p>
@@ -8313,7 +9834,9 @@
               <a:buNone/>
             </a:pPr>
             <a:r>
-              <a:rPr lang="en-NZ" dirty="0"/>
+              <a:rPr lang="en-NZ" dirty="0">
+                <a:latin typeface="Abadi" panose="020B0604020104020204" pitchFamily="34" charset="0"/>
+              </a:rPr>
               <a:t>● accessibility</a:t>
             </a:r>
           </a:p>
@@ -8322,7 +9845,9 @@
               <a:buNone/>
             </a:pPr>
             <a:r>
-              <a:rPr lang="en-NZ" dirty="0"/>
+              <a:rPr lang="en-NZ" dirty="0">
+                <a:latin typeface="Abadi" panose="020B0604020104020204" pitchFamily="34" charset="0"/>
+              </a:rPr>
               <a:t>● usability</a:t>
             </a:r>
           </a:p>
@@ -8331,7 +9856,9 @@
               <a:buNone/>
             </a:pPr>
             <a:r>
-              <a:rPr lang="en-NZ" dirty="0"/>
+              <a:rPr lang="en-NZ" dirty="0">
+                <a:latin typeface="Abadi" panose="020B0604020104020204" pitchFamily="34" charset="0"/>
+              </a:rPr>
               <a:t>● functionality</a:t>
             </a:r>
           </a:p>
@@ -8340,7 +9867,9 @@
               <a:buNone/>
             </a:pPr>
             <a:r>
-              <a:rPr lang="en-NZ" dirty="0"/>
+              <a:rPr lang="en-NZ" dirty="0">
+                <a:latin typeface="Abadi" panose="020B0604020104020204" pitchFamily="34" charset="0"/>
+              </a:rPr>
               <a:t>● aesthetics</a:t>
             </a:r>
           </a:p>
@@ -8349,7 +9878,9 @@
               <a:buNone/>
             </a:pPr>
             <a:r>
-              <a:rPr lang="en-NZ" dirty="0"/>
+              <a:rPr lang="en-NZ" dirty="0">
+                <a:latin typeface="Abadi" panose="020B0604020104020204" pitchFamily="34" charset="0"/>
+              </a:rPr>
               <a:t>● sustainability and future proofing</a:t>
             </a:r>
           </a:p>
@@ -8358,7 +9889,9 @@
               <a:buNone/>
             </a:pPr>
             <a:r>
-              <a:rPr lang="en-NZ" dirty="0"/>
+              <a:rPr lang="en-NZ" dirty="0">
+                <a:latin typeface="Abadi" panose="020B0604020104020204" pitchFamily="34" charset="0"/>
+              </a:rPr>
               <a:t>● end-user considerations</a:t>
             </a:r>
           </a:p>
@@ -8367,7 +9900,9 @@
               <a:buNone/>
             </a:pPr>
             <a:r>
-              <a:rPr lang="en-NZ" dirty="0"/>
+              <a:rPr lang="en-NZ" dirty="0">
+                <a:latin typeface="Abadi" panose="020B0604020104020204" pitchFamily="34" charset="0"/>
+              </a:rPr>
               <a:t>● health and safety.</a:t>
             </a:r>
           </a:p>
@@ -8381,8 +9916,8 @@
         </p:nvSpPr>
         <p:spPr>
           <a:xfrm>
-            <a:off x="6492240" y="1825625"/>
-            <a:ext cx="4995949" cy="1384995"/>
+            <a:off x="5958563" y="2071285"/>
+            <a:ext cx="4995949" cy="1600438"/>
           </a:xfrm>
           <a:prstGeom prst="rect">
             <a:avLst/>
@@ -8397,42 +9932,54 @@
           <a:p>
             <a:pPr lvl="0"/>
             <a:r>
-              <a:rPr lang="en-NZ" sz="1400" dirty="0"/>
+              <a:rPr lang="en-NZ" sz="1400" dirty="0">
+                <a:latin typeface="Abadi" panose="020B0604020104020204" pitchFamily="34" charset="0"/>
+              </a:rPr>
               <a:t>This could include an explanation on why your outcome needs to:</a:t>
             </a:r>
           </a:p>
           <a:p>
             <a:pPr lvl="1"/>
             <a:r>
-              <a:rPr lang="en-NZ" sz="1400" dirty="0"/>
+              <a:rPr lang="en-NZ" sz="1400" dirty="0">
+                <a:latin typeface="Abadi" panose="020B0604020104020204" pitchFamily="34" charset="0"/>
+              </a:rPr>
               <a:t>be socially/culturally acceptable</a:t>
             </a:r>
           </a:p>
           <a:p>
             <a:pPr lvl="1"/>
             <a:r>
-              <a:rPr lang="en-NZ" sz="1400" dirty="0"/>
+              <a:rPr lang="en-NZ" sz="1400" dirty="0">
+                <a:latin typeface="Abadi" panose="020B0604020104020204" pitchFamily="34" charset="0"/>
+              </a:rPr>
               <a:t>honour legal, ethical and intellectual property obligations</a:t>
             </a:r>
           </a:p>
           <a:p>
             <a:pPr lvl="1"/>
             <a:r>
-              <a:rPr lang="en-NZ" sz="1400" dirty="0"/>
+              <a:rPr lang="en-NZ" sz="1400" dirty="0">
+                <a:latin typeface="Abadi" panose="020B0604020104020204" pitchFamily="34" charset="0"/>
+              </a:rPr>
               <a:t>be accessible, usable and functional</a:t>
             </a:r>
           </a:p>
           <a:p>
             <a:pPr lvl="1"/>
             <a:r>
-              <a:rPr lang="en-NZ" sz="1400" dirty="0"/>
+              <a:rPr lang="en-NZ" sz="1400" dirty="0">
+                <a:latin typeface="Abadi" panose="020B0604020104020204" pitchFamily="34" charset="0"/>
+              </a:rPr>
               <a:t>be sustainable and future proof</a:t>
             </a:r>
           </a:p>
           <a:p>
             <a:pPr lvl="1"/>
             <a:r>
-              <a:rPr lang="en-NZ" sz="1400" dirty="0"/>
+              <a:rPr lang="en-NZ" sz="1400" dirty="0">
+                <a:latin typeface="Abadi" panose="020B0604020104020204" pitchFamily="34" charset="0"/>
+              </a:rPr>
               <a:t>effectively use web design conventions.</a:t>
             </a:r>
           </a:p>
@@ -8490,7 +10037,9 @@
           <a:lstStyle/>
           <a:p>
             <a:r>
-              <a:rPr lang="en-NZ" dirty="0"/>
+              <a:rPr lang="en-NZ" dirty="0">
+                <a:latin typeface="Abadi" panose="020B0604020104020204" pitchFamily="34" charset="0"/>
+              </a:rPr>
               <a:t>Relevant Implications - Ethical</a:t>
             </a:r>
           </a:p>
@@ -8518,34 +10067,46 @@
           <a:lstStyle/>
           <a:p>
             <a:r>
-              <a:rPr lang="en-NZ" dirty="0"/>
+              <a:rPr lang="en-NZ" dirty="0">
+                <a:latin typeface="Abadi" panose="020B0604020104020204" pitchFamily="34" charset="0"/>
+              </a:rPr>
               <a:t>Implication 1</a:t>
             </a:r>
           </a:p>
           <a:p>
             <a:r>
-              <a:rPr lang="en-NZ" dirty="0"/>
+              <a:rPr lang="en-NZ" dirty="0">
+                <a:latin typeface="Abadi" panose="020B0604020104020204" pitchFamily="34" charset="0"/>
+              </a:rPr>
               <a:t>Describe the implication?</a:t>
             </a:r>
           </a:p>
           <a:p>
             <a:r>
-              <a:rPr lang="en-NZ" dirty="0"/>
+              <a:rPr lang="en-NZ" dirty="0">
+                <a:latin typeface="Abadi" panose="020B0604020104020204" pitchFamily="34" charset="0"/>
+              </a:rPr>
               <a:t>Ethics focuses on what is right and wrong. Depending on the target audience, it can be inappropriate to allow the use of swear words or letting them be uncensored. It is best to ensure that the content on the website is also appropriate and avoids anything offensive. </a:t>
             </a:r>
           </a:p>
           <a:p>
             <a:r>
-              <a:rPr lang="en-NZ" dirty="0"/>
+              <a:rPr lang="en-NZ" dirty="0">
+                <a:latin typeface="Abadi" panose="020B0604020104020204" pitchFamily="34" charset="0"/>
+              </a:rPr>
               <a:t>How does this apply to your project?</a:t>
             </a:r>
           </a:p>
           <a:p>
-            <a:endParaRPr lang="en-NZ" dirty="0"/>
-          </a:p>
-          <a:p>
-            <a:r>
-              <a:rPr lang="en-NZ" dirty="0"/>
+            <a:endParaRPr lang="en-NZ" dirty="0">
+              <a:latin typeface="Abadi" panose="020B0604020104020204" pitchFamily="34" charset="0"/>
+            </a:endParaRPr>
+          </a:p>
+          <a:p>
+            <a:r>
+              <a:rPr lang="en-NZ" dirty="0">
+                <a:latin typeface="Abadi" panose="020B0604020104020204" pitchFamily="34" charset="0"/>
+              </a:rPr>
               <a:t>How do you plan to address this implication?</a:t>
             </a:r>
           </a:p>
@@ -8603,7 +10164,9 @@
           <a:lstStyle/>
           <a:p>
             <a:r>
-              <a:rPr lang="en-NZ" dirty="0"/>
+              <a:rPr lang="en-NZ" dirty="0">
+                <a:latin typeface="Abadi" panose="020B0604020104020204" pitchFamily="34" charset="0"/>
+              </a:rPr>
               <a:t>Relevant Implications - Functionality</a:t>
             </a:r>
           </a:p>
@@ -8631,39 +10194,55 @@
           <a:lstStyle/>
           <a:p>
             <a:r>
-              <a:rPr lang="en-NZ" dirty="0"/>
+              <a:rPr lang="en-NZ" dirty="0">
+                <a:latin typeface="Abadi" panose="020B0604020104020204" pitchFamily="34" charset="0"/>
+              </a:rPr>
               <a:t>Implication 2 </a:t>
             </a:r>
           </a:p>
           <a:p>
             <a:r>
-              <a:rPr lang="en-NZ" dirty="0"/>
+              <a:rPr lang="en-NZ" dirty="0">
+                <a:latin typeface="Abadi" panose="020B0604020104020204" pitchFamily="34" charset="0"/>
+              </a:rPr>
               <a:t>Describe the implication?</a:t>
             </a:r>
           </a:p>
           <a:p>
             <a:r>
-              <a:rPr lang="en-NZ" dirty="0"/>
+              <a:rPr lang="en-NZ" dirty="0">
+                <a:latin typeface="Abadi" panose="020B0604020104020204" pitchFamily="34" charset="0"/>
+              </a:rPr>
               <a:t>Functionality means ensuring that the entire website and its features work. It should be able to work for the expected values/cases, as well as the boundary cases and unexpected cases. For example, when a user goes to signup on the blog/website, it should be able to create an account if the email address is new, but when they input an existing email address that is already used, then it will inform the user to input </a:t>
             </a:r>
             <a:r>
-              <a:rPr lang="en-NZ"/>
+              <a:rPr lang="en-NZ">
+                <a:latin typeface="Abadi" panose="020B0604020104020204" pitchFamily="34" charset="0"/>
+              </a:rPr>
               <a:t>a different one. </a:t>
             </a:r>
-            <a:endParaRPr lang="en-NZ" dirty="0"/>
-          </a:p>
-          <a:p>
-            <a:r>
-              <a:rPr lang="en-NZ" dirty="0"/>
+            <a:endParaRPr lang="en-NZ" dirty="0">
+              <a:latin typeface="Abadi" panose="020B0604020104020204" pitchFamily="34" charset="0"/>
+            </a:endParaRPr>
+          </a:p>
+          <a:p>
+            <a:r>
+              <a:rPr lang="en-NZ" dirty="0">
+                <a:latin typeface="Abadi" panose="020B0604020104020204" pitchFamily="34" charset="0"/>
+              </a:rPr>
               <a:t>How does this apply to your project?</a:t>
             </a:r>
           </a:p>
           <a:p>
-            <a:endParaRPr lang="en-NZ" dirty="0"/>
-          </a:p>
-          <a:p>
-            <a:r>
-              <a:rPr lang="en-NZ" dirty="0"/>
+            <a:endParaRPr lang="en-NZ" dirty="0">
+              <a:latin typeface="Abadi" panose="020B0604020104020204" pitchFamily="34" charset="0"/>
+            </a:endParaRPr>
+          </a:p>
+          <a:p>
+            <a:r>
+              <a:rPr lang="en-NZ" dirty="0">
+                <a:latin typeface="Abadi" panose="020B0604020104020204" pitchFamily="34" charset="0"/>
+              </a:rPr>
               <a:t>How do you plan to address this implication?</a:t>
             </a:r>
           </a:p>

</xml_diff>

<commit_message>
Imported Blog App into project
Used finished code from Blog App done previously in class as a base for my school forum page.
</commit_message>
<xml_diff>
--- a/AS91903_91906_Evidence_Joaquin_Badenas.pptx
+++ b/AS91903_91906_Evidence_Joaquin_Badenas.pptx
@@ -1579,11 +1579,26 @@
   </pc:docChgLst>
   <pc:docChgLst>
     <pc:chgData name="Joaquin Badenas" userId="5cb29fd719aebf04" providerId="LiveId" clId="{4F53BFBD-1E38-412E-AE7B-7E5D3B30168C}"/>
-    <pc:docChg chg="custSel modSld">
-      <pc:chgData name="Joaquin Badenas" userId="5cb29fd719aebf04" providerId="LiveId" clId="{4F53BFBD-1E38-412E-AE7B-7E5D3B30168C}" dt="2024-07-23T05:44:29.132" v="4" actId="478"/>
+    <pc:docChg chg="undo custSel modSld">
+      <pc:chgData name="Joaquin Badenas" userId="5cb29fd719aebf04" providerId="LiveId" clId="{4F53BFBD-1E38-412E-AE7B-7E5D3B30168C}" dt="2024-07-23T06:19:32.473" v="11" actId="20577"/>
       <pc:docMkLst>
         <pc:docMk/>
       </pc:docMkLst>
+      <pc:sldChg chg="modSp mod">
+        <pc:chgData name="Joaquin Badenas" userId="5cb29fd719aebf04" providerId="LiveId" clId="{4F53BFBD-1E38-412E-AE7B-7E5D3B30168C}" dt="2024-07-23T06:19:32.473" v="11" actId="20577"/>
+        <pc:sldMkLst>
+          <pc:docMk/>
+          <pc:sldMk cId="202757184" sldId="277"/>
+        </pc:sldMkLst>
+        <pc:spChg chg="mod">
+          <ac:chgData name="Joaquin Badenas" userId="5cb29fd719aebf04" providerId="LiveId" clId="{4F53BFBD-1E38-412E-AE7B-7E5D3B30168C}" dt="2024-07-23T06:19:32.473" v="11" actId="20577"/>
+          <ac:spMkLst>
+            <pc:docMk/>
+            <pc:sldMk cId="202757184" sldId="277"/>
+            <ac:spMk id="3" creationId="{00000000-0000-0000-0000-000000000000}"/>
+          </ac:spMkLst>
+        </pc:spChg>
+      </pc:sldChg>
       <pc:sldChg chg="delSp modSp mod">
         <pc:chgData name="Joaquin Badenas" userId="5cb29fd719aebf04" providerId="LiveId" clId="{4F53BFBD-1E38-412E-AE7B-7E5D3B30168C}" dt="2024-07-23T05:44:29.132" v="4" actId="478"/>
         <pc:sldMkLst>
@@ -1766,6 +1781,21 @@
             <ac:cxnSpMk id="33" creationId="{BF872366-236C-78D6-DF62-1E279E24CF2D}"/>
           </ac:cxnSpMkLst>
         </pc:cxnChg>
+      </pc:sldChg>
+      <pc:sldChg chg="modSp mod">
+        <pc:chgData name="Joaquin Badenas" userId="5cb29fd719aebf04" providerId="LiveId" clId="{4F53BFBD-1E38-412E-AE7B-7E5D3B30168C}" dt="2024-07-23T06:19:23.030" v="5" actId="20577"/>
+        <pc:sldMkLst>
+          <pc:docMk/>
+          <pc:sldMk cId="4117868110" sldId="288"/>
+        </pc:sldMkLst>
+        <pc:spChg chg="mod">
+          <ac:chgData name="Joaquin Badenas" userId="5cb29fd719aebf04" providerId="LiveId" clId="{4F53BFBD-1E38-412E-AE7B-7E5D3B30168C}" dt="2024-07-23T06:19:23.030" v="5" actId="20577"/>
+          <ac:spMkLst>
+            <pc:docMk/>
+            <pc:sldMk cId="4117868110" sldId="288"/>
+            <ac:spMk id="3" creationId="{1445B374-01F9-2098-B1C0-B5C133FDD0CE}"/>
+          </ac:spMkLst>
+        </pc:spChg>
       </pc:sldChg>
     </pc:docChg>
   </pc:docChgLst>
@@ -8397,10 +8427,10 @@
               <a:buNone/>
             </a:pPr>
             <a:r>
-              <a:rPr lang="en-NZ" sz="2000" dirty="0">
-                <a:latin typeface="Abadi" panose="020B0604020104020204" pitchFamily="34" charset="0"/>
-              </a:rPr>
-              <a:t>Describe the purpose of your website?</a:t>
+              <a:rPr lang="en-NZ" dirty="0">
+                <a:latin typeface="Abadi" panose="020B0604020104020204" pitchFamily="34" charset="0"/>
+              </a:rPr>
+              <a:t>Purpose of my website is for students to be able to post questions of any subject that may be confused in. </a:t>
             </a:r>
           </a:p>
           <a:p>
@@ -8412,34 +8442,11 @@
               <a:rPr lang="en-NZ" dirty="0">
                 <a:latin typeface="Abadi" panose="020B0604020104020204" pitchFamily="34" charset="0"/>
               </a:rPr>
-              <a:t> Purpose of my website is for students to be able to post questions of any subject that may be confused in. </a:t>
-            </a:r>
-          </a:p>
-          <a:p>
-            <a:pPr>
-              <a:buFont typeface="Wingdings" panose="05000000000000000000" pitchFamily="2" charset="2"/>
-              <a:buChar char="q"/>
-            </a:pPr>
-            <a:r>
-              <a:rPr lang="en-NZ" dirty="0">
-                <a:latin typeface="Abadi" panose="020B0604020104020204" pitchFamily="34" charset="0"/>
-              </a:rPr>
               <a:t> This will then allow other students and teachers to be able to comment underneath their post answering their question. </a:t>
             </a:r>
             <a:endParaRPr lang="en-NZ" sz="2000" dirty="0">
               <a:latin typeface="Abadi" panose="020B0604020104020204" pitchFamily="34" charset="0"/>
             </a:endParaRPr>
-          </a:p>
-          <a:p>
-            <a:pPr marL="0" indent="0">
-              <a:buNone/>
-            </a:pPr>
-            <a:r>
-              <a:rPr lang="en-NZ" sz="2000" dirty="0">
-                <a:latin typeface="Abadi" panose="020B0604020104020204" pitchFamily="34" charset="0"/>
-              </a:rPr>
-              <a:t>Describe who the target audience are?</a:t>
-            </a:r>
           </a:p>
           <a:p>
             <a:pPr>
@@ -8584,15 +8591,6 @@
             <a:normAutofit/>
           </a:bodyPr>
           <a:lstStyle/>
-          <a:p>
-            <a:r>
-              <a:rPr lang="en-US" dirty="0">
-                <a:latin typeface="Abadi" panose="020B0604020104020204" pitchFamily="34" charset="0"/>
-                <a:cs typeface="Calibri"/>
-              </a:rPr>
-              <a:t>What are the specifications of your project (must haves). You can add to these as you develop your project.</a:t>
-            </a:r>
-          </a:p>
           <a:p>
             <a:pPr algn="l" rtl="0" fontAlgn="base">
               <a:buFont typeface="Wingdings" panose="05000000000000000000" pitchFamily="2" charset="2"/>

</xml_diff>

<commit_message>
Changed navlink to correct page
edited one link from the navbar to direct to the forum page instead of the blog page
</commit_message>
<xml_diff>
--- a/AS91903_91906_Evidence_Joaquin_Badenas.pptx
+++ b/AS91903_91906_Evidence_Joaquin_Badenas.pptx
@@ -28,11 +28,12 @@
     <p:sldId id="273" r:id="rId22"/>
     <p:sldId id="274" r:id="rId23"/>
     <p:sldId id="266" r:id="rId24"/>
-    <p:sldId id="275" r:id="rId25"/>
-    <p:sldId id="283" r:id="rId26"/>
-    <p:sldId id="265" r:id="rId27"/>
-    <p:sldId id="269" r:id="rId28"/>
-    <p:sldId id="276" r:id="rId29"/>
+    <p:sldId id="291" r:id="rId25"/>
+    <p:sldId id="275" r:id="rId26"/>
+    <p:sldId id="283" r:id="rId27"/>
+    <p:sldId id="265" r:id="rId28"/>
+    <p:sldId id="269" r:id="rId29"/>
+    <p:sldId id="276" r:id="rId30"/>
   </p:sldIdLst>
   <p:sldSz cx="12192000" cy="6858000"/>
   <p:notesSz cx="6858000" cy="9144000"/>
@@ -139,6 +140,14 @@
 </p:presentation>
 </file>
 
+<file path=ppt/revisionInfo.xml><?xml version="1.0" encoding="utf-8"?>
+<p1510:revInfo xmlns:a="http://schemas.openxmlformats.org/drawingml/2006/main" xmlns:r="http://schemas.openxmlformats.org/officeDocument/2006/relationships" xmlns:p1510="http://schemas.microsoft.com/office/powerpoint/2015/10/main">
+  <p1510:revLst>
+    <p1510:client id="{4F53BFBD-1E38-412E-AE7B-7E5D3B30168C}" v="2" dt="2024-07-23T09:27:04.824"/>
+  </p1510:revLst>
+</p1510:revInfo>
+</file>
+
 <file path=ppt/changesInfos/changesInfo1.xml><?xml version="1.0" encoding="utf-8"?>
 <pc:chgInfo xmlns:a="http://schemas.openxmlformats.org/drawingml/2006/main" xmlns:r="http://schemas.openxmlformats.org/officeDocument/2006/relationships" xmlns:ac="http://schemas.microsoft.com/office/drawing/2013/main/command" xmlns:pc="http://schemas.microsoft.com/office/powerpoint/2013/main/command">
   <pc:docChgLst>
@@ -1579,11 +1588,26 @@
   </pc:docChgLst>
   <pc:docChgLst>
     <pc:chgData name="Joaquin Badenas" userId="5cb29fd719aebf04" providerId="LiveId" clId="{4F53BFBD-1E38-412E-AE7B-7E5D3B30168C}"/>
-    <pc:docChg chg="undo custSel modSld">
-      <pc:chgData name="Joaquin Badenas" userId="5cb29fd719aebf04" providerId="LiveId" clId="{4F53BFBD-1E38-412E-AE7B-7E5D3B30168C}" dt="2024-07-23T06:19:32.473" v="11" actId="20577"/>
+    <pc:docChg chg="undo custSel addSld modSld">
+      <pc:chgData name="Joaquin Badenas" userId="5cb29fd719aebf04" providerId="LiveId" clId="{4F53BFBD-1E38-412E-AE7B-7E5D3B30168C}" dt="2024-07-23T09:38:11.323" v="1295" actId="478"/>
       <pc:docMkLst>
         <pc:docMk/>
       </pc:docMkLst>
+      <pc:sldChg chg="modSp mod">
+        <pc:chgData name="Joaquin Badenas" userId="5cb29fd719aebf04" providerId="LiveId" clId="{4F53BFBD-1E38-412E-AE7B-7E5D3B30168C}" dt="2024-07-23T08:43:48.497" v="910" actId="20577"/>
+        <pc:sldMkLst>
+          <pc:docMk/>
+          <pc:sldMk cId="2873264670" sldId="271"/>
+        </pc:sldMkLst>
+        <pc:spChg chg="mod">
+          <ac:chgData name="Joaquin Badenas" userId="5cb29fd719aebf04" providerId="LiveId" clId="{4F53BFBD-1E38-412E-AE7B-7E5D3B30168C}" dt="2024-07-23T08:43:48.497" v="910" actId="20577"/>
+          <ac:spMkLst>
+            <pc:docMk/>
+            <pc:sldMk cId="2873264670" sldId="271"/>
+            <ac:spMk id="3" creationId="{00000000-0000-0000-0000-000000000000}"/>
+          </ac:spMkLst>
+        </pc:spChg>
+      </pc:sldChg>
       <pc:sldChg chg="modSp mod">
         <pc:chgData name="Joaquin Badenas" userId="5cb29fd719aebf04" providerId="LiveId" clId="{4F53BFBD-1E38-412E-AE7B-7E5D3B30168C}" dt="2024-07-23T06:19:32.473" v="11" actId="20577"/>
         <pc:sldMkLst>
@@ -1796,6 +1820,69 @@
             <ac:spMk id="3" creationId="{1445B374-01F9-2098-B1C0-B5C133FDD0CE}"/>
           </ac:spMkLst>
         </pc:spChg>
+      </pc:sldChg>
+      <pc:sldChg chg="addSp delSp modSp add mod">
+        <pc:chgData name="Joaquin Badenas" userId="5cb29fd719aebf04" providerId="LiveId" clId="{4F53BFBD-1E38-412E-AE7B-7E5D3B30168C}" dt="2024-07-23T09:38:11.323" v="1295" actId="478"/>
+        <pc:sldMkLst>
+          <pc:docMk/>
+          <pc:sldMk cId="3782274042" sldId="291"/>
+        </pc:sldMkLst>
+        <pc:spChg chg="del mod">
+          <ac:chgData name="Joaquin Badenas" userId="5cb29fd719aebf04" providerId="LiveId" clId="{4F53BFBD-1E38-412E-AE7B-7E5D3B30168C}" dt="2024-07-23T09:26:42.243" v="1093" actId="478"/>
+          <ac:spMkLst>
+            <pc:docMk/>
+            <pc:sldMk cId="3782274042" sldId="291"/>
+            <ac:spMk id="3" creationId="{00000000-0000-0000-0000-000000000000}"/>
+          </ac:spMkLst>
+        </pc:spChg>
+        <pc:graphicFrameChg chg="add del mod modGraphic">
+          <ac:chgData name="Joaquin Badenas" userId="5cb29fd719aebf04" providerId="LiveId" clId="{4F53BFBD-1E38-412E-AE7B-7E5D3B30168C}" dt="2024-07-23T09:38:11.323" v="1295" actId="478"/>
+          <ac:graphicFrameMkLst>
+            <pc:docMk/>
+            <pc:sldMk cId="3782274042" sldId="291"/>
+            <ac:graphicFrameMk id="6" creationId="{10F15322-203A-5EC8-C81C-F6F73AFDBCC7}"/>
+          </ac:graphicFrameMkLst>
+        </pc:graphicFrameChg>
+        <pc:picChg chg="add del mod ord modCrop">
+          <ac:chgData name="Joaquin Badenas" userId="5cb29fd719aebf04" providerId="LiveId" clId="{4F53BFBD-1E38-412E-AE7B-7E5D3B30168C}" dt="2024-07-23T09:27:03.676" v="1106" actId="478"/>
+          <ac:picMkLst>
+            <pc:docMk/>
+            <pc:sldMk cId="3782274042" sldId="291"/>
+            <ac:picMk id="5" creationId="{CF74458E-AE4F-523C-FCA4-0104C573D4F1}"/>
+          </ac:picMkLst>
+        </pc:picChg>
+        <pc:picChg chg="add del mod">
+          <ac:chgData name="Joaquin Badenas" userId="5cb29fd719aebf04" providerId="LiveId" clId="{4F53BFBD-1E38-412E-AE7B-7E5D3B30168C}" dt="2024-07-23T09:38:11.323" v="1295" actId="478"/>
+          <ac:picMkLst>
+            <pc:docMk/>
+            <pc:sldMk cId="3782274042" sldId="291"/>
+            <ac:picMk id="7" creationId="{F5C19B0E-E989-617F-E892-0F9F08F98CCF}"/>
+          </ac:picMkLst>
+        </pc:picChg>
+        <pc:picChg chg="add del mod">
+          <ac:chgData name="Joaquin Badenas" userId="5cb29fd719aebf04" providerId="LiveId" clId="{4F53BFBD-1E38-412E-AE7B-7E5D3B30168C}" dt="2024-07-23T09:38:11.323" v="1295" actId="478"/>
+          <ac:picMkLst>
+            <pc:docMk/>
+            <pc:sldMk cId="3782274042" sldId="291"/>
+            <ac:picMk id="9" creationId="{C6113748-6DE0-2D4A-5708-A8E5BC67B90A}"/>
+          </ac:picMkLst>
+        </pc:picChg>
+        <pc:picChg chg="add del mod">
+          <ac:chgData name="Joaquin Badenas" userId="5cb29fd719aebf04" providerId="LiveId" clId="{4F53BFBD-1E38-412E-AE7B-7E5D3B30168C}" dt="2024-07-23T09:38:11.323" v="1295" actId="478"/>
+          <ac:picMkLst>
+            <pc:docMk/>
+            <pc:sldMk cId="3782274042" sldId="291"/>
+            <ac:picMk id="11" creationId="{B177544B-8DE3-AF44-05C4-A950D5D32283}"/>
+          </ac:picMkLst>
+        </pc:picChg>
+        <pc:picChg chg="add del mod">
+          <ac:chgData name="Joaquin Badenas" userId="5cb29fd719aebf04" providerId="LiveId" clId="{4F53BFBD-1E38-412E-AE7B-7E5D3B30168C}" dt="2024-07-23T09:38:11.323" v="1295" actId="478"/>
+          <ac:picMkLst>
+            <pc:docMk/>
+            <pc:sldMk cId="3782274042" sldId="291"/>
+            <ac:picMk id="13" creationId="{9620F8F7-79C3-0926-AF34-F3A22AD2C4E2}"/>
+          </ac:picMkLst>
+        </pc:picChg>
       </pc:sldChg>
     </pc:docChg>
   </pc:docChgLst>
@@ -7092,7 +7179,9 @@
         </p:nvSpPr>
         <p:spPr/>
         <p:txBody>
-          <a:bodyPr/>
+          <a:bodyPr>
+            <a:normAutofit fontScale="77500" lnSpcReduction="20000"/>
+          </a:bodyPr>
           <a:lstStyle/>
           <a:p>
             <a:pPr marL="0" indent="0">
@@ -7112,6 +7201,17 @@
                 <a:latin typeface="Abadi" panose="020B0604020104020204" pitchFamily="34" charset="0"/>
               </a:rPr>
               <a:t>to ensure it functions correctly</a:t>
+            </a:r>
+          </a:p>
+          <a:p>
+            <a:pPr marL="0" lvl="0" indent="0">
+              <a:buNone/>
+            </a:pPr>
+            <a:r>
+              <a:rPr lang="en-NZ" sz="2000" dirty="0">
+                <a:latin typeface="Abadi" panose="020B0604020104020204" pitchFamily="34" charset="0"/>
+              </a:rPr>
+              <a:t>Using the Blog App that I had previously done in class, I have already ensured that the main functions of my program (signup/login, creating/deleting posts), as well as some additional features function already. When I am adding any new components or features into my program/website, I will be sure to test it by taking screenshots before and after implementing the code. </a:t>
             </a:r>
             <a:endParaRPr lang="en-NZ" sz="2000" dirty="0">
               <a:effectLst/>
@@ -7125,6 +7225,37 @@
                 <a:latin typeface="Abadi" panose="020B0604020104020204" pitchFamily="34" charset="0"/>
               </a:rPr>
               <a:t>That the python code is PEP8 compliant</a:t>
+            </a:r>
+          </a:p>
+          <a:p>
+            <a:pPr marL="0" lvl="0" indent="0">
+              <a:buNone/>
+            </a:pPr>
+            <a:r>
+              <a:rPr lang="en-NZ" sz="2000" dirty="0">
+                <a:effectLst/>
+                <a:latin typeface="Abadi" panose="020B0604020104020204" pitchFamily="34" charset="0"/>
+              </a:rPr>
+              <a:t>In </a:t>
+            </a:r>
+            <a:r>
+              <a:rPr lang="en-NZ" sz="2000" dirty="0" err="1">
+                <a:effectLst/>
+                <a:latin typeface="Abadi" panose="020B0604020104020204" pitchFamily="34" charset="0"/>
+              </a:rPr>
+              <a:t>V</a:t>
+            </a:r>
+            <a:r>
+              <a:rPr lang="en-NZ" sz="2000" dirty="0" err="1">
+                <a:latin typeface="Abadi" panose="020B0604020104020204" pitchFamily="34" charset="0"/>
+              </a:rPr>
+              <a:t>SCode</a:t>
+            </a:r>
+            <a:r>
+              <a:rPr lang="en-NZ" sz="2000" dirty="0">
+                <a:latin typeface="Abadi" panose="020B0604020104020204" pitchFamily="34" charset="0"/>
+              </a:rPr>
+              <a:t> there is a PEP8 formatting extension which I will utilise. Doing this, the extension will automatically format my python code making sure that is compliant</a:t>
             </a:r>
             <a:endParaRPr lang="en-NZ" sz="2000" dirty="0">
               <a:effectLst/>
@@ -7505,36 +7636,7 @@
               <a:rPr lang="en-NZ" sz="2800" dirty="0">
                 <a:latin typeface="Abadi" panose="020B0604020104020204" pitchFamily="34" charset="0"/>
               </a:rPr>
-              <a:t>Version Control</a:t>
-            </a:r>
-          </a:p>
-        </p:txBody>
-      </p:sp>
-      <p:sp>
-        <p:nvSpPr>
-          <p:cNvPr id="3" name="Content Placeholder 2"/>
-          <p:cNvSpPr>
-            <a:spLocks noGrp="1"/>
-          </p:cNvSpPr>
-          <p:nvPr>
-            <p:ph idx="1"/>
-          </p:nvPr>
-        </p:nvSpPr>
-        <p:spPr/>
-        <p:txBody>
-          <a:bodyPr>
-            <a:normAutofit/>
-          </a:bodyPr>
-          <a:lstStyle/>
-          <a:p>
-            <a:pPr marL="0" indent="0">
-              <a:buNone/>
-            </a:pPr>
-            <a:r>
-              <a:rPr lang="en-NZ" sz="2000" dirty="0">
-                <a:latin typeface="Abadi" panose="020B0604020104020204" pitchFamily="34" charset="0"/>
-              </a:rPr>
-              <a:t>Show how you have used version control throughout the design, development, and testing process.</a:t>
+              <a:t>Iterative Improvement</a:t>
             </a:r>
           </a:p>
         </p:txBody>
@@ -7542,7 +7644,7 @@
     </p:spTree>
     <p:extLst>
       <p:ext uri="{BB962C8B-B14F-4D97-AF65-F5344CB8AC3E}">
-        <p14:creationId xmlns:p14="http://schemas.microsoft.com/office/powerpoint/2010/main" val="2812247241"/>
+        <p14:creationId xmlns:p14="http://schemas.microsoft.com/office/powerpoint/2010/main" val="3782274042"/>
       </p:ext>
     </p:extLst>
   </p:cSld>
@@ -7590,7 +7692,7 @@
               <a:rPr lang="en-NZ" sz="2800" dirty="0">
                 <a:latin typeface="Abadi" panose="020B0604020104020204" pitchFamily="34" charset="0"/>
               </a:rPr>
-              <a:t>GitHub Commits</a:t>
+              <a:t>Version Control</a:t>
             </a:r>
           </a:p>
         </p:txBody>
@@ -7619,7 +7721,7 @@
               <a:rPr lang="en-NZ" sz="2000" dirty="0">
                 <a:latin typeface="Abadi" panose="020B0604020104020204" pitchFamily="34" charset="0"/>
               </a:rPr>
-              <a:t>Show how you have used GitHub throughout the design, development, and testing process.</a:t>
+              <a:t>Show how you have used version control throughout the design, development, and testing process.</a:t>
             </a:r>
           </a:p>
         </p:txBody>
@@ -7627,7 +7729,7 @@
     </p:spTree>
     <p:extLst>
       <p:ext uri="{BB962C8B-B14F-4D97-AF65-F5344CB8AC3E}">
-        <p14:creationId xmlns:p14="http://schemas.microsoft.com/office/powerpoint/2010/main" val="1865976428"/>
+        <p14:creationId xmlns:p14="http://schemas.microsoft.com/office/powerpoint/2010/main" val="2812247241"/>
       </p:ext>
     </p:extLst>
   </p:cSld>
@@ -7675,6 +7777,91 @@
               <a:rPr lang="en-NZ" sz="2800" dirty="0">
                 <a:latin typeface="Abadi" panose="020B0604020104020204" pitchFamily="34" charset="0"/>
               </a:rPr>
+              <a:t>GitHub Commits</a:t>
+            </a:r>
+          </a:p>
+        </p:txBody>
+      </p:sp>
+      <p:sp>
+        <p:nvSpPr>
+          <p:cNvPr id="3" name="Content Placeholder 2"/>
+          <p:cNvSpPr>
+            <a:spLocks noGrp="1"/>
+          </p:cNvSpPr>
+          <p:nvPr>
+            <p:ph idx="1"/>
+          </p:nvPr>
+        </p:nvSpPr>
+        <p:spPr/>
+        <p:txBody>
+          <a:bodyPr>
+            <a:normAutofit/>
+          </a:bodyPr>
+          <a:lstStyle/>
+          <a:p>
+            <a:pPr marL="0" indent="0">
+              <a:buNone/>
+            </a:pPr>
+            <a:r>
+              <a:rPr lang="en-NZ" sz="2000" dirty="0">
+                <a:latin typeface="Abadi" panose="020B0604020104020204" pitchFamily="34" charset="0"/>
+              </a:rPr>
+              <a:t>Show how you have used GitHub throughout the design, development, and testing process.</a:t>
+            </a:r>
+          </a:p>
+        </p:txBody>
+      </p:sp>
+    </p:spTree>
+    <p:extLst>
+      <p:ext uri="{BB962C8B-B14F-4D97-AF65-F5344CB8AC3E}">
+        <p14:creationId xmlns:p14="http://schemas.microsoft.com/office/powerpoint/2010/main" val="1865976428"/>
+      </p:ext>
+    </p:extLst>
+  </p:cSld>
+  <p:clrMapOvr>
+    <a:masterClrMapping/>
+  </p:clrMapOvr>
+</p:sld>
+</file>
+
+<file path=ppt/slides/slide27.xml><?xml version="1.0" encoding="utf-8"?>
+<p:sld xmlns:a="http://schemas.openxmlformats.org/drawingml/2006/main" xmlns:r="http://schemas.openxmlformats.org/officeDocument/2006/relationships" xmlns:p="http://schemas.openxmlformats.org/presentationml/2006/main">
+  <p:cSld>
+    <p:spTree>
+      <p:nvGrpSpPr>
+        <p:cNvPr id="1" name=""/>
+        <p:cNvGrpSpPr/>
+        <p:nvPr/>
+      </p:nvGrpSpPr>
+      <p:grpSpPr>
+        <a:xfrm>
+          <a:off x="0" y="0"/>
+          <a:ext cx="0" cy="0"/>
+          <a:chOff x="0" y="0"/>
+          <a:chExt cx="0" cy="0"/>
+        </a:xfrm>
+      </p:grpSpPr>
+      <p:sp>
+        <p:nvSpPr>
+          <p:cNvPr id="2" name="Title 1"/>
+          <p:cNvSpPr>
+            <a:spLocks noGrp="1"/>
+          </p:cNvSpPr>
+          <p:nvPr>
+            <p:ph type="title"/>
+          </p:nvPr>
+        </p:nvSpPr>
+        <p:spPr/>
+        <p:txBody>
+          <a:bodyPr>
+            <a:normAutofit/>
+          </a:bodyPr>
+          <a:lstStyle/>
+          <a:p>
+            <a:r>
+              <a:rPr lang="en-NZ" sz="2800" dirty="0">
+                <a:latin typeface="Abadi" panose="020B0604020104020204" pitchFamily="34" charset="0"/>
+              </a:rPr>
               <a:t>Addressing Relevant Implications</a:t>
             </a:r>
           </a:p>
@@ -7722,7 +7909,7 @@
 </p:sld>
 </file>
 
-<file path=ppt/slides/slide27.xml><?xml version="1.0" encoding="utf-8"?>
+<file path=ppt/slides/slide28.xml><?xml version="1.0" encoding="utf-8"?>
 <p:sld xmlns:a="http://schemas.openxmlformats.org/drawingml/2006/main" xmlns:r="http://schemas.openxmlformats.org/officeDocument/2006/relationships" xmlns:p="http://schemas.openxmlformats.org/presentationml/2006/main">
   <p:cSld>
     <p:spTree>
@@ -7821,7 +8008,7 @@
 </p:sld>
 </file>
 
-<file path=ppt/slides/slide28.xml><?xml version="1.0" encoding="utf-8"?>
+<file path=ppt/slides/slide29.xml><?xml version="1.0" encoding="utf-8"?>
 <p:sld xmlns:a="http://schemas.openxmlformats.org/drawingml/2006/main" xmlns:r="http://schemas.openxmlformats.org/officeDocument/2006/relationships" xmlns:p="http://schemas.openxmlformats.org/presentationml/2006/main">
   <p:cSld>
     <p:spTree>

</xml_diff>

<commit_message>
changed route to be for forum
edited route for home page to be named forum rather than blog
</commit_message>
<xml_diff>
--- a/AS91903_91906_Evidence_Joaquin_Badenas.pptx
+++ b/AS91903_91906_Evidence_Joaquin_Badenas.pptx
@@ -1589,7 +1589,7 @@
   <pc:docChgLst>
     <pc:chgData name="Joaquin Badenas" userId="5cb29fd719aebf04" providerId="LiveId" clId="{4F53BFBD-1E38-412E-AE7B-7E5D3B30168C}"/>
     <pc:docChg chg="undo custSel addSld modSld">
-      <pc:chgData name="Joaquin Badenas" userId="5cb29fd719aebf04" providerId="LiveId" clId="{4F53BFBD-1E38-412E-AE7B-7E5D3B30168C}" dt="2024-07-23T09:38:11.323" v="1295" actId="478"/>
+      <pc:chgData name="Joaquin Badenas" userId="5cb29fd719aebf04" providerId="LiveId" clId="{4F53BFBD-1E38-412E-AE7B-7E5D3B30168C}" dt="2024-07-23T09:45:49.163" v="1350" actId="478"/>
       <pc:docMkLst>
         <pc:docMk/>
       </pc:docMkLst>
@@ -1822,7 +1822,7 @@
         </pc:spChg>
       </pc:sldChg>
       <pc:sldChg chg="addSp delSp modSp add mod">
-        <pc:chgData name="Joaquin Badenas" userId="5cb29fd719aebf04" providerId="LiveId" clId="{4F53BFBD-1E38-412E-AE7B-7E5D3B30168C}" dt="2024-07-23T09:38:11.323" v="1295" actId="478"/>
+        <pc:chgData name="Joaquin Badenas" userId="5cb29fd719aebf04" providerId="LiveId" clId="{4F53BFBD-1E38-412E-AE7B-7E5D3B30168C}" dt="2024-07-23T09:45:49.163" v="1350" actId="478"/>
         <pc:sldMkLst>
           <pc:docMk/>
           <pc:sldMk cId="3782274042" sldId="291"/>
@@ -1835,6 +1835,14 @@
             <ac:spMk id="3" creationId="{00000000-0000-0000-0000-000000000000}"/>
           </ac:spMkLst>
         </pc:spChg>
+        <pc:graphicFrameChg chg="add del mod modGraphic">
+          <ac:chgData name="Joaquin Badenas" userId="5cb29fd719aebf04" providerId="LiveId" clId="{4F53BFBD-1E38-412E-AE7B-7E5D3B30168C}" dt="2024-07-23T09:45:49.163" v="1350" actId="478"/>
+          <ac:graphicFrameMkLst>
+            <pc:docMk/>
+            <pc:sldMk cId="3782274042" sldId="291"/>
+            <ac:graphicFrameMk id="3" creationId="{D2018952-7B3F-8863-F1B5-E0A19927F28C}"/>
+          </ac:graphicFrameMkLst>
+        </pc:graphicFrameChg>
         <pc:graphicFrameChg chg="add del mod modGraphic">
           <ac:chgData name="Joaquin Badenas" userId="5cb29fd719aebf04" providerId="LiveId" clId="{4F53BFBD-1E38-412E-AE7B-7E5D3B30168C}" dt="2024-07-23T09:38:11.323" v="1295" actId="478"/>
           <ac:graphicFrameMkLst>

</xml_diff>

<commit_message>
Redesigned wireframes for website
Made changes to wireframe on what the website wants to look like. As well as changed my purpose of my website.
</commit_message>
<xml_diff>
--- a/AS91903_91906_Evidence_Joaquin_Badenas.pptx
+++ b/AS91903_91906_Evidence_Joaquin_Badenas.pptx
@@ -22,18 +22,20 @@
     <p:sldId id="285" r:id="rId16"/>
     <p:sldId id="286" r:id="rId17"/>
     <p:sldId id="289" r:id="rId18"/>
-    <p:sldId id="287" r:id="rId19"/>
-    <p:sldId id="290" r:id="rId20"/>
-    <p:sldId id="271" r:id="rId21"/>
-    <p:sldId id="273" r:id="rId22"/>
-    <p:sldId id="274" r:id="rId23"/>
-    <p:sldId id="266" r:id="rId24"/>
-    <p:sldId id="291" r:id="rId25"/>
-    <p:sldId id="275" r:id="rId26"/>
-    <p:sldId id="283" r:id="rId27"/>
-    <p:sldId id="265" r:id="rId28"/>
-    <p:sldId id="269" r:id="rId29"/>
-    <p:sldId id="276" r:id="rId30"/>
+    <p:sldId id="292" r:id="rId19"/>
+    <p:sldId id="293" r:id="rId20"/>
+    <p:sldId id="294" r:id="rId21"/>
+    <p:sldId id="295" r:id="rId22"/>
+    <p:sldId id="271" r:id="rId23"/>
+    <p:sldId id="273" r:id="rId24"/>
+    <p:sldId id="274" r:id="rId25"/>
+    <p:sldId id="266" r:id="rId26"/>
+    <p:sldId id="291" r:id="rId27"/>
+    <p:sldId id="275" r:id="rId28"/>
+    <p:sldId id="283" r:id="rId29"/>
+    <p:sldId id="265" r:id="rId30"/>
+    <p:sldId id="269" r:id="rId31"/>
+    <p:sldId id="276" r:id="rId32"/>
   </p:sldIdLst>
   <p:sldSz cx="12192000" cy="6858000"/>
   <p:notesSz cx="6858000" cy="9144000"/>
@@ -143,7 +145,7 @@
 <file path=ppt/revisionInfo.xml><?xml version="1.0" encoding="utf-8"?>
 <p1510:revInfo xmlns:a="http://schemas.openxmlformats.org/drawingml/2006/main" xmlns:r="http://schemas.openxmlformats.org/officeDocument/2006/relationships" xmlns:p1510="http://schemas.microsoft.com/office/powerpoint/2015/10/main">
   <p1510:revLst>
-    <p1510:client id="{4F53BFBD-1E38-412E-AE7B-7E5D3B30168C}" v="2" dt="2024-07-23T09:27:04.824"/>
+    <p1510:client id="{4F53BFBD-1E38-412E-AE7B-7E5D3B30168C}" v="13" dt="2024-07-24T21:21:22.876"/>
   </p1510:revLst>
 </p1510:revInfo>
 </file>
@@ -1588,19 +1590,19 @@
   </pc:docChgLst>
   <pc:docChgLst>
     <pc:chgData name="Joaquin Badenas" userId="5cb29fd719aebf04" providerId="LiveId" clId="{4F53BFBD-1E38-412E-AE7B-7E5D3B30168C}"/>
-    <pc:docChg chg="undo custSel addSld modSld">
-      <pc:chgData name="Joaquin Badenas" userId="5cb29fd719aebf04" providerId="LiveId" clId="{4F53BFBD-1E38-412E-AE7B-7E5D3B30168C}" dt="2024-07-23T09:45:49.163" v="1350" actId="478"/>
+    <pc:docChg chg="undo custSel addSld delSld modSld">
+      <pc:chgData name="Joaquin Badenas" userId="5cb29fd719aebf04" providerId="LiveId" clId="{4F53BFBD-1E38-412E-AE7B-7E5D3B30168C}" dt="2024-07-24T21:21:24.649" v="2772" actId="962"/>
       <pc:docMkLst>
         <pc:docMk/>
       </pc:docMkLst>
       <pc:sldChg chg="modSp mod">
-        <pc:chgData name="Joaquin Badenas" userId="5cb29fd719aebf04" providerId="LiveId" clId="{4F53BFBD-1E38-412E-AE7B-7E5D3B30168C}" dt="2024-07-23T08:43:48.497" v="910" actId="20577"/>
+        <pc:chgData name="Joaquin Badenas" userId="5cb29fd719aebf04" providerId="LiveId" clId="{4F53BFBD-1E38-412E-AE7B-7E5D3B30168C}" dt="2024-07-24T20:56:05.910" v="2691" actId="20577"/>
         <pc:sldMkLst>
           <pc:docMk/>
           <pc:sldMk cId="2873264670" sldId="271"/>
         </pc:sldMkLst>
         <pc:spChg chg="mod">
-          <ac:chgData name="Joaquin Badenas" userId="5cb29fd719aebf04" providerId="LiveId" clId="{4F53BFBD-1E38-412E-AE7B-7E5D3B30168C}" dt="2024-07-23T08:43:48.497" v="910" actId="20577"/>
+          <ac:chgData name="Joaquin Badenas" userId="5cb29fd719aebf04" providerId="LiveId" clId="{4F53BFBD-1E38-412E-AE7B-7E5D3B30168C}" dt="2024-07-24T20:56:05.910" v="2691" actId="20577"/>
           <ac:spMkLst>
             <pc:docMk/>
             <pc:sldMk cId="2873264670" sldId="271"/>
@@ -1609,13 +1611,13 @@
         </pc:spChg>
       </pc:sldChg>
       <pc:sldChg chg="modSp mod">
-        <pc:chgData name="Joaquin Badenas" userId="5cb29fd719aebf04" providerId="LiveId" clId="{4F53BFBD-1E38-412E-AE7B-7E5D3B30168C}" dt="2024-07-23T06:19:32.473" v="11" actId="20577"/>
+        <pc:chgData name="Joaquin Badenas" userId="5cb29fd719aebf04" providerId="LiveId" clId="{4F53BFBD-1E38-412E-AE7B-7E5D3B30168C}" dt="2024-07-24T03:50:26.845" v="2157" actId="20577"/>
         <pc:sldMkLst>
           <pc:docMk/>
           <pc:sldMk cId="202757184" sldId="277"/>
         </pc:sldMkLst>
         <pc:spChg chg="mod">
-          <ac:chgData name="Joaquin Badenas" userId="5cb29fd719aebf04" providerId="LiveId" clId="{4F53BFBD-1E38-412E-AE7B-7E5D3B30168C}" dt="2024-07-23T06:19:32.473" v="11" actId="20577"/>
+          <ac:chgData name="Joaquin Badenas" userId="5cb29fd719aebf04" providerId="LiveId" clId="{4F53BFBD-1E38-412E-AE7B-7E5D3B30168C}" dt="2024-07-24T03:50:26.845" v="2157" actId="20577"/>
           <ac:spMkLst>
             <pc:docMk/>
             <pc:sldMk cId="202757184" sldId="277"/>
@@ -1623,12 +1625,43 @@
           </ac:spMkLst>
         </pc:spChg>
       </pc:sldChg>
+      <pc:sldChg chg="modSp mod">
+        <pc:chgData name="Joaquin Badenas" userId="5cb29fd719aebf04" providerId="LiveId" clId="{4F53BFBD-1E38-412E-AE7B-7E5D3B30168C}" dt="2024-07-24T04:05:19.483" v="2685" actId="20577"/>
+        <pc:sldMkLst>
+          <pc:docMk/>
+          <pc:sldMk cId="3884377122" sldId="281"/>
+        </pc:sldMkLst>
+        <pc:spChg chg="mod">
+          <ac:chgData name="Joaquin Badenas" userId="5cb29fd719aebf04" providerId="LiveId" clId="{4F53BFBD-1E38-412E-AE7B-7E5D3B30168C}" dt="2024-07-24T03:28:17.883" v="1358" actId="20577"/>
+          <ac:spMkLst>
+            <pc:docMk/>
+            <pc:sldMk cId="3884377122" sldId="281"/>
+            <ac:spMk id="2" creationId="{AFF829F3-AE19-CC44-635D-6E007C732CE5}"/>
+          </ac:spMkLst>
+        </pc:spChg>
+        <pc:spChg chg="mod">
+          <ac:chgData name="Joaquin Badenas" userId="5cb29fd719aebf04" providerId="LiveId" clId="{4F53BFBD-1E38-412E-AE7B-7E5D3B30168C}" dt="2024-07-24T04:05:19.483" v="2685" actId="20577"/>
+          <ac:spMkLst>
+            <pc:docMk/>
+            <pc:sldMk cId="3884377122" sldId="281"/>
+            <ac:spMk id="3" creationId="{5F197BEC-6339-24DF-441D-E468082D4F84}"/>
+          </ac:spMkLst>
+        </pc:spChg>
+      </pc:sldChg>
       <pc:sldChg chg="delSp modSp mod">
-        <pc:chgData name="Joaquin Badenas" userId="5cb29fd719aebf04" providerId="LiveId" clId="{4F53BFBD-1E38-412E-AE7B-7E5D3B30168C}" dt="2024-07-23T05:44:29.132" v="4" actId="478"/>
+        <pc:chgData name="Joaquin Badenas" userId="5cb29fd719aebf04" providerId="LiveId" clId="{4F53BFBD-1E38-412E-AE7B-7E5D3B30168C}" dt="2024-07-24T21:07:23.514" v="2701" actId="20577"/>
         <pc:sldMkLst>
           <pc:docMk/>
           <pc:sldMk cId="2068048871" sldId="285"/>
         </pc:sldMkLst>
+        <pc:spChg chg="mod">
+          <ac:chgData name="Joaquin Badenas" userId="5cb29fd719aebf04" providerId="LiveId" clId="{4F53BFBD-1E38-412E-AE7B-7E5D3B30168C}" dt="2024-07-24T21:07:23.514" v="2701" actId="20577"/>
+          <ac:spMkLst>
+            <pc:docMk/>
+            <pc:sldMk cId="2068048871" sldId="285"/>
+            <ac:spMk id="4" creationId="{5B069E1F-AA9E-4E42-2862-805AEF54F22E}"/>
+          </ac:spMkLst>
+        </pc:spChg>
         <pc:spChg chg="del">
           <ac:chgData name="Joaquin Badenas" userId="5cb29fd719aebf04" providerId="LiveId" clId="{4F53BFBD-1E38-412E-AE7B-7E5D3B30168C}" dt="2024-07-23T05:44:18.948" v="0" actId="478"/>
           <ac:spMkLst>
@@ -1806,20 +1839,81 @@
           </ac:cxnSpMkLst>
         </pc:cxnChg>
       </pc:sldChg>
+      <pc:sldChg chg="addSp delSp modSp del">
+        <pc:chgData name="Joaquin Badenas" userId="5cb29fd719aebf04" providerId="LiveId" clId="{4F53BFBD-1E38-412E-AE7B-7E5D3B30168C}" dt="2024-07-24T20:41:12.288" v="2688" actId="47"/>
+        <pc:sldMkLst>
+          <pc:docMk/>
+          <pc:sldMk cId="2462060945" sldId="287"/>
+        </pc:sldMkLst>
+        <pc:spChg chg="add mod">
+          <ac:chgData name="Joaquin Badenas" userId="5cb29fd719aebf04" providerId="LiveId" clId="{4F53BFBD-1E38-412E-AE7B-7E5D3B30168C}" dt="2024-07-24T20:41:03.691" v="2686" actId="478"/>
+          <ac:spMkLst>
+            <pc:docMk/>
+            <pc:sldMk cId="2462060945" sldId="287"/>
+            <ac:spMk id="3" creationId="{87251F89-FE99-2DB0-948D-97EE226B42A8}"/>
+          </ac:spMkLst>
+        </pc:spChg>
+        <pc:picChg chg="del">
+          <ac:chgData name="Joaquin Badenas" userId="5cb29fd719aebf04" providerId="LiveId" clId="{4F53BFBD-1E38-412E-AE7B-7E5D3B30168C}" dt="2024-07-24T20:41:03.691" v="2686" actId="478"/>
+          <ac:picMkLst>
+            <pc:docMk/>
+            <pc:sldMk cId="2462060945" sldId="287"/>
+            <ac:picMk id="1026" creationId="{66CFF85F-6C2A-9298-80AC-1EC59BF74326}"/>
+          </ac:picMkLst>
+        </pc:picChg>
+      </pc:sldChg>
       <pc:sldChg chg="modSp mod">
-        <pc:chgData name="Joaquin Badenas" userId="5cb29fd719aebf04" providerId="LiveId" clId="{4F53BFBD-1E38-412E-AE7B-7E5D3B30168C}" dt="2024-07-23T06:19:23.030" v="5" actId="20577"/>
+        <pc:chgData name="Joaquin Badenas" userId="5cb29fd719aebf04" providerId="LiveId" clId="{4F53BFBD-1E38-412E-AE7B-7E5D3B30168C}" dt="2024-07-24T03:57:00.786" v="2380" actId="20577"/>
         <pc:sldMkLst>
           <pc:docMk/>
           <pc:sldMk cId="4117868110" sldId="288"/>
         </pc:sldMkLst>
         <pc:spChg chg="mod">
-          <ac:chgData name="Joaquin Badenas" userId="5cb29fd719aebf04" providerId="LiveId" clId="{4F53BFBD-1E38-412E-AE7B-7E5D3B30168C}" dt="2024-07-23T06:19:23.030" v="5" actId="20577"/>
+          <ac:chgData name="Joaquin Badenas" userId="5cb29fd719aebf04" providerId="LiveId" clId="{4F53BFBD-1E38-412E-AE7B-7E5D3B30168C}" dt="2024-07-24T03:57:00.786" v="2380" actId="20577"/>
           <ac:spMkLst>
             <pc:docMk/>
             <pc:sldMk cId="4117868110" sldId="288"/>
             <ac:spMk id="3" creationId="{1445B374-01F9-2098-B1C0-B5C133FDD0CE}"/>
           </ac:spMkLst>
         </pc:spChg>
+      </pc:sldChg>
+      <pc:sldChg chg="addSp delSp modSp add del mod">
+        <pc:chgData name="Joaquin Badenas" userId="5cb29fd719aebf04" providerId="LiveId" clId="{4F53BFBD-1E38-412E-AE7B-7E5D3B30168C}" dt="2024-07-24T21:07:12.730" v="2696" actId="27614"/>
+        <pc:sldMkLst>
+          <pc:docMk/>
+          <pc:sldMk cId="3446630041" sldId="289"/>
+        </pc:sldMkLst>
+        <pc:spChg chg="del">
+          <ac:chgData name="Joaquin Badenas" userId="5cb29fd719aebf04" providerId="LiveId" clId="{4F53BFBD-1E38-412E-AE7B-7E5D3B30168C}" dt="2024-07-24T21:07:09.058" v="2695" actId="931"/>
+          <ac:spMkLst>
+            <pc:docMk/>
+            <pc:sldMk cId="3446630041" sldId="289"/>
+            <ac:spMk id="3" creationId="{5B68399D-040E-72E1-5BE1-82559BC616F7}"/>
+          </ac:spMkLst>
+        </pc:spChg>
+        <pc:picChg chg="add mod">
+          <ac:chgData name="Joaquin Badenas" userId="5cb29fd719aebf04" providerId="LiveId" clId="{4F53BFBD-1E38-412E-AE7B-7E5D3B30168C}" dt="2024-07-24T21:07:12.730" v="2696" actId="27614"/>
+          <ac:picMkLst>
+            <pc:docMk/>
+            <pc:sldMk cId="3446630041" sldId="289"/>
+            <ac:picMk id="5" creationId="{7D62DDF7-D60C-864E-8AB3-6428C09F5C9F}"/>
+          </ac:picMkLst>
+        </pc:picChg>
+        <pc:picChg chg="del">
+          <ac:chgData name="Joaquin Badenas" userId="5cb29fd719aebf04" providerId="LiveId" clId="{4F53BFBD-1E38-412E-AE7B-7E5D3B30168C}" dt="2024-07-24T21:06:35.190" v="2694" actId="478"/>
+          <ac:picMkLst>
+            <pc:docMk/>
+            <pc:sldMk cId="3446630041" sldId="289"/>
+            <ac:picMk id="2050" creationId="{566CC73E-FB93-225D-8F0A-558DDF0B817A}"/>
+          </ac:picMkLst>
+        </pc:picChg>
+      </pc:sldChg>
+      <pc:sldChg chg="del">
+        <pc:chgData name="Joaquin Badenas" userId="5cb29fd719aebf04" providerId="LiveId" clId="{4F53BFBD-1E38-412E-AE7B-7E5D3B30168C}" dt="2024-07-24T20:41:05.481" v="2687" actId="47"/>
+        <pc:sldMkLst>
+          <pc:docMk/>
+          <pc:sldMk cId="3303625023" sldId="290"/>
+        </pc:sldMkLst>
       </pc:sldChg>
       <pc:sldChg chg="addSp delSp modSp add mod">
         <pc:chgData name="Joaquin Badenas" userId="5cb29fd719aebf04" providerId="LiveId" clId="{4F53BFBD-1E38-412E-AE7B-7E5D3B30168C}" dt="2024-07-23T09:45:49.163" v="1350" actId="478"/>
@@ -1889,6 +1983,162 @@
             <pc:docMk/>
             <pc:sldMk cId="3782274042" sldId="291"/>
             <ac:picMk id="13" creationId="{9620F8F7-79C3-0926-AF34-F3A22AD2C4E2}"/>
+          </ac:picMkLst>
+        </pc:picChg>
+      </pc:sldChg>
+      <pc:sldChg chg="addSp delSp modSp add mod">
+        <pc:chgData name="Joaquin Badenas" userId="5cb29fd719aebf04" providerId="LiveId" clId="{4F53BFBD-1E38-412E-AE7B-7E5D3B30168C}" dt="2024-07-24T21:07:49.673" v="2722" actId="962"/>
+        <pc:sldMkLst>
+          <pc:docMk/>
+          <pc:sldMk cId="1657720437" sldId="292"/>
+        </pc:sldMkLst>
+        <pc:spChg chg="mod">
+          <ac:chgData name="Joaquin Badenas" userId="5cb29fd719aebf04" providerId="LiveId" clId="{4F53BFBD-1E38-412E-AE7B-7E5D3B30168C}" dt="2024-07-24T21:07:37.288" v="2718" actId="20577"/>
+          <ac:spMkLst>
+            <pc:docMk/>
+            <pc:sldMk cId="1657720437" sldId="292"/>
+            <ac:spMk id="2" creationId="{EBE8F3B4-CC3D-4466-40E2-5BC28DD8DF66}"/>
+          </ac:spMkLst>
+        </pc:spChg>
+        <pc:spChg chg="add del mod">
+          <ac:chgData name="Joaquin Badenas" userId="5cb29fd719aebf04" providerId="LiveId" clId="{4F53BFBD-1E38-412E-AE7B-7E5D3B30168C}" dt="2024-07-24T21:07:47.878" v="2720" actId="931"/>
+          <ac:spMkLst>
+            <pc:docMk/>
+            <pc:sldMk cId="1657720437" sldId="292"/>
+            <ac:spMk id="4" creationId="{841206B9-5CB9-04D2-F1F2-4835F25DEB59}"/>
+          </ac:spMkLst>
+        </pc:spChg>
+        <pc:picChg chg="del">
+          <ac:chgData name="Joaquin Badenas" userId="5cb29fd719aebf04" providerId="LiveId" clId="{4F53BFBD-1E38-412E-AE7B-7E5D3B30168C}" dt="2024-07-24T21:07:38.815" v="2719" actId="478"/>
+          <ac:picMkLst>
+            <pc:docMk/>
+            <pc:sldMk cId="1657720437" sldId="292"/>
+            <ac:picMk id="5" creationId="{7D62DDF7-D60C-864E-8AB3-6428C09F5C9F}"/>
+          </ac:picMkLst>
+        </pc:picChg>
+        <pc:picChg chg="add mod">
+          <ac:chgData name="Joaquin Badenas" userId="5cb29fd719aebf04" providerId="LiveId" clId="{4F53BFBD-1E38-412E-AE7B-7E5D3B30168C}" dt="2024-07-24T21:07:49.673" v="2722" actId="962"/>
+          <ac:picMkLst>
+            <pc:docMk/>
+            <pc:sldMk cId="1657720437" sldId="292"/>
+            <ac:picMk id="7" creationId="{9E1136FC-3896-F45C-B157-1063C63EF992}"/>
+          </ac:picMkLst>
+        </pc:picChg>
+      </pc:sldChg>
+      <pc:sldChg chg="addSp delSp modSp add mod">
+        <pc:chgData name="Joaquin Badenas" userId="5cb29fd719aebf04" providerId="LiveId" clId="{4F53BFBD-1E38-412E-AE7B-7E5D3B30168C}" dt="2024-07-24T21:08:07.469" v="2737" actId="962"/>
+        <pc:sldMkLst>
+          <pc:docMk/>
+          <pc:sldMk cId="902534703" sldId="293"/>
+        </pc:sldMkLst>
+        <pc:spChg chg="mod">
+          <ac:chgData name="Joaquin Badenas" userId="5cb29fd719aebf04" providerId="LiveId" clId="{4F53BFBD-1E38-412E-AE7B-7E5D3B30168C}" dt="2024-07-24T21:07:56.475" v="2733" actId="20577"/>
+          <ac:spMkLst>
+            <pc:docMk/>
+            <pc:sldMk cId="902534703" sldId="293"/>
+            <ac:spMk id="2" creationId="{EBE8F3B4-CC3D-4466-40E2-5BC28DD8DF66}"/>
+          </ac:spMkLst>
+        </pc:spChg>
+        <pc:spChg chg="add del mod">
+          <ac:chgData name="Joaquin Badenas" userId="5cb29fd719aebf04" providerId="LiveId" clId="{4F53BFBD-1E38-412E-AE7B-7E5D3B30168C}" dt="2024-07-24T21:08:05.694" v="2735" actId="931"/>
+          <ac:spMkLst>
+            <pc:docMk/>
+            <pc:sldMk cId="902534703" sldId="293"/>
+            <ac:spMk id="4" creationId="{7A71B933-2AF7-136B-70D6-23F17CE48098}"/>
+          </ac:spMkLst>
+        </pc:spChg>
+        <pc:picChg chg="add mod">
+          <ac:chgData name="Joaquin Badenas" userId="5cb29fd719aebf04" providerId="LiveId" clId="{4F53BFBD-1E38-412E-AE7B-7E5D3B30168C}" dt="2024-07-24T21:08:07.469" v="2737" actId="962"/>
+          <ac:picMkLst>
+            <pc:docMk/>
+            <pc:sldMk cId="902534703" sldId="293"/>
+            <ac:picMk id="6" creationId="{48160CE4-BCA4-6BA8-F7E9-9022FA7B7470}"/>
+          </ac:picMkLst>
+        </pc:picChg>
+        <pc:picChg chg="del">
+          <ac:chgData name="Joaquin Badenas" userId="5cb29fd719aebf04" providerId="LiveId" clId="{4F53BFBD-1E38-412E-AE7B-7E5D3B30168C}" dt="2024-07-24T21:08:00.264" v="2734" actId="478"/>
+          <ac:picMkLst>
+            <pc:docMk/>
+            <pc:sldMk cId="902534703" sldId="293"/>
+            <ac:picMk id="7" creationId="{9E1136FC-3896-F45C-B157-1063C63EF992}"/>
+          </ac:picMkLst>
+        </pc:picChg>
+      </pc:sldChg>
+      <pc:sldChg chg="addSp delSp modSp add mod">
+        <pc:chgData name="Joaquin Badenas" userId="5cb29fd719aebf04" providerId="LiveId" clId="{4F53BFBD-1E38-412E-AE7B-7E5D3B30168C}" dt="2024-07-24T21:21:14.314" v="2763" actId="27614"/>
+        <pc:sldMkLst>
+          <pc:docMk/>
+          <pc:sldMk cId="3200174696" sldId="294"/>
+        </pc:sldMkLst>
+        <pc:spChg chg="mod">
+          <ac:chgData name="Joaquin Badenas" userId="5cb29fd719aebf04" providerId="LiveId" clId="{4F53BFBD-1E38-412E-AE7B-7E5D3B30168C}" dt="2024-07-24T21:20:46.990" v="2759" actId="20577"/>
+          <ac:spMkLst>
+            <pc:docMk/>
+            <pc:sldMk cId="3200174696" sldId="294"/>
+            <ac:spMk id="2" creationId="{EBE8F3B4-CC3D-4466-40E2-5BC28DD8DF66}"/>
+          </ac:spMkLst>
+        </pc:spChg>
+        <pc:spChg chg="add del mod">
+          <ac:chgData name="Joaquin Badenas" userId="5cb29fd719aebf04" providerId="LiveId" clId="{4F53BFBD-1E38-412E-AE7B-7E5D3B30168C}" dt="2024-07-24T21:21:11.445" v="2761" actId="931"/>
+          <ac:spMkLst>
+            <pc:docMk/>
+            <pc:sldMk cId="3200174696" sldId="294"/>
+            <ac:spMk id="4" creationId="{A37D9B36-709E-8689-1180-348F66AD1F53}"/>
+          </ac:spMkLst>
+        </pc:spChg>
+        <pc:picChg chg="del">
+          <ac:chgData name="Joaquin Badenas" userId="5cb29fd719aebf04" providerId="LiveId" clId="{4F53BFBD-1E38-412E-AE7B-7E5D3B30168C}" dt="2024-07-24T21:20:49.203" v="2760" actId="478"/>
+          <ac:picMkLst>
+            <pc:docMk/>
+            <pc:sldMk cId="3200174696" sldId="294"/>
+            <ac:picMk id="6" creationId="{48160CE4-BCA4-6BA8-F7E9-9022FA7B7470}"/>
+          </ac:picMkLst>
+        </pc:picChg>
+        <pc:picChg chg="add mod">
+          <ac:chgData name="Joaquin Badenas" userId="5cb29fd719aebf04" providerId="LiveId" clId="{4F53BFBD-1E38-412E-AE7B-7E5D3B30168C}" dt="2024-07-24T21:21:14.314" v="2763" actId="27614"/>
+          <ac:picMkLst>
+            <pc:docMk/>
+            <pc:sldMk cId="3200174696" sldId="294"/>
+            <ac:picMk id="7" creationId="{5745F9A1-8019-DBC8-4A6B-014C00B731BC}"/>
+          </ac:picMkLst>
+        </pc:picChg>
+      </pc:sldChg>
+      <pc:sldChg chg="addSp delSp modSp add mod">
+        <pc:chgData name="Joaquin Badenas" userId="5cb29fd719aebf04" providerId="LiveId" clId="{4F53BFBD-1E38-412E-AE7B-7E5D3B30168C}" dt="2024-07-24T21:21:24.649" v="2772" actId="962"/>
+        <pc:sldMkLst>
+          <pc:docMk/>
+          <pc:sldMk cId="351751385" sldId="295"/>
+        </pc:sldMkLst>
+        <pc:spChg chg="mod">
+          <ac:chgData name="Joaquin Badenas" userId="5cb29fd719aebf04" providerId="LiveId" clId="{4F53BFBD-1E38-412E-AE7B-7E5D3B30168C}" dt="2024-07-24T21:21:16.733" v="2768" actId="20577"/>
+          <ac:spMkLst>
+            <pc:docMk/>
+            <pc:sldMk cId="351751385" sldId="295"/>
+            <ac:spMk id="2" creationId="{EBE8F3B4-CC3D-4466-40E2-5BC28DD8DF66}"/>
+          </ac:spMkLst>
+        </pc:spChg>
+        <pc:spChg chg="add del mod">
+          <ac:chgData name="Joaquin Badenas" userId="5cb29fd719aebf04" providerId="LiveId" clId="{4F53BFBD-1E38-412E-AE7B-7E5D3B30168C}" dt="2024-07-24T21:21:22.876" v="2770" actId="931"/>
+          <ac:spMkLst>
+            <pc:docMk/>
+            <pc:sldMk cId="351751385" sldId="295"/>
+            <ac:spMk id="4" creationId="{95A21D5D-082C-280B-48AC-B0A6FBF90F73}"/>
+          </ac:spMkLst>
+        </pc:spChg>
+        <pc:picChg chg="add mod">
+          <ac:chgData name="Joaquin Badenas" userId="5cb29fd719aebf04" providerId="LiveId" clId="{4F53BFBD-1E38-412E-AE7B-7E5D3B30168C}" dt="2024-07-24T21:21:24.649" v="2772" actId="962"/>
+          <ac:picMkLst>
+            <pc:docMk/>
+            <pc:sldMk cId="351751385" sldId="295"/>
+            <ac:picMk id="6" creationId="{A701E910-3FA8-6239-CD3B-415A239393AC}"/>
+          </ac:picMkLst>
+        </pc:picChg>
+        <pc:picChg chg="del">
+          <ac:chgData name="Joaquin Badenas" userId="5cb29fd719aebf04" providerId="LiveId" clId="{4F53BFBD-1E38-412E-AE7B-7E5D3B30168C}" dt="2024-07-24T21:21:18.374" v="2769" actId="478"/>
+          <ac:picMkLst>
+            <pc:docMk/>
+            <pc:sldMk cId="351751385" sldId="295"/>
+            <ac:picMk id="7" creationId="{5745F9A1-8019-DBC8-4A6B-014C00B731BC}"/>
           </ac:picMkLst>
         </pc:picChg>
       </pc:sldChg>
@@ -2089,7 +2339,7 @@
           <a:p>
             <a:fld id="{57E58380-3550-4AA1-8DE5-F8A856B30F15}" type="datetimeFigureOut">
               <a:rPr lang="en-NZ" smtClean="0"/>
-              <a:t>23/07/2024</a:t>
+              <a:t>24/07/2024</a:t>
             </a:fld>
             <a:endParaRPr lang="en-NZ"/>
           </a:p>
@@ -2317,7 +2567,7 @@
           <a:p>
             <a:fld id="{57E58380-3550-4AA1-8DE5-F8A856B30F15}" type="datetimeFigureOut">
               <a:rPr lang="en-NZ" smtClean="0"/>
-              <a:t>23/07/2024</a:t>
+              <a:t>24/07/2024</a:t>
             </a:fld>
             <a:endParaRPr lang="en-NZ"/>
           </a:p>
@@ -2497,7 +2747,7 @@
           <a:p>
             <a:fld id="{57E58380-3550-4AA1-8DE5-F8A856B30F15}" type="datetimeFigureOut">
               <a:rPr lang="en-NZ" smtClean="0"/>
-              <a:t>23/07/2024</a:t>
+              <a:t>24/07/2024</a:t>
             </a:fld>
             <a:endParaRPr lang="en-NZ"/>
           </a:p>
@@ -2667,7 +2917,7 @@
           <a:p>
             <a:fld id="{57E58380-3550-4AA1-8DE5-F8A856B30F15}" type="datetimeFigureOut">
               <a:rPr lang="en-NZ" smtClean="0"/>
-              <a:t>23/07/2024</a:t>
+              <a:t>24/07/2024</a:t>
             </a:fld>
             <a:endParaRPr lang="en-NZ"/>
           </a:p>
@@ -2921,7 +3171,7 @@
           <a:p>
             <a:fld id="{57E58380-3550-4AA1-8DE5-F8A856B30F15}" type="datetimeFigureOut">
               <a:rPr lang="en-NZ" smtClean="0"/>
-              <a:t>23/07/2024</a:t>
+              <a:t>24/07/2024</a:t>
             </a:fld>
             <a:endParaRPr lang="en-NZ"/>
           </a:p>
@@ -3247,7 +3497,7 @@
           <a:p>
             <a:fld id="{57E58380-3550-4AA1-8DE5-F8A856B30F15}" type="datetimeFigureOut">
               <a:rPr lang="en-NZ" smtClean="0"/>
-              <a:t>23/07/2024</a:t>
+              <a:t>24/07/2024</a:t>
             </a:fld>
             <a:endParaRPr lang="en-NZ"/>
           </a:p>
@@ -3698,7 +3948,7 @@
           <a:p>
             <a:fld id="{57E58380-3550-4AA1-8DE5-F8A856B30F15}" type="datetimeFigureOut">
               <a:rPr lang="en-NZ" smtClean="0"/>
-              <a:t>23/07/2024</a:t>
+              <a:t>24/07/2024</a:t>
             </a:fld>
             <a:endParaRPr lang="en-NZ"/>
           </a:p>
@@ -3816,7 +4066,7 @@
           <a:p>
             <a:fld id="{57E58380-3550-4AA1-8DE5-F8A856B30F15}" type="datetimeFigureOut">
               <a:rPr lang="en-NZ" smtClean="0"/>
-              <a:t>23/07/2024</a:t>
+              <a:t>24/07/2024</a:t>
             </a:fld>
             <a:endParaRPr lang="en-NZ"/>
           </a:p>
@@ -3911,7 +4161,7 @@
           <a:p>
             <a:fld id="{57E58380-3550-4AA1-8DE5-F8A856B30F15}" type="datetimeFigureOut">
               <a:rPr lang="en-NZ" smtClean="0"/>
-              <a:t>23/07/2024</a:t>
+              <a:t>24/07/2024</a:t>
             </a:fld>
             <a:endParaRPr lang="en-NZ"/>
           </a:p>
@@ -4198,7 +4448,7 @@
           <a:p>
             <a:fld id="{57E58380-3550-4AA1-8DE5-F8A856B30F15}" type="datetimeFigureOut">
               <a:rPr lang="en-NZ" smtClean="0"/>
-              <a:t>23/07/2024</a:t>
+              <a:t>24/07/2024</a:t>
             </a:fld>
             <a:endParaRPr lang="en-NZ"/>
           </a:p>
@@ -4520,7 +4770,7 @@
           <a:p>
             <a:fld id="{57E58380-3550-4AA1-8DE5-F8A856B30F15}" type="datetimeFigureOut">
               <a:rPr lang="en-NZ" smtClean="0"/>
-              <a:t>23/07/2024</a:t>
+              <a:t>24/07/2024</a:t>
             </a:fld>
             <a:endParaRPr lang="en-NZ"/>
           </a:p>
@@ -4774,7 +5024,7 @@
           <a:p>
             <a:fld id="{57E58380-3550-4AA1-8DE5-F8A856B30F15}" type="datetimeFigureOut">
               <a:rPr lang="en-NZ" smtClean="0"/>
-              <a:t>23/07/2024</a:t>
+              <a:t>24/07/2024</a:t>
             </a:fld>
             <a:endParaRPr lang="en-NZ"/>
           </a:p>
@@ -5612,7 +5862,7 @@
               <a:rPr lang="en-NZ" dirty="0">
                 <a:latin typeface="Abadi" panose="020B0604020104020204" pitchFamily="34" charset="0"/>
               </a:rPr>
-              <a:t>Relevant Implications -Usability</a:t>
+              <a:t>Relevant Implications – Legal </a:t>
             </a:r>
           </a:p>
         </p:txBody>
@@ -5661,7 +5911,7 @@
               <a:rPr lang="en-NZ" dirty="0">
                 <a:latin typeface="Abadi" panose="020B0604020104020204" pitchFamily="34" charset="0"/>
               </a:rPr>
-              <a:t>Usability is about how straightforward it is for a person to be able to use my website. It ensures that my website is not difficult or confusing to navigate.</a:t>
+              <a:t>Legal implications focuses on ensuring that any information or images that be used is allowed. </a:t>
             </a:r>
           </a:p>
           <a:p>
@@ -5680,17 +5930,8 @@
               <a:rPr lang="en-NZ" dirty="0">
                 <a:latin typeface="Abadi" panose="020B0604020104020204" pitchFamily="34" charset="0"/>
               </a:rPr>
-              <a:t>My site will be a blog post forum for </a:t>
-            </a:r>
-            <a:r>
-              <a:rPr lang="en-NZ">
-                <a:latin typeface="Abadi" panose="020B0604020104020204" pitchFamily="34" charset="0"/>
-              </a:rPr>
-              <a:t>students where they can </a:t>
-            </a:r>
-            <a:endParaRPr lang="en-NZ" dirty="0">
-              <a:latin typeface="Abadi" panose="020B0604020104020204" pitchFamily="34" charset="0"/>
-            </a:endParaRPr>
+              <a:t>My site will be a review/testimonial website about the best fast food restaurant </a:t>
+            </a:r>
           </a:p>
           <a:p>
             <a:r>
@@ -6321,7 +6562,7 @@
                 </a:solidFill>
                 <a:latin typeface="Abadi" panose="020B0604020104020204" pitchFamily="34" charset="0"/>
               </a:rPr>
-              <a:t>Home – SMC Forum Website</a:t>
+              <a:t>Home </a:t>
             </a:r>
           </a:p>
         </p:txBody>
@@ -6451,46 +6692,21 @@
           </a:p>
         </p:txBody>
       </p:sp>
-      <p:sp>
-        <p:nvSpPr>
-          <p:cNvPr id="3" name="Content Placeholder 2">
+      <p:pic>
+        <p:nvPicPr>
+          <p:cNvPr id="5" name="Content Placeholder 4" descr="A screenshot of a computer&#10;&#10;Description automatically generated">
             <a:extLst>
               <a:ext uri="{FF2B5EF4-FFF2-40B4-BE49-F238E27FC236}">
-                <a16:creationId xmlns:a16="http://schemas.microsoft.com/office/drawing/2014/main" id="{5B68399D-040E-72E1-5BE1-82559BC616F7}"/>
-              </a:ext>
-            </a:extLst>
-          </p:cNvPr>
-          <p:cNvSpPr>
-            <a:spLocks noGrp="1"/>
-          </p:cNvSpPr>
-          <p:nvPr>
-            <p:ph idx="1"/>
-          </p:nvPr>
-        </p:nvSpPr>
-        <p:spPr/>
-        <p:txBody>
-          <a:bodyPr/>
-          <a:lstStyle/>
-          <a:p>
-            <a:endParaRPr lang="en-NZ" dirty="0">
-              <a:latin typeface="Abadi" panose="020B0604020104020204" pitchFamily="34" charset="0"/>
-            </a:endParaRPr>
-          </a:p>
-        </p:txBody>
-      </p:sp>
-      <p:pic>
-        <p:nvPicPr>
-          <p:cNvPr id="2050" name="Picture 2" descr="A screenshot of a computer&#10;&#10;Description automatically generated">
-            <a:extLst>
-              <a:ext uri="{FF2B5EF4-FFF2-40B4-BE49-F238E27FC236}">
-                <a16:creationId xmlns:a16="http://schemas.microsoft.com/office/drawing/2014/main" id="{566CC73E-FB93-225D-8F0A-558DDF0B817A}"/>
+                <a16:creationId xmlns:a16="http://schemas.microsoft.com/office/drawing/2014/main" id="{7D62DDF7-D60C-864E-8AB3-6428C09F5C9F}"/>
               </a:ext>
             </a:extLst>
           </p:cNvPr>
           <p:cNvPicPr>
-            <a:picLocks noChangeAspect="1" noChangeArrowheads="1"/>
+            <a:picLocks noGrp="1" noChangeAspect="1"/>
           </p:cNvPicPr>
-          <p:nvPr/>
+          <p:nvPr>
+            <p:ph idx="1"/>
+          </p:nvPr>
         </p:nvPicPr>
         <p:blipFill>
           <a:blip r:embed="rId2">
@@ -6500,29 +6716,15 @@
               </a:ext>
             </a:extLst>
           </a:blip>
-          <a:srcRect/>
           <a:stretch>
             <a:fillRect/>
           </a:stretch>
         </p:blipFill>
-        <p:spPr bwMode="auto">
+        <p:spPr>
           <a:xfrm>
-            <a:off x="1905001" y="1845734"/>
-            <a:ext cx="7267575" cy="4543425"/>
+            <a:off x="2078355" y="1828800"/>
+            <a:ext cx="6962140" cy="4351338"/>
           </a:xfrm>
-          <a:prstGeom prst="rect">
-            <a:avLst/>
-          </a:prstGeom>
-          <a:noFill/>
-          <a:extLst>
-            <a:ext uri="{909E8E84-426E-40DD-AFC4-6F175D3DCCD1}">
-              <a14:hiddenFill xmlns:a14="http://schemas.microsoft.com/office/drawing/2010/main">
-                <a:solidFill>
-                  <a:srgbClr val="FFFFFF"/>
-                </a:solidFill>
-              </a14:hiddenFill>
-            </a:ext>
-          </a:extLst>
         </p:spPr>
       </p:pic>
     </p:spTree>
@@ -6580,22 +6782,22 @@
               <a:rPr lang="en-NZ" dirty="0">
                 <a:latin typeface="Abadi" panose="020B0604020104020204" pitchFamily="34" charset="0"/>
               </a:rPr>
-              <a:t>Design Drawings (Subjects Page)</a:t>
+              <a:t>Design Drawings (About Us Page)</a:t>
             </a:r>
           </a:p>
         </p:txBody>
       </p:sp>
       <p:pic>
         <p:nvPicPr>
-          <p:cNvPr id="1026" name="Picture 2" descr="A screenshot of a computer&#10;&#10;Description automatically generated">
+          <p:cNvPr id="7" name="Content Placeholder 6" descr="A screenshot of a computer&#10;&#10;Description automatically generated">
             <a:extLst>
               <a:ext uri="{FF2B5EF4-FFF2-40B4-BE49-F238E27FC236}">
-                <a16:creationId xmlns:a16="http://schemas.microsoft.com/office/drawing/2014/main" id="{66CFF85F-6C2A-9298-80AC-1EC59BF74326}"/>
+                <a16:creationId xmlns:a16="http://schemas.microsoft.com/office/drawing/2014/main" id="{9E1136FC-3896-F45C-B157-1063C63EF992}"/>
               </a:ext>
             </a:extLst>
           </p:cNvPr>
           <p:cNvPicPr>
-            <a:picLocks noGrp="1" noChangeAspect="1" noChangeArrowheads="1"/>
+            <a:picLocks noGrp="1" noChangeAspect="1"/>
           </p:cNvPicPr>
           <p:nvPr>
             <p:ph idx="1"/>
@@ -6613,30 +6815,17 @@
             <a:fillRect/>
           </a:stretch>
         </p:blipFill>
-        <p:spPr bwMode="auto">
+        <p:spPr>
           <a:xfrm>
-            <a:off x="2079267" y="1828800"/>
-            <a:ext cx="6960316" cy="4351338"/>
+            <a:off x="2078355" y="1828800"/>
+            <a:ext cx="6962140" cy="4351338"/>
           </a:xfrm>
-          <a:prstGeom prst="rect">
-            <a:avLst/>
-          </a:prstGeom>
-          <a:noFill/>
-          <a:extLst>
-            <a:ext uri="{909E8E84-426E-40DD-AFC4-6F175D3DCCD1}">
-              <a14:hiddenFill xmlns:a14="http://schemas.microsoft.com/office/drawing/2010/main">
-                <a:solidFill>
-                  <a:srgbClr val="FFFFFF"/>
-                </a:solidFill>
-              </a14:hiddenFill>
-            </a:ext>
-          </a:extLst>
         </p:spPr>
       </p:pic>
     </p:spTree>
     <p:extLst>
       <p:ext uri="{BB962C8B-B14F-4D97-AF65-F5344CB8AC3E}">
-        <p14:creationId xmlns:p14="http://schemas.microsoft.com/office/powerpoint/2010/main" val="2462060945"/>
+        <p14:creationId xmlns:p14="http://schemas.microsoft.com/office/powerpoint/2010/main" val="1657720437"/>
       </p:ext>
     </p:extLst>
   </p:cSld>
@@ -6688,51 +6877,26 @@
               <a:rPr lang="en-NZ" dirty="0">
                 <a:latin typeface="Abadi" panose="020B0604020104020204" pitchFamily="34" charset="0"/>
               </a:rPr>
-              <a:t>Design Drawings (Forum/Posts Page)</a:t>
-            </a:r>
-          </a:p>
-        </p:txBody>
-      </p:sp>
-      <p:sp>
-        <p:nvSpPr>
-          <p:cNvPr id="3" name="Content Placeholder 2">
+              <a:t>Design Drawings (Reviews Page)</a:t>
+            </a:r>
+          </a:p>
+        </p:txBody>
+      </p:sp>
+      <p:pic>
+        <p:nvPicPr>
+          <p:cNvPr id="6" name="Content Placeholder 5" descr="A screenshot of a computer&#10;&#10;Description automatically generated">
             <a:extLst>
               <a:ext uri="{FF2B5EF4-FFF2-40B4-BE49-F238E27FC236}">
-                <a16:creationId xmlns:a16="http://schemas.microsoft.com/office/drawing/2014/main" id="{178D32C1-10BF-A5DC-3BC3-946C8DE40455}"/>
-              </a:ext>
-            </a:extLst>
-          </p:cNvPr>
-          <p:cNvSpPr>
-            <a:spLocks noGrp="1"/>
-          </p:cNvSpPr>
-          <p:nvPr>
-            <p:ph idx="1"/>
-          </p:nvPr>
-        </p:nvSpPr>
-        <p:spPr/>
-        <p:txBody>
-          <a:bodyPr/>
-          <a:lstStyle/>
-          <a:p>
-            <a:endParaRPr lang="en-NZ">
-              <a:latin typeface="Abadi" panose="020B0604020104020204" pitchFamily="34" charset="0"/>
-            </a:endParaRPr>
-          </a:p>
-        </p:txBody>
-      </p:sp>
-      <p:pic>
-        <p:nvPicPr>
-          <p:cNvPr id="3074" name="Picture 2" descr="A screenshot of a computer&#10;&#10;Description automatically generated">
-            <a:extLst>
-              <a:ext uri="{FF2B5EF4-FFF2-40B4-BE49-F238E27FC236}">
-                <a16:creationId xmlns:a16="http://schemas.microsoft.com/office/drawing/2014/main" id="{99BF0A36-B605-889C-7230-60F622FB88DE}"/>
+                <a16:creationId xmlns:a16="http://schemas.microsoft.com/office/drawing/2014/main" id="{48160CE4-BCA4-6BA8-F7E9-9022FA7B7470}"/>
               </a:ext>
             </a:extLst>
           </p:cNvPr>
           <p:cNvPicPr>
-            <a:picLocks noChangeAspect="1" noChangeArrowheads="1"/>
+            <a:picLocks noGrp="1" noChangeAspect="1"/>
           </p:cNvPicPr>
-          <p:nvPr/>
+          <p:nvPr>
+            <p:ph idx="1"/>
+          </p:nvPr>
         </p:nvPicPr>
         <p:blipFill>
           <a:blip r:embed="rId2">
@@ -6742,35 +6906,21 @@
               </a:ext>
             </a:extLst>
           </a:blip>
-          <a:srcRect/>
           <a:stretch>
             <a:fillRect/>
           </a:stretch>
         </p:blipFill>
-        <p:spPr bwMode="auto">
+        <p:spPr>
           <a:xfrm>
-            <a:off x="2044700" y="1845734"/>
-            <a:ext cx="7267575" cy="4543425"/>
+            <a:off x="2078355" y="1828800"/>
+            <a:ext cx="6962140" cy="4351338"/>
           </a:xfrm>
-          <a:prstGeom prst="rect">
-            <a:avLst/>
-          </a:prstGeom>
-          <a:noFill/>
-          <a:extLst>
-            <a:ext uri="{909E8E84-426E-40DD-AFC4-6F175D3DCCD1}">
-              <a14:hiddenFill xmlns:a14="http://schemas.microsoft.com/office/drawing/2010/main">
-                <a:solidFill>
-                  <a:srgbClr val="FFFFFF"/>
-                </a:solidFill>
-              </a14:hiddenFill>
-            </a:ext>
-          </a:extLst>
         </p:spPr>
       </p:pic>
     </p:spTree>
     <p:extLst>
       <p:ext uri="{BB962C8B-B14F-4D97-AF65-F5344CB8AC3E}">
-        <p14:creationId xmlns:p14="http://schemas.microsoft.com/office/powerpoint/2010/main" val="3303625023"/>
+        <p14:creationId xmlns:p14="http://schemas.microsoft.com/office/powerpoint/2010/main" val="902534703"/>
       </p:ext>
     </p:extLst>
   </p:cSld>
@@ -7151,7 +7301,13 @@
       </p:grpSpPr>
       <p:sp>
         <p:nvSpPr>
-          <p:cNvPr id="2" name="Title 1"/>
+          <p:cNvPr id="2" name="Title 1">
+            <a:extLst>
+              <a:ext uri="{FF2B5EF4-FFF2-40B4-BE49-F238E27FC236}">
+                <a16:creationId xmlns:a16="http://schemas.microsoft.com/office/drawing/2014/main" id="{EBE8F3B4-CC3D-4466-40E2-5BC28DD8DF66}"/>
+              </a:ext>
+            </a:extLst>
+          </p:cNvPr>
           <p:cNvSpPr>
             <a:spLocks noGrp="1"/>
           </p:cNvSpPr>
@@ -7161,181 +7317,57 @@
         </p:nvSpPr>
         <p:spPr/>
         <p:txBody>
-          <a:bodyPr>
-            <a:normAutofit/>
-          </a:bodyPr>
+          <a:bodyPr/>
           <a:lstStyle/>
           <a:p>
             <a:r>
-              <a:rPr lang="en-NZ" sz="2800" dirty="0">
-                <a:latin typeface="Abadi" panose="020B0604020104020204" pitchFamily="34" charset="0"/>
-              </a:rPr>
-              <a:t>Test Plan</a:t>
-            </a:r>
-          </a:p>
-        </p:txBody>
-      </p:sp>
-      <p:sp>
-        <p:nvSpPr>
-          <p:cNvPr id="3" name="Content Placeholder 2"/>
-          <p:cNvSpPr>
-            <a:spLocks noGrp="1"/>
-          </p:cNvSpPr>
+              <a:rPr lang="en-NZ" dirty="0">
+                <a:latin typeface="Abadi" panose="020B0604020104020204" pitchFamily="34" charset="0"/>
+              </a:rPr>
+              <a:t>Design Drawings (Sign-up Page)</a:t>
+            </a:r>
+          </a:p>
+        </p:txBody>
+      </p:sp>
+      <p:pic>
+        <p:nvPicPr>
+          <p:cNvPr id="7" name="Content Placeholder 6" descr="A screenshot of a computer screen&#10;&#10;Description automatically generated">
+            <a:extLst>
+              <a:ext uri="{FF2B5EF4-FFF2-40B4-BE49-F238E27FC236}">
+                <a16:creationId xmlns:a16="http://schemas.microsoft.com/office/drawing/2014/main" id="{5745F9A1-8019-DBC8-4A6B-014C00B731BC}"/>
+              </a:ext>
+            </a:extLst>
+          </p:cNvPr>
+          <p:cNvPicPr>
+            <a:picLocks noGrp="1" noChangeAspect="1"/>
+          </p:cNvPicPr>
           <p:nvPr>
             <p:ph idx="1"/>
           </p:nvPr>
-        </p:nvSpPr>
-        <p:spPr/>
-        <p:txBody>
-          <a:bodyPr>
-            <a:normAutofit fontScale="77500" lnSpcReduction="20000"/>
-          </a:bodyPr>
-          <a:lstStyle/>
-          <a:p>
-            <a:pPr marL="0" indent="0">
-              <a:buNone/>
-            </a:pPr>
-            <a:r>
-              <a:rPr lang="en-NZ" sz="2000" dirty="0">
-                <a:latin typeface="Abadi" panose="020B0604020104020204" pitchFamily="34" charset="0"/>
-              </a:rPr>
-              <a:t>How are you going test your program</a:t>
-            </a:r>
-          </a:p>
-          <a:p>
-            <a:pPr lvl="0"/>
-            <a:r>
-              <a:rPr lang="en-NZ" sz="2000" dirty="0">
-                <a:latin typeface="Abadi" panose="020B0604020104020204" pitchFamily="34" charset="0"/>
-              </a:rPr>
-              <a:t>to ensure it functions correctly</a:t>
-            </a:r>
-          </a:p>
-          <a:p>
-            <a:pPr marL="0" lvl="0" indent="0">
-              <a:buNone/>
-            </a:pPr>
-            <a:r>
-              <a:rPr lang="en-NZ" sz="2000" dirty="0">
-                <a:latin typeface="Abadi" panose="020B0604020104020204" pitchFamily="34" charset="0"/>
-              </a:rPr>
-              <a:t>Using the Blog App that I had previously done in class, I have already ensured that the main functions of my program (signup/login, creating/deleting posts), as well as some additional features function already. When I am adding any new components or features into my program/website, I will be sure to test it by taking screenshots before and after implementing the code. </a:t>
-            </a:r>
-            <a:endParaRPr lang="en-NZ" sz="2000" dirty="0">
-              <a:effectLst/>
-              <a:latin typeface="Abadi" panose="020B0604020104020204" pitchFamily="34" charset="0"/>
-            </a:endParaRPr>
-          </a:p>
-          <a:p>
-            <a:pPr lvl="0"/>
-            <a:r>
-              <a:rPr lang="en-NZ" sz="2000" dirty="0">
-                <a:latin typeface="Abadi" panose="020B0604020104020204" pitchFamily="34" charset="0"/>
-              </a:rPr>
-              <a:t>That the python code is PEP8 compliant</a:t>
-            </a:r>
-          </a:p>
-          <a:p>
-            <a:pPr marL="0" lvl="0" indent="0">
-              <a:buNone/>
-            </a:pPr>
-            <a:r>
-              <a:rPr lang="en-NZ" sz="2000" dirty="0">
-                <a:effectLst/>
-                <a:latin typeface="Abadi" panose="020B0604020104020204" pitchFamily="34" charset="0"/>
-              </a:rPr>
-              <a:t>In </a:t>
-            </a:r>
-            <a:r>
-              <a:rPr lang="en-NZ" sz="2000" dirty="0" err="1">
-                <a:effectLst/>
-                <a:latin typeface="Abadi" panose="020B0604020104020204" pitchFamily="34" charset="0"/>
-              </a:rPr>
-              <a:t>V</a:t>
-            </a:r>
-            <a:r>
-              <a:rPr lang="en-NZ" sz="2000" dirty="0" err="1">
-                <a:latin typeface="Abadi" panose="020B0604020104020204" pitchFamily="34" charset="0"/>
-              </a:rPr>
-              <a:t>SCode</a:t>
-            </a:r>
-            <a:r>
-              <a:rPr lang="en-NZ" sz="2000" dirty="0">
-                <a:latin typeface="Abadi" panose="020B0604020104020204" pitchFamily="34" charset="0"/>
-              </a:rPr>
-              <a:t> there is a PEP8 formatting extension which I will utilise. Doing this, the extension will automatically format my python code making sure that is compliant</a:t>
-            </a:r>
-            <a:endParaRPr lang="en-NZ" sz="2000" dirty="0">
-              <a:effectLst/>
-              <a:latin typeface="Abadi" panose="020B0604020104020204" pitchFamily="34" charset="0"/>
-            </a:endParaRPr>
-          </a:p>
-          <a:p>
-            <a:pPr lvl="0"/>
-            <a:r>
-              <a:rPr lang="en-NZ" sz="2000" dirty="0">
-                <a:latin typeface="Abadi" panose="020B0604020104020204" pitchFamily="34" charset="0"/>
-              </a:rPr>
-              <a:t>for validation and error correction</a:t>
-            </a:r>
-          </a:p>
-          <a:p>
-            <a:pPr lvl="0"/>
-            <a:r>
-              <a:rPr lang="en-NZ" sz="2000" dirty="0">
-                <a:latin typeface="Abadi" panose="020B0604020104020204" pitchFamily="34" charset="0"/>
-              </a:rPr>
-              <a:t>Is well structured </a:t>
-            </a:r>
-            <a:endParaRPr lang="en-NZ" sz="2000" dirty="0">
-              <a:effectLst/>
-              <a:latin typeface="Abadi" panose="020B0604020104020204" pitchFamily="34" charset="0"/>
-            </a:endParaRPr>
-          </a:p>
-          <a:p>
-            <a:pPr lvl="0"/>
-            <a:r>
-              <a:rPr lang="en-NZ" sz="2000" dirty="0">
-                <a:latin typeface="Abadi" panose="020B0604020104020204" pitchFamily="34" charset="0"/>
-              </a:rPr>
-              <a:t>Is flexible and robust</a:t>
-            </a:r>
-          </a:p>
-          <a:p>
-            <a:pPr lvl="0"/>
-            <a:r>
-              <a:rPr lang="en-US" sz="2000" dirty="0">
-                <a:latin typeface="Abadi" panose="020B0604020104020204" pitchFamily="34" charset="0"/>
-              </a:rPr>
-              <a:t>C</a:t>
-            </a:r>
-            <a:r>
-              <a:rPr lang="en-NZ" sz="2000" dirty="0" err="1">
-                <a:latin typeface="Abadi" panose="020B0604020104020204" pitchFamily="34" charset="0"/>
-              </a:rPr>
-              <a:t>omprehensively</a:t>
-            </a:r>
-            <a:r>
-              <a:rPr lang="en-NZ" sz="2000" dirty="0">
-                <a:latin typeface="Abadi" panose="020B0604020104020204" pitchFamily="34" charset="0"/>
-              </a:rPr>
-              <a:t> tested and debugged</a:t>
-            </a:r>
-          </a:p>
-          <a:p>
-            <a:pPr marL="0" indent="0">
-              <a:buNone/>
-            </a:pPr>
-            <a:endParaRPr lang="en-NZ" dirty="0">
-              <a:latin typeface="Abadi" panose="020B0604020104020204" pitchFamily="34" charset="0"/>
-            </a:endParaRPr>
-          </a:p>
-        </p:txBody>
-      </p:sp>
+        </p:nvPicPr>
+        <p:blipFill>
+          <a:blip r:embed="rId2">
+            <a:extLst>
+              <a:ext uri="{28A0092B-C50C-407E-A947-70E740481C1C}">
+                <a14:useLocalDpi xmlns:a14="http://schemas.microsoft.com/office/drawing/2010/main" val="0"/>
+              </a:ext>
+            </a:extLst>
+          </a:blip>
+          <a:stretch>
+            <a:fillRect/>
+          </a:stretch>
+        </p:blipFill>
+        <p:spPr>
+          <a:xfrm>
+            <a:off x="2078355" y="1828800"/>
+            <a:ext cx="6962140" cy="4351338"/>
+          </a:xfrm>
+        </p:spPr>
+      </p:pic>
     </p:spTree>
     <p:extLst>
       <p:ext uri="{BB962C8B-B14F-4D97-AF65-F5344CB8AC3E}">
-        <p14:creationId xmlns:p14="http://schemas.microsoft.com/office/powerpoint/2010/main" val="2873264670"/>
+        <p14:creationId xmlns:p14="http://schemas.microsoft.com/office/powerpoint/2010/main" val="3200174696"/>
       </p:ext>
     </p:extLst>
   </p:cSld>
@@ -7364,7 +7396,13 @@
       </p:grpSpPr>
       <p:sp>
         <p:nvSpPr>
-          <p:cNvPr id="2" name="Title 1"/>
+          <p:cNvPr id="2" name="Title 1">
+            <a:extLst>
+              <a:ext uri="{FF2B5EF4-FFF2-40B4-BE49-F238E27FC236}">
+                <a16:creationId xmlns:a16="http://schemas.microsoft.com/office/drawing/2014/main" id="{EBE8F3B4-CC3D-4466-40E2-5BC28DD8DF66}"/>
+              </a:ext>
+            </a:extLst>
+          </p:cNvPr>
           <p:cNvSpPr>
             <a:spLocks noGrp="1"/>
           </p:cNvSpPr>
@@ -7374,53 +7412,57 @@
         </p:nvSpPr>
         <p:spPr/>
         <p:txBody>
-          <a:bodyPr>
-            <a:normAutofit/>
-          </a:bodyPr>
+          <a:bodyPr/>
           <a:lstStyle/>
           <a:p>
             <a:r>
-              <a:rPr lang="en-NZ" sz="2800" dirty="0">
-                <a:latin typeface="Abadi" panose="020B0604020104020204" pitchFamily="34" charset="0"/>
-              </a:rPr>
-              <a:t>Test results</a:t>
-            </a:r>
-          </a:p>
-        </p:txBody>
-      </p:sp>
-      <p:sp>
-        <p:nvSpPr>
-          <p:cNvPr id="3" name="Content Placeholder 2"/>
-          <p:cNvSpPr>
-            <a:spLocks noGrp="1"/>
-          </p:cNvSpPr>
+              <a:rPr lang="en-NZ" dirty="0">
+                <a:latin typeface="Abadi" panose="020B0604020104020204" pitchFamily="34" charset="0"/>
+              </a:rPr>
+              <a:t>Design Drawings (Login Page)</a:t>
+            </a:r>
+          </a:p>
+        </p:txBody>
+      </p:sp>
+      <p:pic>
+        <p:nvPicPr>
+          <p:cNvPr id="6" name="Content Placeholder 5" descr="A screenshot of a computer&#10;&#10;Description automatically generated">
+            <a:extLst>
+              <a:ext uri="{FF2B5EF4-FFF2-40B4-BE49-F238E27FC236}">
+                <a16:creationId xmlns:a16="http://schemas.microsoft.com/office/drawing/2014/main" id="{A701E910-3FA8-6239-CD3B-415A239393AC}"/>
+              </a:ext>
+            </a:extLst>
+          </p:cNvPr>
+          <p:cNvPicPr>
+            <a:picLocks noGrp="1" noChangeAspect="1"/>
+          </p:cNvPicPr>
           <p:nvPr>
             <p:ph idx="1"/>
           </p:nvPr>
-        </p:nvSpPr>
-        <p:spPr/>
-        <p:txBody>
-          <a:bodyPr>
-            <a:normAutofit/>
-          </a:bodyPr>
-          <a:lstStyle/>
-          <a:p>
-            <a:pPr marL="0" indent="0">
-              <a:buNone/>
-            </a:pPr>
-            <a:r>
-              <a:rPr lang="en-NZ" sz="2000" dirty="0">
-                <a:latin typeface="Abadi" panose="020B0604020104020204" pitchFamily="34" charset="0"/>
-              </a:rPr>
-              <a:t>Summarise the results of your testing and how you addressed any issues or problems that arise during testing. Make sure you get others to test your site and get feedback.</a:t>
-            </a:r>
-          </a:p>
-        </p:txBody>
-      </p:sp>
+        </p:nvPicPr>
+        <p:blipFill>
+          <a:blip r:embed="rId2">
+            <a:extLst>
+              <a:ext uri="{28A0092B-C50C-407E-A947-70E740481C1C}">
+                <a14:useLocalDpi xmlns:a14="http://schemas.microsoft.com/office/drawing/2010/main" val="0"/>
+              </a:ext>
+            </a:extLst>
+          </a:blip>
+          <a:stretch>
+            <a:fillRect/>
+          </a:stretch>
+        </p:blipFill>
+        <p:spPr>
+          <a:xfrm>
+            <a:off x="2078355" y="1828800"/>
+            <a:ext cx="6962140" cy="4351338"/>
+          </a:xfrm>
+        </p:spPr>
+      </p:pic>
     </p:spTree>
     <p:extLst>
       <p:ext uri="{BB962C8B-B14F-4D97-AF65-F5344CB8AC3E}">
-        <p14:creationId xmlns:p14="http://schemas.microsoft.com/office/powerpoint/2010/main" val="1831671313"/>
+        <p14:creationId xmlns:p14="http://schemas.microsoft.com/office/powerpoint/2010/main" val="351751385"/>
       </p:ext>
     </p:extLst>
   </p:cSld>
@@ -7459,43 +7501,37 @@
         </p:nvSpPr>
         <p:spPr/>
         <p:txBody>
-          <a:bodyPr/>
-          <a:lstStyle/>
-          <a:p>
-            <a:r>
-              <a:rPr lang="en-NZ" sz="2800" dirty="0">
-                <a:latin typeface="Abadi" panose="020B0604020104020204" pitchFamily="34" charset="0"/>
-              </a:rPr>
-              <a:t>Describe the end user requirements</a:t>
-            </a:r>
-            <a:br>
-              <a:rPr lang="en-NZ" dirty="0">
-                <a:latin typeface="Abadi" panose="020B0604020104020204" pitchFamily="34" charset="0"/>
-              </a:rPr>
-            </a:br>
-            <a:endParaRPr lang="en-NZ" dirty="0">
-              <a:latin typeface="Abadi" panose="020B0604020104020204" pitchFamily="34" charset="0"/>
-            </a:endParaRPr>
-          </a:p>
-        </p:txBody>
-      </p:sp>
-      <p:sp>
-        <p:nvSpPr>
-          <p:cNvPr id="3" name="Content Placeholder 2"/>
-          <p:cNvSpPr>
-            <a:spLocks noGrp="1"/>
-          </p:cNvSpPr>
-          <p:nvPr>
-            <p:ph idx="1"/>
-          </p:nvPr>
-        </p:nvSpPr>
-        <p:spPr/>
-        <p:txBody>
           <a:bodyPr>
             <a:normAutofit/>
           </a:bodyPr>
           <a:lstStyle/>
           <a:p>
+            <a:r>
+              <a:rPr lang="en-NZ" sz="2800" dirty="0">
+                <a:latin typeface="Abadi" panose="020B0604020104020204" pitchFamily="34" charset="0"/>
+              </a:rPr>
+              <a:t>Test Plan</a:t>
+            </a:r>
+          </a:p>
+        </p:txBody>
+      </p:sp>
+      <p:sp>
+        <p:nvSpPr>
+          <p:cNvPr id="3" name="Content Placeholder 2"/>
+          <p:cNvSpPr>
+            <a:spLocks noGrp="1"/>
+          </p:cNvSpPr>
+          <p:nvPr>
+            <p:ph idx="1"/>
+          </p:nvPr>
+        </p:nvSpPr>
+        <p:spPr/>
+        <p:txBody>
+          <a:bodyPr>
+            <a:normAutofit fontScale="77500" lnSpcReduction="20000"/>
+          </a:bodyPr>
+          <a:lstStyle/>
+          <a:p>
             <a:pPr marL="0" indent="0">
               <a:buNone/>
             </a:pPr>
@@ -7503,15 +7539,143 @@
               <a:rPr lang="en-NZ" sz="2000" dirty="0">
                 <a:latin typeface="Abadi" panose="020B0604020104020204" pitchFamily="34" charset="0"/>
               </a:rPr>
-              <a:t>Describe how the chosen tools and techniques to develop the website were appropriate for the purpose and end users. </a:t>
-            </a:r>
+              <a:t>How are you going test your program</a:t>
+            </a:r>
+          </a:p>
+          <a:p>
+            <a:pPr lvl="0"/>
+            <a:r>
+              <a:rPr lang="en-NZ" sz="2000" dirty="0">
+                <a:latin typeface="Abadi" panose="020B0604020104020204" pitchFamily="34" charset="0"/>
+              </a:rPr>
+              <a:t>to ensure it functions correctly</a:t>
+            </a:r>
+          </a:p>
+          <a:p>
+            <a:pPr marL="0" lvl="0" indent="0">
+              <a:buNone/>
+            </a:pPr>
+            <a:r>
+              <a:rPr lang="en-NZ" sz="2000" dirty="0">
+                <a:latin typeface="Abadi" panose="020B0604020104020204" pitchFamily="34" charset="0"/>
+              </a:rPr>
+              <a:t>Using the Blog App that I had previously done in class, I have already ensured that the main functions of my program (signup/login, creating/deleting posts), as well as some additional features function already. When I am adding any new components or features into my program/website, I will be sure to test it by taking screenshots before and after implementing the code. </a:t>
+            </a:r>
+            <a:endParaRPr lang="en-NZ" sz="2000" dirty="0">
+              <a:effectLst/>
+              <a:latin typeface="Abadi" panose="020B0604020104020204" pitchFamily="34" charset="0"/>
+            </a:endParaRPr>
+          </a:p>
+          <a:p>
+            <a:pPr lvl="0"/>
+            <a:r>
+              <a:rPr lang="en-NZ" sz="2000" dirty="0">
+                <a:latin typeface="Abadi" panose="020B0604020104020204" pitchFamily="34" charset="0"/>
+              </a:rPr>
+              <a:t>That the python code is PEP8 compliant</a:t>
+            </a:r>
+          </a:p>
+          <a:p>
+            <a:pPr marL="0" lvl="0" indent="0">
+              <a:buNone/>
+            </a:pPr>
+            <a:r>
+              <a:rPr lang="en-NZ" sz="2000" dirty="0">
+                <a:effectLst/>
+                <a:latin typeface="Abadi" panose="020B0604020104020204" pitchFamily="34" charset="0"/>
+              </a:rPr>
+              <a:t>In </a:t>
+            </a:r>
+            <a:r>
+              <a:rPr lang="en-NZ" sz="2000" dirty="0" err="1">
+                <a:effectLst/>
+                <a:latin typeface="Abadi" panose="020B0604020104020204" pitchFamily="34" charset="0"/>
+              </a:rPr>
+              <a:t>V</a:t>
+            </a:r>
+            <a:r>
+              <a:rPr lang="en-NZ" sz="2000" dirty="0" err="1">
+                <a:latin typeface="Abadi" panose="020B0604020104020204" pitchFamily="34" charset="0"/>
+              </a:rPr>
+              <a:t>SCode</a:t>
+            </a:r>
+            <a:r>
+              <a:rPr lang="en-NZ" sz="2000" dirty="0">
+                <a:latin typeface="Abadi" panose="020B0604020104020204" pitchFamily="34" charset="0"/>
+              </a:rPr>
+              <a:t> there is a PEP8 formatting extension which I will utilise. Doing this, the extension will automatically format my python code making sure that is compliant</a:t>
+            </a:r>
+            <a:endParaRPr lang="en-NZ" sz="2000" dirty="0">
+              <a:effectLst/>
+              <a:latin typeface="Abadi" panose="020B0604020104020204" pitchFamily="34" charset="0"/>
+            </a:endParaRPr>
+          </a:p>
+          <a:p>
+            <a:pPr lvl="0"/>
+            <a:r>
+              <a:rPr lang="en-NZ" sz="2000" dirty="0">
+                <a:latin typeface="Abadi" panose="020B0604020104020204" pitchFamily="34" charset="0"/>
+              </a:rPr>
+              <a:t>for validation and error correction</a:t>
+            </a:r>
+          </a:p>
+          <a:p>
+            <a:pPr lvl="0"/>
+            <a:r>
+              <a:rPr lang="en-NZ" sz="2000" dirty="0">
+                <a:latin typeface="Abadi" panose="020B0604020104020204" pitchFamily="34" charset="0"/>
+              </a:rPr>
+              <a:t>Is well structured </a:t>
+            </a:r>
+            <a:endParaRPr lang="en-NZ" sz="2000" dirty="0">
+              <a:effectLst/>
+              <a:latin typeface="Abadi" panose="020B0604020104020204" pitchFamily="34" charset="0"/>
+            </a:endParaRPr>
+          </a:p>
+          <a:p>
+            <a:pPr lvl="0"/>
+            <a:r>
+              <a:rPr lang="en-NZ" sz="2000" dirty="0">
+                <a:latin typeface="Abadi" panose="020B0604020104020204" pitchFamily="34" charset="0"/>
+              </a:rPr>
+              <a:t>Is flexible and robust</a:t>
+            </a:r>
+          </a:p>
+          <a:p>
+            <a:pPr lvl="0"/>
+            <a:r>
+              <a:rPr lang="en-US" sz="2000" dirty="0">
+                <a:latin typeface="Abadi" panose="020B0604020104020204" pitchFamily="34" charset="0"/>
+              </a:rPr>
+              <a:t>C</a:t>
+            </a:r>
+            <a:r>
+              <a:rPr lang="en-NZ" sz="2000" dirty="0" err="1">
+                <a:latin typeface="Abadi" panose="020B0604020104020204" pitchFamily="34" charset="0"/>
+              </a:rPr>
+              <a:t>omprehensively</a:t>
+            </a:r>
+            <a:r>
+              <a:rPr lang="en-NZ" sz="2000" dirty="0">
+                <a:latin typeface="Abadi" panose="020B0604020104020204" pitchFamily="34" charset="0"/>
+              </a:rPr>
+              <a:t> tested and debugged</a:t>
+            </a:r>
+          </a:p>
+          <a:p>
+            <a:pPr marL="0" indent="0">
+              <a:buNone/>
+            </a:pPr>
+            <a:endParaRPr lang="en-NZ" dirty="0">
+              <a:latin typeface="Abadi" panose="020B0604020104020204" pitchFamily="34" charset="0"/>
+            </a:endParaRPr>
           </a:p>
         </p:txBody>
       </p:sp>
     </p:spTree>
     <p:extLst>
       <p:ext uri="{BB962C8B-B14F-4D97-AF65-F5344CB8AC3E}">
-        <p14:creationId xmlns:p14="http://schemas.microsoft.com/office/powerpoint/2010/main" val="2290261641"/>
+        <p14:creationId xmlns:p14="http://schemas.microsoft.com/office/powerpoint/2010/main" val="2873264670"/>
       </p:ext>
     </p:extLst>
   </p:cSld>
@@ -7559,7 +7723,7 @@
               <a:rPr lang="en-NZ" sz="2800" dirty="0">
                 <a:latin typeface="Abadi" panose="020B0604020104020204" pitchFamily="34" charset="0"/>
               </a:rPr>
-              <a:t>Iterative Improvement</a:t>
+              <a:t>Test results</a:t>
             </a:r>
           </a:p>
         </p:txBody>
@@ -7588,7 +7752,7 @@
               <a:rPr lang="en-NZ" sz="2000" dirty="0">
                 <a:latin typeface="Abadi" panose="020B0604020104020204" pitchFamily="34" charset="0"/>
               </a:rPr>
-              <a:t>Show how you have used iterative improvement throughout the design, development and testing process to produce a high-quality outcome. (through providing screenshots/a screencast) </a:t>
+              <a:t>Summarise the results of your testing and how you addressed any issues or problems that arise during testing. Make sure you get others to test your site and get feedback.</a:t>
             </a:r>
           </a:p>
         </p:txBody>
@@ -7596,7 +7760,7 @@
     </p:spTree>
     <p:extLst>
       <p:ext uri="{BB962C8B-B14F-4D97-AF65-F5344CB8AC3E}">
-        <p14:creationId xmlns:p14="http://schemas.microsoft.com/office/powerpoint/2010/main" val="2562898663"/>
+        <p14:creationId xmlns:p14="http://schemas.microsoft.com/office/powerpoint/2010/main" val="1831671313"/>
       </p:ext>
     </p:extLst>
   </p:cSld>
@@ -7635,16 +7799,51 @@
         </p:nvSpPr>
         <p:spPr/>
         <p:txBody>
+          <a:bodyPr/>
+          <a:lstStyle/>
+          <a:p>
+            <a:r>
+              <a:rPr lang="en-NZ" sz="2800" dirty="0">
+                <a:latin typeface="Abadi" panose="020B0604020104020204" pitchFamily="34" charset="0"/>
+              </a:rPr>
+              <a:t>Describe the end user requirements</a:t>
+            </a:r>
+            <a:br>
+              <a:rPr lang="en-NZ" dirty="0">
+                <a:latin typeface="Abadi" panose="020B0604020104020204" pitchFamily="34" charset="0"/>
+              </a:rPr>
+            </a:br>
+            <a:endParaRPr lang="en-NZ" dirty="0">
+              <a:latin typeface="Abadi" panose="020B0604020104020204" pitchFamily="34" charset="0"/>
+            </a:endParaRPr>
+          </a:p>
+        </p:txBody>
+      </p:sp>
+      <p:sp>
+        <p:nvSpPr>
+          <p:cNvPr id="3" name="Content Placeholder 2"/>
+          <p:cNvSpPr>
+            <a:spLocks noGrp="1"/>
+          </p:cNvSpPr>
+          <p:nvPr>
+            <p:ph idx="1"/>
+          </p:nvPr>
+        </p:nvSpPr>
+        <p:spPr/>
+        <p:txBody>
           <a:bodyPr>
             <a:normAutofit/>
           </a:bodyPr>
           <a:lstStyle/>
           <a:p>
-            <a:r>
-              <a:rPr lang="en-NZ" sz="2800" dirty="0">
-                <a:latin typeface="Abadi" panose="020B0604020104020204" pitchFamily="34" charset="0"/>
-              </a:rPr>
-              <a:t>Iterative Improvement</a:t>
+            <a:pPr marL="0" indent="0">
+              <a:buNone/>
+            </a:pPr>
+            <a:r>
+              <a:rPr lang="en-NZ" sz="2000" dirty="0">
+                <a:latin typeface="Abadi" panose="020B0604020104020204" pitchFamily="34" charset="0"/>
+              </a:rPr>
+              <a:t>Describe how the chosen tools and techniques to develop the website were appropriate for the purpose and end users. </a:t>
             </a:r>
           </a:p>
         </p:txBody>
@@ -7652,7 +7851,7 @@
     </p:spTree>
     <p:extLst>
       <p:ext uri="{BB962C8B-B14F-4D97-AF65-F5344CB8AC3E}">
-        <p14:creationId xmlns:p14="http://schemas.microsoft.com/office/powerpoint/2010/main" val="3782274042"/>
+        <p14:creationId xmlns:p14="http://schemas.microsoft.com/office/powerpoint/2010/main" val="2290261641"/>
       </p:ext>
     </p:extLst>
   </p:cSld>
@@ -7700,7 +7899,7 @@
               <a:rPr lang="en-NZ" sz="2800" dirty="0">
                 <a:latin typeface="Abadi" panose="020B0604020104020204" pitchFamily="34" charset="0"/>
               </a:rPr>
-              <a:t>Version Control</a:t>
+              <a:t>Iterative Improvement</a:t>
             </a:r>
           </a:p>
         </p:txBody>
@@ -7729,7 +7928,7 @@
               <a:rPr lang="en-NZ" sz="2000" dirty="0">
                 <a:latin typeface="Abadi" panose="020B0604020104020204" pitchFamily="34" charset="0"/>
               </a:rPr>
-              <a:t>Show how you have used version control throughout the design, development, and testing process.</a:t>
+              <a:t>Show how you have used iterative improvement throughout the design, development and testing process to produce a high-quality outcome. (through providing screenshots/a screencast) </a:t>
             </a:r>
           </a:p>
         </p:txBody>
@@ -7737,7 +7936,7 @@
     </p:spTree>
     <p:extLst>
       <p:ext uri="{BB962C8B-B14F-4D97-AF65-F5344CB8AC3E}">
-        <p14:creationId xmlns:p14="http://schemas.microsoft.com/office/powerpoint/2010/main" val="2812247241"/>
+        <p14:creationId xmlns:p14="http://schemas.microsoft.com/office/powerpoint/2010/main" val="2562898663"/>
       </p:ext>
     </p:extLst>
   </p:cSld>
@@ -7785,36 +7984,7 @@
               <a:rPr lang="en-NZ" sz="2800" dirty="0">
                 <a:latin typeface="Abadi" panose="020B0604020104020204" pitchFamily="34" charset="0"/>
               </a:rPr>
-              <a:t>GitHub Commits</a:t>
-            </a:r>
-          </a:p>
-        </p:txBody>
-      </p:sp>
-      <p:sp>
-        <p:nvSpPr>
-          <p:cNvPr id="3" name="Content Placeholder 2"/>
-          <p:cNvSpPr>
-            <a:spLocks noGrp="1"/>
-          </p:cNvSpPr>
-          <p:nvPr>
-            <p:ph idx="1"/>
-          </p:nvPr>
-        </p:nvSpPr>
-        <p:spPr/>
-        <p:txBody>
-          <a:bodyPr>
-            <a:normAutofit/>
-          </a:bodyPr>
-          <a:lstStyle/>
-          <a:p>
-            <a:pPr marL="0" indent="0">
-              <a:buNone/>
-            </a:pPr>
-            <a:r>
-              <a:rPr lang="en-NZ" sz="2000" dirty="0">
-                <a:latin typeface="Abadi" panose="020B0604020104020204" pitchFamily="34" charset="0"/>
-              </a:rPr>
-              <a:t>Show how you have used GitHub throughout the design, development, and testing process.</a:t>
+              <a:t>Iterative Improvement</a:t>
             </a:r>
           </a:p>
         </p:txBody>
@@ -7822,7 +7992,7 @@
     </p:spTree>
     <p:extLst>
       <p:ext uri="{BB962C8B-B14F-4D97-AF65-F5344CB8AC3E}">
-        <p14:creationId xmlns:p14="http://schemas.microsoft.com/office/powerpoint/2010/main" val="1865976428"/>
+        <p14:creationId xmlns:p14="http://schemas.microsoft.com/office/powerpoint/2010/main" val="3782274042"/>
       </p:ext>
     </p:extLst>
   </p:cSld>
@@ -7870,7 +8040,7 @@
               <a:rPr lang="en-NZ" sz="2800" dirty="0">
                 <a:latin typeface="Abadi" panose="020B0604020104020204" pitchFamily="34" charset="0"/>
               </a:rPr>
-              <a:t>Addressing Relevant Implications</a:t>
+              <a:t>Version Control</a:t>
             </a:r>
           </a:p>
         </p:txBody>
@@ -7899,7 +8069,7 @@
               <a:rPr lang="en-NZ" sz="2000" dirty="0">
                 <a:latin typeface="Abadi" panose="020B0604020104020204" pitchFamily="34" charset="0"/>
               </a:rPr>
-              <a:t>Discuss how have you addressed relevant implications?</a:t>
+              <a:t>Show how you have used version control throughout the design, development, and testing process.</a:t>
             </a:r>
           </a:p>
         </p:txBody>
@@ -7907,7 +8077,7 @@
     </p:spTree>
     <p:extLst>
       <p:ext uri="{BB962C8B-B14F-4D97-AF65-F5344CB8AC3E}">
-        <p14:creationId xmlns:p14="http://schemas.microsoft.com/office/powerpoint/2010/main" val="559411755"/>
+        <p14:creationId xmlns:p14="http://schemas.microsoft.com/office/powerpoint/2010/main" val="2812247241"/>
       </p:ext>
     </p:extLst>
   </p:cSld>
@@ -7934,79 +8104,65 @@
           <a:chExt cx="0" cy="0"/>
         </a:xfrm>
       </p:grpSpPr>
-      <p:graphicFrame>
-        <p:nvGraphicFramePr>
-          <p:cNvPr id="5" name="Object 4">
-            <a:extLst>
-              <a:ext uri="{FF2B5EF4-FFF2-40B4-BE49-F238E27FC236}">
-                <a16:creationId xmlns:a16="http://schemas.microsoft.com/office/drawing/2014/main" id="{0E67140C-42C4-4E71-99B3-C68FFFCEDB4A}"/>
-              </a:ext>
-            </a:extLst>
-          </p:cNvPr>
-          <p:cNvGraphicFramePr>
-            <a:graphicFrameLocks noChangeAspect="1"/>
-          </p:cNvGraphicFramePr>
-          <p:nvPr>
-            <p:extLst>
-              <p:ext uri="{D42A27DB-BD31-4B8C-83A1-F6EECF244321}">
-                <p14:modId xmlns:p14="http://schemas.microsoft.com/office/powerpoint/2010/main" val="701816208"/>
-              </p:ext>
-            </p:extLst>
-          </p:nvPr>
-        </p:nvGraphicFramePr>
-        <p:xfrm>
-          <a:off x="1344613" y="1133475"/>
-          <a:ext cx="10102850" cy="4414838"/>
-        </p:xfrm>
-        <a:graphic>
-          <a:graphicData uri="http://schemas.openxmlformats.org/presentationml/2006/ole">
-            <mc:AlternateContent xmlns:mc="http://schemas.openxmlformats.org/markup-compatibility/2006">
-              <mc:Choice xmlns:v="urn:schemas-microsoft-com:vml" Requires="v">
-                <p:oleObj name="Document" r:id="rId2" imgW="9770766" imgH="4267777" progId="Word.Document.12">
-                  <p:embed/>
-                </p:oleObj>
-              </mc:Choice>
-              <mc:Fallback>
-                <p:oleObj name="Document" r:id="rId2" imgW="9770766" imgH="4267777" progId="Word.Document.12">
-                  <p:embed/>
-                  <p:pic>
-                    <p:nvPicPr>
-                      <p:cNvPr id="5" name="Object 4">
-                        <a:extLst>
-                          <a:ext uri="{FF2B5EF4-FFF2-40B4-BE49-F238E27FC236}">
-                            <a16:creationId xmlns:a16="http://schemas.microsoft.com/office/drawing/2014/main" id="{0E67140C-42C4-4E71-99B3-C68FFFCEDB4A}"/>
-                          </a:ext>
-                        </a:extLst>
-                      </p:cNvPr>
-                      <p:cNvPicPr/>
-                      <p:nvPr/>
-                    </p:nvPicPr>
-                    <p:blipFill>
-                      <a:blip r:embed="rId3"/>
-                      <a:stretch>
-                        <a:fillRect/>
-                      </a:stretch>
-                    </p:blipFill>
-                    <p:spPr>
-                      <a:xfrm>
-                        <a:off x="1344613" y="1133475"/>
-                        <a:ext cx="10102850" cy="4414838"/>
-                      </a:xfrm>
-                      <a:prstGeom prst="rect">
-                        <a:avLst/>
-                      </a:prstGeom>
-                    </p:spPr>
-                  </p:pic>
-                </p:oleObj>
-              </mc:Fallback>
-            </mc:AlternateContent>
-          </a:graphicData>
-        </a:graphic>
-      </p:graphicFrame>
+      <p:sp>
+        <p:nvSpPr>
+          <p:cNvPr id="2" name="Title 1"/>
+          <p:cNvSpPr>
+            <a:spLocks noGrp="1"/>
+          </p:cNvSpPr>
+          <p:nvPr>
+            <p:ph type="title"/>
+          </p:nvPr>
+        </p:nvSpPr>
+        <p:spPr/>
+        <p:txBody>
+          <a:bodyPr>
+            <a:normAutofit/>
+          </a:bodyPr>
+          <a:lstStyle/>
+          <a:p>
+            <a:r>
+              <a:rPr lang="en-NZ" sz="2800" dirty="0">
+                <a:latin typeface="Abadi" panose="020B0604020104020204" pitchFamily="34" charset="0"/>
+              </a:rPr>
+              <a:t>GitHub Commits</a:t>
+            </a:r>
+          </a:p>
+        </p:txBody>
+      </p:sp>
+      <p:sp>
+        <p:nvSpPr>
+          <p:cNvPr id="3" name="Content Placeholder 2"/>
+          <p:cNvSpPr>
+            <a:spLocks noGrp="1"/>
+          </p:cNvSpPr>
+          <p:nvPr>
+            <p:ph idx="1"/>
+          </p:nvPr>
+        </p:nvSpPr>
+        <p:spPr/>
+        <p:txBody>
+          <a:bodyPr>
+            <a:normAutofit/>
+          </a:bodyPr>
+          <a:lstStyle/>
+          <a:p>
+            <a:pPr marL="0" indent="0">
+              <a:buNone/>
+            </a:pPr>
+            <a:r>
+              <a:rPr lang="en-NZ" sz="2000" dirty="0">
+                <a:latin typeface="Abadi" panose="020B0604020104020204" pitchFamily="34" charset="0"/>
+              </a:rPr>
+              <a:t>Show how you have used GitHub throughout the design, development, and testing process.</a:t>
+            </a:r>
+          </a:p>
+        </p:txBody>
+      </p:sp>
     </p:spTree>
     <p:extLst>
       <p:ext uri="{BB962C8B-B14F-4D97-AF65-F5344CB8AC3E}">
-        <p14:creationId xmlns:p14="http://schemas.microsoft.com/office/powerpoint/2010/main" val="1448846893"/>
+        <p14:creationId xmlns:p14="http://schemas.microsoft.com/office/powerpoint/2010/main" val="1865976428"/>
       </p:ext>
     </p:extLst>
   </p:cSld>
@@ -8033,79 +8189,65 @@
           <a:chExt cx="0" cy="0"/>
         </a:xfrm>
       </p:grpSpPr>
-      <p:graphicFrame>
-        <p:nvGraphicFramePr>
-          <p:cNvPr id="2" name="Object 1">
-            <a:extLst>
-              <a:ext uri="{FF2B5EF4-FFF2-40B4-BE49-F238E27FC236}">
-                <a16:creationId xmlns:a16="http://schemas.microsoft.com/office/drawing/2014/main" id="{9FC50FC4-0CFE-4056-8552-AC96E70A69FA}"/>
-              </a:ext>
-            </a:extLst>
-          </p:cNvPr>
-          <p:cNvGraphicFramePr>
-            <a:graphicFrameLocks noChangeAspect="1"/>
-          </p:cNvGraphicFramePr>
-          <p:nvPr>
-            <p:extLst>
-              <p:ext uri="{D42A27DB-BD31-4B8C-83A1-F6EECF244321}">
-                <p14:modId xmlns:p14="http://schemas.microsoft.com/office/powerpoint/2010/main" val="2940266929"/>
-              </p:ext>
-            </p:extLst>
-          </p:nvPr>
-        </p:nvGraphicFramePr>
-        <p:xfrm>
-          <a:off x="1211263" y="407988"/>
-          <a:ext cx="9771062" cy="6040437"/>
-        </p:xfrm>
-        <a:graphic>
-          <a:graphicData uri="http://schemas.openxmlformats.org/presentationml/2006/ole">
-            <mc:AlternateContent xmlns:mc="http://schemas.openxmlformats.org/markup-compatibility/2006">
-              <mc:Choice xmlns:v="urn:schemas-microsoft-com:vml" Requires="v">
-                <p:oleObj name="Document" r:id="rId2" imgW="9770766" imgH="6040475" progId="Word.Document.12">
-                  <p:embed/>
-                </p:oleObj>
-              </mc:Choice>
-              <mc:Fallback>
-                <p:oleObj name="Document" r:id="rId2" imgW="9770766" imgH="6040475" progId="Word.Document.12">
-                  <p:embed/>
-                  <p:pic>
-                    <p:nvPicPr>
-                      <p:cNvPr id="2" name="Object 1">
-                        <a:extLst>
-                          <a:ext uri="{FF2B5EF4-FFF2-40B4-BE49-F238E27FC236}">
-                            <a16:creationId xmlns:a16="http://schemas.microsoft.com/office/drawing/2014/main" id="{9FC50FC4-0CFE-4056-8552-AC96E70A69FA}"/>
-                          </a:ext>
-                        </a:extLst>
-                      </p:cNvPr>
-                      <p:cNvPicPr/>
-                      <p:nvPr/>
-                    </p:nvPicPr>
-                    <p:blipFill>
-                      <a:blip r:embed="rId3"/>
-                      <a:stretch>
-                        <a:fillRect/>
-                      </a:stretch>
-                    </p:blipFill>
-                    <p:spPr>
-                      <a:xfrm>
-                        <a:off x="1211263" y="407988"/>
-                        <a:ext cx="9771062" cy="6040437"/>
-                      </a:xfrm>
-                      <a:prstGeom prst="rect">
-                        <a:avLst/>
-                      </a:prstGeom>
-                    </p:spPr>
-                  </p:pic>
-                </p:oleObj>
-              </mc:Fallback>
-            </mc:AlternateContent>
-          </a:graphicData>
-        </a:graphic>
-      </p:graphicFrame>
+      <p:sp>
+        <p:nvSpPr>
+          <p:cNvPr id="2" name="Title 1"/>
+          <p:cNvSpPr>
+            <a:spLocks noGrp="1"/>
+          </p:cNvSpPr>
+          <p:nvPr>
+            <p:ph type="title"/>
+          </p:nvPr>
+        </p:nvSpPr>
+        <p:spPr/>
+        <p:txBody>
+          <a:bodyPr>
+            <a:normAutofit/>
+          </a:bodyPr>
+          <a:lstStyle/>
+          <a:p>
+            <a:r>
+              <a:rPr lang="en-NZ" sz="2800" dirty="0">
+                <a:latin typeface="Abadi" panose="020B0604020104020204" pitchFamily="34" charset="0"/>
+              </a:rPr>
+              <a:t>Addressing Relevant Implications</a:t>
+            </a:r>
+          </a:p>
+        </p:txBody>
+      </p:sp>
+      <p:sp>
+        <p:nvSpPr>
+          <p:cNvPr id="3" name="Content Placeholder 2"/>
+          <p:cNvSpPr>
+            <a:spLocks noGrp="1"/>
+          </p:cNvSpPr>
+          <p:nvPr>
+            <p:ph idx="1"/>
+          </p:nvPr>
+        </p:nvSpPr>
+        <p:spPr/>
+        <p:txBody>
+          <a:bodyPr>
+            <a:normAutofit/>
+          </a:bodyPr>
+          <a:lstStyle/>
+          <a:p>
+            <a:pPr marL="0" indent="0">
+              <a:buNone/>
+            </a:pPr>
+            <a:r>
+              <a:rPr lang="en-NZ" sz="2000" dirty="0">
+                <a:latin typeface="Abadi" panose="020B0604020104020204" pitchFamily="34" charset="0"/>
+              </a:rPr>
+              <a:t>Discuss how have you addressed relevant implications?</a:t>
+            </a:r>
+          </a:p>
+        </p:txBody>
+      </p:sp>
     </p:spTree>
     <p:extLst>
       <p:ext uri="{BB962C8B-B14F-4D97-AF65-F5344CB8AC3E}">
-        <p14:creationId xmlns:p14="http://schemas.microsoft.com/office/powerpoint/2010/main" val="3878584299"/>
+        <p14:creationId xmlns:p14="http://schemas.microsoft.com/office/powerpoint/2010/main" val="559411755"/>
       </p:ext>
     </p:extLst>
   </p:cSld>
@@ -8434,6 +8576,204 @@
 </p:sld>
 </file>
 
+<file path=ppt/slides/slide30.xml><?xml version="1.0" encoding="utf-8"?>
+<p:sld xmlns:a="http://schemas.openxmlformats.org/drawingml/2006/main" xmlns:r="http://schemas.openxmlformats.org/officeDocument/2006/relationships" xmlns:p="http://schemas.openxmlformats.org/presentationml/2006/main">
+  <p:cSld>
+    <p:spTree>
+      <p:nvGrpSpPr>
+        <p:cNvPr id="1" name=""/>
+        <p:cNvGrpSpPr/>
+        <p:nvPr/>
+      </p:nvGrpSpPr>
+      <p:grpSpPr>
+        <a:xfrm>
+          <a:off x="0" y="0"/>
+          <a:ext cx="0" cy="0"/>
+          <a:chOff x="0" y="0"/>
+          <a:chExt cx="0" cy="0"/>
+        </a:xfrm>
+      </p:grpSpPr>
+      <p:graphicFrame>
+        <p:nvGraphicFramePr>
+          <p:cNvPr id="5" name="Object 4">
+            <a:extLst>
+              <a:ext uri="{FF2B5EF4-FFF2-40B4-BE49-F238E27FC236}">
+                <a16:creationId xmlns:a16="http://schemas.microsoft.com/office/drawing/2014/main" id="{0E67140C-42C4-4E71-99B3-C68FFFCEDB4A}"/>
+              </a:ext>
+            </a:extLst>
+          </p:cNvPr>
+          <p:cNvGraphicFramePr>
+            <a:graphicFrameLocks noChangeAspect="1"/>
+          </p:cNvGraphicFramePr>
+          <p:nvPr>
+            <p:extLst>
+              <p:ext uri="{D42A27DB-BD31-4B8C-83A1-F6EECF244321}">
+                <p14:modId xmlns:p14="http://schemas.microsoft.com/office/powerpoint/2010/main" val="701816208"/>
+              </p:ext>
+            </p:extLst>
+          </p:nvPr>
+        </p:nvGraphicFramePr>
+        <p:xfrm>
+          <a:off x="1344613" y="1133475"/>
+          <a:ext cx="10102850" cy="4414838"/>
+        </p:xfrm>
+        <a:graphic>
+          <a:graphicData uri="http://schemas.openxmlformats.org/presentationml/2006/ole">
+            <mc:AlternateContent xmlns:mc="http://schemas.openxmlformats.org/markup-compatibility/2006">
+              <mc:Choice xmlns:v="urn:schemas-microsoft-com:vml" Requires="v">
+                <p:oleObj name="Document" r:id="rId2" imgW="9770766" imgH="4267777" progId="Word.Document.12">
+                  <p:embed/>
+                </p:oleObj>
+              </mc:Choice>
+              <mc:Fallback>
+                <p:oleObj name="Document" r:id="rId2" imgW="9770766" imgH="4267777" progId="Word.Document.12">
+                  <p:embed/>
+                  <p:pic>
+                    <p:nvPicPr>
+                      <p:cNvPr id="5" name="Object 4">
+                        <a:extLst>
+                          <a:ext uri="{FF2B5EF4-FFF2-40B4-BE49-F238E27FC236}">
+                            <a16:creationId xmlns:a16="http://schemas.microsoft.com/office/drawing/2014/main" id="{0E67140C-42C4-4E71-99B3-C68FFFCEDB4A}"/>
+                          </a:ext>
+                        </a:extLst>
+                      </p:cNvPr>
+                      <p:cNvPicPr/>
+                      <p:nvPr/>
+                    </p:nvPicPr>
+                    <p:blipFill>
+                      <a:blip r:embed="rId3"/>
+                      <a:stretch>
+                        <a:fillRect/>
+                      </a:stretch>
+                    </p:blipFill>
+                    <p:spPr>
+                      <a:xfrm>
+                        <a:off x="1344613" y="1133475"/>
+                        <a:ext cx="10102850" cy="4414838"/>
+                      </a:xfrm>
+                      <a:prstGeom prst="rect">
+                        <a:avLst/>
+                      </a:prstGeom>
+                    </p:spPr>
+                  </p:pic>
+                </p:oleObj>
+              </mc:Fallback>
+            </mc:AlternateContent>
+          </a:graphicData>
+        </a:graphic>
+      </p:graphicFrame>
+    </p:spTree>
+    <p:extLst>
+      <p:ext uri="{BB962C8B-B14F-4D97-AF65-F5344CB8AC3E}">
+        <p14:creationId xmlns:p14="http://schemas.microsoft.com/office/powerpoint/2010/main" val="1448846893"/>
+      </p:ext>
+    </p:extLst>
+  </p:cSld>
+  <p:clrMapOvr>
+    <a:masterClrMapping/>
+  </p:clrMapOvr>
+</p:sld>
+</file>
+
+<file path=ppt/slides/slide31.xml><?xml version="1.0" encoding="utf-8"?>
+<p:sld xmlns:a="http://schemas.openxmlformats.org/drawingml/2006/main" xmlns:r="http://schemas.openxmlformats.org/officeDocument/2006/relationships" xmlns:p="http://schemas.openxmlformats.org/presentationml/2006/main">
+  <p:cSld>
+    <p:spTree>
+      <p:nvGrpSpPr>
+        <p:cNvPr id="1" name=""/>
+        <p:cNvGrpSpPr/>
+        <p:nvPr/>
+      </p:nvGrpSpPr>
+      <p:grpSpPr>
+        <a:xfrm>
+          <a:off x="0" y="0"/>
+          <a:ext cx="0" cy="0"/>
+          <a:chOff x="0" y="0"/>
+          <a:chExt cx="0" cy="0"/>
+        </a:xfrm>
+      </p:grpSpPr>
+      <p:graphicFrame>
+        <p:nvGraphicFramePr>
+          <p:cNvPr id="2" name="Object 1">
+            <a:extLst>
+              <a:ext uri="{FF2B5EF4-FFF2-40B4-BE49-F238E27FC236}">
+                <a16:creationId xmlns:a16="http://schemas.microsoft.com/office/drawing/2014/main" id="{9FC50FC4-0CFE-4056-8552-AC96E70A69FA}"/>
+              </a:ext>
+            </a:extLst>
+          </p:cNvPr>
+          <p:cNvGraphicFramePr>
+            <a:graphicFrameLocks noChangeAspect="1"/>
+          </p:cNvGraphicFramePr>
+          <p:nvPr>
+            <p:extLst>
+              <p:ext uri="{D42A27DB-BD31-4B8C-83A1-F6EECF244321}">
+                <p14:modId xmlns:p14="http://schemas.microsoft.com/office/powerpoint/2010/main" val="2940266929"/>
+              </p:ext>
+            </p:extLst>
+          </p:nvPr>
+        </p:nvGraphicFramePr>
+        <p:xfrm>
+          <a:off x="1211263" y="407988"/>
+          <a:ext cx="9771062" cy="6040437"/>
+        </p:xfrm>
+        <a:graphic>
+          <a:graphicData uri="http://schemas.openxmlformats.org/presentationml/2006/ole">
+            <mc:AlternateContent xmlns:mc="http://schemas.openxmlformats.org/markup-compatibility/2006">
+              <mc:Choice xmlns:v="urn:schemas-microsoft-com:vml" Requires="v">
+                <p:oleObj name="Document" r:id="rId2" imgW="9770766" imgH="6040475" progId="Word.Document.12">
+                  <p:embed/>
+                </p:oleObj>
+              </mc:Choice>
+              <mc:Fallback>
+                <p:oleObj name="Document" r:id="rId2" imgW="9770766" imgH="6040475" progId="Word.Document.12">
+                  <p:embed/>
+                  <p:pic>
+                    <p:nvPicPr>
+                      <p:cNvPr id="2" name="Object 1">
+                        <a:extLst>
+                          <a:ext uri="{FF2B5EF4-FFF2-40B4-BE49-F238E27FC236}">
+                            <a16:creationId xmlns:a16="http://schemas.microsoft.com/office/drawing/2014/main" id="{9FC50FC4-0CFE-4056-8552-AC96E70A69FA}"/>
+                          </a:ext>
+                        </a:extLst>
+                      </p:cNvPr>
+                      <p:cNvPicPr/>
+                      <p:nvPr/>
+                    </p:nvPicPr>
+                    <p:blipFill>
+                      <a:blip r:embed="rId3"/>
+                      <a:stretch>
+                        <a:fillRect/>
+                      </a:stretch>
+                    </p:blipFill>
+                    <p:spPr>
+                      <a:xfrm>
+                        <a:off x="1211263" y="407988"/>
+                        <a:ext cx="9771062" cy="6040437"/>
+                      </a:xfrm>
+                      <a:prstGeom prst="rect">
+                        <a:avLst/>
+                      </a:prstGeom>
+                    </p:spPr>
+                  </p:pic>
+                </p:oleObj>
+              </mc:Fallback>
+            </mc:AlternateContent>
+          </a:graphicData>
+        </a:graphic>
+      </p:graphicFrame>
+    </p:spTree>
+    <p:extLst>
+      <p:ext uri="{BB962C8B-B14F-4D97-AF65-F5344CB8AC3E}">
+        <p14:creationId xmlns:p14="http://schemas.microsoft.com/office/powerpoint/2010/main" val="3878584299"/>
+      </p:ext>
+    </p:extLst>
+  </p:cSld>
+  <p:clrMapOvr>
+    <a:masterClrMapping/>
+  </p:clrMapOvr>
+</p:sld>
+</file>
+
 <file path=ppt/slides/slide4.xml><?xml version="1.0" encoding="utf-8"?>
 <p:sld xmlns:a="http://schemas.openxmlformats.org/drawingml/2006/main" xmlns:r="http://schemas.openxmlformats.org/officeDocument/2006/relationships" xmlns:p="http://schemas.openxmlformats.org/presentationml/2006/main">
   <p:cSld>
@@ -8625,62 +8965,19 @@
               <a:rPr lang="en-NZ" dirty="0">
                 <a:latin typeface="Abadi" panose="020B0604020104020204" pitchFamily="34" charset="0"/>
               </a:rPr>
-              <a:t>Purpose of my website is for students to be able to post questions of any subject that may be confused in. </a:t>
-            </a:r>
-          </a:p>
-          <a:p>
-            <a:pPr>
-              <a:buFont typeface="Wingdings" panose="05000000000000000000" pitchFamily="2" charset="2"/>
-              <a:buChar char="q"/>
+              <a:t>Purpose of my website is for people to be able to post their reviews and thoughts on Jollibee. This type of website will be most beneficial to current and possible future consumers. Additionally, it is also beneficial for the fast food restaurant Jollibee. It will serve as free marketing and can attract new consumers that will be influenced by the users reviews. </a:t>
+            </a:r>
+          </a:p>
+          <a:p>
+            <a:pPr marL="0" indent="0">
+              <a:buNone/>
             </a:pPr>
             <a:r>
-              <a:rPr lang="en-NZ" dirty="0">
-                <a:latin typeface="Abadi" panose="020B0604020104020204" pitchFamily="34" charset="0"/>
-              </a:rPr>
-              <a:t> This will then allow other students and teachers to be able to comment underneath their post answering their question. </a:t>
-            </a:r>
-            <a:endParaRPr lang="en-NZ" sz="2000" dirty="0">
-              <a:latin typeface="Abadi" panose="020B0604020104020204" pitchFamily="34" charset="0"/>
-            </a:endParaRPr>
-          </a:p>
-          <a:p>
-            <a:pPr>
-              <a:buFont typeface="Wingdings" panose="05000000000000000000" pitchFamily="2" charset="2"/>
-              <a:buChar char="q"/>
-            </a:pPr>
-            <a:r>
               <a:rPr lang="en-NZ" sz="2000" dirty="0">
                 <a:latin typeface="Abadi" panose="020B0604020104020204" pitchFamily="34" charset="0"/>
               </a:rPr>
-              <a:t> </a:t>
-            </a:r>
-            <a:r>
-              <a:rPr lang="en-NZ" dirty="0">
-                <a:latin typeface="Abadi" panose="020B0604020104020204" pitchFamily="34" charset="0"/>
-              </a:rPr>
-              <a:t>Target audience are senior students (Years 11-13) in Sancta Maria College that are doing NCEA. </a:t>
-            </a:r>
-          </a:p>
-          <a:p>
-            <a:pPr>
-              <a:buFont typeface="Wingdings" panose="05000000000000000000" pitchFamily="2" charset="2"/>
-              <a:buChar char="q"/>
-            </a:pPr>
-            <a:r>
-              <a:rPr lang="en-NZ" sz="2000" dirty="0">
-                <a:latin typeface="Abadi" panose="020B0604020104020204" pitchFamily="34" charset="0"/>
-              </a:rPr>
-              <a:t> </a:t>
-            </a:r>
-            <a:r>
-              <a:rPr lang="en-NZ" dirty="0">
-                <a:latin typeface="Abadi" panose="020B0604020104020204" pitchFamily="34" charset="0"/>
-              </a:rPr>
-              <a:t>This type of website will be most beneficial to these students. </a:t>
-            </a:r>
-            <a:endParaRPr lang="en-NZ" sz="2000" dirty="0">
-              <a:latin typeface="Abadi" panose="020B0604020104020204" pitchFamily="34" charset="0"/>
-            </a:endParaRPr>
+              <a:t>(also to potentially bring Jollibee to NZ)</a:t>
+            </a:r>
           </a:p>
           <a:p>
             <a:pPr marL="0" indent="0">
@@ -8792,6 +9089,22 @@
               <a:buChar char="q"/>
             </a:pPr>
             <a:r>
+              <a:rPr lang="en-US" b="0" i="0" dirty="0">
+                <a:solidFill>
+                  <a:srgbClr val="000000"/>
+                </a:solidFill>
+                <a:effectLst/>
+                <a:latin typeface="Abadi" panose="020B0604020104020204" pitchFamily="34" charset="0"/>
+              </a:rPr>
+              <a:t>Review website/consumer review platform </a:t>
+            </a:r>
+          </a:p>
+          <a:p>
+            <a:pPr algn="l" rtl="0" fontAlgn="base">
+              <a:buFont typeface="Wingdings" panose="05000000000000000000" pitchFamily="2" charset="2"/>
+              <a:buChar char="q"/>
+            </a:pPr>
+            <a:r>
               <a:rPr lang="en-NZ" sz="1800" b="0" i="0" u="none" strike="noStrike" dirty="0">
                 <a:solidFill>
                   <a:srgbClr val="000000"/>
@@ -8799,17 +9112,7 @@
                 <a:effectLst/>
                 <a:latin typeface="Abadi" panose="020B0604020104020204" pitchFamily="34" charset="0"/>
               </a:rPr>
-              <a:t>Q&amp;A/Forum Website</a:t>
-            </a:r>
-            <a:r>
-              <a:rPr lang="en-US" sz="1800" b="0" i="0" dirty="0">
-                <a:solidFill>
-                  <a:srgbClr val="000000"/>
-                </a:solidFill>
-                <a:effectLst/>
-                <a:latin typeface="Abadi" panose="020B0604020104020204" pitchFamily="34" charset="0"/>
-              </a:rPr>
-              <a:t>​</a:t>
+              <a:t>Consumers can post their review and thoughts on Jollibee</a:t>
             </a:r>
             <a:endParaRPr lang="en-US" b="0" i="0" dirty="0">
               <a:solidFill>
@@ -8832,7 +9135,7 @@
                 <a:effectLst/>
                 <a:latin typeface="Abadi" panose="020B0604020104020204" pitchFamily="34" charset="0"/>
               </a:rPr>
-              <a:t>Students can post questions about a particular subject.</a:t>
+              <a:t>Other users will post their comments </a:t>
             </a:r>
             <a:r>
               <a:rPr lang="en-US" sz="1800" b="0" i="0" dirty="0">
@@ -8865,25 +9168,8 @@
                 <a:effectLst/>
                 <a:latin typeface="Abadi" panose="020B0604020104020204" pitchFamily="34" charset="0"/>
               </a:rPr>
-              <a:t>Teachers and other students will post their comments </a:t>
-            </a:r>
-            <a:r>
-              <a:rPr lang="en-US" sz="1800" b="0" i="0" dirty="0">
-                <a:solidFill>
-                  <a:srgbClr val="000000"/>
-                </a:solidFill>
-                <a:effectLst/>
-                <a:latin typeface="Abadi" panose="020B0604020104020204" pitchFamily="34" charset="0"/>
-              </a:rPr>
-              <a:t>​</a:t>
-            </a:r>
-            <a:endParaRPr lang="en-US" b="0" i="0" dirty="0">
-              <a:solidFill>
-                <a:srgbClr val="000000"/>
-              </a:solidFill>
-              <a:effectLst/>
-              <a:latin typeface="Abadi" panose="020B0604020104020204" pitchFamily="34" charset="0"/>
-            </a:endParaRPr>
+              <a:t>Database will store posts and comments </a:t>
+            </a:r>
           </a:p>
           <a:p>
             <a:pPr algn="l" rtl="0" fontAlgn="base">
@@ -8891,14 +9177,13 @@
               <a:buChar char="q"/>
             </a:pPr>
             <a:r>
-              <a:rPr lang="en-NZ" sz="1800" b="0" i="0" u="none" strike="noStrike" dirty="0">
+              <a:rPr lang="en-NZ" sz="1800" dirty="0">
                 <a:solidFill>
                   <a:srgbClr val="000000"/>
                 </a:solidFill>
-                <a:effectLst/>
-                <a:latin typeface="Abadi" panose="020B0604020104020204" pitchFamily="34" charset="0"/>
-              </a:rPr>
-              <a:t>Database will store questions and comments </a:t>
+                <a:latin typeface="Abadi" panose="020B0604020104020204" pitchFamily="34" charset="0"/>
+              </a:rPr>
+              <a:t>Signup/login page </a:t>
             </a:r>
           </a:p>
           <a:p>
@@ -8913,22 +9198,7 @@
                 </a:solidFill>
                 <a:latin typeface="Abadi" panose="020B0604020104020204" pitchFamily="34" charset="0"/>
               </a:rPr>
-              <a:t>Signup/login</a:t>
-            </a:r>
-          </a:p>
-          <a:p>
-            <a:pPr algn="l" rtl="0" fontAlgn="base">
-              <a:buFont typeface="Wingdings" panose="05000000000000000000" pitchFamily="2" charset="2"/>
-              <a:buChar char="q"/>
-            </a:pPr>
-            <a:r>
-              <a:rPr lang="en-NZ" sz="1800" dirty="0">
-                <a:solidFill>
-                  <a:srgbClr val="000000"/>
-                </a:solidFill>
-                <a:latin typeface="Abadi" panose="020B0604020104020204" pitchFamily="34" charset="0"/>
-              </a:rPr>
-              <a:t>Be able to edit or delete their own posts. </a:t>
+              <a:t>Be able to edit or delete their own posts/reviews</a:t>
             </a:r>
           </a:p>
           <a:p>

</xml_diff>

<commit_message>
Changed navbar color to white
</commit_message>
<xml_diff>
--- a/AS91903_91906_Evidence_Joaquin_Badenas.pptx
+++ b/AS91903_91906_Evidence_Joaquin_Badenas.pptx
@@ -31,11 +31,12 @@
     <p:sldId id="274" r:id="rId25"/>
     <p:sldId id="266" r:id="rId26"/>
     <p:sldId id="291" r:id="rId27"/>
-    <p:sldId id="275" r:id="rId28"/>
-    <p:sldId id="283" r:id="rId29"/>
-    <p:sldId id="265" r:id="rId30"/>
-    <p:sldId id="269" r:id="rId31"/>
-    <p:sldId id="276" r:id="rId32"/>
+    <p:sldId id="296" r:id="rId28"/>
+    <p:sldId id="275" r:id="rId29"/>
+    <p:sldId id="283" r:id="rId30"/>
+    <p:sldId id="265" r:id="rId31"/>
+    <p:sldId id="269" r:id="rId32"/>
+    <p:sldId id="276" r:id="rId33"/>
   </p:sldIdLst>
   <p:sldSz cx="12192000" cy="6858000"/>
   <p:notesSz cx="6858000" cy="9144000"/>
@@ -145,7 +146,7 @@
 <file path=ppt/revisionInfo.xml><?xml version="1.0" encoding="utf-8"?>
 <p1510:revInfo xmlns:a="http://schemas.openxmlformats.org/drawingml/2006/main" xmlns:r="http://schemas.openxmlformats.org/officeDocument/2006/relationships" xmlns:p1510="http://schemas.microsoft.com/office/powerpoint/2015/10/main">
   <p1510:revLst>
-    <p1510:client id="{4F53BFBD-1E38-412E-AE7B-7E5D3B30168C}" v="13" dt="2024-07-24T21:21:22.876"/>
+    <p1510:client id="{4F53BFBD-1E38-412E-AE7B-7E5D3B30168C}" v="16" dt="2024-07-24T23:07:35.125"/>
   </p1510:revLst>
 </p1510:revInfo>
 </file>
@@ -1591,7 +1592,7 @@
   <pc:docChgLst>
     <pc:chgData name="Joaquin Badenas" userId="5cb29fd719aebf04" providerId="LiveId" clId="{4F53BFBD-1E38-412E-AE7B-7E5D3B30168C}"/>
     <pc:docChg chg="undo custSel addSld delSld modSld">
-      <pc:chgData name="Joaquin Badenas" userId="5cb29fd719aebf04" providerId="LiveId" clId="{4F53BFBD-1E38-412E-AE7B-7E5D3B30168C}" dt="2024-07-24T21:21:24.649" v="2772" actId="962"/>
+      <pc:chgData name="Joaquin Badenas" userId="5cb29fd719aebf04" providerId="LiveId" clId="{4F53BFBD-1E38-412E-AE7B-7E5D3B30168C}" dt="2024-07-24T23:22:43.702" v="3450" actId="1076"/>
       <pc:docMkLst>
         <pc:docMk/>
       </pc:docMkLst>
@@ -1916,11 +1917,19 @@
         </pc:sldMkLst>
       </pc:sldChg>
       <pc:sldChg chg="addSp delSp modSp add mod">
-        <pc:chgData name="Joaquin Badenas" userId="5cb29fd719aebf04" providerId="LiveId" clId="{4F53BFBD-1E38-412E-AE7B-7E5D3B30168C}" dt="2024-07-23T09:45:49.163" v="1350" actId="478"/>
+        <pc:chgData name="Joaquin Badenas" userId="5cb29fd719aebf04" providerId="LiveId" clId="{4F53BFBD-1E38-412E-AE7B-7E5D3B30168C}" dt="2024-07-24T23:07:11.060" v="3173" actId="1076"/>
         <pc:sldMkLst>
           <pc:docMk/>
           <pc:sldMk cId="3782274042" sldId="291"/>
         </pc:sldMkLst>
+        <pc:spChg chg="mod">
+          <ac:chgData name="Joaquin Badenas" userId="5cb29fd719aebf04" providerId="LiveId" clId="{4F53BFBD-1E38-412E-AE7B-7E5D3B30168C}" dt="2024-07-24T23:05:28.088" v="3034" actId="1076"/>
+          <ac:spMkLst>
+            <pc:docMk/>
+            <pc:sldMk cId="3782274042" sldId="291"/>
+            <ac:spMk id="2" creationId="{00000000-0000-0000-0000-000000000000}"/>
+          </ac:spMkLst>
+        </pc:spChg>
         <pc:spChg chg="del mod">
           <ac:chgData name="Joaquin Badenas" userId="5cb29fd719aebf04" providerId="LiveId" clId="{4F53BFBD-1E38-412E-AE7B-7E5D3B30168C}" dt="2024-07-23T09:26:42.243" v="1093" actId="478"/>
           <ac:spMkLst>
@@ -1929,6 +1938,14 @@
             <ac:spMk id="3" creationId="{00000000-0000-0000-0000-000000000000}"/>
           </ac:spMkLst>
         </pc:spChg>
+        <pc:graphicFrameChg chg="add mod modGraphic">
+          <ac:chgData name="Joaquin Badenas" userId="5cb29fd719aebf04" providerId="LiveId" clId="{4F53BFBD-1E38-412E-AE7B-7E5D3B30168C}" dt="2024-07-24T23:06:19.983" v="3160" actId="20577"/>
+          <ac:graphicFrameMkLst>
+            <pc:docMk/>
+            <pc:sldMk cId="3782274042" sldId="291"/>
+            <ac:graphicFrameMk id="3" creationId="{1A9023FA-33FD-5552-47F6-6A8D6E948421}"/>
+          </ac:graphicFrameMkLst>
+        </pc:graphicFrameChg>
         <pc:graphicFrameChg chg="add del mod modGraphic">
           <ac:chgData name="Joaquin Badenas" userId="5cb29fd719aebf04" providerId="LiveId" clId="{4F53BFBD-1E38-412E-AE7B-7E5D3B30168C}" dt="2024-07-23T09:45:49.163" v="1350" actId="478"/>
           <ac:graphicFrameMkLst>
@@ -1945,6 +1962,22 @@
             <ac:graphicFrameMk id="6" creationId="{10F15322-203A-5EC8-C81C-F6F73AFDBCC7}"/>
           </ac:graphicFrameMkLst>
         </pc:graphicFrameChg>
+        <pc:graphicFrameChg chg="add mod">
+          <ac:chgData name="Joaquin Badenas" userId="5cb29fd719aebf04" providerId="LiveId" clId="{4F53BFBD-1E38-412E-AE7B-7E5D3B30168C}" dt="2024-07-24T23:04:02.213" v="2989" actId="571"/>
+          <ac:graphicFrameMkLst>
+            <pc:docMk/>
+            <pc:sldMk cId="3782274042" sldId="291"/>
+            <ac:graphicFrameMk id="6" creationId="{F0415BC9-0D23-1E7A-403F-C96482E16706}"/>
+          </ac:graphicFrameMkLst>
+        </pc:graphicFrameChg>
+        <pc:picChg chg="add del mod">
+          <ac:chgData name="Joaquin Badenas" userId="5cb29fd719aebf04" providerId="LiveId" clId="{4F53BFBD-1E38-412E-AE7B-7E5D3B30168C}" dt="2024-07-24T23:04:04.027" v="2990" actId="478"/>
+          <ac:picMkLst>
+            <pc:docMk/>
+            <pc:sldMk cId="3782274042" sldId="291"/>
+            <ac:picMk id="5" creationId="{B7C5F395-2B77-0F00-0BDF-5756118F37B5}"/>
+          </ac:picMkLst>
+        </pc:picChg>
         <pc:picChg chg="add del mod ord modCrop">
           <ac:chgData name="Joaquin Badenas" userId="5cb29fd719aebf04" providerId="LiveId" clId="{4F53BFBD-1E38-412E-AE7B-7E5D3B30168C}" dt="2024-07-23T09:27:03.676" v="1106" actId="478"/>
           <ac:picMkLst>
@@ -1961,12 +1994,12 @@
             <ac:picMk id="7" creationId="{F5C19B0E-E989-617F-E892-0F9F08F98CCF}"/>
           </ac:picMkLst>
         </pc:picChg>
-        <pc:picChg chg="add del mod">
-          <ac:chgData name="Joaquin Badenas" userId="5cb29fd719aebf04" providerId="LiveId" clId="{4F53BFBD-1E38-412E-AE7B-7E5D3B30168C}" dt="2024-07-23T09:38:11.323" v="1295" actId="478"/>
+        <pc:picChg chg="add mod">
+          <ac:chgData name="Joaquin Badenas" userId="5cb29fd719aebf04" providerId="LiveId" clId="{4F53BFBD-1E38-412E-AE7B-7E5D3B30168C}" dt="2024-07-24T23:05:37.074" v="3037" actId="1076"/>
           <ac:picMkLst>
             <pc:docMk/>
             <pc:sldMk cId="3782274042" sldId="291"/>
-            <ac:picMk id="9" creationId="{C6113748-6DE0-2D4A-5708-A8E5BC67B90A}"/>
+            <ac:picMk id="8" creationId="{C88293B8-3D9A-0339-DDC1-5E25AB799913}"/>
           </ac:picMkLst>
         </pc:picChg>
         <pc:picChg chg="add del mod">
@@ -1974,7 +2007,15 @@
           <ac:picMkLst>
             <pc:docMk/>
             <pc:sldMk cId="3782274042" sldId="291"/>
-            <ac:picMk id="11" creationId="{B177544B-8DE3-AF44-05C4-A950D5D32283}"/>
+            <ac:picMk id="9" creationId="{C6113748-6DE0-2D4A-5708-A8E5BC67B90A}"/>
+          </ac:picMkLst>
+        </pc:picChg>
+        <pc:picChg chg="add mod">
+          <ac:chgData name="Joaquin Badenas" userId="5cb29fd719aebf04" providerId="LiveId" clId="{4F53BFBD-1E38-412E-AE7B-7E5D3B30168C}" dt="2024-07-24T23:06:48.309" v="3166" actId="1076"/>
+          <ac:picMkLst>
+            <pc:docMk/>
+            <pc:sldMk cId="3782274042" sldId="291"/>
+            <ac:picMk id="10" creationId="{B3E601DD-AC70-F21C-176C-72457F40AB72}"/>
           </ac:picMkLst>
         </pc:picChg>
         <pc:picChg chg="add del mod">
@@ -1982,7 +2023,31 @@
           <ac:picMkLst>
             <pc:docMk/>
             <pc:sldMk cId="3782274042" sldId="291"/>
+            <ac:picMk id="11" creationId="{B177544B-8DE3-AF44-05C4-A950D5D32283}"/>
+          </ac:picMkLst>
+        </pc:picChg>
+        <pc:picChg chg="add mod">
+          <ac:chgData name="Joaquin Badenas" userId="5cb29fd719aebf04" providerId="LiveId" clId="{4F53BFBD-1E38-412E-AE7B-7E5D3B30168C}" dt="2024-07-24T23:06:53.070" v="3169" actId="1076"/>
+          <ac:picMkLst>
+            <pc:docMk/>
+            <pc:sldMk cId="3782274042" sldId="291"/>
+            <ac:picMk id="12" creationId="{3C7ADDE4-B8FD-81B9-6AF5-D68A1DFFFD21}"/>
+          </ac:picMkLst>
+        </pc:picChg>
+        <pc:picChg chg="add del mod">
+          <ac:chgData name="Joaquin Badenas" userId="5cb29fd719aebf04" providerId="LiveId" clId="{4F53BFBD-1E38-412E-AE7B-7E5D3B30168C}" dt="2024-07-23T09:38:11.323" v="1295" actId="478"/>
+          <ac:picMkLst>
+            <pc:docMk/>
+            <pc:sldMk cId="3782274042" sldId="291"/>
             <ac:picMk id="13" creationId="{9620F8F7-79C3-0926-AF34-F3A22AD2C4E2}"/>
+          </ac:picMkLst>
+        </pc:picChg>
+        <pc:picChg chg="add mod">
+          <ac:chgData name="Joaquin Badenas" userId="5cb29fd719aebf04" providerId="LiveId" clId="{4F53BFBD-1E38-412E-AE7B-7E5D3B30168C}" dt="2024-07-24T23:07:11.060" v="3173" actId="1076"/>
+          <ac:picMkLst>
+            <pc:docMk/>
+            <pc:sldMk cId="3782274042" sldId="291"/>
+            <ac:picMk id="14" creationId="{A8E8D3EA-497A-215D-0838-4F78726831E1}"/>
           </ac:picMkLst>
         </pc:picChg>
       </pc:sldChg>
@@ -2139,6 +2204,69 @@
             <pc:docMk/>
             <pc:sldMk cId="351751385" sldId="295"/>
             <ac:picMk id="7" creationId="{5745F9A1-8019-DBC8-4A6B-014C00B731BC}"/>
+          </ac:picMkLst>
+        </pc:picChg>
+      </pc:sldChg>
+      <pc:sldChg chg="addSp delSp modSp add mod">
+        <pc:chgData name="Joaquin Badenas" userId="5cb29fd719aebf04" providerId="LiveId" clId="{4F53BFBD-1E38-412E-AE7B-7E5D3B30168C}" dt="2024-07-24T23:22:43.702" v="3450" actId="1076"/>
+        <pc:sldMkLst>
+          <pc:docMk/>
+          <pc:sldMk cId="2521655467" sldId="296"/>
+        </pc:sldMkLst>
+        <pc:graphicFrameChg chg="modGraphic">
+          <ac:chgData name="Joaquin Badenas" userId="5cb29fd719aebf04" providerId="LiveId" clId="{4F53BFBD-1E38-412E-AE7B-7E5D3B30168C}" dt="2024-07-24T23:21:42.588" v="3446" actId="20577"/>
+          <ac:graphicFrameMkLst>
+            <pc:docMk/>
+            <pc:sldMk cId="2521655467" sldId="296"/>
+            <ac:graphicFrameMk id="3" creationId="{1A9023FA-33FD-5552-47F6-6A8D6E948421}"/>
+          </ac:graphicFrameMkLst>
+        </pc:graphicFrameChg>
+        <pc:picChg chg="add mod">
+          <ac:chgData name="Joaquin Badenas" userId="5cb29fd719aebf04" providerId="LiveId" clId="{4F53BFBD-1E38-412E-AE7B-7E5D3B30168C}" dt="2024-07-24T23:22:33.416" v="3448" actId="1076"/>
+          <ac:picMkLst>
+            <pc:docMk/>
+            <pc:sldMk cId="2521655467" sldId="296"/>
+            <ac:picMk id="5" creationId="{57E7F4CF-D8BC-D90D-0D87-30B1ADB57D25}"/>
+          </ac:picMkLst>
+        </pc:picChg>
+        <pc:picChg chg="add mod">
+          <ac:chgData name="Joaquin Badenas" userId="5cb29fd719aebf04" providerId="LiveId" clId="{4F53BFBD-1E38-412E-AE7B-7E5D3B30168C}" dt="2024-07-24T23:22:43.702" v="3450" actId="1076"/>
+          <ac:picMkLst>
+            <pc:docMk/>
+            <pc:sldMk cId="2521655467" sldId="296"/>
+            <ac:picMk id="7" creationId="{D174B546-08FB-C1FB-CD7C-53F4CF2F4B48}"/>
+          </ac:picMkLst>
+        </pc:picChg>
+        <pc:picChg chg="del">
+          <ac:chgData name="Joaquin Badenas" userId="5cb29fd719aebf04" providerId="LiveId" clId="{4F53BFBD-1E38-412E-AE7B-7E5D3B30168C}" dt="2024-07-24T23:07:50.854" v="3177" actId="478"/>
+          <ac:picMkLst>
+            <pc:docMk/>
+            <pc:sldMk cId="2521655467" sldId="296"/>
+            <ac:picMk id="8" creationId="{C88293B8-3D9A-0339-DDC1-5E25AB799913}"/>
+          </ac:picMkLst>
+        </pc:picChg>
+        <pc:picChg chg="del">
+          <ac:chgData name="Joaquin Badenas" userId="5cb29fd719aebf04" providerId="LiveId" clId="{4F53BFBD-1E38-412E-AE7B-7E5D3B30168C}" dt="2024-07-24T23:07:37.424" v="3175" actId="478"/>
+          <ac:picMkLst>
+            <pc:docMk/>
+            <pc:sldMk cId="2521655467" sldId="296"/>
+            <ac:picMk id="10" creationId="{B3E601DD-AC70-F21C-176C-72457F40AB72}"/>
+          </ac:picMkLst>
+        </pc:picChg>
+        <pc:picChg chg="del">
+          <ac:chgData name="Joaquin Badenas" userId="5cb29fd719aebf04" providerId="LiveId" clId="{4F53BFBD-1E38-412E-AE7B-7E5D3B30168C}" dt="2024-07-24T23:07:38.714" v="3176" actId="478"/>
+          <ac:picMkLst>
+            <pc:docMk/>
+            <pc:sldMk cId="2521655467" sldId="296"/>
+            <ac:picMk id="12" creationId="{3C7ADDE4-B8FD-81B9-6AF5-D68A1DFFFD21}"/>
+          </ac:picMkLst>
+        </pc:picChg>
+        <pc:picChg chg="del">
+          <ac:chgData name="Joaquin Badenas" userId="5cb29fd719aebf04" providerId="LiveId" clId="{4F53BFBD-1E38-412E-AE7B-7E5D3B30168C}" dt="2024-07-24T23:07:51.885" v="3178" actId="478"/>
+          <ac:picMkLst>
+            <pc:docMk/>
+            <pc:sldMk cId="2521655467" sldId="296"/>
+            <ac:picMk id="14" creationId="{A8E8D3EA-497A-215D-0838-4F78726831E1}"/>
           </ac:picMkLst>
         </pc:picChg>
       </pc:sldChg>
@@ -2339,7 +2467,7 @@
           <a:p>
             <a:fld id="{57E58380-3550-4AA1-8DE5-F8A856B30F15}" type="datetimeFigureOut">
               <a:rPr lang="en-NZ" smtClean="0"/>
-              <a:t>24/07/2024</a:t>
+              <a:t>25/07/2024</a:t>
             </a:fld>
             <a:endParaRPr lang="en-NZ"/>
           </a:p>
@@ -2567,7 +2695,7 @@
           <a:p>
             <a:fld id="{57E58380-3550-4AA1-8DE5-F8A856B30F15}" type="datetimeFigureOut">
               <a:rPr lang="en-NZ" smtClean="0"/>
-              <a:t>24/07/2024</a:t>
+              <a:t>25/07/2024</a:t>
             </a:fld>
             <a:endParaRPr lang="en-NZ"/>
           </a:p>
@@ -2747,7 +2875,7 @@
           <a:p>
             <a:fld id="{57E58380-3550-4AA1-8DE5-F8A856B30F15}" type="datetimeFigureOut">
               <a:rPr lang="en-NZ" smtClean="0"/>
-              <a:t>24/07/2024</a:t>
+              <a:t>25/07/2024</a:t>
             </a:fld>
             <a:endParaRPr lang="en-NZ"/>
           </a:p>
@@ -2917,7 +3045,7 @@
           <a:p>
             <a:fld id="{57E58380-3550-4AA1-8DE5-F8A856B30F15}" type="datetimeFigureOut">
               <a:rPr lang="en-NZ" smtClean="0"/>
-              <a:t>24/07/2024</a:t>
+              <a:t>25/07/2024</a:t>
             </a:fld>
             <a:endParaRPr lang="en-NZ"/>
           </a:p>
@@ -3171,7 +3299,7 @@
           <a:p>
             <a:fld id="{57E58380-3550-4AA1-8DE5-F8A856B30F15}" type="datetimeFigureOut">
               <a:rPr lang="en-NZ" smtClean="0"/>
-              <a:t>24/07/2024</a:t>
+              <a:t>25/07/2024</a:t>
             </a:fld>
             <a:endParaRPr lang="en-NZ"/>
           </a:p>
@@ -3497,7 +3625,7 @@
           <a:p>
             <a:fld id="{57E58380-3550-4AA1-8DE5-F8A856B30F15}" type="datetimeFigureOut">
               <a:rPr lang="en-NZ" smtClean="0"/>
-              <a:t>24/07/2024</a:t>
+              <a:t>25/07/2024</a:t>
             </a:fld>
             <a:endParaRPr lang="en-NZ"/>
           </a:p>
@@ -3948,7 +4076,7 @@
           <a:p>
             <a:fld id="{57E58380-3550-4AA1-8DE5-F8A856B30F15}" type="datetimeFigureOut">
               <a:rPr lang="en-NZ" smtClean="0"/>
-              <a:t>24/07/2024</a:t>
+              <a:t>25/07/2024</a:t>
             </a:fld>
             <a:endParaRPr lang="en-NZ"/>
           </a:p>
@@ -4066,7 +4194,7 @@
           <a:p>
             <a:fld id="{57E58380-3550-4AA1-8DE5-F8A856B30F15}" type="datetimeFigureOut">
               <a:rPr lang="en-NZ" smtClean="0"/>
-              <a:t>24/07/2024</a:t>
+              <a:t>25/07/2024</a:t>
             </a:fld>
             <a:endParaRPr lang="en-NZ"/>
           </a:p>
@@ -4161,7 +4289,7 @@
           <a:p>
             <a:fld id="{57E58380-3550-4AA1-8DE5-F8A856B30F15}" type="datetimeFigureOut">
               <a:rPr lang="en-NZ" smtClean="0"/>
-              <a:t>24/07/2024</a:t>
+              <a:t>25/07/2024</a:t>
             </a:fld>
             <a:endParaRPr lang="en-NZ"/>
           </a:p>
@@ -4448,7 +4576,7 @@
           <a:p>
             <a:fld id="{57E58380-3550-4AA1-8DE5-F8A856B30F15}" type="datetimeFigureOut">
               <a:rPr lang="en-NZ" smtClean="0"/>
-              <a:t>24/07/2024</a:t>
+              <a:t>25/07/2024</a:t>
             </a:fld>
             <a:endParaRPr lang="en-NZ"/>
           </a:p>
@@ -4770,7 +4898,7 @@
           <a:p>
             <a:fld id="{57E58380-3550-4AA1-8DE5-F8A856B30F15}" type="datetimeFigureOut">
               <a:rPr lang="en-NZ" smtClean="0"/>
-              <a:t>24/07/2024</a:t>
+              <a:t>25/07/2024</a:t>
             </a:fld>
             <a:endParaRPr lang="en-NZ"/>
           </a:p>
@@ -5024,7 +5152,7 @@
           <a:p>
             <a:fld id="{57E58380-3550-4AA1-8DE5-F8A856B30F15}" type="datetimeFigureOut">
               <a:rPr lang="en-NZ" smtClean="0"/>
-              <a:t>24/07/2024</a:t>
+              <a:t>25/07/2024</a:t>
             </a:fld>
             <a:endParaRPr lang="en-NZ"/>
           </a:p>
@@ -7973,7 +8101,12 @@
             <p:ph type="title"/>
           </p:nvPr>
         </p:nvSpPr>
-        <p:spPr/>
+        <p:spPr>
+          <a:xfrm>
+            <a:off x="1249680" y="183832"/>
+            <a:ext cx="9692640" cy="606738"/>
+          </a:xfrm>
+        </p:spPr>
         <p:txBody>
           <a:bodyPr>
             <a:normAutofit/>
@@ -7984,11 +8117,249 @@
               <a:rPr lang="en-NZ" sz="2800" dirty="0">
                 <a:latin typeface="Abadi" panose="020B0604020104020204" pitchFamily="34" charset="0"/>
               </a:rPr>
-              <a:t>Iterative Improvement</a:t>
-            </a:r>
-          </a:p>
-        </p:txBody>
-      </p:sp>
+              <a:t>Iterative Improvement (Navbar)</a:t>
+            </a:r>
+          </a:p>
+        </p:txBody>
+      </p:sp>
+      <p:graphicFrame>
+        <p:nvGraphicFramePr>
+          <p:cNvPr id="3" name="Table 2">
+            <a:extLst>
+              <a:ext uri="{FF2B5EF4-FFF2-40B4-BE49-F238E27FC236}">
+                <a16:creationId xmlns:a16="http://schemas.microsoft.com/office/drawing/2014/main" id="{1A9023FA-33FD-5552-47F6-6A8D6E948421}"/>
+              </a:ext>
+            </a:extLst>
+          </p:cNvPr>
+          <p:cNvGraphicFramePr>
+            <a:graphicFrameLocks noGrp="1"/>
+          </p:cNvGraphicFramePr>
+          <p:nvPr>
+            <p:extLst>
+              <p:ext uri="{D42A27DB-BD31-4B8C-83A1-F6EECF244321}">
+                <p14:modId xmlns:p14="http://schemas.microsoft.com/office/powerpoint/2010/main" val="1685881454"/>
+              </p:ext>
+            </p:extLst>
+          </p:nvPr>
+        </p:nvGraphicFramePr>
+        <p:xfrm>
+          <a:off x="1249680" y="1031751"/>
+          <a:ext cx="9430604" cy="3902888"/>
+        </p:xfrm>
+        <a:graphic>
+          <a:graphicData uri="http://schemas.openxmlformats.org/drawingml/2006/table">
+            <a:tbl>
+              <a:tblPr firstRow="1" bandRow="1">
+                <a:tableStyleId>{5C22544A-7EE6-4342-B048-85BDC9FD1C3A}</a:tableStyleId>
+              </a:tblPr>
+              <a:tblGrid>
+                <a:gridCol w="4715302">
+                  <a:extLst>
+                    <a:ext uri="{9D8B030D-6E8A-4147-A177-3AD203B41FA5}">
+                      <a16:colId xmlns:a16="http://schemas.microsoft.com/office/drawing/2014/main" val="2104603021"/>
+                    </a:ext>
+                  </a:extLst>
+                </a:gridCol>
+                <a:gridCol w="4715302">
+                  <a:extLst>
+                    <a:ext uri="{9D8B030D-6E8A-4147-A177-3AD203B41FA5}">
+                      <a16:colId xmlns:a16="http://schemas.microsoft.com/office/drawing/2014/main" val="2097243175"/>
+                    </a:ext>
+                  </a:extLst>
+                </a:gridCol>
+              </a:tblGrid>
+              <a:tr h="1861575">
+                <a:tc>
+                  <a:txBody>
+                    <a:bodyPr/>
+                    <a:lstStyle/>
+                    <a:p>
+                      <a:r>
+                        <a:rPr lang="en-NZ" dirty="0">
+                          <a:latin typeface="Abadi" panose="020B0604020104020204" pitchFamily="34" charset="0"/>
+                        </a:rPr>
+                        <a:t>Using the Blog App previously done.</a:t>
+                      </a:r>
+                    </a:p>
+                  </a:txBody>
+                  <a:tcPr/>
+                </a:tc>
+                <a:tc>
+                  <a:txBody>
+                    <a:bodyPr/>
+                    <a:lstStyle/>
+                    <a:p>
+                      <a:r>
+                        <a:rPr lang="en-NZ" dirty="0">
+                          <a:latin typeface="Abadi" panose="020B0604020104020204" pitchFamily="34" charset="0"/>
+                        </a:rPr>
+                        <a:t>Firstly, simply changed the name of the hyperlink to fit the context of my website. </a:t>
+                      </a:r>
+                    </a:p>
+                  </a:txBody>
+                  <a:tcPr/>
+                </a:tc>
+                <a:extLst>
+                  <a:ext uri="{0D108BD9-81ED-4DB2-BD59-A6C34878D82A}">
+                    <a16:rowId xmlns:a16="http://schemas.microsoft.com/office/drawing/2014/main" val="2765992196"/>
+                  </a:ext>
+                </a:extLst>
+              </a:tr>
+              <a:tr h="2041313">
+                <a:tc>
+                  <a:txBody>
+                    <a:bodyPr/>
+                    <a:lstStyle/>
+                    <a:p>
+                      <a:endParaRPr lang="en-NZ" dirty="0">
+                        <a:latin typeface="Abadi" panose="020B0604020104020204" pitchFamily="34" charset="0"/>
+                      </a:endParaRPr>
+                    </a:p>
+                  </a:txBody>
+                  <a:tcPr/>
+                </a:tc>
+                <a:tc>
+                  <a:txBody>
+                    <a:bodyPr/>
+                    <a:lstStyle/>
+                    <a:p>
+                      <a:endParaRPr lang="en-NZ" dirty="0">
+                        <a:latin typeface="Abadi" panose="020B0604020104020204" pitchFamily="34" charset="0"/>
+                      </a:endParaRPr>
+                    </a:p>
+                  </a:txBody>
+                  <a:tcPr/>
+                </a:tc>
+                <a:extLst>
+                  <a:ext uri="{0D108BD9-81ED-4DB2-BD59-A6C34878D82A}">
+                    <a16:rowId xmlns:a16="http://schemas.microsoft.com/office/drawing/2014/main" val="232455405"/>
+                  </a:ext>
+                </a:extLst>
+              </a:tr>
+            </a:tbl>
+          </a:graphicData>
+        </a:graphic>
+      </p:graphicFrame>
+      <p:pic>
+        <p:nvPicPr>
+          <p:cNvPr id="8" name="Picture 7">
+            <a:extLst>
+              <a:ext uri="{FF2B5EF4-FFF2-40B4-BE49-F238E27FC236}">
+                <a16:creationId xmlns:a16="http://schemas.microsoft.com/office/drawing/2014/main" id="{C88293B8-3D9A-0339-DDC1-5E25AB799913}"/>
+              </a:ext>
+            </a:extLst>
+          </p:cNvPr>
+          <p:cNvPicPr>
+            <a:picLocks noChangeAspect="1"/>
+          </p:cNvPicPr>
+          <p:nvPr/>
+        </p:nvPicPr>
+        <p:blipFill>
+          <a:blip r:embed="rId2"/>
+          <a:stretch>
+            <a:fillRect/>
+          </a:stretch>
+        </p:blipFill>
+        <p:spPr>
+          <a:xfrm>
+            <a:off x="1772442" y="1480864"/>
+            <a:ext cx="3932324" cy="1156566"/>
+          </a:xfrm>
+          <a:prstGeom prst="rect">
+            <a:avLst/>
+          </a:prstGeom>
+        </p:spPr>
+      </p:pic>
+      <p:pic>
+        <p:nvPicPr>
+          <p:cNvPr id="10" name="Picture 9">
+            <a:extLst>
+              <a:ext uri="{FF2B5EF4-FFF2-40B4-BE49-F238E27FC236}">
+                <a16:creationId xmlns:a16="http://schemas.microsoft.com/office/drawing/2014/main" id="{B3E601DD-AC70-F21C-176C-72457F40AB72}"/>
+              </a:ext>
+            </a:extLst>
+          </p:cNvPr>
+          <p:cNvPicPr>
+            <a:picLocks noChangeAspect="1"/>
+          </p:cNvPicPr>
+          <p:nvPr/>
+        </p:nvPicPr>
+        <p:blipFill>
+          <a:blip r:embed="rId3"/>
+          <a:stretch>
+            <a:fillRect/>
+          </a:stretch>
+        </p:blipFill>
+        <p:spPr>
+          <a:xfrm>
+            <a:off x="220480" y="2902711"/>
+            <a:ext cx="4892882" cy="3771457"/>
+          </a:xfrm>
+          <a:prstGeom prst="rect">
+            <a:avLst/>
+          </a:prstGeom>
+        </p:spPr>
+      </p:pic>
+      <p:pic>
+        <p:nvPicPr>
+          <p:cNvPr id="12" name="Picture 11">
+            <a:extLst>
+              <a:ext uri="{FF2B5EF4-FFF2-40B4-BE49-F238E27FC236}">
+                <a16:creationId xmlns:a16="http://schemas.microsoft.com/office/drawing/2014/main" id="{3C7ADDE4-B8FD-81B9-6AF5-D68A1DFFFD21}"/>
+              </a:ext>
+            </a:extLst>
+          </p:cNvPr>
+          <p:cNvPicPr>
+            <a:picLocks noChangeAspect="1"/>
+          </p:cNvPicPr>
+          <p:nvPr/>
+        </p:nvPicPr>
+        <p:blipFill>
+          <a:blip r:embed="rId4"/>
+          <a:stretch>
+            <a:fillRect/>
+          </a:stretch>
+        </p:blipFill>
+        <p:spPr>
+          <a:xfrm>
+            <a:off x="5503687" y="3034142"/>
+            <a:ext cx="5438633" cy="3386896"/>
+          </a:xfrm>
+          <a:prstGeom prst="rect">
+            <a:avLst/>
+          </a:prstGeom>
+        </p:spPr>
+      </p:pic>
+      <p:pic>
+        <p:nvPicPr>
+          <p:cNvPr id="14" name="Picture 13">
+            <a:extLst>
+              <a:ext uri="{FF2B5EF4-FFF2-40B4-BE49-F238E27FC236}">
+                <a16:creationId xmlns:a16="http://schemas.microsoft.com/office/drawing/2014/main" id="{A8E8D3EA-497A-215D-0838-4F78726831E1}"/>
+              </a:ext>
+            </a:extLst>
+          </p:cNvPr>
+          <p:cNvPicPr>
+            <a:picLocks noChangeAspect="1"/>
+          </p:cNvPicPr>
+          <p:nvPr/>
+        </p:nvPicPr>
+        <p:blipFill>
+          <a:blip r:embed="rId5"/>
+          <a:stretch>
+            <a:fillRect/>
+          </a:stretch>
+        </p:blipFill>
+        <p:spPr>
+          <a:xfrm>
+            <a:off x="6487236" y="1660643"/>
+            <a:ext cx="3524341" cy="1132318"/>
+          </a:xfrm>
+          <a:prstGeom prst="rect">
+            <a:avLst/>
+          </a:prstGeom>
+        </p:spPr>
+      </p:pic>
     </p:spTree>
     <p:extLst>
       <p:ext uri="{BB962C8B-B14F-4D97-AF65-F5344CB8AC3E}">
@@ -8029,7 +8400,12 @@
             <p:ph type="title"/>
           </p:nvPr>
         </p:nvSpPr>
-        <p:spPr/>
+        <p:spPr>
+          <a:xfrm>
+            <a:off x="1249680" y="183832"/>
+            <a:ext cx="9692640" cy="606738"/>
+          </a:xfrm>
+        </p:spPr>
         <p:txBody>
           <a:bodyPr>
             <a:normAutofit/>
@@ -8040,44 +8416,172 @@
               <a:rPr lang="en-NZ" sz="2800" dirty="0">
                 <a:latin typeface="Abadi" panose="020B0604020104020204" pitchFamily="34" charset="0"/>
               </a:rPr>
-              <a:t>Version Control</a:t>
-            </a:r>
-          </a:p>
-        </p:txBody>
-      </p:sp>
-      <p:sp>
-        <p:nvSpPr>
-          <p:cNvPr id="3" name="Content Placeholder 2"/>
-          <p:cNvSpPr>
-            <a:spLocks noGrp="1"/>
-          </p:cNvSpPr>
-          <p:nvPr>
-            <p:ph idx="1"/>
-          </p:nvPr>
-        </p:nvSpPr>
-        <p:spPr/>
-        <p:txBody>
-          <a:bodyPr>
-            <a:normAutofit/>
-          </a:bodyPr>
-          <a:lstStyle/>
-          <a:p>
-            <a:pPr marL="0" indent="0">
-              <a:buNone/>
-            </a:pPr>
-            <a:r>
-              <a:rPr lang="en-NZ" sz="2000" dirty="0">
-                <a:latin typeface="Abadi" panose="020B0604020104020204" pitchFamily="34" charset="0"/>
-              </a:rPr>
-              <a:t>Show how you have used version control throughout the design, development, and testing process.</a:t>
-            </a:r>
-          </a:p>
-        </p:txBody>
-      </p:sp>
+              <a:t>Iterative Improvement (Navbar)</a:t>
+            </a:r>
+          </a:p>
+        </p:txBody>
+      </p:sp>
+      <p:graphicFrame>
+        <p:nvGraphicFramePr>
+          <p:cNvPr id="3" name="Table 2">
+            <a:extLst>
+              <a:ext uri="{FF2B5EF4-FFF2-40B4-BE49-F238E27FC236}">
+                <a16:creationId xmlns:a16="http://schemas.microsoft.com/office/drawing/2014/main" id="{1A9023FA-33FD-5552-47F6-6A8D6E948421}"/>
+              </a:ext>
+            </a:extLst>
+          </p:cNvPr>
+          <p:cNvGraphicFramePr>
+            <a:graphicFrameLocks noGrp="1"/>
+          </p:cNvGraphicFramePr>
+          <p:nvPr>
+            <p:extLst>
+              <p:ext uri="{D42A27DB-BD31-4B8C-83A1-F6EECF244321}">
+                <p14:modId xmlns:p14="http://schemas.microsoft.com/office/powerpoint/2010/main" val="3142291697"/>
+              </p:ext>
+            </p:extLst>
+          </p:nvPr>
+        </p:nvGraphicFramePr>
+        <p:xfrm>
+          <a:off x="1249680" y="1031751"/>
+          <a:ext cx="9430604" cy="1861575"/>
+        </p:xfrm>
+        <a:graphic>
+          <a:graphicData uri="http://schemas.openxmlformats.org/drawingml/2006/table">
+            <a:tbl>
+              <a:tblPr firstRow="1" bandRow="1">
+                <a:tableStyleId>{5C22544A-7EE6-4342-B048-85BDC9FD1C3A}</a:tableStyleId>
+              </a:tblPr>
+              <a:tblGrid>
+                <a:gridCol w="4715302">
+                  <a:extLst>
+                    <a:ext uri="{9D8B030D-6E8A-4147-A177-3AD203B41FA5}">
+                      <a16:colId xmlns:a16="http://schemas.microsoft.com/office/drawing/2014/main" val="2104603021"/>
+                    </a:ext>
+                  </a:extLst>
+                </a:gridCol>
+                <a:gridCol w="4715302">
+                  <a:extLst>
+                    <a:ext uri="{9D8B030D-6E8A-4147-A177-3AD203B41FA5}">
+                      <a16:colId xmlns:a16="http://schemas.microsoft.com/office/drawing/2014/main" val="2097243175"/>
+                    </a:ext>
+                  </a:extLst>
+                </a:gridCol>
+              </a:tblGrid>
+              <a:tr h="1861575">
+                <a:tc>
+                  <a:txBody>
+                    <a:bodyPr/>
+                    <a:lstStyle/>
+                    <a:p>
+                      <a:r>
+                        <a:rPr lang="en-NZ" dirty="0">
+                          <a:latin typeface="Abadi" panose="020B0604020104020204" pitchFamily="34" charset="0"/>
+                        </a:rPr>
+                        <a:t>Next, the colour of the navbar felt too dark and not fitting. </a:t>
+                      </a:r>
+                    </a:p>
+                    <a:p>
+                      <a:endParaRPr lang="en-NZ" dirty="0">
+                        <a:latin typeface="Abadi" panose="020B0604020104020204" pitchFamily="34" charset="0"/>
+                      </a:endParaRPr>
+                    </a:p>
+                    <a:p>
+                      <a:endParaRPr lang="en-NZ" dirty="0">
+                        <a:latin typeface="Abadi" panose="020B0604020104020204" pitchFamily="34" charset="0"/>
+                      </a:endParaRPr>
+                    </a:p>
+                  </a:txBody>
+                  <a:tcPr/>
+                </a:tc>
+                <a:tc>
+                  <a:txBody>
+                    <a:bodyPr/>
+                    <a:lstStyle/>
+                    <a:p>
+                      <a:r>
+                        <a:rPr lang="en-NZ" dirty="0">
+                          <a:latin typeface="Abadi" panose="020B0604020104020204" pitchFamily="34" charset="0"/>
+                        </a:rPr>
+                        <a:t>Doing this, I decided to change to the navbar to be white with black text with the hyperlinks.</a:t>
+                      </a:r>
+                    </a:p>
+                  </a:txBody>
+                  <a:tcPr/>
+                </a:tc>
+                <a:extLst>
+                  <a:ext uri="{0D108BD9-81ED-4DB2-BD59-A6C34878D82A}">
+                    <a16:rowId xmlns:a16="http://schemas.microsoft.com/office/drawing/2014/main" val="2765992196"/>
+                  </a:ext>
+                </a:extLst>
+              </a:tr>
+            </a:tbl>
+          </a:graphicData>
+        </a:graphic>
+      </p:graphicFrame>
+      <p:pic>
+        <p:nvPicPr>
+          <p:cNvPr id="5" name="Picture 4">
+            <a:extLst>
+              <a:ext uri="{FF2B5EF4-FFF2-40B4-BE49-F238E27FC236}">
+                <a16:creationId xmlns:a16="http://schemas.microsoft.com/office/drawing/2014/main" id="{57E7F4CF-D8BC-D90D-0D87-30B1ADB57D25}"/>
+              </a:ext>
+            </a:extLst>
+          </p:cNvPr>
+          <p:cNvPicPr>
+            <a:picLocks noChangeAspect="1"/>
+          </p:cNvPicPr>
+          <p:nvPr/>
+        </p:nvPicPr>
+        <p:blipFill>
+          <a:blip r:embed="rId2"/>
+          <a:stretch>
+            <a:fillRect/>
+          </a:stretch>
+        </p:blipFill>
+        <p:spPr>
+          <a:xfrm>
+            <a:off x="6773198" y="1859037"/>
+            <a:ext cx="3067478" cy="628738"/>
+          </a:xfrm>
+          <a:prstGeom prst="rect">
+            <a:avLst/>
+          </a:prstGeom>
+        </p:spPr>
+      </p:pic>
+      <p:pic>
+        <p:nvPicPr>
+          <p:cNvPr id="7" name="Picture 6">
+            <a:extLst>
+              <a:ext uri="{FF2B5EF4-FFF2-40B4-BE49-F238E27FC236}">
+                <a16:creationId xmlns:a16="http://schemas.microsoft.com/office/drawing/2014/main" id="{D174B546-08FB-C1FB-CD7C-53F4CF2F4B48}"/>
+              </a:ext>
+            </a:extLst>
+          </p:cNvPr>
+          <p:cNvPicPr>
+            <a:picLocks noChangeAspect="1"/>
+          </p:cNvPicPr>
+          <p:nvPr/>
+        </p:nvPicPr>
+        <p:blipFill>
+          <a:blip r:embed="rId3"/>
+          <a:stretch>
+            <a:fillRect/>
+          </a:stretch>
+        </p:blipFill>
+        <p:spPr>
+          <a:xfrm>
+            <a:off x="1722244" y="1887616"/>
+            <a:ext cx="3124636" cy="600159"/>
+          </a:xfrm>
+          <a:prstGeom prst="rect">
+            <a:avLst/>
+          </a:prstGeom>
+        </p:spPr>
+      </p:pic>
     </p:spTree>
     <p:extLst>
       <p:ext uri="{BB962C8B-B14F-4D97-AF65-F5344CB8AC3E}">
-        <p14:creationId xmlns:p14="http://schemas.microsoft.com/office/powerpoint/2010/main" val="2812247241"/>
+        <p14:creationId xmlns:p14="http://schemas.microsoft.com/office/powerpoint/2010/main" val="2521655467"/>
       </p:ext>
     </p:extLst>
   </p:cSld>
@@ -8125,7 +8629,7 @@
               <a:rPr lang="en-NZ" sz="2800" dirty="0">
                 <a:latin typeface="Abadi" panose="020B0604020104020204" pitchFamily="34" charset="0"/>
               </a:rPr>
-              <a:t>GitHub Commits</a:t>
+              <a:t>Version Control</a:t>
             </a:r>
           </a:p>
         </p:txBody>
@@ -8154,7 +8658,7 @@
               <a:rPr lang="en-NZ" sz="2000" dirty="0">
                 <a:latin typeface="Abadi" panose="020B0604020104020204" pitchFamily="34" charset="0"/>
               </a:rPr>
-              <a:t>Show how you have used GitHub throughout the design, development, and testing process.</a:t>
+              <a:t>Show how you have used version control throughout the design, development, and testing process.</a:t>
             </a:r>
           </a:p>
         </p:txBody>
@@ -8162,7 +8666,7 @@
     </p:spTree>
     <p:extLst>
       <p:ext uri="{BB962C8B-B14F-4D97-AF65-F5344CB8AC3E}">
-        <p14:creationId xmlns:p14="http://schemas.microsoft.com/office/powerpoint/2010/main" val="1865976428"/>
+        <p14:creationId xmlns:p14="http://schemas.microsoft.com/office/powerpoint/2010/main" val="2812247241"/>
       </p:ext>
     </p:extLst>
   </p:cSld>
@@ -8210,7 +8714,7 @@
               <a:rPr lang="en-NZ" sz="2800" dirty="0">
                 <a:latin typeface="Abadi" panose="020B0604020104020204" pitchFamily="34" charset="0"/>
               </a:rPr>
-              <a:t>Addressing Relevant Implications</a:t>
+              <a:t>GitHub Commits</a:t>
             </a:r>
           </a:p>
         </p:txBody>
@@ -8239,7 +8743,7 @@
               <a:rPr lang="en-NZ" sz="2000" dirty="0">
                 <a:latin typeface="Abadi" panose="020B0604020104020204" pitchFamily="34" charset="0"/>
               </a:rPr>
-              <a:t>Discuss how have you addressed relevant implications?</a:t>
+              <a:t>Show how you have used GitHub throughout the design, development, and testing process.</a:t>
             </a:r>
           </a:p>
         </p:txBody>
@@ -8247,7 +8751,7 @@
     </p:spTree>
     <p:extLst>
       <p:ext uri="{BB962C8B-B14F-4D97-AF65-F5344CB8AC3E}">
-        <p14:creationId xmlns:p14="http://schemas.microsoft.com/office/powerpoint/2010/main" val="559411755"/>
+        <p14:creationId xmlns:p14="http://schemas.microsoft.com/office/powerpoint/2010/main" val="1865976428"/>
       </p:ext>
     </p:extLst>
   </p:cSld>
@@ -8593,6 +9097,91 @@
           <a:chExt cx="0" cy="0"/>
         </a:xfrm>
       </p:grpSpPr>
+      <p:sp>
+        <p:nvSpPr>
+          <p:cNvPr id="2" name="Title 1"/>
+          <p:cNvSpPr>
+            <a:spLocks noGrp="1"/>
+          </p:cNvSpPr>
+          <p:nvPr>
+            <p:ph type="title"/>
+          </p:nvPr>
+        </p:nvSpPr>
+        <p:spPr/>
+        <p:txBody>
+          <a:bodyPr>
+            <a:normAutofit/>
+          </a:bodyPr>
+          <a:lstStyle/>
+          <a:p>
+            <a:r>
+              <a:rPr lang="en-NZ" sz="2800" dirty="0">
+                <a:latin typeface="Abadi" panose="020B0604020104020204" pitchFamily="34" charset="0"/>
+              </a:rPr>
+              <a:t>Addressing Relevant Implications</a:t>
+            </a:r>
+          </a:p>
+        </p:txBody>
+      </p:sp>
+      <p:sp>
+        <p:nvSpPr>
+          <p:cNvPr id="3" name="Content Placeholder 2"/>
+          <p:cNvSpPr>
+            <a:spLocks noGrp="1"/>
+          </p:cNvSpPr>
+          <p:nvPr>
+            <p:ph idx="1"/>
+          </p:nvPr>
+        </p:nvSpPr>
+        <p:spPr/>
+        <p:txBody>
+          <a:bodyPr>
+            <a:normAutofit/>
+          </a:bodyPr>
+          <a:lstStyle/>
+          <a:p>
+            <a:pPr marL="0" indent="0">
+              <a:buNone/>
+            </a:pPr>
+            <a:r>
+              <a:rPr lang="en-NZ" sz="2000" dirty="0">
+                <a:latin typeface="Abadi" panose="020B0604020104020204" pitchFamily="34" charset="0"/>
+              </a:rPr>
+              <a:t>Discuss how have you addressed relevant implications?</a:t>
+            </a:r>
+          </a:p>
+        </p:txBody>
+      </p:sp>
+    </p:spTree>
+    <p:extLst>
+      <p:ext uri="{BB962C8B-B14F-4D97-AF65-F5344CB8AC3E}">
+        <p14:creationId xmlns:p14="http://schemas.microsoft.com/office/powerpoint/2010/main" val="559411755"/>
+      </p:ext>
+    </p:extLst>
+  </p:cSld>
+  <p:clrMapOvr>
+    <a:masterClrMapping/>
+  </p:clrMapOvr>
+</p:sld>
+</file>
+
+<file path=ppt/slides/slide31.xml><?xml version="1.0" encoding="utf-8"?>
+<p:sld xmlns:a="http://schemas.openxmlformats.org/drawingml/2006/main" xmlns:r="http://schemas.openxmlformats.org/officeDocument/2006/relationships" xmlns:p="http://schemas.openxmlformats.org/presentationml/2006/main">
+  <p:cSld>
+    <p:spTree>
+      <p:nvGrpSpPr>
+        <p:cNvPr id="1" name=""/>
+        <p:cNvGrpSpPr/>
+        <p:nvPr/>
+      </p:nvGrpSpPr>
+      <p:grpSpPr>
+        <a:xfrm>
+          <a:off x="0" y="0"/>
+          <a:ext cx="0" cy="0"/>
+          <a:chOff x="0" y="0"/>
+          <a:chExt cx="0" cy="0"/>
+        </a:xfrm>
+      </p:grpSpPr>
       <p:graphicFrame>
         <p:nvGraphicFramePr>
           <p:cNvPr id="5" name="Object 4">
@@ -8675,7 +9264,7 @@
 </p:sld>
 </file>
 
-<file path=ppt/slides/slide31.xml><?xml version="1.0" encoding="utf-8"?>
+<file path=ppt/slides/slide32.xml><?xml version="1.0" encoding="utf-8"?>
 <p:sld xmlns:a="http://schemas.openxmlformats.org/drawingml/2006/main" xmlns:r="http://schemas.openxmlformats.org/officeDocument/2006/relationships" xmlns:p="http://schemas.openxmlformats.org/presentationml/2006/main">
   <p:cSld>
     <p:spTree>

</xml_diff>

<commit_message>
Font weight of headings V1 finished
</commit_message>
<xml_diff>
--- a/AS91903_91906_Evidence_Joaquin_Badenas.pptx
+++ b/AS91903_91906_Evidence_Joaquin_Badenas.pptx
@@ -32,11 +32,15 @@
     <p:sldId id="266" r:id="rId26"/>
     <p:sldId id="291" r:id="rId27"/>
     <p:sldId id="296" r:id="rId28"/>
-    <p:sldId id="275" r:id="rId29"/>
-    <p:sldId id="283" r:id="rId30"/>
-    <p:sldId id="265" r:id="rId31"/>
-    <p:sldId id="269" r:id="rId32"/>
-    <p:sldId id="276" r:id="rId33"/>
+    <p:sldId id="297" r:id="rId29"/>
+    <p:sldId id="298" r:id="rId30"/>
+    <p:sldId id="299" r:id="rId31"/>
+    <p:sldId id="300" r:id="rId32"/>
+    <p:sldId id="275" r:id="rId33"/>
+    <p:sldId id="283" r:id="rId34"/>
+    <p:sldId id="265" r:id="rId35"/>
+    <p:sldId id="269" r:id="rId36"/>
+    <p:sldId id="276" r:id="rId37"/>
   </p:sldIdLst>
   <p:sldSz cx="12192000" cy="6858000"/>
   <p:notesSz cx="6858000" cy="9144000"/>
@@ -146,7 +150,7 @@
 <file path=ppt/revisionInfo.xml><?xml version="1.0" encoding="utf-8"?>
 <p1510:revInfo xmlns:a="http://schemas.openxmlformats.org/drawingml/2006/main" xmlns:r="http://schemas.openxmlformats.org/officeDocument/2006/relationships" xmlns:p1510="http://schemas.microsoft.com/office/powerpoint/2015/10/main">
   <p1510:revLst>
-    <p1510:client id="{4F53BFBD-1E38-412E-AE7B-7E5D3B30168C}" v="16" dt="2024-07-24T23:07:35.125"/>
+    <p1510:client id="{4F53BFBD-1E38-412E-AE7B-7E5D3B30168C}" v="23" dt="2024-07-25T22:47:44.810"/>
   </p1510:revLst>
 </p1510:revInfo>
 </file>
@@ -1591,8 +1595,8 @@
   </pc:docChgLst>
   <pc:docChgLst>
     <pc:chgData name="Joaquin Badenas" userId="5cb29fd719aebf04" providerId="LiveId" clId="{4F53BFBD-1E38-412E-AE7B-7E5D3B30168C}"/>
-    <pc:docChg chg="undo custSel addSld delSld modSld">
-      <pc:chgData name="Joaquin Badenas" userId="5cb29fd719aebf04" providerId="LiveId" clId="{4F53BFBD-1E38-412E-AE7B-7E5D3B30168C}" dt="2024-07-24T23:22:43.702" v="3450" actId="1076"/>
+    <pc:docChg chg="undo custSel addSld delSld modSld sldOrd">
+      <pc:chgData name="Joaquin Badenas" userId="5cb29fd719aebf04" providerId="LiveId" clId="{4F53BFBD-1E38-412E-AE7B-7E5D3B30168C}" dt="2024-07-25T22:51:46.495" v="4635" actId="1076"/>
       <pc:docMkLst>
         <pc:docMk/>
       </pc:docMkLst>
@@ -1917,13 +1921,13 @@
         </pc:sldMkLst>
       </pc:sldChg>
       <pc:sldChg chg="addSp delSp modSp add mod">
-        <pc:chgData name="Joaquin Badenas" userId="5cb29fd719aebf04" providerId="LiveId" clId="{4F53BFBD-1E38-412E-AE7B-7E5D3B30168C}" dt="2024-07-24T23:07:11.060" v="3173" actId="1076"/>
+        <pc:chgData name="Joaquin Badenas" userId="5cb29fd719aebf04" providerId="LiveId" clId="{4F53BFBD-1E38-412E-AE7B-7E5D3B30168C}" dt="2024-07-25T22:26:56.932" v="3486" actId="20577"/>
         <pc:sldMkLst>
           <pc:docMk/>
           <pc:sldMk cId="3782274042" sldId="291"/>
         </pc:sldMkLst>
         <pc:spChg chg="mod">
-          <ac:chgData name="Joaquin Badenas" userId="5cb29fd719aebf04" providerId="LiveId" clId="{4F53BFBD-1E38-412E-AE7B-7E5D3B30168C}" dt="2024-07-24T23:05:28.088" v="3034" actId="1076"/>
+          <ac:chgData name="Joaquin Badenas" userId="5cb29fd719aebf04" providerId="LiveId" clId="{4F53BFBD-1E38-412E-AE7B-7E5D3B30168C}" dt="2024-07-25T22:26:56.932" v="3486" actId="20577"/>
           <ac:spMkLst>
             <pc:docMk/>
             <pc:sldMk cId="3782274042" sldId="291"/>
@@ -2208,11 +2212,19 @@
         </pc:picChg>
       </pc:sldChg>
       <pc:sldChg chg="addSp delSp modSp add mod">
-        <pc:chgData name="Joaquin Badenas" userId="5cb29fd719aebf04" providerId="LiveId" clId="{4F53BFBD-1E38-412E-AE7B-7E5D3B30168C}" dt="2024-07-24T23:22:43.702" v="3450" actId="1076"/>
+        <pc:chgData name="Joaquin Badenas" userId="5cb29fd719aebf04" providerId="LiveId" clId="{4F53BFBD-1E38-412E-AE7B-7E5D3B30168C}" dt="2024-07-25T22:26:54.101" v="3483" actId="20577"/>
         <pc:sldMkLst>
           <pc:docMk/>
           <pc:sldMk cId="2521655467" sldId="296"/>
         </pc:sldMkLst>
+        <pc:spChg chg="mod">
+          <ac:chgData name="Joaquin Badenas" userId="5cb29fd719aebf04" providerId="LiveId" clId="{4F53BFBD-1E38-412E-AE7B-7E5D3B30168C}" dt="2024-07-25T22:26:54.101" v="3483" actId="20577"/>
+          <ac:spMkLst>
+            <pc:docMk/>
+            <pc:sldMk cId="2521655467" sldId="296"/>
+            <ac:spMk id="2" creationId="{00000000-0000-0000-0000-000000000000}"/>
+          </ac:spMkLst>
+        </pc:spChg>
         <pc:graphicFrameChg chg="modGraphic">
           <ac:chgData name="Joaquin Badenas" userId="5cb29fd719aebf04" providerId="LiveId" clId="{4F53BFBD-1E38-412E-AE7B-7E5D3B30168C}" dt="2024-07-24T23:21:42.588" v="3446" actId="20577"/>
           <ac:graphicFrameMkLst>
@@ -2230,11 +2242,27 @@
           </ac:picMkLst>
         </pc:picChg>
         <pc:picChg chg="add mod">
+          <ac:chgData name="Joaquin Badenas" userId="5cb29fd719aebf04" providerId="LiveId" clId="{4F53BFBD-1E38-412E-AE7B-7E5D3B30168C}" dt="2024-07-25T22:25:17.904" v="3456" actId="1076"/>
+          <ac:picMkLst>
+            <pc:docMk/>
+            <pc:sldMk cId="2521655467" sldId="296"/>
+            <ac:picMk id="6" creationId="{5F4297DF-0FB2-6474-3ACA-76725C4AFCD9}"/>
+          </ac:picMkLst>
+        </pc:picChg>
+        <pc:picChg chg="add mod">
           <ac:chgData name="Joaquin Badenas" userId="5cb29fd719aebf04" providerId="LiveId" clId="{4F53BFBD-1E38-412E-AE7B-7E5D3B30168C}" dt="2024-07-24T23:22:43.702" v="3450" actId="1076"/>
           <ac:picMkLst>
             <pc:docMk/>
             <pc:sldMk cId="2521655467" sldId="296"/>
             <ac:picMk id="7" creationId="{D174B546-08FB-C1FB-CD7C-53F4CF2F4B48}"/>
+          </ac:picMkLst>
+        </pc:picChg>
+        <pc:picChg chg="add del mod">
+          <ac:chgData name="Joaquin Badenas" userId="5cb29fd719aebf04" providerId="LiveId" clId="{4F53BFBD-1E38-412E-AE7B-7E5D3B30168C}" dt="2024-07-25T22:26:32.683" v="3458" actId="478"/>
+          <ac:picMkLst>
+            <pc:docMk/>
+            <pc:sldMk cId="2521655467" sldId="296"/>
+            <ac:picMk id="8" creationId="{03A936F0-F9E0-55FB-699D-D8CB4B2461B4}"/>
           </ac:picMkLst>
         </pc:picChg>
         <pc:picChg chg="del">
@@ -2267,6 +2295,234 @@
             <pc:docMk/>
             <pc:sldMk cId="2521655467" sldId="296"/>
             <ac:picMk id="14" creationId="{A8E8D3EA-497A-215D-0838-4F78726831E1}"/>
+          </ac:picMkLst>
+        </pc:picChg>
+      </pc:sldChg>
+      <pc:sldChg chg="addSp delSp modSp add mod">
+        <pc:chgData name="Joaquin Badenas" userId="5cb29fd719aebf04" providerId="LiveId" clId="{4F53BFBD-1E38-412E-AE7B-7E5D3B30168C}" dt="2024-07-25T22:30:55.877" v="3885" actId="1076"/>
+        <pc:sldMkLst>
+          <pc:docMk/>
+          <pc:sldMk cId="3184647088" sldId="297"/>
+        </pc:sldMkLst>
+        <pc:spChg chg="mod">
+          <ac:chgData name="Joaquin Badenas" userId="5cb29fd719aebf04" providerId="LiveId" clId="{4F53BFBD-1E38-412E-AE7B-7E5D3B30168C}" dt="2024-07-25T22:26:49.852" v="3480" actId="20577"/>
+          <ac:spMkLst>
+            <pc:docMk/>
+            <pc:sldMk cId="3184647088" sldId="297"/>
+            <ac:spMk id="2" creationId="{00000000-0000-0000-0000-000000000000}"/>
+          </ac:spMkLst>
+        </pc:spChg>
+        <pc:graphicFrameChg chg="modGraphic">
+          <ac:chgData name="Joaquin Badenas" userId="5cb29fd719aebf04" providerId="LiveId" clId="{4F53BFBD-1E38-412E-AE7B-7E5D3B30168C}" dt="2024-07-25T22:28:38.189" v="3870" actId="20577"/>
+          <ac:graphicFrameMkLst>
+            <pc:docMk/>
+            <pc:sldMk cId="3184647088" sldId="297"/>
+            <ac:graphicFrameMk id="3" creationId="{1A9023FA-33FD-5552-47F6-6A8D6E948421}"/>
+          </ac:graphicFrameMkLst>
+        </pc:graphicFrameChg>
+        <pc:picChg chg="del">
+          <ac:chgData name="Joaquin Badenas" userId="5cb29fd719aebf04" providerId="LiveId" clId="{4F53BFBD-1E38-412E-AE7B-7E5D3B30168C}" dt="2024-07-25T22:26:40.166" v="3462" actId="478"/>
+          <ac:picMkLst>
+            <pc:docMk/>
+            <pc:sldMk cId="3184647088" sldId="297"/>
+            <ac:picMk id="5" creationId="{57E7F4CF-D8BC-D90D-0D87-30B1ADB57D25}"/>
+          </ac:picMkLst>
+        </pc:picChg>
+        <pc:picChg chg="del">
+          <ac:chgData name="Joaquin Badenas" userId="5cb29fd719aebf04" providerId="LiveId" clId="{4F53BFBD-1E38-412E-AE7B-7E5D3B30168C}" dt="2024-07-25T22:26:37.046" v="3460" actId="478"/>
+          <ac:picMkLst>
+            <pc:docMk/>
+            <pc:sldMk cId="3184647088" sldId="297"/>
+            <ac:picMk id="6" creationId="{5F4297DF-0FB2-6474-3ACA-76725C4AFCD9}"/>
+          </ac:picMkLst>
+        </pc:picChg>
+        <pc:picChg chg="del">
+          <ac:chgData name="Joaquin Badenas" userId="5cb29fd719aebf04" providerId="LiveId" clId="{4F53BFBD-1E38-412E-AE7B-7E5D3B30168C}" dt="2024-07-25T22:26:38.627" v="3461" actId="478"/>
+          <ac:picMkLst>
+            <pc:docMk/>
+            <pc:sldMk cId="3184647088" sldId="297"/>
+            <ac:picMk id="7" creationId="{D174B546-08FB-C1FB-CD7C-53F4CF2F4B48}"/>
+          </ac:picMkLst>
+        </pc:picChg>
+        <pc:picChg chg="add mod">
+          <ac:chgData name="Joaquin Badenas" userId="5cb29fd719aebf04" providerId="LiveId" clId="{4F53BFBD-1E38-412E-AE7B-7E5D3B30168C}" dt="2024-07-25T22:29:53.824" v="3877" actId="1076"/>
+          <ac:picMkLst>
+            <pc:docMk/>
+            <pc:sldMk cId="3184647088" sldId="297"/>
+            <ac:picMk id="8" creationId="{C033D905-8F74-BEC7-9B38-33407A6BDE4A}"/>
+          </ac:picMkLst>
+        </pc:picChg>
+        <pc:picChg chg="add mod">
+          <ac:chgData name="Joaquin Badenas" userId="5cb29fd719aebf04" providerId="LiveId" clId="{4F53BFBD-1E38-412E-AE7B-7E5D3B30168C}" dt="2024-07-25T22:30:03.161" v="3881" actId="1076"/>
+          <ac:picMkLst>
+            <pc:docMk/>
+            <pc:sldMk cId="3184647088" sldId="297"/>
+            <ac:picMk id="9" creationId="{51D1A24A-2773-0E7F-928F-BB363B2237E2}"/>
+          </ac:picMkLst>
+        </pc:picChg>
+        <pc:picChg chg="add mod">
+          <ac:chgData name="Joaquin Badenas" userId="5cb29fd719aebf04" providerId="LiveId" clId="{4F53BFBD-1E38-412E-AE7B-7E5D3B30168C}" dt="2024-07-25T22:30:37.796" v="3883" actId="1076"/>
+          <ac:picMkLst>
+            <pc:docMk/>
+            <pc:sldMk cId="3184647088" sldId="297"/>
+            <ac:picMk id="11" creationId="{E187ECB1-C820-A533-EE37-286B8D5A9562}"/>
+          </ac:picMkLst>
+        </pc:picChg>
+        <pc:picChg chg="add mod">
+          <ac:chgData name="Joaquin Badenas" userId="5cb29fd719aebf04" providerId="LiveId" clId="{4F53BFBD-1E38-412E-AE7B-7E5D3B30168C}" dt="2024-07-25T22:30:55.877" v="3885" actId="1076"/>
+          <ac:picMkLst>
+            <pc:docMk/>
+            <pc:sldMk cId="3184647088" sldId="297"/>
+            <ac:picMk id="13" creationId="{9CDC97B8-A802-BF58-8C90-410ADA20B8D5}"/>
+          </ac:picMkLst>
+        </pc:picChg>
+      </pc:sldChg>
+      <pc:sldChg chg="delSp modSp add mod">
+        <pc:chgData name="Joaquin Badenas" userId="5cb29fd719aebf04" providerId="LiveId" clId="{4F53BFBD-1E38-412E-AE7B-7E5D3B30168C}" dt="2024-07-25T22:31:39.934" v="3896" actId="1076"/>
+        <pc:sldMkLst>
+          <pc:docMk/>
+          <pc:sldMk cId="3308064268" sldId="298"/>
+        </pc:sldMkLst>
+        <pc:graphicFrameChg chg="del">
+          <ac:chgData name="Joaquin Badenas" userId="5cb29fd719aebf04" providerId="LiveId" clId="{4F53BFBD-1E38-412E-AE7B-7E5D3B30168C}" dt="2024-07-25T22:31:07.823" v="3888" actId="478"/>
+          <ac:graphicFrameMkLst>
+            <pc:docMk/>
+            <pc:sldMk cId="3308064268" sldId="298"/>
+            <ac:graphicFrameMk id="3" creationId="{1A9023FA-33FD-5552-47F6-6A8D6E948421}"/>
+          </ac:graphicFrameMkLst>
+        </pc:graphicFrameChg>
+        <pc:picChg chg="del">
+          <ac:chgData name="Joaquin Badenas" userId="5cb29fd719aebf04" providerId="LiveId" clId="{4F53BFBD-1E38-412E-AE7B-7E5D3B30168C}" dt="2024-07-25T22:31:35.977" v="3894" actId="478"/>
+          <ac:picMkLst>
+            <pc:docMk/>
+            <pc:sldMk cId="3308064268" sldId="298"/>
+            <ac:picMk id="8" creationId="{C033D905-8F74-BEC7-9B38-33407A6BDE4A}"/>
+          </ac:picMkLst>
+        </pc:picChg>
+        <pc:picChg chg="del">
+          <ac:chgData name="Joaquin Badenas" userId="5cb29fd719aebf04" providerId="LiveId" clId="{4F53BFBD-1E38-412E-AE7B-7E5D3B30168C}" dt="2024-07-25T22:31:06.222" v="3887" actId="478"/>
+          <ac:picMkLst>
+            <pc:docMk/>
+            <pc:sldMk cId="3308064268" sldId="298"/>
+            <ac:picMk id="9" creationId="{51D1A24A-2773-0E7F-928F-BB363B2237E2}"/>
+          </ac:picMkLst>
+        </pc:picChg>
+        <pc:picChg chg="mod">
+          <ac:chgData name="Joaquin Badenas" userId="5cb29fd719aebf04" providerId="LiveId" clId="{4F53BFBD-1E38-412E-AE7B-7E5D3B30168C}" dt="2024-07-25T22:31:37.940" v="3895" actId="1076"/>
+          <ac:picMkLst>
+            <pc:docMk/>
+            <pc:sldMk cId="3308064268" sldId="298"/>
+            <ac:picMk id="11" creationId="{E187ECB1-C820-A533-EE37-286B8D5A9562}"/>
+          </ac:picMkLst>
+        </pc:picChg>
+        <pc:picChg chg="mod">
+          <ac:chgData name="Joaquin Badenas" userId="5cb29fd719aebf04" providerId="LiveId" clId="{4F53BFBD-1E38-412E-AE7B-7E5D3B30168C}" dt="2024-07-25T22:31:39.934" v="3896" actId="1076"/>
+          <ac:picMkLst>
+            <pc:docMk/>
+            <pc:sldMk cId="3308064268" sldId="298"/>
+            <ac:picMk id="13" creationId="{9CDC97B8-A802-BF58-8C90-410ADA20B8D5}"/>
+          </ac:picMkLst>
+        </pc:picChg>
+      </pc:sldChg>
+      <pc:sldChg chg="addSp delSp modSp add mod ord">
+        <pc:chgData name="Joaquin Badenas" userId="5cb29fd719aebf04" providerId="LiveId" clId="{4F53BFBD-1E38-412E-AE7B-7E5D3B30168C}" dt="2024-07-25T22:47:43.117" v="4616" actId="1076"/>
+        <pc:sldMkLst>
+          <pc:docMk/>
+          <pc:sldMk cId="1650522295" sldId="299"/>
+        </pc:sldMkLst>
+        <pc:graphicFrameChg chg="mod modGraphic">
+          <ac:chgData name="Joaquin Badenas" userId="5cb29fd719aebf04" providerId="LiveId" clId="{4F53BFBD-1E38-412E-AE7B-7E5D3B30168C}" dt="2024-07-25T22:47:40.440" v="4615" actId="20577"/>
+          <ac:graphicFrameMkLst>
+            <pc:docMk/>
+            <pc:sldMk cId="1650522295" sldId="299"/>
+            <ac:graphicFrameMk id="3" creationId="{1A9023FA-33FD-5552-47F6-6A8D6E948421}"/>
+          </ac:graphicFrameMkLst>
+        </pc:graphicFrameChg>
+        <pc:picChg chg="add mod">
+          <ac:chgData name="Joaquin Badenas" userId="5cb29fd719aebf04" providerId="LiveId" clId="{4F53BFBD-1E38-412E-AE7B-7E5D3B30168C}" dt="2024-07-25T22:44:39.362" v="4082" actId="1076"/>
+          <ac:picMkLst>
+            <pc:docMk/>
+            <pc:sldMk cId="1650522295" sldId="299"/>
+            <ac:picMk id="5" creationId="{12BDD781-01D9-C766-A286-AC924C10E72F}"/>
+          </ac:picMkLst>
+        </pc:picChg>
+        <pc:picChg chg="add mod">
+          <ac:chgData name="Joaquin Badenas" userId="5cb29fd719aebf04" providerId="LiveId" clId="{4F53BFBD-1E38-412E-AE7B-7E5D3B30168C}" dt="2024-07-25T22:47:43.117" v="4616" actId="1076"/>
+          <ac:picMkLst>
+            <pc:docMk/>
+            <pc:sldMk cId="1650522295" sldId="299"/>
+            <ac:picMk id="7" creationId="{7509F016-81E3-35B8-29C2-AF76B1B23F01}"/>
+          </ac:picMkLst>
+        </pc:picChg>
+        <pc:picChg chg="del">
+          <ac:chgData name="Joaquin Badenas" userId="5cb29fd719aebf04" providerId="LiveId" clId="{4F53BFBD-1E38-412E-AE7B-7E5D3B30168C}" dt="2024-07-25T22:34:17.084" v="3903" actId="478"/>
+          <ac:picMkLst>
+            <pc:docMk/>
+            <pc:sldMk cId="1650522295" sldId="299"/>
+            <ac:picMk id="8" creationId="{C033D905-8F74-BEC7-9B38-33407A6BDE4A}"/>
+          </ac:picMkLst>
+        </pc:picChg>
+        <pc:picChg chg="del">
+          <ac:chgData name="Joaquin Badenas" userId="5cb29fd719aebf04" providerId="LiveId" clId="{4F53BFBD-1E38-412E-AE7B-7E5D3B30168C}" dt="2024-07-25T22:34:15.656" v="3902" actId="478"/>
+          <ac:picMkLst>
+            <pc:docMk/>
+            <pc:sldMk cId="1650522295" sldId="299"/>
+            <ac:picMk id="9" creationId="{51D1A24A-2773-0E7F-928F-BB363B2237E2}"/>
+          </ac:picMkLst>
+        </pc:picChg>
+        <pc:picChg chg="del">
+          <ac:chgData name="Joaquin Badenas" userId="5cb29fd719aebf04" providerId="LiveId" clId="{4F53BFBD-1E38-412E-AE7B-7E5D3B30168C}" dt="2024-07-25T22:34:14.189" v="3901" actId="478"/>
+          <ac:picMkLst>
+            <pc:docMk/>
+            <pc:sldMk cId="1650522295" sldId="299"/>
+            <ac:picMk id="11" creationId="{E187ECB1-C820-A533-EE37-286B8D5A9562}"/>
+          </ac:picMkLst>
+        </pc:picChg>
+        <pc:picChg chg="del">
+          <ac:chgData name="Joaquin Badenas" userId="5cb29fd719aebf04" providerId="LiveId" clId="{4F53BFBD-1E38-412E-AE7B-7E5D3B30168C}" dt="2024-07-25T22:34:13.512" v="3900" actId="478"/>
+          <ac:picMkLst>
+            <pc:docMk/>
+            <pc:sldMk cId="1650522295" sldId="299"/>
+            <ac:picMk id="13" creationId="{9CDC97B8-A802-BF58-8C90-410ADA20B8D5}"/>
+          </ac:picMkLst>
+        </pc:picChg>
+      </pc:sldChg>
+      <pc:sldChg chg="addSp delSp modSp add mod">
+        <pc:chgData name="Joaquin Badenas" userId="5cb29fd719aebf04" providerId="LiveId" clId="{4F53BFBD-1E38-412E-AE7B-7E5D3B30168C}" dt="2024-07-25T22:51:46.495" v="4635" actId="1076"/>
+        <pc:sldMkLst>
+          <pc:docMk/>
+          <pc:sldMk cId="1246263540" sldId="300"/>
+        </pc:sldMkLst>
+        <pc:picChg chg="del">
+          <ac:chgData name="Joaquin Badenas" userId="5cb29fd719aebf04" providerId="LiveId" clId="{4F53BFBD-1E38-412E-AE7B-7E5D3B30168C}" dt="2024-07-25T22:47:47.533" v="4619" actId="478"/>
+          <ac:picMkLst>
+            <pc:docMk/>
+            <pc:sldMk cId="1246263540" sldId="300"/>
+            <ac:picMk id="5" creationId="{12BDD781-01D9-C766-A286-AC924C10E72F}"/>
+          </ac:picMkLst>
+        </pc:picChg>
+        <pc:picChg chg="add mod">
+          <ac:chgData name="Joaquin Badenas" userId="5cb29fd719aebf04" providerId="LiveId" clId="{4F53BFBD-1E38-412E-AE7B-7E5D3B30168C}" dt="2024-07-25T22:51:46.495" v="4635" actId="1076"/>
+          <ac:picMkLst>
+            <pc:docMk/>
+            <pc:sldMk cId="1246263540" sldId="300"/>
+            <ac:picMk id="6" creationId="{48B898A2-1128-0226-411D-26C6ECB90C97}"/>
+          </ac:picMkLst>
+        </pc:picChg>
+        <pc:picChg chg="del">
+          <ac:chgData name="Joaquin Badenas" userId="5cb29fd719aebf04" providerId="LiveId" clId="{4F53BFBD-1E38-412E-AE7B-7E5D3B30168C}" dt="2024-07-25T22:47:46.555" v="4618" actId="478"/>
+          <ac:picMkLst>
+            <pc:docMk/>
+            <pc:sldMk cId="1246263540" sldId="300"/>
+            <ac:picMk id="7" creationId="{7509F016-81E3-35B8-29C2-AF76B1B23F01}"/>
+          </ac:picMkLst>
+        </pc:picChg>
+        <pc:picChg chg="add mod">
+          <ac:chgData name="Joaquin Badenas" userId="5cb29fd719aebf04" providerId="LiveId" clId="{4F53BFBD-1E38-412E-AE7B-7E5D3B30168C}" dt="2024-07-25T22:51:45.340" v="4634" actId="1076"/>
+          <ac:picMkLst>
+            <pc:docMk/>
+            <pc:sldMk cId="1246263540" sldId="300"/>
+            <ac:picMk id="9" creationId="{2EDAD458-D1A0-5E5C-EB30-220B0AC8997B}"/>
           </ac:picMkLst>
         </pc:picChg>
       </pc:sldChg>
@@ -2467,7 +2723,7 @@
           <a:p>
             <a:fld id="{57E58380-3550-4AA1-8DE5-F8A856B30F15}" type="datetimeFigureOut">
               <a:rPr lang="en-NZ" smtClean="0"/>
-              <a:t>25/07/2024</a:t>
+              <a:t>26/07/2024</a:t>
             </a:fld>
             <a:endParaRPr lang="en-NZ"/>
           </a:p>
@@ -2695,7 +2951,7 @@
           <a:p>
             <a:fld id="{57E58380-3550-4AA1-8DE5-F8A856B30F15}" type="datetimeFigureOut">
               <a:rPr lang="en-NZ" smtClean="0"/>
-              <a:t>25/07/2024</a:t>
+              <a:t>26/07/2024</a:t>
             </a:fld>
             <a:endParaRPr lang="en-NZ"/>
           </a:p>
@@ -2875,7 +3131,7 @@
           <a:p>
             <a:fld id="{57E58380-3550-4AA1-8DE5-F8A856B30F15}" type="datetimeFigureOut">
               <a:rPr lang="en-NZ" smtClean="0"/>
-              <a:t>25/07/2024</a:t>
+              <a:t>26/07/2024</a:t>
             </a:fld>
             <a:endParaRPr lang="en-NZ"/>
           </a:p>
@@ -3045,7 +3301,7 @@
           <a:p>
             <a:fld id="{57E58380-3550-4AA1-8DE5-F8A856B30F15}" type="datetimeFigureOut">
               <a:rPr lang="en-NZ" smtClean="0"/>
-              <a:t>25/07/2024</a:t>
+              <a:t>26/07/2024</a:t>
             </a:fld>
             <a:endParaRPr lang="en-NZ"/>
           </a:p>
@@ -3299,7 +3555,7 @@
           <a:p>
             <a:fld id="{57E58380-3550-4AA1-8DE5-F8A856B30F15}" type="datetimeFigureOut">
               <a:rPr lang="en-NZ" smtClean="0"/>
-              <a:t>25/07/2024</a:t>
+              <a:t>26/07/2024</a:t>
             </a:fld>
             <a:endParaRPr lang="en-NZ"/>
           </a:p>
@@ -3625,7 +3881,7 @@
           <a:p>
             <a:fld id="{57E58380-3550-4AA1-8DE5-F8A856B30F15}" type="datetimeFigureOut">
               <a:rPr lang="en-NZ" smtClean="0"/>
-              <a:t>25/07/2024</a:t>
+              <a:t>26/07/2024</a:t>
             </a:fld>
             <a:endParaRPr lang="en-NZ"/>
           </a:p>
@@ -4076,7 +4332,7 @@
           <a:p>
             <a:fld id="{57E58380-3550-4AA1-8DE5-F8A856B30F15}" type="datetimeFigureOut">
               <a:rPr lang="en-NZ" smtClean="0"/>
-              <a:t>25/07/2024</a:t>
+              <a:t>26/07/2024</a:t>
             </a:fld>
             <a:endParaRPr lang="en-NZ"/>
           </a:p>
@@ -4194,7 +4450,7 @@
           <a:p>
             <a:fld id="{57E58380-3550-4AA1-8DE5-F8A856B30F15}" type="datetimeFigureOut">
               <a:rPr lang="en-NZ" smtClean="0"/>
-              <a:t>25/07/2024</a:t>
+              <a:t>26/07/2024</a:t>
             </a:fld>
             <a:endParaRPr lang="en-NZ"/>
           </a:p>
@@ -4289,7 +4545,7 @@
           <a:p>
             <a:fld id="{57E58380-3550-4AA1-8DE5-F8A856B30F15}" type="datetimeFigureOut">
               <a:rPr lang="en-NZ" smtClean="0"/>
-              <a:t>25/07/2024</a:t>
+              <a:t>26/07/2024</a:t>
             </a:fld>
             <a:endParaRPr lang="en-NZ"/>
           </a:p>
@@ -4576,7 +4832,7 @@
           <a:p>
             <a:fld id="{57E58380-3550-4AA1-8DE5-F8A856B30F15}" type="datetimeFigureOut">
               <a:rPr lang="en-NZ" smtClean="0"/>
-              <a:t>25/07/2024</a:t>
+              <a:t>26/07/2024</a:t>
             </a:fld>
             <a:endParaRPr lang="en-NZ"/>
           </a:p>
@@ -4898,7 +5154,7 @@
           <a:p>
             <a:fld id="{57E58380-3550-4AA1-8DE5-F8A856B30F15}" type="datetimeFigureOut">
               <a:rPr lang="en-NZ" smtClean="0"/>
-              <a:t>25/07/2024</a:t>
+              <a:t>26/07/2024</a:t>
             </a:fld>
             <a:endParaRPr lang="en-NZ"/>
           </a:p>
@@ -5152,7 +5408,7 @@
           <a:p>
             <a:fld id="{57E58380-3550-4AA1-8DE5-F8A856B30F15}" type="datetimeFigureOut">
               <a:rPr lang="en-NZ" smtClean="0"/>
-              <a:t>25/07/2024</a:t>
+              <a:t>26/07/2024</a:t>
             </a:fld>
             <a:endParaRPr lang="en-NZ"/>
           </a:p>
@@ -8117,7 +8373,7 @@
               <a:rPr lang="en-NZ" sz="2800" dirty="0">
                 <a:latin typeface="Abadi" panose="020B0604020104020204" pitchFamily="34" charset="0"/>
               </a:rPr>
-              <a:t>Iterative Improvement (Navbar)</a:t>
+              <a:t>Iterative Improvement (Navbar V1)</a:t>
             </a:r>
           </a:p>
         </p:txBody>
@@ -8416,7 +8672,7 @@
               <a:rPr lang="en-NZ" sz="2800" dirty="0">
                 <a:latin typeface="Abadi" panose="020B0604020104020204" pitchFamily="34" charset="0"/>
               </a:rPr>
-              <a:t>Iterative Improvement (Navbar)</a:t>
+              <a:t>Iterative Improvement (Navbar V1)</a:t>
             </a:r>
           </a:p>
         </p:txBody>
@@ -8578,6 +8834,36 @@
           </a:prstGeom>
         </p:spPr>
       </p:pic>
+      <p:pic>
+        <p:nvPicPr>
+          <p:cNvPr id="6" name="Picture 5">
+            <a:extLst>
+              <a:ext uri="{FF2B5EF4-FFF2-40B4-BE49-F238E27FC236}">
+                <a16:creationId xmlns:a16="http://schemas.microsoft.com/office/drawing/2014/main" id="{5F4297DF-0FB2-6474-3ACA-76725C4AFCD9}"/>
+              </a:ext>
+            </a:extLst>
+          </p:cNvPr>
+          <p:cNvPicPr>
+            <a:picLocks noChangeAspect="1"/>
+          </p:cNvPicPr>
+          <p:nvPr/>
+        </p:nvPicPr>
+        <p:blipFill>
+          <a:blip r:embed="rId4"/>
+          <a:stretch>
+            <a:fillRect/>
+          </a:stretch>
+        </p:blipFill>
+        <p:spPr>
+          <a:xfrm>
+            <a:off x="1965278" y="2631836"/>
+            <a:ext cx="7561086" cy="4042332"/>
+          </a:xfrm>
+          <a:prstGeom prst="rect">
+            <a:avLst/>
+          </a:prstGeom>
+        </p:spPr>
+      </p:pic>
     </p:spTree>
     <p:extLst>
       <p:ext uri="{BB962C8B-B14F-4D97-AF65-F5344CB8AC3E}">
@@ -8618,7 +8904,12 @@
             <p:ph type="title"/>
           </p:nvPr>
         </p:nvSpPr>
-        <p:spPr/>
+        <p:spPr>
+          <a:xfrm>
+            <a:off x="1249680" y="183832"/>
+            <a:ext cx="9692640" cy="606738"/>
+          </a:xfrm>
+        </p:spPr>
         <p:txBody>
           <a:bodyPr>
             <a:normAutofit/>
@@ -8629,44 +8920,232 @@
               <a:rPr lang="en-NZ" sz="2800" dirty="0">
                 <a:latin typeface="Abadi" panose="020B0604020104020204" pitchFamily="34" charset="0"/>
               </a:rPr>
-              <a:t>Version Control</a:t>
-            </a:r>
-          </a:p>
-        </p:txBody>
-      </p:sp>
-      <p:sp>
-        <p:nvSpPr>
-          <p:cNvPr id="3" name="Content Placeholder 2"/>
-          <p:cNvSpPr>
-            <a:spLocks noGrp="1"/>
-          </p:cNvSpPr>
-          <p:nvPr>
-            <p:ph idx="1"/>
-          </p:nvPr>
-        </p:nvSpPr>
-        <p:spPr/>
-        <p:txBody>
-          <a:bodyPr>
-            <a:normAutofit/>
-          </a:bodyPr>
-          <a:lstStyle/>
-          <a:p>
-            <a:pPr marL="0" indent="0">
-              <a:buNone/>
-            </a:pPr>
-            <a:r>
-              <a:rPr lang="en-NZ" sz="2000" dirty="0">
-                <a:latin typeface="Abadi" panose="020B0604020104020204" pitchFamily="34" charset="0"/>
-              </a:rPr>
-              <a:t>Show how you have used version control throughout the design, development, and testing process.</a:t>
-            </a:r>
-          </a:p>
-        </p:txBody>
-      </p:sp>
+              <a:t>Iterative Improvement (Navbar V1)</a:t>
+            </a:r>
+          </a:p>
+        </p:txBody>
+      </p:sp>
+      <p:graphicFrame>
+        <p:nvGraphicFramePr>
+          <p:cNvPr id="3" name="Table 2">
+            <a:extLst>
+              <a:ext uri="{FF2B5EF4-FFF2-40B4-BE49-F238E27FC236}">
+                <a16:creationId xmlns:a16="http://schemas.microsoft.com/office/drawing/2014/main" id="{1A9023FA-33FD-5552-47F6-6A8D6E948421}"/>
+              </a:ext>
+            </a:extLst>
+          </p:cNvPr>
+          <p:cNvGraphicFramePr>
+            <a:graphicFrameLocks noGrp="1"/>
+          </p:cNvGraphicFramePr>
+          <p:nvPr>
+            <p:extLst>
+              <p:ext uri="{D42A27DB-BD31-4B8C-83A1-F6EECF244321}">
+                <p14:modId xmlns:p14="http://schemas.microsoft.com/office/powerpoint/2010/main" val="3109444822"/>
+              </p:ext>
+            </p:extLst>
+          </p:nvPr>
+        </p:nvGraphicFramePr>
+        <p:xfrm>
+          <a:off x="1249680" y="1031751"/>
+          <a:ext cx="9430604" cy="1861575"/>
+        </p:xfrm>
+        <a:graphic>
+          <a:graphicData uri="http://schemas.openxmlformats.org/drawingml/2006/table">
+            <a:tbl>
+              <a:tblPr firstRow="1" bandRow="1">
+                <a:tableStyleId>{5C22544A-7EE6-4342-B048-85BDC9FD1C3A}</a:tableStyleId>
+              </a:tblPr>
+              <a:tblGrid>
+                <a:gridCol w="4715302">
+                  <a:extLst>
+                    <a:ext uri="{9D8B030D-6E8A-4147-A177-3AD203B41FA5}">
+                      <a16:colId xmlns:a16="http://schemas.microsoft.com/office/drawing/2014/main" val="2104603021"/>
+                    </a:ext>
+                  </a:extLst>
+                </a:gridCol>
+                <a:gridCol w="4715302">
+                  <a:extLst>
+                    <a:ext uri="{9D8B030D-6E8A-4147-A177-3AD203B41FA5}">
+                      <a16:colId xmlns:a16="http://schemas.microsoft.com/office/drawing/2014/main" val="2097243175"/>
+                    </a:ext>
+                  </a:extLst>
+                </a:gridCol>
+              </a:tblGrid>
+              <a:tr h="1861575">
+                <a:tc>
+                  <a:txBody>
+                    <a:bodyPr/>
+                    <a:lstStyle/>
+                    <a:p>
+                      <a:r>
+                        <a:rPr lang="en-NZ" dirty="0">
+                          <a:latin typeface="Abadi" panose="020B0604020104020204" pitchFamily="34" charset="0"/>
+                        </a:rPr>
+                        <a:t>Then the font felt that it was not aesthetically pleasing and matches well with the Jollibee brand</a:t>
+                      </a:r>
+                    </a:p>
+                    <a:p>
+                      <a:endParaRPr lang="en-NZ" dirty="0">
+                        <a:latin typeface="Abadi" panose="020B0604020104020204" pitchFamily="34" charset="0"/>
+                      </a:endParaRPr>
+                    </a:p>
+                    <a:p>
+                      <a:endParaRPr lang="en-NZ" dirty="0">
+                        <a:latin typeface="Abadi" panose="020B0604020104020204" pitchFamily="34" charset="0"/>
+                      </a:endParaRPr>
+                    </a:p>
+                  </a:txBody>
+                  <a:tcPr/>
+                </a:tc>
+                <a:tc>
+                  <a:txBody>
+                    <a:bodyPr/>
+                    <a:lstStyle/>
+                    <a:p>
+                      <a:r>
+                        <a:rPr lang="en-NZ" dirty="0">
+                          <a:latin typeface="Abadi" panose="020B0604020104020204" pitchFamily="34" charset="0"/>
+                        </a:rPr>
+                        <a:t>Then I found in the official Jollibee website that the font they use and embedded it into my website. </a:t>
+                      </a:r>
+                    </a:p>
+                  </a:txBody>
+                  <a:tcPr/>
+                </a:tc>
+                <a:extLst>
+                  <a:ext uri="{0D108BD9-81ED-4DB2-BD59-A6C34878D82A}">
+                    <a16:rowId xmlns:a16="http://schemas.microsoft.com/office/drawing/2014/main" val="2765992196"/>
+                  </a:ext>
+                </a:extLst>
+              </a:tr>
+            </a:tbl>
+          </a:graphicData>
+        </a:graphic>
+      </p:graphicFrame>
+      <p:pic>
+        <p:nvPicPr>
+          <p:cNvPr id="8" name="Picture 7">
+            <a:extLst>
+              <a:ext uri="{FF2B5EF4-FFF2-40B4-BE49-F238E27FC236}">
+                <a16:creationId xmlns:a16="http://schemas.microsoft.com/office/drawing/2014/main" id="{C033D905-8F74-BEC7-9B38-33407A6BDE4A}"/>
+              </a:ext>
+            </a:extLst>
+          </p:cNvPr>
+          <p:cNvPicPr>
+            <a:picLocks noChangeAspect="1"/>
+          </p:cNvPicPr>
+          <p:nvPr/>
+        </p:nvPicPr>
+        <p:blipFill>
+          <a:blip r:embed="rId2"/>
+          <a:stretch>
+            <a:fillRect/>
+          </a:stretch>
+        </p:blipFill>
+        <p:spPr>
+          <a:xfrm>
+            <a:off x="7315200" y="1689368"/>
+            <a:ext cx="3251664" cy="965511"/>
+          </a:xfrm>
+          <a:prstGeom prst="rect">
+            <a:avLst/>
+          </a:prstGeom>
+        </p:spPr>
+      </p:pic>
+      <p:pic>
+        <p:nvPicPr>
+          <p:cNvPr id="9" name="Picture 8">
+            <a:extLst>
+              <a:ext uri="{FF2B5EF4-FFF2-40B4-BE49-F238E27FC236}">
+                <a16:creationId xmlns:a16="http://schemas.microsoft.com/office/drawing/2014/main" id="{51D1A24A-2773-0E7F-928F-BB363B2237E2}"/>
+              </a:ext>
+            </a:extLst>
+          </p:cNvPr>
+          <p:cNvPicPr>
+            <a:picLocks noChangeAspect="1"/>
+          </p:cNvPicPr>
+          <p:nvPr/>
+        </p:nvPicPr>
+        <p:blipFill>
+          <a:blip r:embed="rId3"/>
+          <a:stretch>
+            <a:fillRect/>
+          </a:stretch>
+        </p:blipFill>
+        <p:spPr>
+          <a:xfrm>
+            <a:off x="1741084" y="2026139"/>
+            <a:ext cx="3889002" cy="797125"/>
+          </a:xfrm>
+          <a:prstGeom prst="rect">
+            <a:avLst/>
+          </a:prstGeom>
+        </p:spPr>
+      </p:pic>
+      <p:pic>
+        <p:nvPicPr>
+          <p:cNvPr id="11" name="Picture 10">
+            <a:extLst>
+              <a:ext uri="{FF2B5EF4-FFF2-40B4-BE49-F238E27FC236}">
+                <a16:creationId xmlns:a16="http://schemas.microsoft.com/office/drawing/2014/main" id="{E187ECB1-C820-A533-EE37-286B8D5A9562}"/>
+              </a:ext>
+            </a:extLst>
+          </p:cNvPr>
+          <p:cNvPicPr>
+            <a:picLocks noChangeAspect="1"/>
+          </p:cNvPicPr>
+          <p:nvPr/>
+        </p:nvPicPr>
+        <p:blipFill>
+          <a:blip r:embed="rId4"/>
+          <a:stretch>
+            <a:fillRect/>
+          </a:stretch>
+        </p:blipFill>
+        <p:spPr>
+          <a:xfrm>
+            <a:off x="539169" y="3134507"/>
+            <a:ext cx="9011908" cy="2686425"/>
+          </a:xfrm>
+          <a:prstGeom prst="rect">
+            <a:avLst/>
+          </a:prstGeom>
+        </p:spPr>
+      </p:pic>
+      <p:pic>
+        <p:nvPicPr>
+          <p:cNvPr id="13" name="Picture 12">
+            <a:extLst>
+              <a:ext uri="{FF2B5EF4-FFF2-40B4-BE49-F238E27FC236}">
+                <a16:creationId xmlns:a16="http://schemas.microsoft.com/office/drawing/2014/main" id="{9CDC97B8-A802-BF58-8C90-410ADA20B8D5}"/>
+              </a:ext>
+            </a:extLst>
+          </p:cNvPr>
+          <p:cNvPicPr>
+            <a:picLocks noChangeAspect="1"/>
+          </p:cNvPicPr>
+          <p:nvPr/>
+        </p:nvPicPr>
+        <p:blipFill>
+          <a:blip r:embed="rId5"/>
+          <a:stretch>
+            <a:fillRect/>
+          </a:stretch>
+        </p:blipFill>
+        <p:spPr>
+          <a:xfrm>
+            <a:off x="3303617" y="1031751"/>
+            <a:ext cx="9078592" cy="4810796"/>
+          </a:xfrm>
+          <a:prstGeom prst="rect">
+            <a:avLst/>
+          </a:prstGeom>
+        </p:spPr>
+      </p:pic>
     </p:spTree>
     <p:extLst>
       <p:ext uri="{BB962C8B-B14F-4D97-AF65-F5344CB8AC3E}">
-        <p14:creationId xmlns:p14="http://schemas.microsoft.com/office/powerpoint/2010/main" val="2812247241"/>
+        <p14:creationId xmlns:p14="http://schemas.microsoft.com/office/powerpoint/2010/main" val="3184647088"/>
       </p:ext>
     </p:extLst>
   </p:cSld>
@@ -8703,7 +9182,12 @@
             <p:ph type="title"/>
           </p:nvPr>
         </p:nvSpPr>
-        <p:spPr/>
+        <p:spPr>
+          <a:xfrm>
+            <a:off x="1249680" y="183832"/>
+            <a:ext cx="9692640" cy="606738"/>
+          </a:xfrm>
+        </p:spPr>
         <p:txBody>
           <a:bodyPr>
             <a:normAutofit/>
@@ -8714,44 +9198,75 @@
               <a:rPr lang="en-NZ" sz="2800" dirty="0">
                 <a:latin typeface="Abadi" panose="020B0604020104020204" pitchFamily="34" charset="0"/>
               </a:rPr>
-              <a:t>GitHub Commits</a:t>
-            </a:r>
-          </a:p>
-        </p:txBody>
-      </p:sp>
-      <p:sp>
-        <p:nvSpPr>
-          <p:cNvPr id="3" name="Content Placeholder 2"/>
-          <p:cNvSpPr>
-            <a:spLocks noGrp="1"/>
-          </p:cNvSpPr>
-          <p:nvPr>
-            <p:ph idx="1"/>
-          </p:nvPr>
-        </p:nvSpPr>
-        <p:spPr/>
-        <p:txBody>
-          <a:bodyPr>
-            <a:normAutofit/>
-          </a:bodyPr>
-          <a:lstStyle/>
-          <a:p>
-            <a:pPr marL="0" indent="0">
-              <a:buNone/>
-            </a:pPr>
-            <a:r>
-              <a:rPr lang="en-NZ" sz="2000" dirty="0">
-                <a:latin typeface="Abadi" panose="020B0604020104020204" pitchFamily="34" charset="0"/>
-              </a:rPr>
-              <a:t>Show how you have used GitHub throughout the design, development, and testing process.</a:t>
-            </a:r>
-          </a:p>
-        </p:txBody>
-      </p:sp>
+              <a:t>Iterative Improvement (Navbar V1)</a:t>
+            </a:r>
+          </a:p>
+        </p:txBody>
+      </p:sp>
+      <p:pic>
+        <p:nvPicPr>
+          <p:cNvPr id="11" name="Picture 10">
+            <a:extLst>
+              <a:ext uri="{FF2B5EF4-FFF2-40B4-BE49-F238E27FC236}">
+                <a16:creationId xmlns:a16="http://schemas.microsoft.com/office/drawing/2014/main" id="{E187ECB1-C820-A533-EE37-286B8D5A9562}"/>
+              </a:ext>
+            </a:extLst>
+          </p:cNvPr>
+          <p:cNvPicPr>
+            <a:picLocks noChangeAspect="1"/>
+          </p:cNvPicPr>
+          <p:nvPr/>
+        </p:nvPicPr>
+        <p:blipFill>
+          <a:blip r:embed="rId2"/>
+          <a:stretch>
+            <a:fillRect/>
+          </a:stretch>
+        </p:blipFill>
+        <p:spPr>
+          <a:xfrm>
+            <a:off x="1544555" y="935826"/>
+            <a:ext cx="6944353" cy="2070093"/>
+          </a:xfrm>
+          <a:prstGeom prst="rect">
+            <a:avLst/>
+          </a:prstGeom>
+        </p:spPr>
+      </p:pic>
+      <p:pic>
+        <p:nvPicPr>
+          <p:cNvPr id="13" name="Picture 12">
+            <a:extLst>
+              <a:ext uri="{FF2B5EF4-FFF2-40B4-BE49-F238E27FC236}">
+                <a16:creationId xmlns:a16="http://schemas.microsoft.com/office/drawing/2014/main" id="{9CDC97B8-A802-BF58-8C90-410ADA20B8D5}"/>
+              </a:ext>
+            </a:extLst>
+          </p:cNvPr>
+          <p:cNvPicPr>
+            <a:picLocks noChangeAspect="1"/>
+          </p:cNvPicPr>
+          <p:nvPr/>
+        </p:nvPicPr>
+        <p:blipFill>
+          <a:blip r:embed="rId3"/>
+          <a:stretch>
+            <a:fillRect/>
+          </a:stretch>
+        </p:blipFill>
+        <p:spPr>
+          <a:xfrm>
+            <a:off x="1642282" y="3151175"/>
+            <a:ext cx="6467335" cy="3427077"/>
+          </a:xfrm>
+          <a:prstGeom prst="rect">
+            <a:avLst/>
+          </a:prstGeom>
+        </p:spPr>
+      </p:pic>
     </p:spTree>
     <p:extLst>
       <p:ext uri="{BB962C8B-B14F-4D97-AF65-F5344CB8AC3E}">
-        <p14:creationId xmlns:p14="http://schemas.microsoft.com/office/powerpoint/2010/main" val="1865976428"/>
+        <p14:creationId xmlns:p14="http://schemas.microsoft.com/office/powerpoint/2010/main" val="3308064268"/>
       </p:ext>
     </p:extLst>
   </p:cSld>
@@ -9107,6 +9622,640 @@
             <p:ph type="title"/>
           </p:nvPr>
         </p:nvSpPr>
+        <p:spPr>
+          <a:xfrm>
+            <a:off x="1249680" y="183832"/>
+            <a:ext cx="9692640" cy="606738"/>
+          </a:xfrm>
+        </p:spPr>
+        <p:txBody>
+          <a:bodyPr>
+            <a:normAutofit/>
+          </a:bodyPr>
+          <a:lstStyle/>
+          <a:p>
+            <a:r>
+              <a:rPr lang="en-NZ" sz="2800" dirty="0">
+                <a:latin typeface="Abadi" panose="020B0604020104020204" pitchFamily="34" charset="0"/>
+              </a:rPr>
+              <a:t>Iterative Improvement (Navbar V1)</a:t>
+            </a:r>
+          </a:p>
+        </p:txBody>
+      </p:sp>
+      <p:graphicFrame>
+        <p:nvGraphicFramePr>
+          <p:cNvPr id="3" name="Table 2">
+            <a:extLst>
+              <a:ext uri="{FF2B5EF4-FFF2-40B4-BE49-F238E27FC236}">
+                <a16:creationId xmlns:a16="http://schemas.microsoft.com/office/drawing/2014/main" id="{1A9023FA-33FD-5552-47F6-6A8D6E948421}"/>
+              </a:ext>
+            </a:extLst>
+          </p:cNvPr>
+          <p:cNvGraphicFramePr>
+            <a:graphicFrameLocks noGrp="1"/>
+          </p:cNvGraphicFramePr>
+          <p:nvPr>
+            <p:extLst>
+              <p:ext uri="{D42A27DB-BD31-4B8C-83A1-F6EECF244321}">
+                <p14:modId xmlns:p14="http://schemas.microsoft.com/office/powerpoint/2010/main" val="632603800"/>
+              </p:ext>
+            </p:extLst>
+          </p:nvPr>
+        </p:nvGraphicFramePr>
+        <p:xfrm>
+          <a:off x="1249680" y="1031751"/>
+          <a:ext cx="9430604" cy="1861575"/>
+        </p:xfrm>
+        <a:graphic>
+          <a:graphicData uri="http://schemas.openxmlformats.org/drawingml/2006/table">
+            <a:tbl>
+              <a:tblPr firstRow="1" bandRow="1">
+                <a:tableStyleId>{5C22544A-7EE6-4342-B048-85BDC9FD1C3A}</a:tableStyleId>
+              </a:tblPr>
+              <a:tblGrid>
+                <a:gridCol w="4715302">
+                  <a:extLst>
+                    <a:ext uri="{9D8B030D-6E8A-4147-A177-3AD203B41FA5}">
+                      <a16:colId xmlns:a16="http://schemas.microsoft.com/office/drawing/2014/main" val="2104603021"/>
+                    </a:ext>
+                  </a:extLst>
+                </a:gridCol>
+                <a:gridCol w="4715302">
+                  <a:extLst>
+                    <a:ext uri="{9D8B030D-6E8A-4147-A177-3AD203B41FA5}">
+                      <a16:colId xmlns:a16="http://schemas.microsoft.com/office/drawing/2014/main" val="2097243175"/>
+                    </a:ext>
+                  </a:extLst>
+                </a:gridCol>
+              </a:tblGrid>
+              <a:tr h="1861575">
+                <a:tc>
+                  <a:txBody>
+                    <a:bodyPr/>
+                    <a:lstStyle/>
+                    <a:p>
+                      <a:pPr marL="0" marR="0" lvl="0" indent="0" algn="l" defTabSz="914400" rtl="0" eaLnBrk="1" fontAlgn="auto" latinLnBrk="0" hangingPunct="1">
+                        <a:lnSpc>
+                          <a:spcPct val="100000"/>
+                        </a:lnSpc>
+                        <a:spcBef>
+                          <a:spcPts val="0"/>
+                        </a:spcBef>
+                        <a:spcAft>
+                          <a:spcPts val="0"/>
+                        </a:spcAft>
+                        <a:buClrTx/>
+                        <a:buSzTx/>
+                        <a:buFontTx/>
+                        <a:buNone/>
+                        <a:tabLst/>
+                        <a:defRPr/>
+                      </a:pPr>
+                      <a:r>
+                        <a:rPr lang="en-NZ" dirty="0">
+                          <a:latin typeface="Abadi" panose="020B0604020104020204" pitchFamily="34" charset="0"/>
+                        </a:rPr>
+                        <a:t>I felt that the headings on my website were not bold enough. Looking at my code I saw that the bootstrap was written as ‘display-4’ which gave it that look. </a:t>
+                      </a:r>
+                    </a:p>
+                    <a:p>
+                      <a:endParaRPr lang="en-NZ" dirty="0">
+                        <a:latin typeface="Abadi" panose="020B0604020104020204" pitchFamily="34" charset="0"/>
+                      </a:endParaRPr>
+                    </a:p>
+                    <a:p>
+                      <a:endParaRPr lang="en-NZ" dirty="0">
+                        <a:latin typeface="Abadi" panose="020B0604020104020204" pitchFamily="34" charset="0"/>
+                      </a:endParaRPr>
+                    </a:p>
+                  </a:txBody>
+                  <a:tcPr/>
+                </a:tc>
+                <a:tc>
+                  <a:txBody>
+                    <a:bodyPr/>
+                    <a:lstStyle/>
+                    <a:p>
+                      <a:r>
+                        <a:rPr lang="en-NZ" dirty="0">
+                          <a:latin typeface="Abadi" panose="020B0604020104020204" pitchFamily="34" charset="0"/>
+                        </a:rPr>
+                        <a:t>Instead, I decided to remove that and just simply make the headings bolder even if the size of the headings are smaller. I believe it makes the headings pop out more. </a:t>
+                      </a:r>
+                    </a:p>
+                  </a:txBody>
+                  <a:tcPr/>
+                </a:tc>
+                <a:extLst>
+                  <a:ext uri="{0D108BD9-81ED-4DB2-BD59-A6C34878D82A}">
+                    <a16:rowId xmlns:a16="http://schemas.microsoft.com/office/drawing/2014/main" val="2765992196"/>
+                  </a:ext>
+                </a:extLst>
+              </a:tr>
+            </a:tbl>
+          </a:graphicData>
+        </a:graphic>
+      </p:graphicFrame>
+      <p:pic>
+        <p:nvPicPr>
+          <p:cNvPr id="5" name="Picture 4">
+            <a:extLst>
+              <a:ext uri="{FF2B5EF4-FFF2-40B4-BE49-F238E27FC236}">
+                <a16:creationId xmlns:a16="http://schemas.microsoft.com/office/drawing/2014/main" id="{12BDD781-01D9-C766-A286-AC924C10E72F}"/>
+              </a:ext>
+            </a:extLst>
+          </p:cNvPr>
+          <p:cNvPicPr>
+            <a:picLocks noChangeAspect="1"/>
+          </p:cNvPicPr>
+          <p:nvPr/>
+        </p:nvPicPr>
+        <p:blipFill>
+          <a:blip r:embed="rId2"/>
+          <a:stretch>
+            <a:fillRect/>
+          </a:stretch>
+        </p:blipFill>
+        <p:spPr>
+          <a:xfrm>
+            <a:off x="6096000" y="2893326"/>
+            <a:ext cx="4324954" cy="3801005"/>
+          </a:xfrm>
+          <a:prstGeom prst="rect">
+            <a:avLst/>
+          </a:prstGeom>
+        </p:spPr>
+      </p:pic>
+      <p:pic>
+        <p:nvPicPr>
+          <p:cNvPr id="7" name="Picture 6">
+            <a:extLst>
+              <a:ext uri="{FF2B5EF4-FFF2-40B4-BE49-F238E27FC236}">
+                <a16:creationId xmlns:a16="http://schemas.microsoft.com/office/drawing/2014/main" id="{7509F016-81E3-35B8-29C2-AF76B1B23F01}"/>
+              </a:ext>
+            </a:extLst>
+          </p:cNvPr>
+          <p:cNvPicPr>
+            <a:picLocks noChangeAspect="1"/>
+          </p:cNvPicPr>
+          <p:nvPr/>
+        </p:nvPicPr>
+        <p:blipFill>
+          <a:blip r:embed="rId3"/>
+          <a:stretch>
+            <a:fillRect/>
+          </a:stretch>
+        </p:blipFill>
+        <p:spPr>
+          <a:xfrm>
+            <a:off x="1406927" y="2330162"/>
+            <a:ext cx="4429743" cy="4344006"/>
+          </a:xfrm>
+          <a:prstGeom prst="rect">
+            <a:avLst/>
+          </a:prstGeom>
+        </p:spPr>
+      </p:pic>
+    </p:spTree>
+    <p:extLst>
+      <p:ext uri="{BB962C8B-B14F-4D97-AF65-F5344CB8AC3E}">
+        <p14:creationId xmlns:p14="http://schemas.microsoft.com/office/powerpoint/2010/main" val="1650522295"/>
+      </p:ext>
+    </p:extLst>
+  </p:cSld>
+  <p:clrMapOvr>
+    <a:masterClrMapping/>
+  </p:clrMapOvr>
+</p:sld>
+</file>
+
+<file path=ppt/slides/slide31.xml><?xml version="1.0" encoding="utf-8"?>
+<p:sld xmlns:a="http://schemas.openxmlformats.org/drawingml/2006/main" xmlns:r="http://schemas.openxmlformats.org/officeDocument/2006/relationships" xmlns:p="http://schemas.openxmlformats.org/presentationml/2006/main">
+  <p:cSld>
+    <p:spTree>
+      <p:nvGrpSpPr>
+        <p:cNvPr id="1" name=""/>
+        <p:cNvGrpSpPr/>
+        <p:nvPr/>
+      </p:nvGrpSpPr>
+      <p:grpSpPr>
+        <a:xfrm>
+          <a:off x="0" y="0"/>
+          <a:ext cx="0" cy="0"/>
+          <a:chOff x="0" y="0"/>
+          <a:chExt cx="0" cy="0"/>
+        </a:xfrm>
+      </p:grpSpPr>
+      <p:sp>
+        <p:nvSpPr>
+          <p:cNvPr id="2" name="Title 1"/>
+          <p:cNvSpPr>
+            <a:spLocks noGrp="1"/>
+          </p:cNvSpPr>
+          <p:nvPr>
+            <p:ph type="title"/>
+          </p:nvPr>
+        </p:nvSpPr>
+        <p:spPr>
+          <a:xfrm>
+            <a:off x="1249680" y="183832"/>
+            <a:ext cx="9692640" cy="606738"/>
+          </a:xfrm>
+        </p:spPr>
+        <p:txBody>
+          <a:bodyPr>
+            <a:normAutofit/>
+          </a:bodyPr>
+          <a:lstStyle/>
+          <a:p>
+            <a:r>
+              <a:rPr lang="en-NZ" sz="2800" dirty="0">
+                <a:latin typeface="Abadi" panose="020B0604020104020204" pitchFamily="34" charset="0"/>
+              </a:rPr>
+              <a:t>Iterative Improvement (Navbar V1)</a:t>
+            </a:r>
+          </a:p>
+        </p:txBody>
+      </p:sp>
+      <p:graphicFrame>
+        <p:nvGraphicFramePr>
+          <p:cNvPr id="3" name="Table 2">
+            <a:extLst>
+              <a:ext uri="{FF2B5EF4-FFF2-40B4-BE49-F238E27FC236}">
+                <a16:creationId xmlns:a16="http://schemas.microsoft.com/office/drawing/2014/main" id="{1A9023FA-33FD-5552-47F6-6A8D6E948421}"/>
+              </a:ext>
+            </a:extLst>
+          </p:cNvPr>
+          <p:cNvGraphicFramePr>
+            <a:graphicFrameLocks noGrp="1"/>
+          </p:cNvGraphicFramePr>
+          <p:nvPr/>
+        </p:nvGraphicFramePr>
+        <p:xfrm>
+          <a:off x="1249680" y="1031751"/>
+          <a:ext cx="9430604" cy="1861575"/>
+        </p:xfrm>
+        <a:graphic>
+          <a:graphicData uri="http://schemas.openxmlformats.org/drawingml/2006/table">
+            <a:tbl>
+              <a:tblPr firstRow="1" bandRow="1">
+                <a:tableStyleId>{5C22544A-7EE6-4342-B048-85BDC9FD1C3A}</a:tableStyleId>
+              </a:tblPr>
+              <a:tblGrid>
+                <a:gridCol w="4715302">
+                  <a:extLst>
+                    <a:ext uri="{9D8B030D-6E8A-4147-A177-3AD203B41FA5}">
+                      <a16:colId xmlns:a16="http://schemas.microsoft.com/office/drawing/2014/main" val="2104603021"/>
+                    </a:ext>
+                  </a:extLst>
+                </a:gridCol>
+                <a:gridCol w="4715302">
+                  <a:extLst>
+                    <a:ext uri="{9D8B030D-6E8A-4147-A177-3AD203B41FA5}">
+                      <a16:colId xmlns:a16="http://schemas.microsoft.com/office/drawing/2014/main" val="2097243175"/>
+                    </a:ext>
+                  </a:extLst>
+                </a:gridCol>
+              </a:tblGrid>
+              <a:tr h="1861575">
+                <a:tc>
+                  <a:txBody>
+                    <a:bodyPr/>
+                    <a:lstStyle/>
+                    <a:p>
+                      <a:pPr marL="0" marR="0" lvl="0" indent="0" algn="l" defTabSz="914400" rtl="0" eaLnBrk="1" fontAlgn="auto" latinLnBrk="0" hangingPunct="1">
+                        <a:lnSpc>
+                          <a:spcPct val="100000"/>
+                        </a:lnSpc>
+                        <a:spcBef>
+                          <a:spcPts val="0"/>
+                        </a:spcBef>
+                        <a:spcAft>
+                          <a:spcPts val="0"/>
+                        </a:spcAft>
+                        <a:buClrTx/>
+                        <a:buSzTx/>
+                        <a:buFontTx/>
+                        <a:buNone/>
+                        <a:tabLst/>
+                        <a:defRPr/>
+                      </a:pPr>
+                      <a:r>
+                        <a:rPr lang="en-NZ" dirty="0">
+                          <a:latin typeface="Abadi" panose="020B0604020104020204" pitchFamily="34" charset="0"/>
+                        </a:rPr>
+                        <a:t>I felt that the headings on my website were not bold enough. Looking at my code I saw that the bootstrap was written as ‘display-4’ which gave it that look. </a:t>
+                      </a:r>
+                    </a:p>
+                    <a:p>
+                      <a:endParaRPr lang="en-NZ" dirty="0">
+                        <a:latin typeface="Abadi" panose="020B0604020104020204" pitchFamily="34" charset="0"/>
+                      </a:endParaRPr>
+                    </a:p>
+                    <a:p>
+                      <a:endParaRPr lang="en-NZ" dirty="0">
+                        <a:latin typeface="Abadi" panose="020B0604020104020204" pitchFamily="34" charset="0"/>
+                      </a:endParaRPr>
+                    </a:p>
+                  </a:txBody>
+                  <a:tcPr/>
+                </a:tc>
+                <a:tc>
+                  <a:txBody>
+                    <a:bodyPr/>
+                    <a:lstStyle/>
+                    <a:p>
+                      <a:r>
+                        <a:rPr lang="en-NZ" dirty="0">
+                          <a:latin typeface="Abadi" panose="020B0604020104020204" pitchFamily="34" charset="0"/>
+                        </a:rPr>
+                        <a:t>Instead, I decided to remove that and just simply make the headings bolder even if the size of the headings are smaller. I believe it makes the headings pop out more. </a:t>
+                      </a:r>
+                    </a:p>
+                  </a:txBody>
+                  <a:tcPr/>
+                </a:tc>
+                <a:extLst>
+                  <a:ext uri="{0D108BD9-81ED-4DB2-BD59-A6C34878D82A}">
+                    <a16:rowId xmlns:a16="http://schemas.microsoft.com/office/drawing/2014/main" val="2765992196"/>
+                  </a:ext>
+                </a:extLst>
+              </a:tr>
+            </a:tbl>
+          </a:graphicData>
+        </a:graphic>
+      </p:graphicFrame>
+      <p:pic>
+        <p:nvPicPr>
+          <p:cNvPr id="6" name="Picture 5">
+            <a:extLst>
+              <a:ext uri="{FF2B5EF4-FFF2-40B4-BE49-F238E27FC236}">
+                <a16:creationId xmlns:a16="http://schemas.microsoft.com/office/drawing/2014/main" id="{48B898A2-1128-0226-411D-26C6ECB90C97}"/>
+              </a:ext>
+            </a:extLst>
+          </p:cNvPr>
+          <p:cNvPicPr>
+            <a:picLocks noChangeAspect="1"/>
+          </p:cNvPicPr>
+          <p:nvPr/>
+        </p:nvPicPr>
+        <p:blipFill>
+          <a:blip r:embed="rId2"/>
+          <a:stretch>
+            <a:fillRect/>
+          </a:stretch>
+        </p:blipFill>
+        <p:spPr>
+          <a:xfrm>
+            <a:off x="5596492" y="2859207"/>
+            <a:ext cx="5496692" cy="2638793"/>
+          </a:xfrm>
+          <a:prstGeom prst="rect">
+            <a:avLst/>
+          </a:prstGeom>
+        </p:spPr>
+      </p:pic>
+      <p:pic>
+        <p:nvPicPr>
+          <p:cNvPr id="9" name="Picture 8">
+            <a:extLst>
+              <a:ext uri="{FF2B5EF4-FFF2-40B4-BE49-F238E27FC236}">
+                <a16:creationId xmlns:a16="http://schemas.microsoft.com/office/drawing/2014/main" id="{2EDAD458-D1A0-5E5C-EB30-220B0AC8997B}"/>
+              </a:ext>
+            </a:extLst>
+          </p:cNvPr>
+          <p:cNvPicPr>
+            <a:picLocks noChangeAspect="1"/>
+          </p:cNvPicPr>
+          <p:nvPr/>
+        </p:nvPicPr>
+        <p:blipFill>
+          <a:blip r:embed="rId3"/>
+          <a:stretch>
+            <a:fillRect/>
+          </a:stretch>
+        </p:blipFill>
+        <p:spPr>
+          <a:xfrm>
+            <a:off x="296036" y="2995163"/>
+            <a:ext cx="5054484" cy="1339438"/>
+          </a:xfrm>
+          <a:prstGeom prst="rect">
+            <a:avLst/>
+          </a:prstGeom>
+        </p:spPr>
+      </p:pic>
+    </p:spTree>
+    <p:extLst>
+      <p:ext uri="{BB962C8B-B14F-4D97-AF65-F5344CB8AC3E}">
+        <p14:creationId xmlns:p14="http://schemas.microsoft.com/office/powerpoint/2010/main" val="1246263540"/>
+      </p:ext>
+    </p:extLst>
+  </p:cSld>
+  <p:clrMapOvr>
+    <a:masterClrMapping/>
+  </p:clrMapOvr>
+</p:sld>
+</file>
+
+<file path=ppt/slides/slide32.xml><?xml version="1.0" encoding="utf-8"?>
+<p:sld xmlns:a="http://schemas.openxmlformats.org/drawingml/2006/main" xmlns:r="http://schemas.openxmlformats.org/officeDocument/2006/relationships" xmlns:p="http://schemas.openxmlformats.org/presentationml/2006/main">
+  <p:cSld>
+    <p:spTree>
+      <p:nvGrpSpPr>
+        <p:cNvPr id="1" name=""/>
+        <p:cNvGrpSpPr/>
+        <p:nvPr/>
+      </p:nvGrpSpPr>
+      <p:grpSpPr>
+        <a:xfrm>
+          <a:off x="0" y="0"/>
+          <a:ext cx="0" cy="0"/>
+          <a:chOff x="0" y="0"/>
+          <a:chExt cx="0" cy="0"/>
+        </a:xfrm>
+      </p:grpSpPr>
+      <p:sp>
+        <p:nvSpPr>
+          <p:cNvPr id="2" name="Title 1"/>
+          <p:cNvSpPr>
+            <a:spLocks noGrp="1"/>
+          </p:cNvSpPr>
+          <p:nvPr>
+            <p:ph type="title"/>
+          </p:nvPr>
+        </p:nvSpPr>
+        <p:spPr/>
+        <p:txBody>
+          <a:bodyPr>
+            <a:normAutofit/>
+          </a:bodyPr>
+          <a:lstStyle/>
+          <a:p>
+            <a:r>
+              <a:rPr lang="en-NZ" sz="2800" dirty="0">
+                <a:latin typeface="Abadi" panose="020B0604020104020204" pitchFamily="34" charset="0"/>
+              </a:rPr>
+              <a:t>Version Control</a:t>
+            </a:r>
+          </a:p>
+        </p:txBody>
+      </p:sp>
+      <p:sp>
+        <p:nvSpPr>
+          <p:cNvPr id="3" name="Content Placeholder 2"/>
+          <p:cNvSpPr>
+            <a:spLocks noGrp="1"/>
+          </p:cNvSpPr>
+          <p:nvPr>
+            <p:ph idx="1"/>
+          </p:nvPr>
+        </p:nvSpPr>
+        <p:spPr/>
+        <p:txBody>
+          <a:bodyPr>
+            <a:normAutofit/>
+          </a:bodyPr>
+          <a:lstStyle/>
+          <a:p>
+            <a:pPr marL="0" indent="0">
+              <a:buNone/>
+            </a:pPr>
+            <a:r>
+              <a:rPr lang="en-NZ" sz="2000" dirty="0">
+                <a:latin typeface="Abadi" panose="020B0604020104020204" pitchFamily="34" charset="0"/>
+              </a:rPr>
+              <a:t>Show how you have used version control throughout the design, development, and testing process.</a:t>
+            </a:r>
+          </a:p>
+        </p:txBody>
+      </p:sp>
+    </p:spTree>
+    <p:extLst>
+      <p:ext uri="{BB962C8B-B14F-4D97-AF65-F5344CB8AC3E}">
+        <p14:creationId xmlns:p14="http://schemas.microsoft.com/office/powerpoint/2010/main" val="2812247241"/>
+      </p:ext>
+    </p:extLst>
+  </p:cSld>
+  <p:clrMapOvr>
+    <a:masterClrMapping/>
+  </p:clrMapOvr>
+</p:sld>
+</file>
+
+<file path=ppt/slides/slide33.xml><?xml version="1.0" encoding="utf-8"?>
+<p:sld xmlns:a="http://schemas.openxmlformats.org/drawingml/2006/main" xmlns:r="http://schemas.openxmlformats.org/officeDocument/2006/relationships" xmlns:p="http://schemas.openxmlformats.org/presentationml/2006/main">
+  <p:cSld>
+    <p:spTree>
+      <p:nvGrpSpPr>
+        <p:cNvPr id="1" name=""/>
+        <p:cNvGrpSpPr/>
+        <p:nvPr/>
+      </p:nvGrpSpPr>
+      <p:grpSpPr>
+        <a:xfrm>
+          <a:off x="0" y="0"/>
+          <a:ext cx="0" cy="0"/>
+          <a:chOff x="0" y="0"/>
+          <a:chExt cx="0" cy="0"/>
+        </a:xfrm>
+      </p:grpSpPr>
+      <p:sp>
+        <p:nvSpPr>
+          <p:cNvPr id="2" name="Title 1"/>
+          <p:cNvSpPr>
+            <a:spLocks noGrp="1"/>
+          </p:cNvSpPr>
+          <p:nvPr>
+            <p:ph type="title"/>
+          </p:nvPr>
+        </p:nvSpPr>
+        <p:spPr/>
+        <p:txBody>
+          <a:bodyPr>
+            <a:normAutofit/>
+          </a:bodyPr>
+          <a:lstStyle/>
+          <a:p>
+            <a:r>
+              <a:rPr lang="en-NZ" sz="2800" dirty="0">
+                <a:latin typeface="Abadi" panose="020B0604020104020204" pitchFamily="34" charset="0"/>
+              </a:rPr>
+              <a:t>GitHub Commits</a:t>
+            </a:r>
+          </a:p>
+        </p:txBody>
+      </p:sp>
+      <p:sp>
+        <p:nvSpPr>
+          <p:cNvPr id="3" name="Content Placeholder 2"/>
+          <p:cNvSpPr>
+            <a:spLocks noGrp="1"/>
+          </p:cNvSpPr>
+          <p:nvPr>
+            <p:ph idx="1"/>
+          </p:nvPr>
+        </p:nvSpPr>
+        <p:spPr/>
+        <p:txBody>
+          <a:bodyPr>
+            <a:normAutofit/>
+          </a:bodyPr>
+          <a:lstStyle/>
+          <a:p>
+            <a:pPr marL="0" indent="0">
+              <a:buNone/>
+            </a:pPr>
+            <a:r>
+              <a:rPr lang="en-NZ" sz="2000" dirty="0">
+                <a:latin typeface="Abadi" panose="020B0604020104020204" pitchFamily="34" charset="0"/>
+              </a:rPr>
+              <a:t>Show how you have used GitHub throughout the design, development, and testing process.</a:t>
+            </a:r>
+          </a:p>
+        </p:txBody>
+      </p:sp>
+    </p:spTree>
+    <p:extLst>
+      <p:ext uri="{BB962C8B-B14F-4D97-AF65-F5344CB8AC3E}">
+        <p14:creationId xmlns:p14="http://schemas.microsoft.com/office/powerpoint/2010/main" val="1865976428"/>
+      </p:ext>
+    </p:extLst>
+  </p:cSld>
+  <p:clrMapOvr>
+    <a:masterClrMapping/>
+  </p:clrMapOvr>
+</p:sld>
+</file>
+
+<file path=ppt/slides/slide34.xml><?xml version="1.0" encoding="utf-8"?>
+<p:sld xmlns:a="http://schemas.openxmlformats.org/drawingml/2006/main" xmlns:r="http://schemas.openxmlformats.org/officeDocument/2006/relationships" xmlns:p="http://schemas.openxmlformats.org/presentationml/2006/main">
+  <p:cSld>
+    <p:spTree>
+      <p:nvGrpSpPr>
+        <p:cNvPr id="1" name=""/>
+        <p:cNvGrpSpPr/>
+        <p:nvPr/>
+      </p:nvGrpSpPr>
+      <p:grpSpPr>
+        <a:xfrm>
+          <a:off x="0" y="0"/>
+          <a:ext cx="0" cy="0"/>
+          <a:chOff x="0" y="0"/>
+          <a:chExt cx="0" cy="0"/>
+        </a:xfrm>
+      </p:grpSpPr>
+      <p:sp>
+        <p:nvSpPr>
+          <p:cNvPr id="2" name="Title 1"/>
+          <p:cNvSpPr>
+            <a:spLocks noGrp="1"/>
+          </p:cNvSpPr>
+          <p:nvPr>
+            <p:ph type="title"/>
+          </p:nvPr>
+        </p:nvSpPr>
         <p:spPr/>
         <p:txBody>
           <a:bodyPr>
@@ -9165,7 +10314,7 @@
 </p:sld>
 </file>
 
-<file path=ppt/slides/slide31.xml><?xml version="1.0" encoding="utf-8"?>
+<file path=ppt/slides/slide35.xml><?xml version="1.0" encoding="utf-8"?>
 <p:sld xmlns:a="http://schemas.openxmlformats.org/drawingml/2006/main" xmlns:r="http://schemas.openxmlformats.org/officeDocument/2006/relationships" xmlns:p="http://schemas.openxmlformats.org/presentationml/2006/main">
   <p:cSld>
     <p:spTree>
@@ -9264,7 +10413,7 @@
 </p:sld>
 </file>
 
-<file path=ppt/slides/slide32.xml><?xml version="1.0" encoding="utf-8"?>
+<file path=ppt/slides/slide36.xml><?xml version="1.0" encoding="utf-8"?>
 <p:sld xmlns:a="http://schemas.openxmlformats.org/drawingml/2006/main" xmlns:r="http://schemas.openxmlformats.org/officeDocument/2006/relationships" xmlns:p="http://schemas.openxmlformats.org/presentationml/2006/main">
   <p:cSld>
     <p:spTree>

</xml_diff>

<commit_message>
Made Navbar stick to top of page
</commit_message>
<xml_diff>
--- a/AS91903_91906_Evidence_Joaquin_Badenas.pptx
+++ b/AS91903_91906_Evidence_Joaquin_Badenas.pptx
@@ -36,11 +36,14 @@
     <p:sldId id="298" r:id="rId30"/>
     <p:sldId id="299" r:id="rId31"/>
     <p:sldId id="300" r:id="rId32"/>
-    <p:sldId id="275" r:id="rId33"/>
-    <p:sldId id="283" r:id="rId34"/>
-    <p:sldId id="265" r:id="rId35"/>
-    <p:sldId id="269" r:id="rId36"/>
-    <p:sldId id="276" r:id="rId37"/>
+    <p:sldId id="302" r:id="rId33"/>
+    <p:sldId id="303" r:id="rId34"/>
+    <p:sldId id="301" r:id="rId35"/>
+    <p:sldId id="275" r:id="rId36"/>
+    <p:sldId id="283" r:id="rId37"/>
+    <p:sldId id="265" r:id="rId38"/>
+    <p:sldId id="269" r:id="rId39"/>
+    <p:sldId id="276" r:id="rId40"/>
   </p:sldIdLst>
   <p:sldSz cx="12192000" cy="6858000"/>
   <p:notesSz cx="6858000" cy="9144000"/>
@@ -150,7 +153,7 @@
 <file path=ppt/revisionInfo.xml><?xml version="1.0" encoding="utf-8"?>
 <p1510:revInfo xmlns:a="http://schemas.openxmlformats.org/drawingml/2006/main" xmlns:r="http://schemas.openxmlformats.org/officeDocument/2006/relationships" xmlns:p1510="http://schemas.microsoft.com/office/powerpoint/2015/10/main">
   <p1510:revLst>
-    <p1510:client id="{4F53BFBD-1E38-412E-AE7B-7E5D3B30168C}" v="23" dt="2024-07-25T22:47:44.810"/>
+    <p1510:client id="{4F53BFBD-1E38-412E-AE7B-7E5D3B30168C}" v="27" dt="2024-07-26T06:43:45.139"/>
   </p1510:revLst>
 </p1510:revInfo>
 </file>
@@ -1596,7 +1599,7 @@
   <pc:docChgLst>
     <pc:chgData name="Joaquin Badenas" userId="5cb29fd719aebf04" providerId="LiveId" clId="{4F53BFBD-1E38-412E-AE7B-7E5D3B30168C}"/>
     <pc:docChg chg="undo custSel addSld delSld modSld sldOrd">
-      <pc:chgData name="Joaquin Badenas" userId="5cb29fd719aebf04" providerId="LiveId" clId="{4F53BFBD-1E38-412E-AE7B-7E5D3B30168C}" dt="2024-07-25T22:51:46.495" v="4635" actId="1076"/>
+      <pc:chgData name="Joaquin Badenas" userId="5cb29fd719aebf04" providerId="LiveId" clId="{4F53BFBD-1E38-412E-AE7B-7E5D3B30168C}" dt="2024-07-26T06:51:12.598" v="5789" actId="20577"/>
       <pc:docMkLst>
         <pc:docMk/>
       </pc:docMkLst>
@@ -2523,6 +2526,123 @@
             <pc:docMk/>
             <pc:sldMk cId="1246263540" sldId="300"/>
             <ac:picMk id="9" creationId="{2EDAD458-D1A0-5E5C-EB30-220B0AC8997B}"/>
+          </ac:picMkLst>
+        </pc:picChg>
+      </pc:sldChg>
+      <pc:sldChg chg="delSp modSp add mod">
+        <pc:chgData name="Joaquin Badenas" userId="5cb29fd719aebf04" providerId="LiveId" clId="{4F53BFBD-1E38-412E-AE7B-7E5D3B30168C}" dt="2024-07-26T06:33:01.134" v="5066" actId="20577"/>
+        <pc:sldMkLst>
+          <pc:docMk/>
+          <pc:sldMk cId="3154286637" sldId="301"/>
+        </pc:sldMkLst>
+        <pc:spChg chg="mod">
+          <ac:chgData name="Joaquin Badenas" userId="5cb29fd719aebf04" providerId="LiveId" clId="{4F53BFBD-1E38-412E-AE7B-7E5D3B30168C}" dt="2024-07-26T06:31:29.837" v="4642" actId="20577"/>
+          <ac:spMkLst>
+            <pc:docMk/>
+            <pc:sldMk cId="3154286637" sldId="301"/>
+            <ac:spMk id="2" creationId="{00000000-0000-0000-0000-000000000000}"/>
+          </ac:spMkLst>
+        </pc:spChg>
+        <pc:graphicFrameChg chg="modGraphic">
+          <ac:chgData name="Joaquin Badenas" userId="5cb29fd719aebf04" providerId="LiveId" clId="{4F53BFBD-1E38-412E-AE7B-7E5D3B30168C}" dt="2024-07-26T06:33:01.134" v="5066" actId="20577"/>
+          <ac:graphicFrameMkLst>
+            <pc:docMk/>
+            <pc:sldMk cId="3154286637" sldId="301"/>
+            <ac:graphicFrameMk id="3" creationId="{1A9023FA-33FD-5552-47F6-6A8D6E948421}"/>
+          </ac:graphicFrameMkLst>
+        </pc:graphicFrameChg>
+        <pc:picChg chg="del">
+          <ac:chgData name="Joaquin Badenas" userId="5cb29fd719aebf04" providerId="LiveId" clId="{4F53BFBD-1E38-412E-AE7B-7E5D3B30168C}" dt="2024-07-26T03:11:19.762" v="4638" actId="478"/>
+          <ac:picMkLst>
+            <pc:docMk/>
+            <pc:sldMk cId="3154286637" sldId="301"/>
+            <ac:picMk id="6" creationId="{48B898A2-1128-0226-411D-26C6ECB90C97}"/>
+          </ac:picMkLst>
+        </pc:picChg>
+        <pc:picChg chg="del">
+          <ac:chgData name="Joaquin Badenas" userId="5cb29fd719aebf04" providerId="LiveId" clId="{4F53BFBD-1E38-412E-AE7B-7E5D3B30168C}" dt="2024-07-26T03:11:19.125" v="4637" actId="478"/>
+          <ac:picMkLst>
+            <pc:docMk/>
+            <pc:sldMk cId="3154286637" sldId="301"/>
+            <ac:picMk id="9" creationId="{2EDAD458-D1A0-5E5C-EB30-220B0AC8997B}"/>
+          </ac:picMkLst>
+        </pc:picChg>
+      </pc:sldChg>
+      <pc:sldChg chg="addSp modSp add mod ord">
+        <pc:chgData name="Joaquin Badenas" userId="5cb29fd719aebf04" providerId="LiveId" clId="{4F53BFBD-1E38-412E-AE7B-7E5D3B30168C}" dt="2024-07-26T06:43:58.049" v="5420" actId="1076"/>
+        <pc:sldMkLst>
+          <pc:docMk/>
+          <pc:sldMk cId="2071227590" sldId="302"/>
+        </pc:sldMkLst>
+        <pc:graphicFrameChg chg="modGraphic">
+          <ac:chgData name="Joaquin Badenas" userId="5cb29fd719aebf04" providerId="LiveId" clId="{4F53BFBD-1E38-412E-AE7B-7E5D3B30168C}" dt="2024-07-26T06:38:41.403" v="5405" actId="20577"/>
+          <ac:graphicFrameMkLst>
+            <pc:docMk/>
+            <pc:sldMk cId="2071227590" sldId="302"/>
+            <ac:graphicFrameMk id="3" creationId="{1A9023FA-33FD-5552-47F6-6A8D6E948421}"/>
+          </ac:graphicFrameMkLst>
+        </pc:graphicFrameChg>
+        <pc:picChg chg="add mod">
+          <ac:chgData name="Joaquin Badenas" userId="5cb29fd719aebf04" providerId="LiveId" clId="{4F53BFBD-1E38-412E-AE7B-7E5D3B30168C}" dt="2024-07-26T06:42:18.610" v="5409" actId="1076"/>
+          <ac:picMkLst>
+            <pc:docMk/>
+            <pc:sldMk cId="2071227590" sldId="302"/>
+            <ac:picMk id="5" creationId="{D7172DA1-78FB-6B4F-E4E1-399B4F302BC9}"/>
+          </ac:picMkLst>
+        </pc:picChg>
+        <pc:picChg chg="add mod">
+          <ac:chgData name="Joaquin Badenas" userId="5cb29fd719aebf04" providerId="LiveId" clId="{4F53BFBD-1E38-412E-AE7B-7E5D3B30168C}" dt="2024-07-26T06:42:55.440" v="5413" actId="1076"/>
+          <ac:picMkLst>
+            <pc:docMk/>
+            <pc:sldMk cId="2071227590" sldId="302"/>
+            <ac:picMk id="7" creationId="{7D6F6499-07E5-BD97-40D1-7DC6AF735044}"/>
+          </ac:picMkLst>
+        </pc:picChg>
+        <pc:picChg chg="add mod">
+          <ac:chgData name="Joaquin Badenas" userId="5cb29fd719aebf04" providerId="LiveId" clId="{4F53BFBD-1E38-412E-AE7B-7E5D3B30168C}" dt="2024-07-26T06:43:58.049" v="5420" actId="1076"/>
+          <ac:picMkLst>
+            <pc:docMk/>
+            <pc:sldMk cId="2071227590" sldId="302"/>
+            <ac:picMk id="8" creationId="{DD2ECE51-250C-1841-8162-A4FE5519B08D}"/>
+          </ac:picMkLst>
+        </pc:picChg>
+      </pc:sldChg>
+      <pc:sldChg chg="addSp delSp modSp add mod">
+        <pc:chgData name="Joaquin Badenas" userId="5cb29fd719aebf04" providerId="LiveId" clId="{4F53BFBD-1E38-412E-AE7B-7E5D3B30168C}" dt="2024-07-26T06:51:12.598" v="5789" actId="20577"/>
+        <pc:sldMkLst>
+          <pc:docMk/>
+          <pc:sldMk cId="3434099490" sldId="303"/>
+        </pc:sldMkLst>
+        <pc:graphicFrameChg chg="modGraphic">
+          <ac:chgData name="Joaquin Badenas" userId="5cb29fd719aebf04" providerId="LiveId" clId="{4F53BFBD-1E38-412E-AE7B-7E5D3B30168C}" dt="2024-07-26T06:51:12.598" v="5789" actId="20577"/>
+          <ac:graphicFrameMkLst>
+            <pc:docMk/>
+            <pc:sldMk cId="3434099490" sldId="303"/>
+            <ac:graphicFrameMk id="3" creationId="{1A9023FA-33FD-5552-47F6-6A8D6E948421}"/>
+          </ac:graphicFrameMkLst>
+        </pc:graphicFrameChg>
+        <pc:picChg chg="del">
+          <ac:chgData name="Joaquin Badenas" userId="5cb29fd719aebf04" providerId="LiveId" clId="{4F53BFBD-1E38-412E-AE7B-7E5D3B30168C}" dt="2024-07-26T06:43:16.926" v="5415" actId="478"/>
+          <ac:picMkLst>
+            <pc:docMk/>
+            <pc:sldMk cId="3434099490" sldId="303"/>
+            <ac:picMk id="5" creationId="{D7172DA1-78FB-6B4F-E4E1-399B4F302BC9}"/>
+          </ac:picMkLst>
+        </pc:picChg>
+        <pc:picChg chg="add del mod">
+          <ac:chgData name="Joaquin Badenas" userId="5cb29fd719aebf04" providerId="LiveId" clId="{4F53BFBD-1E38-412E-AE7B-7E5D3B30168C}" dt="2024-07-26T06:44:04.039" v="5421" actId="478"/>
+          <ac:picMkLst>
+            <pc:docMk/>
+            <pc:sldMk cId="3434099490" sldId="303"/>
+            <ac:picMk id="6" creationId="{1D59BF0B-4482-2C01-FA5B-9D505767C3CF}"/>
+          </ac:picMkLst>
+        </pc:picChg>
+        <pc:picChg chg="del">
+          <ac:chgData name="Joaquin Badenas" userId="5cb29fd719aebf04" providerId="LiveId" clId="{4F53BFBD-1E38-412E-AE7B-7E5D3B30168C}" dt="2024-07-26T06:43:17.460" v="5416" actId="478"/>
+          <ac:picMkLst>
+            <pc:docMk/>
+            <pc:sldMk cId="3434099490" sldId="303"/>
+            <ac:picMk id="7" creationId="{7D6F6499-07E5-BD97-40D1-7DC6AF735044}"/>
           </ac:picMkLst>
         </pc:picChg>
       </pc:sldChg>
@@ -10086,7 +10206,12 @@
             <p:ph type="title"/>
           </p:nvPr>
         </p:nvSpPr>
-        <p:spPr/>
+        <p:spPr>
+          <a:xfrm>
+            <a:off x="1249680" y="183832"/>
+            <a:ext cx="9692640" cy="606738"/>
+          </a:xfrm>
+        </p:spPr>
         <p:txBody>
           <a:bodyPr>
             <a:normAutofit/>
@@ -10097,44 +10222,197 @@
               <a:rPr lang="en-NZ" sz="2800" dirty="0">
                 <a:latin typeface="Abadi" panose="020B0604020104020204" pitchFamily="34" charset="0"/>
               </a:rPr>
-              <a:t>Version Control</a:t>
+              <a:t>Iterative Improvement (Navbar V2)</a:t>
             </a:r>
           </a:p>
         </p:txBody>
       </p:sp>
-      <p:sp>
-        <p:nvSpPr>
-          <p:cNvPr id="3" name="Content Placeholder 2"/>
-          <p:cNvSpPr>
-            <a:spLocks noGrp="1"/>
-          </p:cNvSpPr>
-          <p:nvPr>
-            <p:ph idx="1"/>
-          </p:nvPr>
-        </p:nvSpPr>
-        <p:spPr/>
-        <p:txBody>
-          <a:bodyPr>
-            <a:normAutofit/>
-          </a:bodyPr>
-          <a:lstStyle/>
-          <a:p>
-            <a:pPr marL="0" indent="0">
-              <a:buNone/>
-            </a:pPr>
-            <a:r>
-              <a:rPr lang="en-NZ" sz="2000" dirty="0">
-                <a:latin typeface="Abadi" panose="020B0604020104020204" pitchFamily="34" charset="0"/>
-              </a:rPr>
-              <a:t>Show how you have used version control throughout the design, development, and testing process.</a:t>
-            </a:r>
-          </a:p>
-        </p:txBody>
-      </p:sp>
+      <p:graphicFrame>
+        <p:nvGraphicFramePr>
+          <p:cNvPr id="3" name="Table 2">
+            <a:extLst>
+              <a:ext uri="{FF2B5EF4-FFF2-40B4-BE49-F238E27FC236}">
+                <a16:creationId xmlns:a16="http://schemas.microsoft.com/office/drawing/2014/main" id="{1A9023FA-33FD-5552-47F6-6A8D6E948421}"/>
+              </a:ext>
+            </a:extLst>
+          </p:cNvPr>
+          <p:cNvGraphicFramePr>
+            <a:graphicFrameLocks noGrp="1"/>
+          </p:cNvGraphicFramePr>
+          <p:nvPr>
+            <p:extLst>
+              <p:ext uri="{D42A27DB-BD31-4B8C-83A1-F6EECF244321}">
+                <p14:modId xmlns:p14="http://schemas.microsoft.com/office/powerpoint/2010/main" val="3294698452"/>
+              </p:ext>
+            </p:extLst>
+          </p:nvPr>
+        </p:nvGraphicFramePr>
+        <p:xfrm>
+          <a:off x="1249680" y="1031751"/>
+          <a:ext cx="9430604" cy="1861575"/>
+        </p:xfrm>
+        <a:graphic>
+          <a:graphicData uri="http://schemas.openxmlformats.org/drawingml/2006/table">
+            <a:tbl>
+              <a:tblPr firstRow="1" bandRow="1">
+                <a:tableStyleId>{5C22544A-7EE6-4342-B048-85BDC9FD1C3A}</a:tableStyleId>
+              </a:tblPr>
+              <a:tblGrid>
+                <a:gridCol w="4715302">
+                  <a:extLst>
+                    <a:ext uri="{9D8B030D-6E8A-4147-A177-3AD203B41FA5}">
+                      <a16:colId xmlns:a16="http://schemas.microsoft.com/office/drawing/2014/main" val="2104603021"/>
+                    </a:ext>
+                  </a:extLst>
+                </a:gridCol>
+                <a:gridCol w="4715302">
+                  <a:extLst>
+                    <a:ext uri="{9D8B030D-6E8A-4147-A177-3AD203B41FA5}">
+                      <a16:colId xmlns:a16="http://schemas.microsoft.com/office/drawing/2014/main" val="2097243175"/>
+                    </a:ext>
+                  </a:extLst>
+                </a:gridCol>
+              </a:tblGrid>
+              <a:tr h="1861575">
+                <a:tc>
+                  <a:txBody>
+                    <a:bodyPr/>
+                    <a:lstStyle/>
+                    <a:p>
+                      <a:r>
+                        <a:rPr lang="en-NZ" dirty="0">
+                          <a:latin typeface="Abadi" panose="020B0604020104020204" pitchFamily="34" charset="0"/>
+                        </a:rPr>
+                        <a:t>Then I wanted to make the navbar stick to the top of the page even when scrolling down.</a:t>
+                      </a:r>
+                    </a:p>
+                    <a:p>
+                      <a:endParaRPr lang="en-NZ" dirty="0">
+                        <a:latin typeface="Abadi" panose="020B0604020104020204" pitchFamily="34" charset="0"/>
+                      </a:endParaRPr>
+                    </a:p>
+                  </a:txBody>
+                  <a:tcPr/>
+                </a:tc>
+                <a:tc>
+                  <a:txBody>
+                    <a:bodyPr/>
+                    <a:lstStyle/>
+                    <a:p>
+                      <a:r>
+                        <a:rPr lang="en-NZ" dirty="0">
+                          <a:latin typeface="Abadi" panose="020B0604020104020204" pitchFamily="34" charset="0"/>
+                        </a:rPr>
+                        <a:t>To do this, I used bootstrap classing which made it simple to make the navbar sticky</a:t>
+                      </a:r>
+                    </a:p>
+                  </a:txBody>
+                  <a:tcPr/>
+                </a:tc>
+                <a:extLst>
+                  <a:ext uri="{0D108BD9-81ED-4DB2-BD59-A6C34878D82A}">
+                    <a16:rowId xmlns:a16="http://schemas.microsoft.com/office/drawing/2014/main" val="2765992196"/>
+                  </a:ext>
+                </a:extLst>
+              </a:tr>
+            </a:tbl>
+          </a:graphicData>
+        </a:graphic>
+      </p:graphicFrame>
+      <p:pic>
+        <p:nvPicPr>
+          <p:cNvPr id="5" name="Picture 4">
+            <a:extLst>
+              <a:ext uri="{FF2B5EF4-FFF2-40B4-BE49-F238E27FC236}">
+                <a16:creationId xmlns:a16="http://schemas.microsoft.com/office/drawing/2014/main" id="{D7172DA1-78FB-6B4F-E4E1-399B4F302BC9}"/>
+              </a:ext>
+            </a:extLst>
+          </p:cNvPr>
+          <p:cNvPicPr>
+            <a:picLocks noChangeAspect="1"/>
+          </p:cNvPicPr>
+          <p:nvPr/>
+        </p:nvPicPr>
+        <p:blipFill>
+          <a:blip r:embed="rId2"/>
+          <a:stretch>
+            <a:fillRect/>
+          </a:stretch>
+        </p:blipFill>
+        <p:spPr>
+          <a:xfrm>
+            <a:off x="5803801" y="1822388"/>
+            <a:ext cx="5052083" cy="4851780"/>
+          </a:xfrm>
+          <a:prstGeom prst="rect">
+            <a:avLst/>
+          </a:prstGeom>
+        </p:spPr>
+      </p:pic>
+      <p:pic>
+        <p:nvPicPr>
+          <p:cNvPr id="7" name="Picture 6">
+            <a:extLst>
+              <a:ext uri="{FF2B5EF4-FFF2-40B4-BE49-F238E27FC236}">
+                <a16:creationId xmlns:a16="http://schemas.microsoft.com/office/drawing/2014/main" id="{7D6F6499-07E5-BD97-40D1-7DC6AF735044}"/>
+              </a:ext>
+            </a:extLst>
+          </p:cNvPr>
+          <p:cNvPicPr>
+            <a:picLocks noChangeAspect="1"/>
+          </p:cNvPicPr>
+          <p:nvPr/>
+        </p:nvPicPr>
+        <p:blipFill>
+          <a:blip r:embed="rId3"/>
+          <a:stretch>
+            <a:fillRect/>
+          </a:stretch>
+        </p:blipFill>
+        <p:spPr>
+          <a:xfrm>
+            <a:off x="627797" y="1873828"/>
+            <a:ext cx="4841220" cy="4641526"/>
+          </a:xfrm>
+          <a:prstGeom prst="rect">
+            <a:avLst/>
+          </a:prstGeom>
+        </p:spPr>
+      </p:pic>
+      <p:pic>
+        <p:nvPicPr>
+          <p:cNvPr id="8" name="Picture 7">
+            <a:extLst>
+              <a:ext uri="{FF2B5EF4-FFF2-40B4-BE49-F238E27FC236}">
+                <a16:creationId xmlns:a16="http://schemas.microsoft.com/office/drawing/2014/main" id="{DD2ECE51-250C-1841-8162-A4FE5519B08D}"/>
+              </a:ext>
+            </a:extLst>
+          </p:cNvPr>
+          <p:cNvPicPr>
+            <a:picLocks noChangeAspect="1"/>
+          </p:cNvPicPr>
+          <p:nvPr/>
+        </p:nvPicPr>
+        <p:blipFill>
+          <a:blip r:embed="rId4"/>
+          <a:stretch>
+            <a:fillRect/>
+          </a:stretch>
+        </p:blipFill>
+        <p:spPr>
+          <a:xfrm>
+            <a:off x="1519810" y="5191736"/>
+            <a:ext cx="8233198" cy="1482432"/>
+          </a:xfrm>
+          <a:prstGeom prst="rect">
+            <a:avLst/>
+          </a:prstGeom>
+        </p:spPr>
+      </p:pic>
     </p:spTree>
     <p:extLst>
       <p:ext uri="{BB962C8B-B14F-4D97-AF65-F5344CB8AC3E}">
-        <p14:creationId xmlns:p14="http://schemas.microsoft.com/office/powerpoint/2010/main" val="2812247241"/>
+        <p14:creationId xmlns:p14="http://schemas.microsoft.com/office/powerpoint/2010/main" val="2071227590"/>
       </p:ext>
     </p:extLst>
   </p:cSld>
@@ -10171,7 +10449,12 @@
             <p:ph type="title"/>
           </p:nvPr>
         </p:nvSpPr>
-        <p:spPr/>
+        <p:spPr>
+          <a:xfrm>
+            <a:off x="1249680" y="183832"/>
+            <a:ext cx="9692640" cy="606738"/>
+          </a:xfrm>
+        </p:spPr>
         <p:txBody>
           <a:bodyPr>
             <a:normAutofit/>
@@ -10182,44 +10465,101 @@
               <a:rPr lang="en-NZ" sz="2800" dirty="0">
                 <a:latin typeface="Abadi" panose="020B0604020104020204" pitchFamily="34" charset="0"/>
               </a:rPr>
-              <a:t>GitHub Commits</a:t>
+              <a:t>Iterative Improvement (Navbar V2)</a:t>
             </a:r>
           </a:p>
         </p:txBody>
       </p:sp>
-      <p:sp>
-        <p:nvSpPr>
-          <p:cNvPr id="3" name="Content Placeholder 2"/>
-          <p:cNvSpPr>
-            <a:spLocks noGrp="1"/>
-          </p:cNvSpPr>
-          <p:nvPr>
-            <p:ph idx="1"/>
-          </p:nvPr>
-        </p:nvSpPr>
-        <p:spPr/>
-        <p:txBody>
-          <a:bodyPr>
-            <a:normAutofit/>
-          </a:bodyPr>
-          <a:lstStyle/>
-          <a:p>
-            <a:pPr marL="0" indent="0">
-              <a:buNone/>
-            </a:pPr>
-            <a:r>
-              <a:rPr lang="en-NZ" sz="2000" dirty="0">
-                <a:latin typeface="Abadi" panose="020B0604020104020204" pitchFamily="34" charset="0"/>
-              </a:rPr>
-              <a:t>Show how you have used GitHub throughout the design, development, and testing process.</a:t>
-            </a:r>
-          </a:p>
-        </p:txBody>
-      </p:sp>
+      <p:graphicFrame>
+        <p:nvGraphicFramePr>
+          <p:cNvPr id="3" name="Table 2">
+            <a:extLst>
+              <a:ext uri="{FF2B5EF4-FFF2-40B4-BE49-F238E27FC236}">
+                <a16:creationId xmlns:a16="http://schemas.microsoft.com/office/drawing/2014/main" id="{1A9023FA-33FD-5552-47F6-6A8D6E948421}"/>
+              </a:ext>
+            </a:extLst>
+          </p:cNvPr>
+          <p:cNvGraphicFramePr>
+            <a:graphicFrameLocks noGrp="1"/>
+          </p:cNvGraphicFramePr>
+          <p:nvPr>
+            <p:extLst>
+              <p:ext uri="{D42A27DB-BD31-4B8C-83A1-F6EECF244321}">
+                <p14:modId xmlns:p14="http://schemas.microsoft.com/office/powerpoint/2010/main" val="290382877"/>
+              </p:ext>
+            </p:extLst>
+          </p:nvPr>
+        </p:nvGraphicFramePr>
+        <p:xfrm>
+          <a:off x="1249680" y="1031751"/>
+          <a:ext cx="9430604" cy="1861575"/>
+        </p:xfrm>
+        <a:graphic>
+          <a:graphicData uri="http://schemas.openxmlformats.org/drawingml/2006/table">
+            <a:tbl>
+              <a:tblPr firstRow="1" bandRow="1">
+                <a:tableStyleId>{5C22544A-7EE6-4342-B048-85BDC9FD1C3A}</a:tableStyleId>
+              </a:tblPr>
+              <a:tblGrid>
+                <a:gridCol w="4715302">
+                  <a:extLst>
+                    <a:ext uri="{9D8B030D-6E8A-4147-A177-3AD203B41FA5}">
+                      <a16:colId xmlns:a16="http://schemas.microsoft.com/office/drawing/2014/main" val="2104603021"/>
+                    </a:ext>
+                  </a:extLst>
+                </a:gridCol>
+                <a:gridCol w="4715302">
+                  <a:extLst>
+                    <a:ext uri="{9D8B030D-6E8A-4147-A177-3AD203B41FA5}">
+                      <a16:colId xmlns:a16="http://schemas.microsoft.com/office/drawing/2014/main" val="2097243175"/>
+                    </a:ext>
+                  </a:extLst>
+                </a:gridCol>
+              </a:tblGrid>
+              <a:tr h="1861575">
+                <a:tc>
+                  <a:txBody>
+                    <a:bodyPr/>
+                    <a:lstStyle/>
+                    <a:p>
+                      <a:endParaRPr lang="en-NZ" dirty="0">
+                        <a:latin typeface="Abadi" panose="020B0604020104020204" pitchFamily="34" charset="0"/>
+                      </a:endParaRPr>
+                    </a:p>
+                    <a:p>
+                      <a:endParaRPr lang="en-NZ" dirty="0">
+                        <a:latin typeface="Abadi" panose="020B0604020104020204" pitchFamily="34" charset="0"/>
+                      </a:endParaRPr>
+                    </a:p>
+                  </a:txBody>
+                  <a:tcPr/>
+                </a:tc>
+                <a:tc>
+                  <a:txBody>
+                    <a:bodyPr/>
+                    <a:lstStyle/>
+                    <a:p>
+                      <a:endParaRPr lang="en-NZ" dirty="0">
+                        <a:latin typeface="Abadi" panose="020B0604020104020204" pitchFamily="34" charset="0"/>
+                      </a:endParaRPr>
+                    </a:p>
+                  </a:txBody>
+                  <a:tcPr/>
+                </a:tc>
+                <a:extLst>
+                  <a:ext uri="{0D108BD9-81ED-4DB2-BD59-A6C34878D82A}">
+                    <a16:rowId xmlns:a16="http://schemas.microsoft.com/office/drawing/2014/main" val="2765992196"/>
+                  </a:ext>
+                </a:extLst>
+              </a:tr>
+            </a:tbl>
+          </a:graphicData>
+        </a:graphic>
+      </p:graphicFrame>
     </p:spTree>
     <p:extLst>
       <p:ext uri="{BB962C8B-B14F-4D97-AF65-F5344CB8AC3E}">
-        <p14:creationId xmlns:p14="http://schemas.microsoft.com/office/powerpoint/2010/main" val="1865976428"/>
+        <p14:creationId xmlns:p14="http://schemas.microsoft.com/office/powerpoint/2010/main" val="3434099490"/>
       </p:ext>
     </p:extLst>
   </p:cSld>
@@ -10256,6 +10596,329 @@
             <p:ph type="title"/>
           </p:nvPr>
         </p:nvSpPr>
+        <p:spPr>
+          <a:xfrm>
+            <a:off x="1249680" y="183832"/>
+            <a:ext cx="9692640" cy="606738"/>
+          </a:xfrm>
+        </p:spPr>
+        <p:txBody>
+          <a:bodyPr>
+            <a:normAutofit/>
+          </a:bodyPr>
+          <a:lstStyle/>
+          <a:p>
+            <a:r>
+              <a:rPr lang="en-NZ" sz="2800" dirty="0">
+                <a:latin typeface="Abadi" panose="020B0604020104020204" pitchFamily="34" charset="0"/>
+              </a:rPr>
+              <a:t>Iterative Improvement (Navbar V2)</a:t>
+            </a:r>
+          </a:p>
+        </p:txBody>
+      </p:sp>
+      <p:graphicFrame>
+        <p:nvGraphicFramePr>
+          <p:cNvPr id="3" name="Table 2">
+            <a:extLst>
+              <a:ext uri="{FF2B5EF4-FFF2-40B4-BE49-F238E27FC236}">
+                <a16:creationId xmlns:a16="http://schemas.microsoft.com/office/drawing/2014/main" id="{1A9023FA-33FD-5552-47F6-6A8D6E948421}"/>
+              </a:ext>
+            </a:extLst>
+          </p:cNvPr>
+          <p:cNvGraphicFramePr>
+            <a:graphicFrameLocks noGrp="1"/>
+          </p:cNvGraphicFramePr>
+          <p:nvPr>
+            <p:extLst>
+              <p:ext uri="{D42A27DB-BD31-4B8C-83A1-F6EECF244321}">
+                <p14:modId xmlns:p14="http://schemas.microsoft.com/office/powerpoint/2010/main" val="1589415114"/>
+              </p:ext>
+            </p:extLst>
+          </p:nvPr>
+        </p:nvGraphicFramePr>
+        <p:xfrm>
+          <a:off x="1249680" y="1031751"/>
+          <a:ext cx="9430604" cy="1861575"/>
+        </p:xfrm>
+        <a:graphic>
+          <a:graphicData uri="http://schemas.openxmlformats.org/drawingml/2006/table">
+            <a:tbl>
+              <a:tblPr firstRow="1" bandRow="1">
+                <a:tableStyleId>{5C22544A-7EE6-4342-B048-85BDC9FD1C3A}</a:tableStyleId>
+              </a:tblPr>
+              <a:tblGrid>
+                <a:gridCol w="4715302">
+                  <a:extLst>
+                    <a:ext uri="{9D8B030D-6E8A-4147-A177-3AD203B41FA5}">
+                      <a16:colId xmlns:a16="http://schemas.microsoft.com/office/drawing/2014/main" val="2104603021"/>
+                    </a:ext>
+                  </a:extLst>
+                </a:gridCol>
+                <a:gridCol w="4715302">
+                  <a:extLst>
+                    <a:ext uri="{9D8B030D-6E8A-4147-A177-3AD203B41FA5}">
+                      <a16:colId xmlns:a16="http://schemas.microsoft.com/office/drawing/2014/main" val="2097243175"/>
+                    </a:ext>
+                  </a:extLst>
+                </a:gridCol>
+              </a:tblGrid>
+              <a:tr h="1861575">
+                <a:tc>
+                  <a:txBody>
+                    <a:bodyPr/>
+                    <a:lstStyle/>
+                    <a:p>
+                      <a:r>
+                        <a:rPr lang="en-NZ" dirty="0">
+                          <a:latin typeface="Abadi" panose="020B0604020104020204" pitchFamily="34" charset="0"/>
+                        </a:rPr>
+                        <a:t>Scrolling down on the page, I realised that navbar itself was not actually white but transparent. </a:t>
+                      </a:r>
+                    </a:p>
+                    <a:p>
+                      <a:endParaRPr lang="en-NZ" dirty="0">
+                        <a:latin typeface="Abadi" panose="020B0604020104020204" pitchFamily="34" charset="0"/>
+                      </a:endParaRPr>
+                    </a:p>
+                  </a:txBody>
+                  <a:tcPr/>
+                </a:tc>
+                <a:tc>
+                  <a:txBody>
+                    <a:bodyPr/>
+                    <a:lstStyle/>
+                    <a:p>
+                      <a:r>
+                        <a:rPr lang="en-NZ" dirty="0">
+                          <a:latin typeface="Abadi" panose="020B0604020104020204" pitchFamily="34" charset="0"/>
+                        </a:rPr>
+                        <a:t>I thought that by default the background colour was white so I changed it shortly after finding this error. </a:t>
+                      </a:r>
+                    </a:p>
+                  </a:txBody>
+                  <a:tcPr/>
+                </a:tc>
+                <a:extLst>
+                  <a:ext uri="{0D108BD9-81ED-4DB2-BD59-A6C34878D82A}">
+                    <a16:rowId xmlns:a16="http://schemas.microsoft.com/office/drawing/2014/main" val="2765992196"/>
+                  </a:ext>
+                </a:extLst>
+              </a:tr>
+            </a:tbl>
+          </a:graphicData>
+        </a:graphic>
+      </p:graphicFrame>
+    </p:spTree>
+    <p:extLst>
+      <p:ext uri="{BB962C8B-B14F-4D97-AF65-F5344CB8AC3E}">
+        <p14:creationId xmlns:p14="http://schemas.microsoft.com/office/powerpoint/2010/main" val="3154286637"/>
+      </p:ext>
+    </p:extLst>
+  </p:cSld>
+  <p:clrMapOvr>
+    <a:masterClrMapping/>
+  </p:clrMapOvr>
+</p:sld>
+</file>
+
+<file path=ppt/slides/slide35.xml><?xml version="1.0" encoding="utf-8"?>
+<p:sld xmlns:a="http://schemas.openxmlformats.org/drawingml/2006/main" xmlns:r="http://schemas.openxmlformats.org/officeDocument/2006/relationships" xmlns:p="http://schemas.openxmlformats.org/presentationml/2006/main">
+  <p:cSld>
+    <p:spTree>
+      <p:nvGrpSpPr>
+        <p:cNvPr id="1" name=""/>
+        <p:cNvGrpSpPr/>
+        <p:nvPr/>
+      </p:nvGrpSpPr>
+      <p:grpSpPr>
+        <a:xfrm>
+          <a:off x="0" y="0"/>
+          <a:ext cx="0" cy="0"/>
+          <a:chOff x="0" y="0"/>
+          <a:chExt cx="0" cy="0"/>
+        </a:xfrm>
+      </p:grpSpPr>
+      <p:sp>
+        <p:nvSpPr>
+          <p:cNvPr id="2" name="Title 1"/>
+          <p:cNvSpPr>
+            <a:spLocks noGrp="1"/>
+          </p:cNvSpPr>
+          <p:nvPr>
+            <p:ph type="title"/>
+          </p:nvPr>
+        </p:nvSpPr>
+        <p:spPr/>
+        <p:txBody>
+          <a:bodyPr>
+            <a:normAutofit/>
+          </a:bodyPr>
+          <a:lstStyle/>
+          <a:p>
+            <a:r>
+              <a:rPr lang="en-NZ" sz="2800" dirty="0">
+                <a:latin typeface="Abadi" panose="020B0604020104020204" pitchFamily="34" charset="0"/>
+              </a:rPr>
+              <a:t>Version Control</a:t>
+            </a:r>
+          </a:p>
+        </p:txBody>
+      </p:sp>
+      <p:sp>
+        <p:nvSpPr>
+          <p:cNvPr id="3" name="Content Placeholder 2"/>
+          <p:cNvSpPr>
+            <a:spLocks noGrp="1"/>
+          </p:cNvSpPr>
+          <p:nvPr>
+            <p:ph idx="1"/>
+          </p:nvPr>
+        </p:nvSpPr>
+        <p:spPr/>
+        <p:txBody>
+          <a:bodyPr>
+            <a:normAutofit/>
+          </a:bodyPr>
+          <a:lstStyle/>
+          <a:p>
+            <a:pPr marL="0" indent="0">
+              <a:buNone/>
+            </a:pPr>
+            <a:r>
+              <a:rPr lang="en-NZ" sz="2000" dirty="0">
+                <a:latin typeface="Abadi" panose="020B0604020104020204" pitchFamily="34" charset="0"/>
+              </a:rPr>
+              <a:t>Show how you have used version control throughout the design, development, and testing process.</a:t>
+            </a:r>
+          </a:p>
+        </p:txBody>
+      </p:sp>
+    </p:spTree>
+    <p:extLst>
+      <p:ext uri="{BB962C8B-B14F-4D97-AF65-F5344CB8AC3E}">
+        <p14:creationId xmlns:p14="http://schemas.microsoft.com/office/powerpoint/2010/main" val="2812247241"/>
+      </p:ext>
+    </p:extLst>
+  </p:cSld>
+  <p:clrMapOvr>
+    <a:masterClrMapping/>
+  </p:clrMapOvr>
+</p:sld>
+</file>
+
+<file path=ppt/slides/slide36.xml><?xml version="1.0" encoding="utf-8"?>
+<p:sld xmlns:a="http://schemas.openxmlformats.org/drawingml/2006/main" xmlns:r="http://schemas.openxmlformats.org/officeDocument/2006/relationships" xmlns:p="http://schemas.openxmlformats.org/presentationml/2006/main">
+  <p:cSld>
+    <p:spTree>
+      <p:nvGrpSpPr>
+        <p:cNvPr id="1" name=""/>
+        <p:cNvGrpSpPr/>
+        <p:nvPr/>
+      </p:nvGrpSpPr>
+      <p:grpSpPr>
+        <a:xfrm>
+          <a:off x="0" y="0"/>
+          <a:ext cx="0" cy="0"/>
+          <a:chOff x="0" y="0"/>
+          <a:chExt cx="0" cy="0"/>
+        </a:xfrm>
+      </p:grpSpPr>
+      <p:sp>
+        <p:nvSpPr>
+          <p:cNvPr id="2" name="Title 1"/>
+          <p:cNvSpPr>
+            <a:spLocks noGrp="1"/>
+          </p:cNvSpPr>
+          <p:nvPr>
+            <p:ph type="title"/>
+          </p:nvPr>
+        </p:nvSpPr>
+        <p:spPr/>
+        <p:txBody>
+          <a:bodyPr>
+            <a:normAutofit/>
+          </a:bodyPr>
+          <a:lstStyle/>
+          <a:p>
+            <a:r>
+              <a:rPr lang="en-NZ" sz="2800" dirty="0">
+                <a:latin typeface="Abadi" panose="020B0604020104020204" pitchFamily="34" charset="0"/>
+              </a:rPr>
+              <a:t>GitHub Commits</a:t>
+            </a:r>
+          </a:p>
+        </p:txBody>
+      </p:sp>
+      <p:sp>
+        <p:nvSpPr>
+          <p:cNvPr id="3" name="Content Placeholder 2"/>
+          <p:cNvSpPr>
+            <a:spLocks noGrp="1"/>
+          </p:cNvSpPr>
+          <p:nvPr>
+            <p:ph idx="1"/>
+          </p:nvPr>
+        </p:nvSpPr>
+        <p:spPr/>
+        <p:txBody>
+          <a:bodyPr>
+            <a:normAutofit/>
+          </a:bodyPr>
+          <a:lstStyle/>
+          <a:p>
+            <a:pPr marL="0" indent="0">
+              <a:buNone/>
+            </a:pPr>
+            <a:r>
+              <a:rPr lang="en-NZ" sz="2000" dirty="0">
+                <a:latin typeface="Abadi" panose="020B0604020104020204" pitchFamily="34" charset="0"/>
+              </a:rPr>
+              <a:t>Show how you have used GitHub throughout the design, development, and testing process.</a:t>
+            </a:r>
+          </a:p>
+        </p:txBody>
+      </p:sp>
+    </p:spTree>
+    <p:extLst>
+      <p:ext uri="{BB962C8B-B14F-4D97-AF65-F5344CB8AC3E}">
+        <p14:creationId xmlns:p14="http://schemas.microsoft.com/office/powerpoint/2010/main" val="1865976428"/>
+      </p:ext>
+    </p:extLst>
+  </p:cSld>
+  <p:clrMapOvr>
+    <a:masterClrMapping/>
+  </p:clrMapOvr>
+</p:sld>
+</file>
+
+<file path=ppt/slides/slide37.xml><?xml version="1.0" encoding="utf-8"?>
+<p:sld xmlns:a="http://schemas.openxmlformats.org/drawingml/2006/main" xmlns:r="http://schemas.openxmlformats.org/officeDocument/2006/relationships" xmlns:p="http://schemas.openxmlformats.org/presentationml/2006/main">
+  <p:cSld>
+    <p:spTree>
+      <p:nvGrpSpPr>
+        <p:cNvPr id="1" name=""/>
+        <p:cNvGrpSpPr/>
+        <p:nvPr/>
+      </p:nvGrpSpPr>
+      <p:grpSpPr>
+        <a:xfrm>
+          <a:off x="0" y="0"/>
+          <a:ext cx="0" cy="0"/>
+          <a:chOff x="0" y="0"/>
+          <a:chExt cx="0" cy="0"/>
+        </a:xfrm>
+      </p:grpSpPr>
+      <p:sp>
+        <p:nvSpPr>
+          <p:cNvPr id="2" name="Title 1"/>
+          <p:cNvSpPr>
+            <a:spLocks noGrp="1"/>
+          </p:cNvSpPr>
+          <p:nvPr>
+            <p:ph type="title"/>
+          </p:nvPr>
+        </p:nvSpPr>
         <p:spPr/>
         <p:txBody>
           <a:bodyPr>
@@ -10314,7 +10977,7 @@
 </p:sld>
 </file>
 
-<file path=ppt/slides/slide35.xml><?xml version="1.0" encoding="utf-8"?>
+<file path=ppt/slides/slide38.xml><?xml version="1.0" encoding="utf-8"?>
 <p:sld xmlns:a="http://schemas.openxmlformats.org/drawingml/2006/main" xmlns:r="http://schemas.openxmlformats.org/officeDocument/2006/relationships" xmlns:p="http://schemas.openxmlformats.org/presentationml/2006/main">
   <p:cSld>
     <p:spTree>
@@ -10413,7 +11076,7 @@
 </p:sld>
 </file>
 
-<file path=ppt/slides/slide36.xml><?xml version="1.0" encoding="utf-8"?>
+<file path=ppt/slides/slide39.xml><?xml version="1.0" encoding="utf-8"?>
 <p:sld xmlns:a="http://schemas.openxmlformats.org/drawingml/2006/main" xmlns:r="http://schemas.openxmlformats.org/officeDocument/2006/relationships" xmlns:p="http://schemas.openxmlformats.org/presentationml/2006/main">
   <p:cSld>
     <p:spTree>

</xml_diff>

<commit_message>
Changed Navbar Colour to white
Before, navbar was transparent instead of actually being white.
</commit_message>
<xml_diff>
--- a/AS91903_91906_Evidence_Joaquin_Badenas.pptx
+++ b/AS91903_91906_Evidence_Joaquin_Badenas.pptx
@@ -30,20 +30,24 @@
     <p:sldId id="273" r:id="rId24"/>
     <p:sldId id="274" r:id="rId25"/>
     <p:sldId id="266" r:id="rId26"/>
-    <p:sldId id="291" r:id="rId27"/>
-    <p:sldId id="296" r:id="rId28"/>
-    <p:sldId id="297" r:id="rId29"/>
-    <p:sldId id="298" r:id="rId30"/>
-    <p:sldId id="299" r:id="rId31"/>
-    <p:sldId id="300" r:id="rId32"/>
-    <p:sldId id="302" r:id="rId33"/>
-    <p:sldId id="303" r:id="rId34"/>
-    <p:sldId id="301" r:id="rId35"/>
-    <p:sldId id="275" r:id="rId36"/>
-    <p:sldId id="283" r:id="rId37"/>
-    <p:sldId id="265" r:id="rId38"/>
-    <p:sldId id="269" r:id="rId39"/>
-    <p:sldId id="276" r:id="rId40"/>
+    <p:sldId id="304" r:id="rId27"/>
+    <p:sldId id="306" r:id="rId28"/>
+    <p:sldId id="291" r:id="rId29"/>
+    <p:sldId id="296" r:id="rId30"/>
+    <p:sldId id="297" r:id="rId31"/>
+    <p:sldId id="298" r:id="rId32"/>
+    <p:sldId id="299" r:id="rId33"/>
+    <p:sldId id="300" r:id="rId34"/>
+    <p:sldId id="305" r:id="rId35"/>
+    <p:sldId id="302" r:id="rId36"/>
+    <p:sldId id="303" r:id="rId37"/>
+    <p:sldId id="307" r:id="rId38"/>
+    <p:sldId id="301" r:id="rId39"/>
+    <p:sldId id="275" r:id="rId40"/>
+    <p:sldId id="283" r:id="rId41"/>
+    <p:sldId id="265" r:id="rId42"/>
+    <p:sldId id="269" r:id="rId43"/>
+    <p:sldId id="276" r:id="rId44"/>
   </p:sldIdLst>
   <p:sldSz cx="12192000" cy="6858000"/>
   <p:notesSz cx="6858000" cy="9144000"/>
@@ -153,7 +157,7 @@
 <file path=ppt/revisionInfo.xml><?xml version="1.0" encoding="utf-8"?>
 <p1510:revInfo xmlns:a="http://schemas.openxmlformats.org/drawingml/2006/main" xmlns:r="http://schemas.openxmlformats.org/officeDocument/2006/relationships" xmlns:p1510="http://schemas.microsoft.com/office/powerpoint/2015/10/main">
   <p1510:revLst>
-    <p1510:client id="{4F53BFBD-1E38-412E-AE7B-7E5D3B30168C}" v="27" dt="2024-07-26T06:43:45.139"/>
+    <p1510:client id="{4F53BFBD-1E38-412E-AE7B-7E5D3B30168C}" v="28" dt="2024-07-28T13:27:09.674"/>
   </p1510:revLst>
 </p1510:revInfo>
 </file>
@@ -1599,7 +1603,7 @@
   <pc:docChgLst>
     <pc:chgData name="Joaquin Badenas" userId="5cb29fd719aebf04" providerId="LiveId" clId="{4F53BFBD-1E38-412E-AE7B-7E5D3B30168C}"/>
     <pc:docChg chg="undo custSel addSld delSld modSld sldOrd">
-      <pc:chgData name="Joaquin Badenas" userId="5cb29fd719aebf04" providerId="LiveId" clId="{4F53BFBD-1E38-412E-AE7B-7E5D3B30168C}" dt="2024-07-26T06:51:12.598" v="5789" actId="20577"/>
+      <pc:chgData name="Joaquin Badenas" userId="5cb29fd719aebf04" providerId="LiveId" clId="{4F53BFBD-1E38-412E-AE7B-7E5D3B30168C}" dt="2024-07-28T13:28:32.950" v="7001" actId="478"/>
       <pc:docMkLst>
         <pc:docMk/>
       </pc:docMkLst>
@@ -2302,7 +2306,7 @@
         </pc:picChg>
       </pc:sldChg>
       <pc:sldChg chg="addSp delSp modSp add mod">
-        <pc:chgData name="Joaquin Badenas" userId="5cb29fd719aebf04" providerId="LiveId" clId="{4F53BFBD-1E38-412E-AE7B-7E5D3B30168C}" dt="2024-07-25T22:30:55.877" v="3885" actId="1076"/>
+        <pc:chgData name="Joaquin Badenas" userId="5cb29fd719aebf04" providerId="LiveId" clId="{4F53BFBD-1E38-412E-AE7B-7E5D3B30168C}" dt="2024-07-28T13:14:45.809" v="6187" actId="478"/>
         <pc:sldMkLst>
           <pc:docMk/>
           <pc:sldMk cId="3184647088" sldId="297"/>
@@ -2363,16 +2367,16 @@
             <ac:picMk id="9" creationId="{51D1A24A-2773-0E7F-928F-BB363B2237E2}"/>
           </ac:picMkLst>
         </pc:picChg>
-        <pc:picChg chg="add mod">
-          <ac:chgData name="Joaquin Badenas" userId="5cb29fd719aebf04" providerId="LiveId" clId="{4F53BFBD-1E38-412E-AE7B-7E5D3B30168C}" dt="2024-07-25T22:30:37.796" v="3883" actId="1076"/>
+        <pc:picChg chg="add del mod">
+          <ac:chgData name="Joaquin Badenas" userId="5cb29fd719aebf04" providerId="LiveId" clId="{4F53BFBD-1E38-412E-AE7B-7E5D3B30168C}" dt="2024-07-28T13:14:45.809" v="6187" actId="478"/>
           <ac:picMkLst>
             <pc:docMk/>
             <pc:sldMk cId="3184647088" sldId="297"/>
             <ac:picMk id="11" creationId="{E187ECB1-C820-A533-EE37-286B8D5A9562}"/>
           </ac:picMkLst>
         </pc:picChg>
-        <pc:picChg chg="add mod">
-          <ac:chgData name="Joaquin Badenas" userId="5cb29fd719aebf04" providerId="LiveId" clId="{4F53BFBD-1E38-412E-AE7B-7E5D3B30168C}" dt="2024-07-25T22:30:55.877" v="3885" actId="1076"/>
+        <pc:picChg chg="add del mod">
+          <ac:chgData name="Joaquin Badenas" userId="5cb29fd719aebf04" providerId="LiveId" clId="{4F53BFBD-1E38-412E-AE7B-7E5D3B30168C}" dt="2024-07-28T13:14:44.636" v="6186" actId="478"/>
           <ac:picMkLst>
             <pc:docMk/>
             <pc:sldMk cId="3184647088" sldId="297"/>
@@ -2530,13 +2534,13 @@
         </pc:picChg>
       </pc:sldChg>
       <pc:sldChg chg="delSp modSp add mod">
-        <pc:chgData name="Joaquin Badenas" userId="5cb29fd719aebf04" providerId="LiveId" clId="{4F53BFBD-1E38-412E-AE7B-7E5D3B30168C}" dt="2024-07-26T06:33:01.134" v="5066" actId="20577"/>
+        <pc:chgData name="Joaquin Badenas" userId="5cb29fd719aebf04" providerId="LiveId" clId="{4F53BFBD-1E38-412E-AE7B-7E5D3B30168C}" dt="2024-07-28T13:21:23.679" v="6743" actId="20577"/>
         <pc:sldMkLst>
           <pc:docMk/>
           <pc:sldMk cId="3154286637" sldId="301"/>
         </pc:sldMkLst>
         <pc:spChg chg="mod">
-          <ac:chgData name="Joaquin Badenas" userId="5cb29fd719aebf04" providerId="LiveId" clId="{4F53BFBD-1E38-412E-AE7B-7E5D3B30168C}" dt="2024-07-26T06:31:29.837" v="4642" actId="20577"/>
+          <ac:chgData name="Joaquin Badenas" userId="5cb29fd719aebf04" providerId="LiveId" clId="{4F53BFBD-1E38-412E-AE7B-7E5D3B30168C}" dt="2024-07-28T13:17:35.078" v="6300" actId="20577"/>
           <ac:spMkLst>
             <pc:docMk/>
             <pc:sldMk cId="3154286637" sldId="301"/>
@@ -2544,7 +2548,7 @@
           </ac:spMkLst>
         </pc:spChg>
         <pc:graphicFrameChg chg="modGraphic">
-          <ac:chgData name="Joaquin Badenas" userId="5cb29fd719aebf04" providerId="LiveId" clId="{4F53BFBD-1E38-412E-AE7B-7E5D3B30168C}" dt="2024-07-26T06:33:01.134" v="5066" actId="20577"/>
+          <ac:chgData name="Joaquin Badenas" userId="5cb29fd719aebf04" providerId="LiveId" clId="{4F53BFBD-1E38-412E-AE7B-7E5D3B30168C}" dt="2024-07-28T13:21:23.679" v="6743" actId="20577"/>
           <ac:graphicFrameMkLst>
             <pc:docMk/>
             <pc:sldMk cId="3154286637" sldId="301"/>
@@ -2608,19 +2612,27 @@
         </pc:picChg>
       </pc:sldChg>
       <pc:sldChg chg="addSp delSp modSp add mod">
-        <pc:chgData name="Joaquin Badenas" userId="5cb29fd719aebf04" providerId="LiveId" clId="{4F53BFBD-1E38-412E-AE7B-7E5D3B30168C}" dt="2024-07-26T06:51:12.598" v="5789" actId="20577"/>
+        <pc:chgData name="Joaquin Badenas" userId="5cb29fd719aebf04" providerId="LiveId" clId="{4F53BFBD-1E38-412E-AE7B-7E5D3B30168C}" dt="2024-07-28T13:13:28.456" v="6132" actId="1076"/>
         <pc:sldMkLst>
           <pc:docMk/>
           <pc:sldMk cId="3434099490" sldId="303"/>
         </pc:sldMkLst>
         <pc:graphicFrameChg chg="modGraphic">
-          <ac:chgData name="Joaquin Badenas" userId="5cb29fd719aebf04" providerId="LiveId" clId="{4F53BFBD-1E38-412E-AE7B-7E5D3B30168C}" dt="2024-07-26T06:51:12.598" v="5789" actId="20577"/>
+          <ac:chgData name="Joaquin Badenas" userId="5cb29fd719aebf04" providerId="LiveId" clId="{4F53BFBD-1E38-412E-AE7B-7E5D3B30168C}" dt="2024-07-28T13:12:29.239" v="6124" actId="20577"/>
           <ac:graphicFrameMkLst>
             <pc:docMk/>
             <pc:sldMk cId="3434099490" sldId="303"/>
             <ac:graphicFrameMk id="3" creationId="{1A9023FA-33FD-5552-47F6-6A8D6E948421}"/>
           </ac:graphicFrameMkLst>
         </pc:graphicFrameChg>
+        <pc:picChg chg="add mod">
+          <ac:chgData name="Joaquin Badenas" userId="5cb29fd719aebf04" providerId="LiveId" clId="{4F53BFBD-1E38-412E-AE7B-7E5D3B30168C}" dt="2024-07-28T13:12:34.092" v="6125" actId="1076"/>
+          <ac:picMkLst>
+            <pc:docMk/>
+            <pc:sldMk cId="3434099490" sldId="303"/>
+            <ac:picMk id="5" creationId="{25137C94-039F-3DF4-90D3-CFDE5F736E49}"/>
+          </ac:picMkLst>
+        </pc:picChg>
         <pc:picChg chg="del">
           <ac:chgData name="Joaquin Badenas" userId="5cb29fd719aebf04" providerId="LiveId" clId="{4F53BFBD-1E38-412E-AE7B-7E5D3B30168C}" dt="2024-07-26T06:43:16.926" v="5415" actId="478"/>
           <ac:picMkLst>
@@ -2643,6 +2655,144 @@
             <pc:docMk/>
             <pc:sldMk cId="3434099490" sldId="303"/>
             <ac:picMk id="7" creationId="{7D6F6499-07E5-BD97-40D1-7DC6AF735044}"/>
+          </ac:picMkLst>
+        </pc:picChg>
+        <pc:picChg chg="add mod">
+          <ac:chgData name="Joaquin Badenas" userId="5cb29fd719aebf04" providerId="LiveId" clId="{4F53BFBD-1E38-412E-AE7B-7E5D3B30168C}" dt="2024-07-28T13:12:03.344" v="5971" actId="1076"/>
+          <ac:picMkLst>
+            <pc:docMk/>
+            <pc:sldMk cId="3434099490" sldId="303"/>
+            <ac:picMk id="7" creationId="{DD785A3E-D8A0-F7B2-EE57-F1EC629879CF}"/>
+          </ac:picMkLst>
+        </pc:picChg>
+        <pc:picChg chg="add del mod">
+          <ac:chgData name="Joaquin Badenas" userId="5cb29fd719aebf04" providerId="LiveId" clId="{4F53BFBD-1E38-412E-AE7B-7E5D3B30168C}" dt="2024-07-28T13:13:13.939" v="6128" actId="478"/>
+          <ac:picMkLst>
+            <pc:docMk/>
+            <pc:sldMk cId="3434099490" sldId="303"/>
+            <ac:picMk id="9" creationId="{1B3199EF-2291-B7D1-E2D6-E1E47358CA4C}"/>
+          </ac:picMkLst>
+        </pc:picChg>
+        <pc:picChg chg="add mod">
+          <ac:chgData name="Joaquin Badenas" userId="5cb29fd719aebf04" providerId="LiveId" clId="{4F53BFBD-1E38-412E-AE7B-7E5D3B30168C}" dt="2024-07-28T13:13:28.456" v="6132" actId="1076"/>
+          <ac:picMkLst>
+            <pc:docMk/>
+            <pc:sldMk cId="3434099490" sldId="303"/>
+            <ac:picMk id="11" creationId="{43ED400D-F0F9-83A6-288A-AACD04217DA4}"/>
+          </ac:picMkLst>
+        </pc:picChg>
+      </pc:sldChg>
+      <pc:sldChg chg="modSp new mod">
+        <pc:chgData name="Joaquin Badenas" userId="5cb29fd719aebf04" providerId="LiveId" clId="{4F53BFBD-1E38-412E-AE7B-7E5D3B30168C}" dt="2024-07-28T13:14:34.672" v="6184" actId="20577"/>
+        <pc:sldMkLst>
+          <pc:docMk/>
+          <pc:sldMk cId="365957671" sldId="304"/>
+        </pc:sldMkLst>
+        <pc:spChg chg="mod">
+          <ac:chgData name="Joaquin Badenas" userId="5cb29fd719aebf04" providerId="LiveId" clId="{4F53BFBD-1E38-412E-AE7B-7E5D3B30168C}" dt="2024-07-28T13:14:34.672" v="6184" actId="20577"/>
+          <ac:spMkLst>
+            <pc:docMk/>
+            <pc:sldMk cId="365957671" sldId="304"/>
+            <ac:spMk id="2" creationId="{34597DDD-8A9F-91CE-34D0-F1F4490D2E2F}"/>
+          </ac:spMkLst>
+        </pc:spChg>
+      </pc:sldChg>
+      <pc:sldChg chg="new del">
+        <pc:chgData name="Joaquin Badenas" userId="5cb29fd719aebf04" providerId="LiveId" clId="{4F53BFBD-1E38-412E-AE7B-7E5D3B30168C}" dt="2024-07-28T13:14:23.065" v="6136" actId="680"/>
+        <pc:sldMkLst>
+          <pc:docMk/>
+          <pc:sldMk cId="1496446807" sldId="304"/>
+        </pc:sldMkLst>
+      </pc:sldChg>
+      <pc:sldChg chg="modSp new mod">
+        <pc:chgData name="Joaquin Badenas" userId="5cb29fd719aebf04" providerId="LiveId" clId="{4F53BFBD-1E38-412E-AE7B-7E5D3B30168C}" dt="2024-07-28T13:15:01.885" v="6225" actId="20577"/>
+        <pc:sldMkLst>
+          <pc:docMk/>
+          <pc:sldMk cId="1714849973" sldId="305"/>
+        </pc:sldMkLst>
+        <pc:spChg chg="mod">
+          <ac:chgData name="Joaquin Badenas" userId="5cb29fd719aebf04" providerId="LiveId" clId="{4F53BFBD-1E38-412E-AE7B-7E5D3B30168C}" dt="2024-07-28T13:15:01.885" v="6225" actId="20577"/>
+          <ac:spMkLst>
+            <pc:docMk/>
+            <pc:sldMk cId="1714849973" sldId="305"/>
+            <ac:spMk id="2" creationId="{BDD183A0-C9F2-AAE4-7897-5DABA866383C}"/>
+          </ac:spMkLst>
+        </pc:spChg>
+      </pc:sldChg>
+      <pc:sldChg chg="addSp modSp new mod">
+        <pc:chgData name="Joaquin Badenas" userId="5cb29fd719aebf04" providerId="LiveId" clId="{4F53BFBD-1E38-412E-AE7B-7E5D3B30168C}" dt="2024-07-28T13:17:11.415" v="6272" actId="1076"/>
+        <pc:sldMkLst>
+          <pc:docMk/>
+          <pc:sldMk cId="224206674" sldId="306"/>
+        </pc:sldMkLst>
+        <pc:spChg chg="mod">
+          <ac:chgData name="Joaquin Badenas" userId="5cb29fd719aebf04" providerId="LiveId" clId="{4F53BFBD-1E38-412E-AE7B-7E5D3B30168C}" dt="2024-07-28T13:16:14.574" v="6267" actId="1076"/>
+          <ac:spMkLst>
+            <pc:docMk/>
+            <pc:sldMk cId="224206674" sldId="306"/>
+            <ac:spMk id="2" creationId="{FBA05339-2903-F601-F6BA-E93B084B497D}"/>
+          </ac:spMkLst>
+        </pc:spChg>
+        <pc:picChg chg="add mod">
+          <ac:chgData name="Joaquin Badenas" userId="5cb29fd719aebf04" providerId="LiveId" clId="{4F53BFBD-1E38-412E-AE7B-7E5D3B30168C}" dt="2024-07-28T13:17:11.415" v="6272" actId="1076"/>
+          <ac:picMkLst>
+            <pc:docMk/>
+            <pc:sldMk cId="224206674" sldId="306"/>
+            <ac:picMk id="4" creationId="{4724BCC3-2154-88B1-5A2E-A3B5DA634785}"/>
+          </ac:picMkLst>
+        </pc:picChg>
+      </pc:sldChg>
+      <pc:sldChg chg="new del">
+        <pc:chgData name="Joaquin Badenas" userId="5cb29fd719aebf04" providerId="LiveId" clId="{4F53BFBD-1E38-412E-AE7B-7E5D3B30168C}" dt="2024-07-28T13:15:47.926" v="6227" actId="680"/>
+        <pc:sldMkLst>
+          <pc:docMk/>
+          <pc:sldMk cId="4180871316" sldId="306"/>
+        </pc:sldMkLst>
+      </pc:sldChg>
+      <pc:sldChg chg="addSp delSp modSp add mod">
+        <pc:chgData name="Joaquin Badenas" userId="5cb29fd719aebf04" providerId="LiveId" clId="{4F53BFBD-1E38-412E-AE7B-7E5D3B30168C}" dt="2024-07-28T13:28:32.950" v="7001" actId="478"/>
+        <pc:sldMkLst>
+          <pc:docMk/>
+          <pc:sldMk cId="989374121" sldId="307"/>
+        </pc:sldMkLst>
+        <pc:graphicFrameChg chg="del modGraphic">
+          <ac:chgData name="Joaquin Badenas" userId="5cb29fd719aebf04" providerId="LiveId" clId="{4F53BFBD-1E38-412E-AE7B-7E5D3B30168C}" dt="2024-07-28T13:27:48.069" v="6866" actId="478"/>
+          <ac:graphicFrameMkLst>
+            <pc:docMk/>
+            <pc:sldMk cId="989374121" sldId="307"/>
+            <ac:graphicFrameMk id="3" creationId="{1A9023FA-33FD-5552-47F6-6A8D6E948421}"/>
+          </ac:graphicFrameMkLst>
+        </pc:graphicFrameChg>
+        <pc:graphicFrameChg chg="add mod modGraphic">
+          <ac:chgData name="Joaquin Badenas" userId="5cb29fd719aebf04" providerId="LiveId" clId="{4F53BFBD-1E38-412E-AE7B-7E5D3B30168C}" dt="2024-07-28T13:28:26.702" v="6998" actId="1076"/>
+          <ac:graphicFrameMkLst>
+            <pc:docMk/>
+            <pc:sldMk cId="989374121" sldId="307"/>
+            <ac:graphicFrameMk id="4" creationId="{9FA07D46-C251-4EF2-0365-B907C7DBEBCF}"/>
+          </ac:graphicFrameMkLst>
+        </pc:graphicFrameChg>
+        <pc:picChg chg="mod">
+          <ac:chgData name="Joaquin Badenas" userId="5cb29fd719aebf04" providerId="LiveId" clId="{4F53BFBD-1E38-412E-AE7B-7E5D3B30168C}" dt="2024-07-28T13:28:32.036" v="7000" actId="1076"/>
+          <ac:picMkLst>
+            <pc:docMk/>
+            <pc:sldMk cId="989374121" sldId="307"/>
+            <ac:picMk id="5" creationId="{25137C94-039F-3DF4-90D3-CFDE5F736E49}"/>
+          </ac:picMkLst>
+        </pc:picChg>
+        <pc:picChg chg="del">
+          <ac:chgData name="Joaquin Badenas" userId="5cb29fd719aebf04" providerId="LiveId" clId="{4F53BFBD-1E38-412E-AE7B-7E5D3B30168C}" dt="2024-07-28T13:28:28.503" v="6999" actId="478"/>
+          <ac:picMkLst>
+            <pc:docMk/>
+            <pc:sldMk cId="989374121" sldId="307"/>
+            <ac:picMk id="7" creationId="{DD785A3E-D8A0-F7B2-EE57-F1EC629879CF}"/>
+          </ac:picMkLst>
+        </pc:picChg>
+        <pc:picChg chg="del">
+          <ac:chgData name="Joaquin Badenas" userId="5cb29fd719aebf04" providerId="LiveId" clId="{4F53BFBD-1E38-412E-AE7B-7E5D3B30168C}" dt="2024-07-28T13:28:32.950" v="7001" actId="478"/>
+          <ac:picMkLst>
+            <pc:docMk/>
+            <pc:sldMk cId="989374121" sldId="307"/>
+            <ac:picMk id="11" creationId="{43ED400D-F0F9-83A6-288A-AACD04217DA4}"/>
           </ac:picMkLst>
         </pc:picChg>
       </pc:sldChg>
@@ -2843,7 +2993,7 @@
           <a:p>
             <a:fld id="{57E58380-3550-4AA1-8DE5-F8A856B30F15}" type="datetimeFigureOut">
               <a:rPr lang="en-NZ" smtClean="0"/>
-              <a:t>26/07/2024</a:t>
+              <a:t>29/07/2024</a:t>
             </a:fld>
             <a:endParaRPr lang="en-NZ"/>
           </a:p>
@@ -3071,7 +3221,7 @@
           <a:p>
             <a:fld id="{57E58380-3550-4AA1-8DE5-F8A856B30F15}" type="datetimeFigureOut">
               <a:rPr lang="en-NZ" smtClean="0"/>
-              <a:t>26/07/2024</a:t>
+              <a:t>29/07/2024</a:t>
             </a:fld>
             <a:endParaRPr lang="en-NZ"/>
           </a:p>
@@ -3251,7 +3401,7 @@
           <a:p>
             <a:fld id="{57E58380-3550-4AA1-8DE5-F8A856B30F15}" type="datetimeFigureOut">
               <a:rPr lang="en-NZ" smtClean="0"/>
-              <a:t>26/07/2024</a:t>
+              <a:t>29/07/2024</a:t>
             </a:fld>
             <a:endParaRPr lang="en-NZ"/>
           </a:p>
@@ -3421,7 +3571,7 @@
           <a:p>
             <a:fld id="{57E58380-3550-4AA1-8DE5-F8A856B30F15}" type="datetimeFigureOut">
               <a:rPr lang="en-NZ" smtClean="0"/>
-              <a:t>26/07/2024</a:t>
+              <a:t>29/07/2024</a:t>
             </a:fld>
             <a:endParaRPr lang="en-NZ"/>
           </a:p>
@@ -3675,7 +3825,7 @@
           <a:p>
             <a:fld id="{57E58380-3550-4AA1-8DE5-F8A856B30F15}" type="datetimeFigureOut">
               <a:rPr lang="en-NZ" smtClean="0"/>
-              <a:t>26/07/2024</a:t>
+              <a:t>29/07/2024</a:t>
             </a:fld>
             <a:endParaRPr lang="en-NZ"/>
           </a:p>
@@ -4001,7 +4151,7 @@
           <a:p>
             <a:fld id="{57E58380-3550-4AA1-8DE5-F8A856B30F15}" type="datetimeFigureOut">
               <a:rPr lang="en-NZ" smtClean="0"/>
-              <a:t>26/07/2024</a:t>
+              <a:t>29/07/2024</a:t>
             </a:fld>
             <a:endParaRPr lang="en-NZ"/>
           </a:p>
@@ -4452,7 +4602,7 @@
           <a:p>
             <a:fld id="{57E58380-3550-4AA1-8DE5-F8A856B30F15}" type="datetimeFigureOut">
               <a:rPr lang="en-NZ" smtClean="0"/>
-              <a:t>26/07/2024</a:t>
+              <a:t>29/07/2024</a:t>
             </a:fld>
             <a:endParaRPr lang="en-NZ"/>
           </a:p>
@@ -4570,7 +4720,7 @@
           <a:p>
             <a:fld id="{57E58380-3550-4AA1-8DE5-F8A856B30F15}" type="datetimeFigureOut">
               <a:rPr lang="en-NZ" smtClean="0"/>
-              <a:t>26/07/2024</a:t>
+              <a:t>29/07/2024</a:t>
             </a:fld>
             <a:endParaRPr lang="en-NZ"/>
           </a:p>
@@ -4665,7 +4815,7 @@
           <a:p>
             <a:fld id="{57E58380-3550-4AA1-8DE5-F8A856B30F15}" type="datetimeFigureOut">
               <a:rPr lang="en-NZ" smtClean="0"/>
-              <a:t>26/07/2024</a:t>
+              <a:t>29/07/2024</a:t>
             </a:fld>
             <a:endParaRPr lang="en-NZ"/>
           </a:p>
@@ -4952,7 +5102,7 @@
           <a:p>
             <a:fld id="{57E58380-3550-4AA1-8DE5-F8A856B30F15}" type="datetimeFigureOut">
               <a:rPr lang="en-NZ" smtClean="0"/>
-              <a:t>26/07/2024</a:t>
+              <a:t>29/07/2024</a:t>
             </a:fld>
             <a:endParaRPr lang="en-NZ"/>
           </a:p>
@@ -5274,7 +5424,7 @@
           <a:p>
             <a:fld id="{57E58380-3550-4AA1-8DE5-F8A856B30F15}" type="datetimeFigureOut">
               <a:rPr lang="en-NZ" smtClean="0"/>
-              <a:t>26/07/2024</a:t>
+              <a:t>29/07/2024</a:t>
             </a:fld>
             <a:endParaRPr lang="en-NZ"/>
           </a:p>
@@ -5528,7 +5678,7 @@
           <a:p>
             <a:fld id="{57E58380-3550-4AA1-8DE5-F8A856B30F15}" type="datetimeFigureOut">
               <a:rPr lang="en-NZ" smtClean="0"/>
-              <a:t>26/07/2024</a:t>
+              <a:t>29/07/2024</a:t>
             </a:fld>
             <a:endParaRPr lang="en-NZ"/>
           </a:p>
@@ -8469,6 +8619,182 @@
       </p:grpSpPr>
       <p:sp>
         <p:nvSpPr>
+          <p:cNvPr id="2" name="Title 1">
+            <a:extLst>
+              <a:ext uri="{FF2B5EF4-FFF2-40B4-BE49-F238E27FC236}">
+                <a16:creationId xmlns:a16="http://schemas.microsoft.com/office/drawing/2014/main" id="{34597DDD-8A9F-91CE-34D0-F1F4490D2E2F}"/>
+              </a:ext>
+            </a:extLst>
+          </p:cNvPr>
+          <p:cNvSpPr>
+            <a:spLocks noGrp="1"/>
+          </p:cNvSpPr>
+          <p:nvPr>
+            <p:ph type="ctrTitle"/>
+          </p:nvPr>
+        </p:nvSpPr>
+        <p:spPr/>
+        <p:txBody>
+          <a:bodyPr/>
+          <a:lstStyle/>
+          <a:p>
+            <a:r>
+              <a:rPr lang="en-NZ" dirty="0"/>
+              <a:t>Version 1 Iterative Improvement</a:t>
+            </a:r>
+          </a:p>
+        </p:txBody>
+      </p:sp>
+      <p:sp>
+        <p:nvSpPr>
+          <p:cNvPr id="3" name="Subtitle 2">
+            <a:extLst>
+              <a:ext uri="{FF2B5EF4-FFF2-40B4-BE49-F238E27FC236}">
+                <a16:creationId xmlns:a16="http://schemas.microsoft.com/office/drawing/2014/main" id="{E3998A4E-F971-DCD7-3358-E21819B9965F}"/>
+              </a:ext>
+            </a:extLst>
+          </p:cNvPr>
+          <p:cNvSpPr>
+            <a:spLocks noGrp="1"/>
+          </p:cNvSpPr>
+          <p:nvPr>
+            <p:ph type="subTitle" idx="1"/>
+          </p:nvPr>
+        </p:nvSpPr>
+        <p:spPr/>
+        <p:txBody>
+          <a:bodyPr/>
+          <a:lstStyle/>
+          <a:p>
+            <a:endParaRPr lang="en-NZ" dirty="0"/>
+          </a:p>
+        </p:txBody>
+      </p:sp>
+    </p:spTree>
+    <p:extLst>
+      <p:ext uri="{BB962C8B-B14F-4D97-AF65-F5344CB8AC3E}">
+        <p14:creationId xmlns:p14="http://schemas.microsoft.com/office/powerpoint/2010/main" val="365957671"/>
+      </p:ext>
+    </p:extLst>
+  </p:cSld>
+  <p:clrMapOvr>
+    <a:masterClrMapping/>
+  </p:clrMapOvr>
+</p:sld>
+</file>
+
+<file path=ppt/slides/slide27.xml><?xml version="1.0" encoding="utf-8"?>
+<p:sld xmlns:a="http://schemas.openxmlformats.org/drawingml/2006/main" xmlns:r="http://schemas.openxmlformats.org/officeDocument/2006/relationships" xmlns:p="http://schemas.openxmlformats.org/presentationml/2006/main">
+  <p:cSld>
+    <p:spTree>
+      <p:nvGrpSpPr>
+        <p:cNvPr id="1" name=""/>
+        <p:cNvGrpSpPr/>
+        <p:nvPr/>
+      </p:nvGrpSpPr>
+      <p:grpSpPr>
+        <a:xfrm>
+          <a:off x="0" y="0"/>
+          <a:ext cx="0" cy="0"/>
+          <a:chOff x="0" y="0"/>
+          <a:chExt cx="0" cy="0"/>
+        </a:xfrm>
+      </p:grpSpPr>
+      <p:sp>
+        <p:nvSpPr>
+          <p:cNvPr id="2" name="Title 1">
+            <a:extLst>
+              <a:ext uri="{FF2B5EF4-FFF2-40B4-BE49-F238E27FC236}">
+                <a16:creationId xmlns:a16="http://schemas.microsoft.com/office/drawing/2014/main" id="{FBA05339-2903-F601-F6BA-E93B084B497D}"/>
+              </a:ext>
+            </a:extLst>
+          </p:cNvPr>
+          <p:cNvSpPr>
+            <a:spLocks noGrp="1"/>
+          </p:cNvSpPr>
+          <p:nvPr>
+            <p:ph type="title"/>
+          </p:nvPr>
+        </p:nvSpPr>
+        <p:spPr>
+          <a:xfrm>
+            <a:off x="156403" y="-289332"/>
+            <a:ext cx="9692640" cy="1325562"/>
+          </a:xfrm>
+        </p:spPr>
+        <p:txBody>
+          <a:bodyPr/>
+          <a:lstStyle/>
+          <a:p>
+            <a:r>
+              <a:rPr lang="en-NZ" dirty="0"/>
+              <a:t>Imported Blog App </a:t>
+            </a:r>
+          </a:p>
+        </p:txBody>
+      </p:sp>
+      <p:pic>
+        <p:nvPicPr>
+          <p:cNvPr id="4" name="Picture 3">
+            <a:extLst>
+              <a:ext uri="{FF2B5EF4-FFF2-40B4-BE49-F238E27FC236}">
+                <a16:creationId xmlns:a16="http://schemas.microsoft.com/office/drawing/2014/main" id="{4724BCC3-2154-88B1-5A2E-A3B5DA634785}"/>
+              </a:ext>
+            </a:extLst>
+          </p:cNvPr>
+          <p:cNvPicPr>
+            <a:picLocks noChangeAspect="1"/>
+          </p:cNvPicPr>
+          <p:nvPr/>
+        </p:nvPicPr>
+        <p:blipFill>
+          <a:blip r:embed="rId2"/>
+          <a:stretch>
+            <a:fillRect/>
+          </a:stretch>
+        </p:blipFill>
+        <p:spPr>
+          <a:xfrm>
+            <a:off x="361120" y="930562"/>
+            <a:ext cx="10134009" cy="5927438"/>
+          </a:xfrm>
+          <a:prstGeom prst="rect">
+            <a:avLst/>
+          </a:prstGeom>
+        </p:spPr>
+      </p:pic>
+    </p:spTree>
+    <p:extLst>
+      <p:ext uri="{BB962C8B-B14F-4D97-AF65-F5344CB8AC3E}">
+        <p14:creationId xmlns:p14="http://schemas.microsoft.com/office/powerpoint/2010/main" val="224206674"/>
+      </p:ext>
+    </p:extLst>
+  </p:cSld>
+  <p:clrMapOvr>
+    <a:masterClrMapping/>
+  </p:clrMapOvr>
+</p:sld>
+</file>
+
+<file path=ppt/slides/slide28.xml><?xml version="1.0" encoding="utf-8"?>
+<p:sld xmlns:a="http://schemas.openxmlformats.org/drawingml/2006/main" xmlns:r="http://schemas.openxmlformats.org/officeDocument/2006/relationships" xmlns:p="http://schemas.openxmlformats.org/presentationml/2006/main">
+  <p:cSld>
+    <p:spTree>
+      <p:nvGrpSpPr>
+        <p:cNvPr id="1" name=""/>
+        <p:cNvGrpSpPr/>
+        <p:nvPr/>
+      </p:nvGrpSpPr>
+      <p:grpSpPr>
+        <a:xfrm>
+          <a:off x="0" y="0"/>
+          <a:ext cx="0" cy="0"/>
+          <a:chOff x="0" y="0"/>
+          <a:chExt cx="0" cy="0"/>
+        </a:xfrm>
+      </p:grpSpPr>
+      <p:sp>
+        <p:nvSpPr>
           <p:cNvPr id="2" name="Title 1"/>
           <p:cNvSpPr>
             <a:spLocks noGrp="1"/>
@@ -8749,7 +9075,7 @@
 </p:sld>
 </file>
 
-<file path=ppt/slides/slide27.xml><?xml version="1.0" encoding="utf-8"?>
+<file path=ppt/slides/slide29.xml><?xml version="1.0" encoding="utf-8"?>
 <p:sld xmlns:a="http://schemas.openxmlformats.org/drawingml/2006/main" xmlns:r="http://schemas.openxmlformats.org/officeDocument/2006/relationships" xmlns:p="http://schemas.openxmlformats.org/presentationml/2006/main">
   <p:cSld>
     <p:spTree>
@@ -8997,7 +9323,326 @@
 </p:sld>
 </file>
 
-<file path=ppt/slides/slide28.xml><?xml version="1.0" encoding="utf-8"?>
+<file path=ppt/slides/slide3.xml><?xml version="1.0" encoding="utf-8"?>
+<p:sld xmlns:a="http://schemas.openxmlformats.org/drawingml/2006/main" xmlns:r="http://schemas.openxmlformats.org/officeDocument/2006/relationships" xmlns:p="http://schemas.openxmlformats.org/presentationml/2006/main">
+  <p:cSld>
+    <p:bg>
+      <p:bgPr>
+        <a:solidFill>
+          <a:schemeClr val="bg2">
+            <a:lumMod val="75000"/>
+          </a:schemeClr>
+        </a:solidFill>
+        <a:effectLst/>
+      </p:bgPr>
+    </p:bg>
+    <p:spTree>
+      <p:nvGrpSpPr>
+        <p:cNvPr id="1" name=""/>
+        <p:cNvGrpSpPr/>
+        <p:nvPr/>
+      </p:nvGrpSpPr>
+      <p:grpSpPr>
+        <a:xfrm>
+          <a:off x="0" y="0"/>
+          <a:ext cx="0" cy="0"/>
+          <a:chOff x="0" y="0"/>
+          <a:chExt cx="0" cy="0"/>
+        </a:xfrm>
+      </p:grpSpPr>
+      <p:sp>
+        <p:nvSpPr>
+          <p:cNvPr id="11" name="Rectangle 10">
+            <a:extLst>
+              <a:ext uri="{FF2B5EF4-FFF2-40B4-BE49-F238E27FC236}">
+                <a16:creationId xmlns:a16="http://schemas.microsoft.com/office/drawing/2014/main" id="{323D50B8-1D27-420D-BA4A-249914120C5D}"/>
+              </a:ext>
+              <a:ext uri="{C183D7F6-B498-43B3-948B-1728B52AA6E4}">
+                <adec:decorative xmlns:adec="http://schemas.microsoft.com/office/drawing/2017/decorative" val="1"/>
+              </a:ext>
+            </a:extLst>
+          </p:cNvPr>
+          <p:cNvSpPr>
+            <a:spLocks noGrp="1" noRot="1" noChangeAspect="1" noMove="1" noResize="1" noEditPoints="1" noAdjustHandles="1" noChangeArrowheads="1" noChangeShapeType="1" noTextEdit="1"/>
+          </p:cNvSpPr>
+          <p:nvPr>
+            <p:extLst>
+              <p:ext uri="{386F3935-93C4-4BCD-93E2-E3B085C9AB24}">
+                <p16:designElem xmlns:p16="http://schemas.microsoft.com/office/powerpoint/2015/main" val="1"/>
+              </p:ext>
+            </p:extLst>
+          </p:nvPr>
+        </p:nvSpPr>
+        <p:spPr>
+          <a:xfrm>
+            <a:off x="0" y="0"/>
+            <a:ext cx="457200" cy="6858000"/>
+          </a:xfrm>
+          <a:prstGeom prst="rect">
+            <a:avLst/>
+          </a:prstGeom>
+          <a:solidFill>
+            <a:schemeClr val="accent1"/>
+          </a:solidFill>
+          <a:ln>
+            <a:noFill/>
+          </a:ln>
+        </p:spPr>
+        <p:style>
+          <a:lnRef idx="2">
+            <a:schemeClr val="accent1">
+              <a:shade val="50000"/>
+            </a:schemeClr>
+          </a:lnRef>
+          <a:fillRef idx="1">
+            <a:schemeClr val="accent1"/>
+          </a:fillRef>
+          <a:effectRef idx="0">
+            <a:schemeClr val="accent1"/>
+          </a:effectRef>
+          <a:fontRef idx="minor">
+            <a:schemeClr val="lt1"/>
+          </a:fontRef>
+        </p:style>
+        <p:txBody>
+          <a:bodyPr/>
+          <a:lstStyle/>
+          <a:p>
+            <a:endParaRPr lang="en-NZ"/>
+          </a:p>
+        </p:txBody>
+      </p:sp>
+      <p:sp>
+        <p:nvSpPr>
+          <p:cNvPr id="13" name="Rectangle 12">
+            <a:extLst>
+              <a:ext uri="{FF2B5EF4-FFF2-40B4-BE49-F238E27FC236}">
+                <a16:creationId xmlns:a16="http://schemas.microsoft.com/office/drawing/2014/main" id="{2EFBB176-B6C1-4B5A-AADA-F930947E09CC}"/>
+              </a:ext>
+              <a:ext uri="{C183D7F6-B498-43B3-948B-1728B52AA6E4}">
+                <adec:decorative xmlns:adec="http://schemas.microsoft.com/office/drawing/2017/decorative" val="1"/>
+              </a:ext>
+            </a:extLst>
+          </p:cNvPr>
+          <p:cNvSpPr>
+            <a:spLocks noGrp="1" noRot="1" noChangeAspect="1" noMove="1" noResize="1" noEditPoints="1" noAdjustHandles="1" noChangeArrowheads="1" noChangeShapeType="1" noTextEdit="1"/>
+          </p:cNvSpPr>
+          <p:nvPr>
+            <p:extLst>
+              <p:ext uri="{386F3935-93C4-4BCD-93E2-E3B085C9AB24}">
+                <p16:designElem xmlns:p16="http://schemas.microsoft.com/office/powerpoint/2015/main" val="1"/>
+              </p:ext>
+            </p:extLst>
+          </p:nvPr>
+        </p:nvSpPr>
+        <p:spPr>
+          <a:xfrm>
+            <a:off x="457200" y="0"/>
+            <a:ext cx="10820400" cy="4949953"/>
+          </a:xfrm>
+          <a:prstGeom prst="rect">
+            <a:avLst/>
+          </a:prstGeom>
+          <a:solidFill>
+            <a:srgbClr val="FFFFFF"/>
+          </a:solidFill>
+          <a:ln>
+            <a:noFill/>
+          </a:ln>
+        </p:spPr>
+        <p:style>
+          <a:lnRef idx="2">
+            <a:schemeClr val="accent1">
+              <a:shade val="50000"/>
+            </a:schemeClr>
+          </a:lnRef>
+          <a:fillRef idx="1">
+            <a:schemeClr val="accent1"/>
+          </a:fillRef>
+          <a:effectRef idx="0">
+            <a:schemeClr val="accent1"/>
+          </a:effectRef>
+          <a:fontRef idx="minor">
+            <a:schemeClr val="lt1"/>
+          </a:fontRef>
+        </p:style>
+        <p:txBody>
+          <a:bodyPr/>
+          <a:lstStyle/>
+          <a:p>
+            <a:endParaRPr lang="en-NZ"/>
+          </a:p>
+        </p:txBody>
+      </p:sp>
+      <p:sp useBgFill="1">
+        <p:nvSpPr>
+          <p:cNvPr id="15" name="Rectangle 14">
+            <a:extLst>
+              <a:ext uri="{FF2B5EF4-FFF2-40B4-BE49-F238E27FC236}">
+                <a16:creationId xmlns:a16="http://schemas.microsoft.com/office/drawing/2014/main" id="{918CDC34-0F26-409D-B10F-578D4DCC46DE}"/>
+              </a:ext>
+              <a:ext uri="{C183D7F6-B498-43B3-948B-1728B52AA6E4}">
+                <adec:decorative xmlns:adec="http://schemas.microsoft.com/office/drawing/2017/decorative" val="1"/>
+              </a:ext>
+            </a:extLst>
+          </p:cNvPr>
+          <p:cNvSpPr>
+            <a:spLocks noGrp="1" noRot="1" noChangeAspect="1" noMove="1" noResize="1" noEditPoints="1" noAdjustHandles="1" noChangeArrowheads="1" noChangeShapeType="1" noTextEdit="1"/>
+          </p:cNvSpPr>
+          <p:nvPr>
+            <p:extLst>
+              <p:ext uri="{386F3935-93C4-4BCD-93E2-E3B085C9AB24}">
+                <p16:designElem xmlns:p16="http://schemas.microsoft.com/office/powerpoint/2015/main" val="1"/>
+              </p:ext>
+            </p:extLst>
+          </p:nvPr>
+        </p:nvSpPr>
+        <p:spPr>
+          <a:xfrm>
+            <a:off x="457200" y="5105400"/>
+            <a:ext cx="10835640" cy="1752600"/>
+          </a:xfrm>
+          <a:prstGeom prst="rect">
+            <a:avLst/>
+          </a:prstGeom>
+          <a:ln>
+            <a:noFill/>
+          </a:ln>
+        </p:spPr>
+        <p:style>
+          <a:lnRef idx="2">
+            <a:schemeClr val="accent1">
+              <a:shade val="50000"/>
+            </a:schemeClr>
+          </a:lnRef>
+          <a:fillRef idx="1">
+            <a:schemeClr val="accent1"/>
+          </a:fillRef>
+          <a:effectRef idx="0">
+            <a:schemeClr val="accent1"/>
+          </a:effectRef>
+          <a:fontRef idx="minor">
+            <a:schemeClr val="lt1"/>
+          </a:fontRef>
+        </p:style>
+        <p:txBody>
+          <a:bodyPr/>
+          <a:lstStyle/>
+          <a:p>
+            <a:endParaRPr lang="en-NZ"/>
+          </a:p>
+        </p:txBody>
+      </p:sp>
+      <p:sp>
+        <p:nvSpPr>
+          <p:cNvPr id="2" name="Title 1"/>
+          <p:cNvSpPr>
+            <a:spLocks noGrp="1"/>
+          </p:cNvSpPr>
+          <p:nvPr>
+            <p:ph type="title"/>
+          </p:nvPr>
+        </p:nvSpPr>
+        <p:spPr>
+          <a:xfrm>
+            <a:off x="944183" y="5181600"/>
+            <a:ext cx="10156435" cy="1076324"/>
+          </a:xfrm>
+        </p:spPr>
+        <p:txBody>
+          <a:bodyPr vert="horz" lIns="91440" tIns="45720" rIns="91440" bIns="45720" rtlCol="0" anchor="b">
+            <a:normAutofit/>
+          </a:bodyPr>
+          <a:lstStyle/>
+          <a:p>
+            <a:pPr>
+              <a:lnSpc>
+                <a:spcPct val="85000"/>
+              </a:lnSpc>
+            </a:pPr>
+            <a:r>
+              <a:rPr lang="en-US" sz="5400" dirty="0">
+                <a:latin typeface="Abadi" panose="020B0604020104020204" pitchFamily="34" charset="0"/>
+              </a:rPr>
+              <a:t>Project Management - Planning</a:t>
+            </a:r>
+          </a:p>
+        </p:txBody>
+      </p:sp>
+      <p:pic>
+        <p:nvPicPr>
+          <p:cNvPr id="6" name="Picture 5">
+            <a:extLst>
+              <a:ext uri="{FF2B5EF4-FFF2-40B4-BE49-F238E27FC236}">
+                <a16:creationId xmlns:a16="http://schemas.microsoft.com/office/drawing/2014/main" id="{8CB37E0A-EA31-B25C-AE49-225545FC70B2}"/>
+              </a:ext>
+            </a:extLst>
+          </p:cNvPr>
+          <p:cNvPicPr>
+            <a:picLocks noChangeAspect="1"/>
+          </p:cNvPicPr>
+          <p:nvPr/>
+        </p:nvPicPr>
+        <p:blipFill>
+          <a:blip r:embed="rId2"/>
+          <a:stretch>
+            <a:fillRect/>
+          </a:stretch>
+        </p:blipFill>
+        <p:spPr>
+          <a:xfrm>
+            <a:off x="963198" y="640081"/>
+            <a:ext cx="4513557" cy="3825240"/>
+          </a:xfrm>
+          <a:prstGeom prst="rect">
+            <a:avLst/>
+          </a:prstGeom>
+        </p:spPr>
+      </p:pic>
+      <p:pic>
+        <p:nvPicPr>
+          <p:cNvPr id="4" name="Picture 3">
+            <a:extLst>
+              <a:ext uri="{FF2B5EF4-FFF2-40B4-BE49-F238E27FC236}">
+                <a16:creationId xmlns:a16="http://schemas.microsoft.com/office/drawing/2014/main" id="{D4CA816A-D3CF-ECC0-B46C-8B987B00B5FF}"/>
+              </a:ext>
+            </a:extLst>
+          </p:cNvPr>
+          <p:cNvPicPr>
+            <a:picLocks noChangeAspect="1"/>
+          </p:cNvPicPr>
+          <p:nvPr/>
+        </p:nvPicPr>
+        <p:blipFill>
+          <a:blip r:embed="rId3"/>
+          <a:stretch>
+            <a:fillRect/>
+          </a:stretch>
+        </p:blipFill>
+        <p:spPr>
+          <a:xfrm>
+            <a:off x="5850146" y="600075"/>
+            <a:ext cx="5102634" cy="3865245"/>
+          </a:xfrm>
+          <a:prstGeom prst="rect">
+            <a:avLst/>
+          </a:prstGeom>
+        </p:spPr>
+      </p:pic>
+    </p:spTree>
+    <p:extLst>
+      <p:ext uri="{BB962C8B-B14F-4D97-AF65-F5344CB8AC3E}">
+        <p14:creationId xmlns:p14="http://schemas.microsoft.com/office/powerpoint/2010/main" val="3780887099"/>
+      </p:ext>
+    </p:extLst>
+  </p:cSld>
+  <p:clrMapOvr>
+    <a:masterClrMapping/>
+  </p:clrMapOvr>
+</p:sld>
+</file>
+
+<file path=ppt/slides/slide30.xml><?xml version="1.0" encoding="utf-8"?>
 <p:sld xmlns:a="http://schemas.openxmlformats.org/drawingml/2006/main" xmlns:r="http://schemas.openxmlformats.org/officeDocument/2006/relationships" xmlns:p="http://schemas.openxmlformats.org/presentationml/2006/main">
   <p:cSld>
     <p:spTree>
@@ -9202,66 +9847,6 @@
           </a:prstGeom>
         </p:spPr>
       </p:pic>
-      <p:pic>
-        <p:nvPicPr>
-          <p:cNvPr id="11" name="Picture 10">
-            <a:extLst>
-              <a:ext uri="{FF2B5EF4-FFF2-40B4-BE49-F238E27FC236}">
-                <a16:creationId xmlns:a16="http://schemas.microsoft.com/office/drawing/2014/main" id="{E187ECB1-C820-A533-EE37-286B8D5A9562}"/>
-              </a:ext>
-            </a:extLst>
-          </p:cNvPr>
-          <p:cNvPicPr>
-            <a:picLocks noChangeAspect="1"/>
-          </p:cNvPicPr>
-          <p:nvPr/>
-        </p:nvPicPr>
-        <p:blipFill>
-          <a:blip r:embed="rId4"/>
-          <a:stretch>
-            <a:fillRect/>
-          </a:stretch>
-        </p:blipFill>
-        <p:spPr>
-          <a:xfrm>
-            <a:off x="539169" y="3134507"/>
-            <a:ext cx="9011908" cy="2686425"/>
-          </a:xfrm>
-          <a:prstGeom prst="rect">
-            <a:avLst/>
-          </a:prstGeom>
-        </p:spPr>
-      </p:pic>
-      <p:pic>
-        <p:nvPicPr>
-          <p:cNvPr id="13" name="Picture 12">
-            <a:extLst>
-              <a:ext uri="{FF2B5EF4-FFF2-40B4-BE49-F238E27FC236}">
-                <a16:creationId xmlns:a16="http://schemas.microsoft.com/office/drawing/2014/main" id="{9CDC97B8-A802-BF58-8C90-410ADA20B8D5}"/>
-              </a:ext>
-            </a:extLst>
-          </p:cNvPr>
-          <p:cNvPicPr>
-            <a:picLocks noChangeAspect="1"/>
-          </p:cNvPicPr>
-          <p:nvPr/>
-        </p:nvPicPr>
-        <p:blipFill>
-          <a:blip r:embed="rId5"/>
-          <a:stretch>
-            <a:fillRect/>
-          </a:stretch>
-        </p:blipFill>
-        <p:spPr>
-          <a:xfrm>
-            <a:off x="3303617" y="1031751"/>
-            <a:ext cx="9078592" cy="4810796"/>
-          </a:xfrm>
-          <a:prstGeom prst="rect">
-            <a:avLst/>
-          </a:prstGeom>
-        </p:spPr>
-      </p:pic>
     </p:spTree>
     <p:extLst>
       <p:ext uri="{BB962C8B-B14F-4D97-AF65-F5344CB8AC3E}">
@@ -9275,7 +9860,7 @@
 </p:sld>
 </file>
 
-<file path=ppt/slides/slide29.xml><?xml version="1.0" encoding="utf-8"?>
+<file path=ppt/slides/slide31.xml><?xml version="1.0" encoding="utf-8"?>
 <p:sld xmlns:a="http://schemas.openxmlformats.org/drawingml/2006/main" xmlns:r="http://schemas.openxmlformats.org/officeDocument/2006/relationships" xmlns:p="http://schemas.openxmlformats.org/presentationml/2006/main">
   <p:cSld>
     <p:spTree>
@@ -9396,326 +9981,7 @@
 </p:sld>
 </file>
 
-<file path=ppt/slides/slide3.xml><?xml version="1.0" encoding="utf-8"?>
-<p:sld xmlns:a="http://schemas.openxmlformats.org/drawingml/2006/main" xmlns:r="http://schemas.openxmlformats.org/officeDocument/2006/relationships" xmlns:p="http://schemas.openxmlformats.org/presentationml/2006/main">
-  <p:cSld>
-    <p:bg>
-      <p:bgPr>
-        <a:solidFill>
-          <a:schemeClr val="bg2">
-            <a:lumMod val="75000"/>
-          </a:schemeClr>
-        </a:solidFill>
-        <a:effectLst/>
-      </p:bgPr>
-    </p:bg>
-    <p:spTree>
-      <p:nvGrpSpPr>
-        <p:cNvPr id="1" name=""/>
-        <p:cNvGrpSpPr/>
-        <p:nvPr/>
-      </p:nvGrpSpPr>
-      <p:grpSpPr>
-        <a:xfrm>
-          <a:off x="0" y="0"/>
-          <a:ext cx="0" cy="0"/>
-          <a:chOff x="0" y="0"/>
-          <a:chExt cx="0" cy="0"/>
-        </a:xfrm>
-      </p:grpSpPr>
-      <p:sp>
-        <p:nvSpPr>
-          <p:cNvPr id="11" name="Rectangle 10">
-            <a:extLst>
-              <a:ext uri="{FF2B5EF4-FFF2-40B4-BE49-F238E27FC236}">
-                <a16:creationId xmlns:a16="http://schemas.microsoft.com/office/drawing/2014/main" id="{323D50B8-1D27-420D-BA4A-249914120C5D}"/>
-              </a:ext>
-              <a:ext uri="{C183D7F6-B498-43B3-948B-1728B52AA6E4}">
-                <adec:decorative xmlns:adec="http://schemas.microsoft.com/office/drawing/2017/decorative" val="1"/>
-              </a:ext>
-            </a:extLst>
-          </p:cNvPr>
-          <p:cNvSpPr>
-            <a:spLocks noGrp="1" noRot="1" noChangeAspect="1" noMove="1" noResize="1" noEditPoints="1" noAdjustHandles="1" noChangeArrowheads="1" noChangeShapeType="1" noTextEdit="1"/>
-          </p:cNvSpPr>
-          <p:nvPr>
-            <p:extLst>
-              <p:ext uri="{386F3935-93C4-4BCD-93E2-E3B085C9AB24}">
-                <p16:designElem xmlns:p16="http://schemas.microsoft.com/office/powerpoint/2015/main" val="1"/>
-              </p:ext>
-            </p:extLst>
-          </p:nvPr>
-        </p:nvSpPr>
-        <p:spPr>
-          <a:xfrm>
-            <a:off x="0" y="0"/>
-            <a:ext cx="457200" cy="6858000"/>
-          </a:xfrm>
-          <a:prstGeom prst="rect">
-            <a:avLst/>
-          </a:prstGeom>
-          <a:solidFill>
-            <a:schemeClr val="accent1"/>
-          </a:solidFill>
-          <a:ln>
-            <a:noFill/>
-          </a:ln>
-        </p:spPr>
-        <p:style>
-          <a:lnRef idx="2">
-            <a:schemeClr val="accent1">
-              <a:shade val="50000"/>
-            </a:schemeClr>
-          </a:lnRef>
-          <a:fillRef idx="1">
-            <a:schemeClr val="accent1"/>
-          </a:fillRef>
-          <a:effectRef idx="0">
-            <a:schemeClr val="accent1"/>
-          </a:effectRef>
-          <a:fontRef idx="minor">
-            <a:schemeClr val="lt1"/>
-          </a:fontRef>
-        </p:style>
-        <p:txBody>
-          <a:bodyPr/>
-          <a:lstStyle/>
-          <a:p>
-            <a:endParaRPr lang="en-NZ"/>
-          </a:p>
-        </p:txBody>
-      </p:sp>
-      <p:sp>
-        <p:nvSpPr>
-          <p:cNvPr id="13" name="Rectangle 12">
-            <a:extLst>
-              <a:ext uri="{FF2B5EF4-FFF2-40B4-BE49-F238E27FC236}">
-                <a16:creationId xmlns:a16="http://schemas.microsoft.com/office/drawing/2014/main" id="{2EFBB176-B6C1-4B5A-AADA-F930947E09CC}"/>
-              </a:ext>
-              <a:ext uri="{C183D7F6-B498-43B3-948B-1728B52AA6E4}">
-                <adec:decorative xmlns:adec="http://schemas.microsoft.com/office/drawing/2017/decorative" val="1"/>
-              </a:ext>
-            </a:extLst>
-          </p:cNvPr>
-          <p:cNvSpPr>
-            <a:spLocks noGrp="1" noRot="1" noChangeAspect="1" noMove="1" noResize="1" noEditPoints="1" noAdjustHandles="1" noChangeArrowheads="1" noChangeShapeType="1" noTextEdit="1"/>
-          </p:cNvSpPr>
-          <p:nvPr>
-            <p:extLst>
-              <p:ext uri="{386F3935-93C4-4BCD-93E2-E3B085C9AB24}">
-                <p16:designElem xmlns:p16="http://schemas.microsoft.com/office/powerpoint/2015/main" val="1"/>
-              </p:ext>
-            </p:extLst>
-          </p:nvPr>
-        </p:nvSpPr>
-        <p:spPr>
-          <a:xfrm>
-            <a:off x="457200" y="0"/>
-            <a:ext cx="10820400" cy="4949953"/>
-          </a:xfrm>
-          <a:prstGeom prst="rect">
-            <a:avLst/>
-          </a:prstGeom>
-          <a:solidFill>
-            <a:srgbClr val="FFFFFF"/>
-          </a:solidFill>
-          <a:ln>
-            <a:noFill/>
-          </a:ln>
-        </p:spPr>
-        <p:style>
-          <a:lnRef idx="2">
-            <a:schemeClr val="accent1">
-              <a:shade val="50000"/>
-            </a:schemeClr>
-          </a:lnRef>
-          <a:fillRef idx="1">
-            <a:schemeClr val="accent1"/>
-          </a:fillRef>
-          <a:effectRef idx="0">
-            <a:schemeClr val="accent1"/>
-          </a:effectRef>
-          <a:fontRef idx="minor">
-            <a:schemeClr val="lt1"/>
-          </a:fontRef>
-        </p:style>
-        <p:txBody>
-          <a:bodyPr/>
-          <a:lstStyle/>
-          <a:p>
-            <a:endParaRPr lang="en-NZ"/>
-          </a:p>
-        </p:txBody>
-      </p:sp>
-      <p:sp useBgFill="1">
-        <p:nvSpPr>
-          <p:cNvPr id="15" name="Rectangle 14">
-            <a:extLst>
-              <a:ext uri="{FF2B5EF4-FFF2-40B4-BE49-F238E27FC236}">
-                <a16:creationId xmlns:a16="http://schemas.microsoft.com/office/drawing/2014/main" id="{918CDC34-0F26-409D-B10F-578D4DCC46DE}"/>
-              </a:ext>
-              <a:ext uri="{C183D7F6-B498-43B3-948B-1728B52AA6E4}">
-                <adec:decorative xmlns:adec="http://schemas.microsoft.com/office/drawing/2017/decorative" val="1"/>
-              </a:ext>
-            </a:extLst>
-          </p:cNvPr>
-          <p:cNvSpPr>
-            <a:spLocks noGrp="1" noRot="1" noChangeAspect="1" noMove="1" noResize="1" noEditPoints="1" noAdjustHandles="1" noChangeArrowheads="1" noChangeShapeType="1" noTextEdit="1"/>
-          </p:cNvSpPr>
-          <p:nvPr>
-            <p:extLst>
-              <p:ext uri="{386F3935-93C4-4BCD-93E2-E3B085C9AB24}">
-                <p16:designElem xmlns:p16="http://schemas.microsoft.com/office/powerpoint/2015/main" val="1"/>
-              </p:ext>
-            </p:extLst>
-          </p:nvPr>
-        </p:nvSpPr>
-        <p:spPr>
-          <a:xfrm>
-            <a:off x="457200" y="5105400"/>
-            <a:ext cx="10835640" cy="1752600"/>
-          </a:xfrm>
-          <a:prstGeom prst="rect">
-            <a:avLst/>
-          </a:prstGeom>
-          <a:ln>
-            <a:noFill/>
-          </a:ln>
-        </p:spPr>
-        <p:style>
-          <a:lnRef idx="2">
-            <a:schemeClr val="accent1">
-              <a:shade val="50000"/>
-            </a:schemeClr>
-          </a:lnRef>
-          <a:fillRef idx="1">
-            <a:schemeClr val="accent1"/>
-          </a:fillRef>
-          <a:effectRef idx="0">
-            <a:schemeClr val="accent1"/>
-          </a:effectRef>
-          <a:fontRef idx="minor">
-            <a:schemeClr val="lt1"/>
-          </a:fontRef>
-        </p:style>
-        <p:txBody>
-          <a:bodyPr/>
-          <a:lstStyle/>
-          <a:p>
-            <a:endParaRPr lang="en-NZ"/>
-          </a:p>
-        </p:txBody>
-      </p:sp>
-      <p:sp>
-        <p:nvSpPr>
-          <p:cNvPr id="2" name="Title 1"/>
-          <p:cNvSpPr>
-            <a:spLocks noGrp="1"/>
-          </p:cNvSpPr>
-          <p:nvPr>
-            <p:ph type="title"/>
-          </p:nvPr>
-        </p:nvSpPr>
-        <p:spPr>
-          <a:xfrm>
-            <a:off x="944183" y="5181600"/>
-            <a:ext cx="10156435" cy="1076324"/>
-          </a:xfrm>
-        </p:spPr>
-        <p:txBody>
-          <a:bodyPr vert="horz" lIns="91440" tIns="45720" rIns="91440" bIns="45720" rtlCol="0" anchor="b">
-            <a:normAutofit/>
-          </a:bodyPr>
-          <a:lstStyle/>
-          <a:p>
-            <a:pPr>
-              <a:lnSpc>
-                <a:spcPct val="85000"/>
-              </a:lnSpc>
-            </a:pPr>
-            <a:r>
-              <a:rPr lang="en-US" sz="5400" dirty="0">
-                <a:latin typeface="Abadi" panose="020B0604020104020204" pitchFamily="34" charset="0"/>
-              </a:rPr>
-              <a:t>Project Management - Planning</a:t>
-            </a:r>
-          </a:p>
-        </p:txBody>
-      </p:sp>
-      <p:pic>
-        <p:nvPicPr>
-          <p:cNvPr id="6" name="Picture 5">
-            <a:extLst>
-              <a:ext uri="{FF2B5EF4-FFF2-40B4-BE49-F238E27FC236}">
-                <a16:creationId xmlns:a16="http://schemas.microsoft.com/office/drawing/2014/main" id="{8CB37E0A-EA31-B25C-AE49-225545FC70B2}"/>
-              </a:ext>
-            </a:extLst>
-          </p:cNvPr>
-          <p:cNvPicPr>
-            <a:picLocks noChangeAspect="1"/>
-          </p:cNvPicPr>
-          <p:nvPr/>
-        </p:nvPicPr>
-        <p:blipFill>
-          <a:blip r:embed="rId2"/>
-          <a:stretch>
-            <a:fillRect/>
-          </a:stretch>
-        </p:blipFill>
-        <p:spPr>
-          <a:xfrm>
-            <a:off x="963198" y="640081"/>
-            <a:ext cx="4513557" cy="3825240"/>
-          </a:xfrm>
-          <a:prstGeom prst="rect">
-            <a:avLst/>
-          </a:prstGeom>
-        </p:spPr>
-      </p:pic>
-      <p:pic>
-        <p:nvPicPr>
-          <p:cNvPr id="4" name="Picture 3">
-            <a:extLst>
-              <a:ext uri="{FF2B5EF4-FFF2-40B4-BE49-F238E27FC236}">
-                <a16:creationId xmlns:a16="http://schemas.microsoft.com/office/drawing/2014/main" id="{D4CA816A-D3CF-ECC0-B46C-8B987B00B5FF}"/>
-              </a:ext>
-            </a:extLst>
-          </p:cNvPr>
-          <p:cNvPicPr>
-            <a:picLocks noChangeAspect="1"/>
-          </p:cNvPicPr>
-          <p:nvPr/>
-        </p:nvPicPr>
-        <p:blipFill>
-          <a:blip r:embed="rId3"/>
-          <a:stretch>
-            <a:fillRect/>
-          </a:stretch>
-        </p:blipFill>
-        <p:spPr>
-          <a:xfrm>
-            <a:off x="5850146" y="600075"/>
-            <a:ext cx="5102634" cy="3865245"/>
-          </a:xfrm>
-          <a:prstGeom prst="rect">
-            <a:avLst/>
-          </a:prstGeom>
-        </p:spPr>
-      </p:pic>
-    </p:spTree>
-    <p:extLst>
-      <p:ext uri="{BB962C8B-B14F-4D97-AF65-F5344CB8AC3E}">
-        <p14:creationId xmlns:p14="http://schemas.microsoft.com/office/powerpoint/2010/main" val="3780887099"/>
-      </p:ext>
-    </p:extLst>
-  </p:cSld>
-  <p:clrMapOvr>
-    <a:masterClrMapping/>
-  </p:clrMapOvr>
-</p:sld>
-</file>
-
-<file path=ppt/slides/slide30.xml><?xml version="1.0" encoding="utf-8"?>
+<file path=ppt/slides/slide32.xml><?xml version="1.0" encoding="utf-8"?>
 <p:sld xmlns:a="http://schemas.openxmlformats.org/drawingml/2006/main" xmlns:r="http://schemas.openxmlformats.org/officeDocument/2006/relationships" xmlns:p="http://schemas.openxmlformats.org/presentationml/2006/main">
   <p:cSld>
     <p:spTree>
@@ -9950,7 +10216,7 @@
 </p:sld>
 </file>
 
-<file path=ppt/slides/slide31.xml><?xml version="1.0" encoding="utf-8"?>
+<file path=ppt/slides/slide33.xml><?xml version="1.0" encoding="utf-8"?>
 <p:sld xmlns:a="http://schemas.openxmlformats.org/drawingml/2006/main" xmlns:r="http://schemas.openxmlformats.org/officeDocument/2006/relationships" xmlns:p="http://schemas.openxmlformats.org/presentationml/2006/main">
   <p:cSld>
     <p:spTree>
@@ -10179,7 +10445,90 @@
 </p:sld>
 </file>
 
-<file path=ppt/slides/slide32.xml><?xml version="1.0" encoding="utf-8"?>
+<file path=ppt/slides/slide34.xml><?xml version="1.0" encoding="utf-8"?>
+<p:sld xmlns:a="http://schemas.openxmlformats.org/drawingml/2006/main" xmlns:r="http://schemas.openxmlformats.org/officeDocument/2006/relationships" xmlns:p="http://schemas.openxmlformats.org/presentationml/2006/main">
+  <p:cSld>
+    <p:spTree>
+      <p:nvGrpSpPr>
+        <p:cNvPr id="1" name=""/>
+        <p:cNvGrpSpPr/>
+        <p:nvPr/>
+      </p:nvGrpSpPr>
+      <p:grpSpPr>
+        <a:xfrm>
+          <a:off x="0" y="0"/>
+          <a:ext cx="0" cy="0"/>
+          <a:chOff x="0" y="0"/>
+          <a:chExt cx="0" cy="0"/>
+        </a:xfrm>
+      </p:grpSpPr>
+      <p:sp>
+        <p:nvSpPr>
+          <p:cNvPr id="2" name="Title 1">
+            <a:extLst>
+              <a:ext uri="{FF2B5EF4-FFF2-40B4-BE49-F238E27FC236}">
+                <a16:creationId xmlns:a16="http://schemas.microsoft.com/office/drawing/2014/main" id="{BDD183A0-C9F2-AAE4-7897-5DABA866383C}"/>
+              </a:ext>
+            </a:extLst>
+          </p:cNvPr>
+          <p:cNvSpPr>
+            <a:spLocks noGrp="1"/>
+          </p:cNvSpPr>
+          <p:nvPr>
+            <p:ph type="ctrTitle"/>
+          </p:nvPr>
+        </p:nvSpPr>
+        <p:spPr/>
+        <p:txBody>
+          <a:bodyPr/>
+          <a:lstStyle/>
+          <a:p>
+            <a:r>
+              <a:rPr lang="en-NZ" dirty="0"/>
+              <a:t>Version 2 Iterative Improvement</a:t>
+            </a:r>
+          </a:p>
+        </p:txBody>
+      </p:sp>
+      <p:sp>
+        <p:nvSpPr>
+          <p:cNvPr id="3" name="Subtitle 2">
+            <a:extLst>
+              <a:ext uri="{FF2B5EF4-FFF2-40B4-BE49-F238E27FC236}">
+                <a16:creationId xmlns:a16="http://schemas.microsoft.com/office/drawing/2014/main" id="{F91F91A4-51F1-6F5B-B4EE-CD8D492AD30D}"/>
+              </a:ext>
+            </a:extLst>
+          </p:cNvPr>
+          <p:cNvSpPr>
+            <a:spLocks noGrp="1"/>
+          </p:cNvSpPr>
+          <p:nvPr>
+            <p:ph type="subTitle" idx="1"/>
+          </p:nvPr>
+        </p:nvSpPr>
+        <p:spPr/>
+        <p:txBody>
+          <a:bodyPr/>
+          <a:lstStyle/>
+          <a:p>
+            <a:endParaRPr lang="en-NZ"/>
+          </a:p>
+        </p:txBody>
+      </p:sp>
+    </p:spTree>
+    <p:extLst>
+      <p:ext uri="{BB962C8B-B14F-4D97-AF65-F5344CB8AC3E}">
+        <p14:creationId xmlns:p14="http://schemas.microsoft.com/office/powerpoint/2010/main" val="1714849973"/>
+      </p:ext>
+    </p:extLst>
+  </p:cSld>
+  <p:clrMapOvr>
+    <a:masterClrMapping/>
+  </p:clrMapOvr>
+</p:sld>
+</file>
+
+<file path=ppt/slides/slide35.xml><?xml version="1.0" encoding="utf-8"?>
 <p:sld xmlns:a="http://schemas.openxmlformats.org/drawingml/2006/main" xmlns:r="http://schemas.openxmlformats.org/officeDocument/2006/relationships" xmlns:p="http://schemas.openxmlformats.org/presentationml/2006/main">
   <p:cSld>
     <p:spTree>
@@ -10422,7 +10771,7 @@
 </p:sld>
 </file>
 
-<file path=ppt/slides/slide33.xml><?xml version="1.0" encoding="utf-8"?>
+<file path=ppt/slides/slide36.xml><?xml version="1.0" encoding="utf-8"?>
 <p:sld xmlns:a="http://schemas.openxmlformats.org/drawingml/2006/main" xmlns:r="http://schemas.openxmlformats.org/officeDocument/2006/relationships" xmlns:p="http://schemas.openxmlformats.org/presentationml/2006/main">
   <p:cSld>
     <p:spTree>
@@ -10485,7 +10834,399 @@
           <p:nvPr>
             <p:extLst>
               <p:ext uri="{D42A27DB-BD31-4B8C-83A1-F6EECF244321}">
-                <p14:modId xmlns:p14="http://schemas.microsoft.com/office/powerpoint/2010/main" val="290382877"/>
+                <p14:modId xmlns:p14="http://schemas.microsoft.com/office/powerpoint/2010/main" val="3721217617"/>
+              </p:ext>
+            </p:extLst>
+          </p:nvPr>
+        </p:nvGraphicFramePr>
+        <p:xfrm>
+          <a:off x="1249680" y="1031751"/>
+          <a:ext cx="9430604" cy="1861575"/>
+        </p:xfrm>
+        <a:graphic>
+          <a:graphicData uri="http://schemas.openxmlformats.org/drawingml/2006/table">
+            <a:tbl>
+              <a:tblPr firstRow="1" bandRow="1">
+                <a:tableStyleId>{5C22544A-7EE6-4342-B048-85BDC9FD1C3A}</a:tableStyleId>
+              </a:tblPr>
+              <a:tblGrid>
+                <a:gridCol w="4715302">
+                  <a:extLst>
+                    <a:ext uri="{9D8B030D-6E8A-4147-A177-3AD203B41FA5}">
+                      <a16:colId xmlns:a16="http://schemas.microsoft.com/office/drawing/2014/main" val="2104603021"/>
+                    </a:ext>
+                  </a:extLst>
+                </a:gridCol>
+                <a:gridCol w="4715302">
+                  <a:extLst>
+                    <a:ext uri="{9D8B030D-6E8A-4147-A177-3AD203B41FA5}">
+                      <a16:colId xmlns:a16="http://schemas.microsoft.com/office/drawing/2014/main" val="2097243175"/>
+                    </a:ext>
+                  </a:extLst>
+                </a:gridCol>
+              </a:tblGrid>
+              <a:tr h="1861575">
+                <a:tc>
+                  <a:txBody>
+                    <a:bodyPr/>
+                    <a:lstStyle/>
+                    <a:p>
+                      <a:r>
+                        <a:rPr lang="en-NZ" dirty="0">
+                          <a:latin typeface="Abadi" panose="020B0604020104020204" pitchFamily="34" charset="0"/>
+                        </a:rPr>
+                        <a:t>After making my navbar stick to the top, scrolling down made me realise that the navbar was transparent rather than being white.</a:t>
+                      </a:r>
+                    </a:p>
+                  </a:txBody>
+                  <a:tcPr/>
+                </a:tc>
+                <a:tc>
+                  <a:txBody>
+                    <a:bodyPr/>
+                    <a:lstStyle/>
+                    <a:p>
+                      <a:r>
+                        <a:rPr lang="en-NZ" dirty="0">
+                          <a:latin typeface="Abadi" panose="020B0604020104020204" pitchFamily="34" charset="0"/>
+                        </a:rPr>
+                        <a:t>I corrected this by setting the background colour in my stylesheet. </a:t>
+                      </a:r>
+                    </a:p>
+                  </a:txBody>
+                  <a:tcPr/>
+                </a:tc>
+                <a:extLst>
+                  <a:ext uri="{0D108BD9-81ED-4DB2-BD59-A6C34878D82A}">
+                    <a16:rowId xmlns:a16="http://schemas.microsoft.com/office/drawing/2014/main" val="2765992196"/>
+                  </a:ext>
+                </a:extLst>
+              </a:tr>
+            </a:tbl>
+          </a:graphicData>
+        </a:graphic>
+      </p:graphicFrame>
+      <p:pic>
+        <p:nvPicPr>
+          <p:cNvPr id="5" name="Picture 4">
+            <a:extLst>
+              <a:ext uri="{FF2B5EF4-FFF2-40B4-BE49-F238E27FC236}">
+                <a16:creationId xmlns:a16="http://schemas.microsoft.com/office/drawing/2014/main" id="{25137C94-039F-3DF4-90D3-CFDE5F736E49}"/>
+              </a:ext>
+            </a:extLst>
+          </p:cNvPr>
+          <p:cNvPicPr>
+            <a:picLocks noChangeAspect="1"/>
+          </p:cNvPicPr>
+          <p:nvPr/>
+        </p:nvPicPr>
+        <p:blipFill>
+          <a:blip r:embed="rId2"/>
+          <a:stretch>
+            <a:fillRect/>
+          </a:stretch>
+        </p:blipFill>
+        <p:spPr>
+          <a:xfrm>
+            <a:off x="5755717" y="2893326"/>
+            <a:ext cx="5016463" cy="1292987"/>
+          </a:xfrm>
+          <a:prstGeom prst="rect">
+            <a:avLst/>
+          </a:prstGeom>
+        </p:spPr>
+      </p:pic>
+      <p:pic>
+        <p:nvPicPr>
+          <p:cNvPr id="7" name="Picture 6">
+            <a:extLst>
+              <a:ext uri="{FF2B5EF4-FFF2-40B4-BE49-F238E27FC236}">
+                <a16:creationId xmlns:a16="http://schemas.microsoft.com/office/drawing/2014/main" id="{DD785A3E-D8A0-F7B2-EE57-F1EC629879CF}"/>
+              </a:ext>
+            </a:extLst>
+          </p:cNvPr>
+          <p:cNvPicPr>
+            <a:picLocks noChangeAspect="1"/>
+          </p:cNvPicPr>
+          <p:nvPr/>
+        </p:nvPicPr>
+        <p:blipFill>
+          <a:blip r:embed="rId3"/>
+          <a:stretch>
+            <a:fillRect/>
+          </a:stretch>
+        </p:blipFill>
+        <p:spPr>
+          <a:xfrm>
+            <a:off x="602692" y="2961778"/>
+            <a:ext cx="5153025" cy="600075"/>
+          </a:xfrm>
+          <a:prstGeom prst="rect">
+            <a:avLst/>
+          </a:prstGeom>
+        </p:spPr>
+      </p:pic>
+      <p:pic>
+        <p:nvPicPr>
+          <p:cNvPr id="11" name="Picture 10">
+            <a:extLst>
+              <a:ext uri="{FF2B5EF4-FFF2-40B4-BE49-F238E27FC236}">
+                <a16:creationId xmlns:a16="http://schemas.microsoft.com/office/drawing/2014/main" id="{43ED400D-F0F9-83A6-288A-AACD04217DA4}"/>
+              </a:ext>
+            </a:extLst>
+          </p:cNvPr>
+          <p:cNvPicPr>
+            <a:picLocks noChangeAspect="1"/>
+          </p:cNvPicPr>
+          <p:nvPr/>
+        </p:nvPicPr>
+        <p:blipFill>
+          <a:blip r:embed="rId4"/>
+          <a:stretch>
+            <a:fillRect/>
+          </a:stretch>
+        </p:blipFill>
+        <p:spPr>
+          <a:xfrm>
+            <a:off x="556918" y="3953246"/>
+            <a:ext cx="5891562" cy="2904754"/>
+          </a:xfrm>
+          <a:prstGeom prst="rect">
+            <a:avLst/>
+          </a:prstGeom>
+        </p:spPr>
+      </p:pic>
+    </p:spTree>
+    <p:extLst>
+      <p:ext uri="{BB962C8B-B14F-4D97-AF65-F5344CB8AC3E}">
+        <p14:creationId xmlns:p14="http://schemas.microsoft.com/office/powerpoint/2010/main" val="3434099490"/>
+      </p:ext>
+    </p:extLst>
+  </p:cSld>
+  <p:clrMapOvr>
+    <a:masterClrMapping/>
+  </p:clrMapOvr>
+</p:sld>
+</file>
+
+<file path=ppt/slides/slide37.xml><?xml version="1.0" encoding="utf-8"?>
+<p:sld xmlns:a="http://schemas.openxmlformats.org/drawingml/2006/main" xmlns:r="http://schemas.openxmlformats.org/officeDocument/2006/relationships" xmlns:p="http://schemas.openxmlformats.org/presentationml/2006/main">
+  <p:cSld>
+    <p:spTree>
+      <p:nvGrpSpPr>
+        <p:cNvPr id="1" name=""/>
+        <p:cNvGrpSpPr/>
+        <p:nvPr/>
+      </p:nvGrpSpPr>
+      <p:grpSpPr>
+        <a:xfrm>
+          <a:off x="0" y="0"/>
+          <a:ext cx="0" cy="0"/>
+          <a:chOff x="0" y="0"/>
+          <a:chExt cx="0" cy="0"/>
+        </a:xfrm>
+      </p:grpSpPr>
+      <p:sp>
+        <p:nvSpPr>
+          <p:cNvPr id="2" name="Title 1"/>
+          <p:cNvSpPr>
+            <a:spLocks noGrp="1"/>
+          </p:cNvSpPr>
+          <p:nvPr>
+            <p:ph type="title"/>
+          </p:nvPr>
+        </p:nvSpPr>
+        <p:spPr>
+          <a:xfrm>
+            <a:off x="1249680" y="183832"/>
+            <a:ext cx="9692640" cy="606738"/>
+          </a:xfrm>
+        </p:spPr>
+        <p:txBody>
+          <a:bodyPr>
+            <a:normAutofit/>
+          </a:bodyPr>
+          <a:lstStyle/>
+          <a:p>
+            <a:r>
+              <a:rPr lang="en-NZ" sz="2800" dirty="0">
+                <a:latin typeface="Abadi" panose="020B0604020104020204" pitchFamily="34" charset="0"/>
+              </a:rPr>
+              <a:t>Iterative Improvement (Navbar V2)</a:t>
+            </a:r>
+          </a:p>
+        </p:txBody>
+      </p:sp>
+      <p:pic>
+        <p:nvPicPr>
+          <p:cNvPr id="5" name="Picture 4">
+            <a:extLst>
+              <a:ext uri="{FF2B5EF4-FFF2-40B4-BE49-F238E27FC236}">
+                <a16:creationId xmlns:a16="http://schemas.microsoft.com/office/drawing/2014/main" id="{25137C94-039F-3DF4-90D3-CFDE5F736E49}"/>
+              </a:ext>
+            </a:extLst>
+          </p:cNvPr>
+          <p:cNvPicPr>
+            <a:picLocks noChangeAspect="1"/>
+          </p:cNvPicPr>
+          <p:nvPr/>
+        </p:nvPicPr>
+        <p:blipFill>
+          <a:blip r:embed="rId2"/>
+          <a:stretch>
+            <a:fillRect/>
+          </a:stretch>
+        </p:blipFill>
+        <p:spPr>
+          <a:xfrm>
+            <a:off x="994467" y="1783418"/>
+            <a:ext cx="5016463" cy="1292987"/>
+          </a:xfrm>
+          <a:prstGeom prst="rect">
+            <a:avLst/>
+          </a:prstGeom>
+        </p:spPr>
+      </p:pic>
+      <p:graphicFrame>
+        <p:nvGraphicFramePr>
+          <p:cNvPr id="4" name="Table 3">
+            <a:extLst>
+              <a:ext uri="{FF2B5EF4-FFF2-40B4-BE49-F238E27FC236}">
+                <a16:creationId xmlns:a16="http://schemas.microsoft.com/office/drawing/2014/main" id="{9FA07D46-C251-4EF2-0365-B907C7DBEBCF}"/>
+              </a:ext>
+            </a:extLst>
+          </p:cNvPr>
+          <p:cNvGraphicFramePr>
+            <a:graphicFrameLocks noGrp="1"/>
+          </p:cNvGraphicFramePr>
+          <p:nvPr>
+            <p:extLst>
+              <p:ext uri="{D42A27DB-BD31-4B8C-83A1-F6EECF244321}">
+                <p14:modId xmlns:p14="http://schemas.microsoft.com/office/powerpoint/2010/main" val="527820972"/>
+              </p:ext>
+            </p:extLst>
+          </p:nvPr>
+        </p:nvGraphicFramePr>
+        <p:xfrm>
+          <a:off x="1249680" y="996543"/>
+          <a:ext cx="8128000" cy="370840"/>
+        </p:xfrm>
+        <a:graphic>
+          <a:graphicData uri="http://schemas.openxmlformats.org/drawingml/2006/table">
+            <a:tbl>
+              <a:tblPr firstRow="1" bandRow="1">
+                <a:tableStyleId>{5C22544A-7EE6-4342-B048-85BDC9FD1C3A}</a:tableStyleId>
+              </a:tblPr>
+              <a:tblGrid>
+                <a:gridCol w="8128000">
+                  <a:extLst>
+                    <a:ext uri="{9D8B030D-6E8A-4147-A177-3AD203B41FA5}">
+                      <a16:colId xmlns:a16="http://schemas.microsoft.com/office/drawing/2014/main" val="3661073892"/>
+                    </a:ext>
+                  </a:extLst>
+                </a:gridCol>
+              </a:tblGrid>
+              <a:tr h="370840">
+                <a:tc>
+                  <a:txBody>
+                    <a:bodyPr/>
+                    <a:lstStyle/>
+                    <a:p>
+                      <a:r>
+                        <a:rPr lang="en-NZ" dirty="0"/>
+                        <a:t>The navbar was also missing the image of the logo in the navbar. </a:t>
+                      </a:r>
+                    </a:p>
+                  </a:txBody>
+                  <a:tcPr/>
+                </a:tc>
+                <a:extLst>
+                  <a:ext uri="{0D108BD9-81ED-4DB2-BD59-A6C34878D82A}">
+                    <a16:rowId xmlns:a16="http://schemas.microsoft.com/office/drawing/2014/main" val="2220021842"/>
+                  </a:ext>
+                </a:extLst>
+              </a:tr>
+            </a:tbl>
+          </a:graphicData>
+        </a:graphic>
+      </p:graphicFrame>
+    </p:spTree>
+    <p:extLst>
+      <p:ext uri="{BB962C8B-B14F-4D97-AF65-F5344CB8AC3E}">
+        <p14:creationId xmlns:p14="http://schemas.microsoft.com/office/powerpoint/2010/main" val="989374121"/>
+      </p:ext>
+    </p:extLst>
+  </p:cSld>
+  <p:clrMapOvr>
+    <a:masterClrMapping/>
+  </p:clrMapOvr>
+</p:sld>
+</file>
+
+<file path=ppt/slides/slide38.xml><?xml version="1.0" encoding="utf-8"?>
+<p:sld xmlns:a="http://schemas.openxmlformats.org/drawingml/2006/main" xmlns:r="http://schemas.openxmlformats.org/officeDocument/2006/relationships" xmlns:p="http://schemas.openxmlformats.org/presentationml/2006/main">
+  <p:cSld>
+    <p:spTree>
+      <p:nvGrpSpPr>
+        <p:cNvPr id="1" name=""/>
+        <p:cNvGrpSpPr/>
+        <p:nvPr/>
+      </p:nvGrpSpPr>
+      <p:grpSpPr>
+        <a:xfrm>
+          <a:off x="0" y="0"/>
+          <a:ext cx="0" cy="0"/>
+          <a:chOff x="0" y="0"/>
+          <a:chExt cx="0" cy="0"/>
+        </a:xfrm>
+      </p:grpSpPr>
+      <p:sp>
+        <p:nvSpPr>
+          <p:cNvPr id="2" name="Title 1"/>
+          <p:cNvSpPr>
+            <a:spLocks noGrp="1"/>
+          </p:cNvSpPr>
+          <p:nvPr>
+            <p:ph type="title"/>
+          </p:nvPr>
+        </p:nvSpPr>
+        <p:spPr>
+          <a:xfrm>
+            <a:off x="1249680" y="183832"/>
+            <a:ext cx="9692640" cy="606738"/>
+          </a:xfrm>
+        </p:spPr>
+        <p:txBody>
+          <a:bodyPr>
+            <a:normAutofit/>
+          </a:bodyPr>
+          <a:lstStyle/>
+          <a:p>
+            <a:r>
+              <a:rPr lang="en-NZ" sz="2800" dirty="0">
+                <a:latin typeface="Abadi" panose="020B0604020104020204" pitchFamily="34" charset="0"/>
+              </a:rPr>
+              <a:t>Iterative Improvement (Home Page V2)</a:t>
+            </a:r>
+          </a:p>
+        </p:txBody>
+      </p:sp>
+      <p:graphicFrame>
+        <p:nvGraphicFramePr>
+          <p:cNvPr id="3" name="Table 2">
+            <a:extLst>
+              <a:ext uri="{FF2B5EF4-FFF2-40B4-BE49-F238E27FC236}">
+                <a16:creationId xmlns:a16="http://schemas.microsoft.com/office/drawing/2014/main" id="{1A9023FA-33FD-5552-47F6-6A8D6E948421}"/>
+              </a:ext>
+            </a:extLst>
+          </p:cNvPr>
+          <p:cNvGraphicFramePr>
+            <a:graphicFrameLocks noGrp="1"/>
+          </p:cNvGraphicFramePr>
+          <p:nvPr>
+            <p:extLst>
+              <p:ext uri="{D42A27DB-BD31-4B8C-83A1-F6EECF244321}">
+                <p14:modId xmlns:p14="http://schemas.microsoft.com/office/powerpoint/2010/main" val="3015092751"/>
               </p:ext>
             </p:extLst>
           </p:nvPr>
@@ -10526,11 +11267,6 @@
                         <a:latin typeface="Abadi" panose="020B0604020104020204" pitchFamily="34" charset="0"/>
                       </a:endParaRPr>
                     </a:p>
-                    <a:p>
-                      <a:endParaRPr lang="en-NZ" dirty="0">
-                        <a:latin typeface="Abadi" panose="020B0604020104020204" pitchFamily="34" charset="0"/>
-                      </a:endParaRPr>
-                    </a:p>
                   </a:txBody>
                   <a:tcPr/>
                 </a:tc>
@@ -10559,7 +11295,7 @@
     </p:spTree>
     <p:extLst>
       <p:ext uri="{BB962C8B-B14F-4D97-AF65-F5344CB8AC3E}">
-        <p14:creationId xmlns:p14="http://schemas.microsoft.com/office/powerpoint/2010/main" val="3434099490"/>
+        <p14:creationId xmlns:p14="http://schemas.microsoft.com/office/powerpoint/2010/main" val="3154286637"/>
       </p:ext>
     </p:extLst>
   </p:cSld>
@@ -10569,7 +11305,7 @@
 </p:sld>
 </file>
 
-<file path=ppt/slides/slide34.xml><?xml version="1.0" encoding="utf-8"?>
+<file path=ppt/slides/slide39.xml><?xml version="1.0" encoding="utf-8"?>
 <p:sld xmlns:a="http://schemas.openxmlformats.org/drawingml/2006/main" xmlns:r="http://schemas.openxmlformats.org/officeDocument/2006/relationships" xmlns:p="http://schemas.openxmlformats.org/presentationml/2006/main">
   <p:cSld>
     <p:spTree>
@@ -10596,12 +11332,7 @@
             <p:ph type="title"/>
           </p:nvPr>
         </p:nvSpPr>
-        <p:spPr>
-          <a:xfrm>
-            <a:off x="1249680" y="183832"/>
-            <a:ext cx="9692640" cy="606738"/>
-          </a:xfrm>
-        </p:spPr>
+        <p:spPr/>
         <p:txBody>
           <a:bodyPr>
             <a:normAutofit/>
@@ -10612,107 +11343,44 @@
               <a:rPr lang="en-NZ" sz="2800" dirty="0">
                 <a:latin typeface="Abadi" panose="020B0604020104020204" pitchFamily="34" charset="0"/>
               </a:rPr>
-              <a:t>Iterative Improvement (Navbar V2)</a:t>
+              <a:t>Version Control</a:t>
             </a:r>
           </a:p>
         </p:txBody>
       </p:sp>
-      <p:graphicFrame>
-        <p:nvGraphicFramePr>
-          <p:cNvPr id="3" name="Table 2">
-            <a:extLst>
-              <a:ext uri="{FF2B5EF4-FFF2-40B4-BE49-F238E27FC236}">
-                <a16:creationId xmlns:a16="http://schemas.microsoft.com/office/drawing/2014/main" id="{1A9023FA-33FD-5552-47F6-6A8D6E948421}"/>
-              </a:ext>
-            </a:extLst>
-          </p:cNvPr>
-          <p:cNvGraphicFramePr>
-            <a:graphicFrameLocks noGrp="1"/>
-          </p:cNvGraphicFramePr>
-          <p:nvPr>
-            <p:extLst>
-              <p:ext uri="{D42A27DB-BD31-4B8C-83A1-F6EECF244321}">
-                <p14:modId xmlns:p14="http://schemas.microsoft.com/office/powerpoint/2010/main" val="1589415114"/>
-              </p:ext>
-            </p:extLst>
-          </p:nvPr>
-        </p:nvGraphicFramePr>
-        <p:xfrm>
-          <a:off x="1249680" y="1031751"/>
-          <a:ext cx="9430604" cy="1861575"/>
-        </p:xfrm>
-        <a:graphic>
-          <a:graphicData uri="http://schemas.openxmlformats.org/drawingml/2006/table">
-            <a:tbl>
-              <a:tblPr firstRow="1" bandRow="1">
-                <a:tableStyleId>{5C22544A-7EE6-4342-B048-85BDC9FD1C3A}</a:tableStyleId>
-              </a:tblPr>
-              <a:tblGrid>
-                <a:gridCol w="4715302">
-                  <a:extLst>
-                    <a:ext uri="{9D8B030D-6E8A-4147-A177-3AD203B41FA5}">
-                      <a16:colId xmlns:a16="http://schemas.microsoft.com/office/drawing/2014/main" val="2104603021"/>
-                    </a:ext>
-                  </a:extLst>
-                </a:gridCol>
-                <a:gridCol w="4715302">
-                  <a:extLst>
-                    <a:ext uri="{9D8B030D-6E8A-4147-A177-3AD203B41FA5}">
-                      <a16:colId xmlns:a16="http://schemas.microsoft.com/office/drawing/2014/main" val="2097243175"/>
-                    </a:ext>
-                  </a:extLst>
-                </a:gridCol>
-              </a:tblGrid>
-              <a:tr h="1861575">
-                <a:tc>
-                  <a:txBody>
-                    <a:bodyPr/>
-                    <a:lstStyle/>
-                    <a:p>
-                      <a:r>
-                        <a:rPr lang="en-NZ" dirty="0">
-                          <a:latin typeface="Abadi" panose="020B0604020104020204" pitchFamily="34" charset="0"/>
-                        </a:rPr>
-                        <a:t>Scrolling down on the page, I realised that navbar itself was not actually white but transparent. </a:t>
-                      </a:r>
-                    </a:p>
-                    <a:p>
-                      <a:endParaRPr lang="en-NZ" dirty="0">
-                        <a:latin typeface="Abadi" panose="020B0604020104020204" pitchFamily="34" charset="0"/>
-                      </a:endParaRPr>
-                    </a:p>
-                  </a:txBody>
-                  <a:tcPr/>
-                </a:tc>
-                <a:tc>
-                  <a:txBody>
-                    <a:bodyPr/>
-                    <a:lstStyle/>
-                    <a:p>
-                      <a:r>
-                        <a:rPr lang="en-NZ" dirty="0">
-                          <a:latin typeface="Abadi" panose="020B0604020104020204" pitchFamily="34" charset="0"/>
-                        </a:rPr>
-                        <a:t>I thought that by default the background colour was white so I changed it shortly after finding this error. </a:t>
-                      </a:r>
-                    </a:p>
-                  </a:txBody>
-                  <a:tcPr/>
-                </a:tc>
-                <a:extLst>
-                  <a:ext uri="{0D108BD9-81ED-4DB2-BD59-A6C34878D82A}">
-                    <a16:rowId xmlns:a16="http://schemas.microsoft.com/office/drawing/2014/main" val="2765992196"/>
-                  </a:ext>
-                </a:extLst>
-              </a:tr>
-            </a:tbl>
-          </a:graphicData>
-        </a:graphic>
-      </p:graphicFrame>
+      <p:sp>
+        <p:nvSpPr>
+          <p:cNvPr id="3" name="Content Placeholder 2"/>
+          <p:cNvSpPr>
+            <a:spLocks noGrp="1"/>
+          </p:cNvSpPr>
+          <p:nvPr>
+            <p:ph idx="1"/>
+          </p:nvPr>
+        </p:nvSpPr>
+        <p:spPr/>
+        <p:txBody>
+          <a:bodyPr>
+            <a:normAutofit/>
+          </a:bodyPr>
+          <a:lstStyle/>
+          <a:p>
+            <a:pPr marL="0" indent="0">
+              <a:buNone/>
+            </a:pPr>
+            <a:r>
+              <a:rPr lang="en-NZ" sz="2000" dirty="0">
+                <a:latin typeface="Abadi" panose="020B0604020104020204" pitchFamily="34" charset="0"/>
+              </a:rPr>
+              <a:t>Show how you have used version control throughout the design, development, and testing process.</a:t>
+            </a:r>
+          </a:p>
+        </p:txBody>
+      </p:sp>
     </p:spTree>
     <p:extLst>
       <p:ext uri="{BB962C8B-B14F-4D97-AF65-F5344CB8AC3E}">
-        <p14:creationId xmlns:p14="http://schemas.microsoft.com/office/powerpoint/2010/main" val="3154286637"/>
+        <p14:creationId xmlns:p14="http://schemas.microsoft.com/office/powerpoint/2010/main" val="2812247241"/>
       </p:ext>
     </p:extLst>
   </p:cSld>
@@ -10722,7 +11390,7 @@
 </p:sld>
 </file>
 
-<file path=ppt/slides/slide35.xml><?xml version="1.0" encoding="utf-8"?>
+<file path=ppt/slides/slide4.xml><?xml version="1.0" encoding="utf-8"?>
 <p:sld xmlns:a="http://schemas.openxmlformats.org/drawingml/2006/main" xmlns:r="http://schemas.openxmlformats.org/officeDocument/2006/relationships" xmlns:p="http://schemas.openxmlformats.org/presentationml/2006/main">
   <p:cSld>
     <p:spTree>
@@ -10741,7 +11409,13 @@
       </p:grpSpPr>
       <p:sp>
         <p:nvSpPr>
-          <p:cNvPr id="2" name="Title 1"/>
+          <p:cNvPr id="2" name="Title 1">
+            <a:extLst>
+              <a:ext uri="{FF2B5EF4-FFF2-40B4-BE49-F238E27FC236}">
+                <a16:creationId xmlns:a16="http://schemas.microsoft.com/office/drawing/2014/main" id="{6CD09A84-FA8A-9EBA-C732-E1E1D2D9E81D}"/>
+              </a:ext>
+            </a:extLst>
+          </p:cNvPr>
           <p:cNvSpPr>
             <a:spLocks noGrp="1"/>
           </p:cNvSpPr>
@@ -10751,23 +11425,27 @@
         </p:nvSpPr>
         <p:spPr/>
         <p:txBody>
-          <a:bodyPr>
-            <a:normAutofit/>
-          </a:bodyPr>
+          <a:bodyPr/>
           <a:lstStyle/>
           <a:p>
             <a:r>
-              <a:rPr lang="en-NZ" sz="2800" dirty="0">
+              <a:rPr lang="en-NZ" dirty="0">
                 <a:latin typeface="Abadi" panose="020B0604020104020204" pitchFamily="34" charset="0"/>
               </a:rPr>
-              <a:t>Version Control</a:t>
+              <a:t>Project Management - Planning</a:t>
             </a:r>
           </a:p>
         </p:txBody>
       </p:sp>
       <p:sp>
         <p:nvSpPr>
-          <p:cNvPr id="3" name="Content Placeholder 2"/>
+          <p:cNvPr id="3" name="Content Placeholder 2">
+            <a:extLst>
+              <a:ext uri="{FF2B5EF4-FFF2-40B4-BE49-F238E27FC236}">
+                <a16:creationId xmlns:a16="http://schemas.microsoft.com/office/drawing/2014/main" id="{3D07CEE0-AFD6-4A11-A1C8-0B47F7E844D7}"/>
+              </a:ext>
+            </a:extLst>
+          </p:cNvPr>
           <p:cNvSpPr>
             <a:spLocks noGrp="1"/>
           </p:cNvSpPr>
@@ -10777,27 +11455,50 @@
         </p:nvSpPr>
         <p:spPr/>
         <p:txBody>
-          <a:bodyPr>
-            <a:normAutofit/>
-          </a:bodyPr>
+          <a:bodyPr/>
           <a:lstStyle/>
           <a:p>
-            <a:pPr marL="0" indent="0">
-              <a:buNone/>
-            </a:pPr>
-            <a:r>
-              <a:rPr lang="en-NZ" sz="2000" dirty="0">
-                <a:latin typeface="Abadi" panose="020B0604020104020204" pitchFamily="34" charset="0"/>
-              </a:rPr>
-              <a:t>Show how you have used version control throughout the design, development, and testing process.</a:t>
+            <a:r>
+              <a:rPr lang="en-NZ" dirty="0"/>
+              <a:t>Explain how you plan to manage the project</a:t>
             </a:r>
           </a:p>
         </p:txBody>
       </p:sp>
+      <p:pic>
+        <p:nvPicPr>
+          <p:cNvPr id="4" name="Picture 4" descr="Diagram&#10;&#10;Description automatically generated">
+            <a:extLst>
+              <a:ext uri="{FF2B5EF4-FFF2-40B4-BE49-F238E27FC236}">
+                <a16:creationId xmlns:a16="http://schemas.microsoft.com/office/drawing/2014/main" id="{C1601F02-FA0C-438E-1836-73C8FD35C079}"/>
+              </a:ext>
+            </a:extLst>
+          </p:cNvPr>
+          <p:cNvPicPr>
+            <a:picLocks noChangeAspect="1"/>
+          </p:cNvPicPr>
+          <p:nvPr/>
+        </p:nvPicPr>
+        <p:blipFill>
+          <a:blip r:embed="rId2"/>
+          <a:stretch>
+            <a:fillRect/>
+          </a:stretch>
+        </p:blipFill>
+        <p:spPr>
+          <a:xfrm>
+            <a:off x="224227" y="3458025"/>
+            <a:ext cx="4635485" cy="3112606"/>
+          </a:xfrm>
+          <a:prstGeom prst="rect">
+            <a:avLst/>
+          </a:prstGeom>
+        </p:spPr>
+      </p:pic>
     </p:spTree>
     <p:extLst>
       <p:ext uri="{BB962C8B-B14F-4D97-AF65-F5344CB8AC3E}">
-        <p14:creationId xmlns:p14="http://schemas.microsoft.com/office/powerpoint/2010/main" val="2812247241"/>
+        <p14:creationId xmlns:p14="http://schemas.microsoft.com/office/powerpoint/2010/main" val="4265713020"/>
       </p:ext>
     </p:extLst>
   </p:cSld>
@@ -10807,7 +11508,7 @@
 </p:sld>
 </file>
 
-<file path=ppt/slides/slide36.xml><?xml version="1.0" encoding="utf-8"?>
+<file path=ppt/slides/slide40.xml><?xml version="1.0" encoding="utf-8"?>
 <p:sld xmlns:a="http://schemas.openxmlformats.org/drawingml/2006/main" xmlns:r="http://schemas.openxmlformats.org/officeDocument/2006/relationships" xmlns:p="http://schemas.openxmlformats.org/presentationml/2006/main">
   <p:cSld>
     <p:spTree>
@@ -10892,7 +11593,7 @@
 </p:sld>
 </file>
 
-<file path=ppt/slides/slide37.xml><?xml version="1.0" encoding="utf-8"?>
+<file path=ppt/slides/slide41.xml><?xml version="1.0" encoding="utf-8"?>
 <p:sld xmlns:a="http://schemas.openxmlformats.org/drawingml/2006/main" xmlns:r="http://schemas.openxmlformats.org/officeDocument/2006/relationships" xmlns:p="http://schemas.openxmlformats.org/presentationml/2006/main">
   <p:cSld>
     <p:spTree>
@@ -10977,7 +11678,7 @@
 </p:sld>
 </file>
 
-<file path=ppt/slides/slide38.xml><?xml version="1.0" encoding="utf-8"?>
+<file path=ppt/slides/slide42.xml><?xml version="1.0" encoding="utf-8"?>
 <p:sld xmlns:a="http://schemas.openxmlformats.org/drawingml/2006/main" xmlns:r="http://schemas.openxmlformats.org/officeDocument/2006/relationships" xmlns:p="http://schemas.openxmlformats.org/presentationml/2006/main">
   <p:cSld>
     <p:spTree>
@@ -11076,7 +11777,7 @@
 </p:sld>
 </file>
 
-<file path=ppt/slides/slide39.xml><?xml version="1.0" encoding="utf-8"?>
+<file path=ppt/slides/slide43.xml><?xml version="1.0" encoding="utf-8"?>
 <p:sld xmlns:a="http://schemas.openxmlformats.org/drawingml/2006/main" xmlns:r="http://schemas.openxmlformats.org/officeDocument/2006/relationships" xmlns:p="http://schemas.openxmlformats.org/presentationml/2006/main">
   <p:cSld>
     <p:spTree>
@@ -11166,124 +11867,6 @@
     <p:extLst>
       <p:ext uri="{BB962C8B-B14F-4D97-AF65-F5344CB8AC3E}">
         <p14:creationId xmlns:p14="http://schemas.microsoft.com/office/powerpoint/2010/main" val="3878584299"/>
-      </p:ext>
-    </p:extLst>
-  </p:cSld>
-  <p:clrMapOvr>
-    <a:masterClrMapping/>
-  </p:clrMapOvr>
-</p:sld>
-</file>
-
-<file path=ppt/slides/slide4.xml><?xml version="1.0" encoding="utf-8"?>
-<p:sld xmlns:a="http://schemas.openxmlformats.org/drawingml/2006/main" xmlns:r="http://schemas.openxmlformats.org/officeDocument/2006/relationships" xmlns:p="http://schemas.openxmlformats.org/presentationml/2006/main">
-  <p:cSld>
-    <p:spTree>
-      <p:nvGrpSpPr>
-        <p:cNvPr id="1" name=""/>
-        <p:cNvGrpSpPr/>
-        <p:nvPr/>
-      </p:nvGrpSpPr>
-      <p:grpSpPr>
-        <a:xfrm>
-          <a:off x="0" y="0"/>
-          <a:ext cx="0" cy="0"/>
-          <a:chOff x="0" y="0"/>
-          <a:chExt cx="0" cy="0"/>
-        </a:xfrm>
-      </p:grpSpPr>
-      <p:sp>
-        <p:nvSpPr>
-          <p:cNvPr id="2" name="Title 1">
-            <a:extLst>
-              <a:ext uri="{FF2B5EF4-FFF2-40B4-BE49-F238E27FC236}">
-                <a16:creationId xmlns:a16="http://schemas.microsoft.com/office/drawing/2014/main" id="{6CD09A84-FA8A-9EBA-C732-E1E1D2D9E81D}"/>
-              </a:ext>
-            </a:extLst>
-          </p:cNvPr>
-          <p:cNvSpPr>
-            <a:spLocks noGrp="1"/>
-          </p:cNvSpPr>
-          <p:nvPr>
-            <p:ph type="title"/>
-          </p:nvPr>
-        </p:nvSpPr>
-        <p:spPr/>
-        <p:txBody>
-          <a:bodyPr/>
-          <a:lstStyle/>
-          <a:p>
-            <a:r>
-              <a:rPr lang="en-NZ" dirty="0">
-                <a:latin typeface="Abadi" panose="020B0604020104020204" pitchFamily="34" charset="0"/>
-              </a:rPr>
-              <a:t>Project Management - Planning</a:t>
-            </a:r>
-          </a:p>
-        </p:txBody>
-      </p:sp>
-      <p:sp>
-        <p:nvSpPr>
-          <p:cNvPr id="3" name="Content Placeholder 2">
-            <a:extLst>
-              <a:ext uri="{FF2B5EF4-FFF2-40B4-BE49-F238E27FC236}">
-                <a16:creationId xmlns:a16="http://schemas.microsoft.com/office/drawing/2014/main" id="{3D07CEE0-AFD6-4A11-A1C8-0B47F7E844D7}"/>
-              </a:ext>
-            </a:extLst>
-          </p:cNvPr>
-          <p:cNvSpPr>
-            <a:spLocks noGrp="1"/>
-          </p:cNvSpPr>
-          <p:nvPr>
-            <p:ph idx="1"/>
-          </p:nvPr>
-        </p:nvSpPr>
-        <p:spPr/>
-        <p:txBody>
-          <a:bodyPr/>
-          <a:lstStyle/>
-          <a:p>
-            <a:r>
-              <a:rPr lang="en-NZ" dirty="0"/>
-              <a:t>Explain how you plan to manage the project</a:t>
-            </a:r>
-          </a:p>
-        </p:txBody>
-      </p:sp>
-      <p:pic>
-        <p:nvPicPr>
-          <p:cNvPr id="4" name="Picture 4" descr="Diagram&#10;&#10;Description automatically generated">
-            <a:extLst>
-              <a:ext uri="{FF2B5EF4-FFF2-40B4-BE49-F238E27FC236}">
-                <a16:creationId xmlns:a16="http://schemas.microsoft.com/office/drawing/2014/main" id="{C1601F02-FA0C-438E-1836-73C8FD35C079}"/>
-              </a:ext>
-            </a:extLst>
-          </p:cNvPr>
-          <p:cNvPicPr>
-            <a:picLocks noChangeAspect="1"/>
-          </p:cNvPicPr>
-          <p:nvPr/>
-        </p:nvPicPr>
-        <p:blipFill>
-          <a:blip r:embed="rId2"/>
-          <a:stretch>
-            <a:fillRect/>
-          </a:stretch>
-        </p:blipFill>
-        <p:spPr>
-          <a:xfrm>
-            <a:off x="224227" y="3458025"/>
-            <a:ext cx="4635485" cy="3112606"/>
-          </a:xfrm>
-          <a:prstGeom prst="rect">
-            <a:avLst/>
-          </a:prstGeom>
-        </p:spPr>
-      </p:pic>
-    </p:spTree>
-    <p:extLst>
-      <p:ext uri="{BB962C8B-B14F-4D97-AF65-F5344CB8AC3E}">
-        <p14:creationId xmlns:p14="http://schemas.microsoft.com/office/powerpoint/2010/main" val="4265713020"/>
       </p:ext>
     </p:extLst>
   </p:cSld>

</xml_diff>

<commit_message>
Fixes Issue with Toggler Icon
Corrected problem where when screen is small, the toggler icon would not appear.
</commit_message>
<xml_diff>
--- a/AS91903_91906_Evidence_Joaquin_Badenas.pptx
+++ b/AS91903_91906_Evidence_Joaquin_Badenas.pptx
@@ -42,12 +42,17 @@
     <p:sldId id="302" r:id="rId36"/>
     <p:sldId id="303" r:id="rId37"/>
     <p:sldId id="307" r:id="rId38"/>
-    <p:sldId id="301" r:id="rId39"/>
-    <p:sldId id="275" r:id="rId40"/>
-    <p:sldId id="283" r:id="rId41"/>
-    <p:sldId id="265" r:id="rId42"/>
-    <p:sldId id="269" r:id="rId43"/>
-    <p:sldId id="276" r:id="rId44"/>
+    <p:sldId id="308" r:id="rId39"/>
+    <p:sldId id="309" r:id="rId40"/>
+    <p:sldId id="310" r:id="rId41"/>
+    <p:sldId id="311" r:id="rId42"/>
+    <p:sldId id="312" r:id="rId43"/>
+    <p:sldId id="301" r:id="rId44"/>
+    <p:sldId id="275" r:id="rId45"/>
+    <p:sldId id="283" r:id="rId46"/>
+    <p:sldId id="265" r:id="rId47"/>
+    <p:sldId id="269" r:id="rId48"/>
+    <p:sldId id="276" r:id="rId49"/>
   </p:sldIdLst>
   <p:sldSz cx="12192000" cy="6858000"/>
   <p:notesSz cx="6858000" cy="9144000"/>
@@ -157,7 +162,7 @@
 <file path=ppt/revisionInfo.xml><?xml version="1.0" encoding="utf-8"?>
 <p1510:revInfo xmlns:a="http://schemas.openxmlformats.org/drawingml/2006/main" xmlns:r="http://schemas.openxmlformats.org/officeDocument/2006/relationships" xmlns:p1510="http://schemas.microsoft.com/office/powerpoint/2015/10/main">
   <p1510:revLst>
-    <p1510:client id="{4F53BFBD-1E38-412E-AE7B-7E5D3B30168C}" v="28" dt="2024-07-28T13:27:09.674"/>
+    <p1510:client id="{4F53BFBD-1E38-412E-AE7B-7E5D3B30168C}" v="36" dt="2024-07-28T14:30:59.017"/>
   </p1510:revLst>
 </p1510:revInfo>
 </file>
@@ -1603,7 +1608,7 @@
   <pc:docChgLst>
     <pc:chgData name="Joaquin Badenas" userId="5cb29fd719aebf04" providerId="LiveId" clId="{4F53BFBD-1E38-412E-AE7B-7E5D3B30168C}"/>
     <pc:docChg chg="undo custSel addSld delSld modSld sldOrd">
-      <pc:chgData name="Joaquin Badenas" userId="5cb29fd719aebf04" providerId="LiveId" clId="{4F53BFBD-1E38-412E-AE7B-7E5D3B30168C}" dt="2024-07-28T13:28:32.950" v="7001" actId="478"/>
+      <pc:chgData name="Joaquin Badenas" userId="5cb29fd719aebf04" providerId="LiveId" clId="{4F53BFBD-1E38-412E-AE7B-7E5D3B30168C}" dt="2024-07-28T14:31:08.635" v="7662" actId="20577"/>
       <pc:docMkLst>
         <pc:docMk/>
       </pc:docMkLst>
@@ -2750,7 +2755,7 @@
         </pc:sldMkLst>
       </pc:sldChg>
       <pc:sldChg chg="addSp delSp modSp add mod">
-        <pc:chgData name="Joaquin Badenas" userId="5cb29fd719aebf04" providerId="LiveId" clId="{4F53BFBD-1E38-412E-AE7B-7E5D3B30168C}" dt="2024-07-28T13:28:32.950" v="7001" actId="478"/>
+        <pc:chgData name="Joaquin Badenas" userId="5cb29fd719aebf04" providerId="LiveId" clId="{4F53BFBD-1E38-412E-AE7B-7E5D3B30168C}" dt="2024-07-28T14:14:01.158" v="7009" actId="1076"/>
         <pc:sldMkLst>
           <pc:docMk/>
           <pc:sldMk cId="989374121" sldId="307"/>
@@ -2772,11 +2777,19 @@
           </ac:graphicFrameMkLst>
         </pc:graphicFrameChg>
         <pc:picChg chg="mod">
-          <ac:chgData name="Joaquin Badenas" userId="5cb29fd719aebf04" providerId="LiveId" clId="{4F53BFBD-1E38-412E-AE7B-7E5D3B30168C}" dt="2024-07-28T13:28:32.036" v="7000" actId="1076"/>
+          <ac:chgData name="Joaquin Badenas" userId="5cb29fd719aebf04" providerId="LiveId" clId="{4F53BFBD-1E38-412E-AE7B-7E5D3B30168C}" dt="2024-07-28T14:13:25.630" v="7004" actId="1076"/>
           <ac:picMkLst>
             <pc:docMk/>
             <pc:sldMk cId="989374121" sldId="307"/>
             <ac:picMk id="5" creationId="{25137C94-039F-3DF4-90D3-CFDE5F736E49}"/>
+          </ac:picMkLst>
+        </pc:picChg>
+        <pc:picChg chg="add mod">
+          <ac:chgData name="Joaquin Badenas" userId="5cb29fd719aebf04" providerId="LiveId" clId="{4F53BFBD-1E38-412E-AE7B-7E5D3B30168C}" dt="2024-07-28T14:13:27.583" v="7005" actId="1076"/>
+          <ac:picMkLst>
+            <pc:docMk/>
+            <pc:sldMk cId="989374121" sldId="307"/>
+            <ac:picMk id="6" creationId="{0650D66E-BF1A-1913-55B5-BCB5930E76F0}"/>
           </ac:picMkLst>
         </pc:picChg>
         <pc:picChg chg="del">
@@ -2787,12 +2800,254 @@
             <ac:picMk id="7" creationId="{DD785A3E-D8A0-F7B2-EE57-F1EC629879CF}"/>
           </ac:picMkLst>
         </pc:picChg>
+        <pc:picChg chg="add mod">
+          <ac:chgData name="Joaquin Badenas" userId="5cb29fd719aebf04" providerId="LiveId" clId="{4F53BFBD-1E38-412E-AE7B-7E5D3B30168C}" dt="2024-07-28T14:13:51.122" v="7007" actId="1076"/>
+          <ac:picMkLst>
+            <pc:docMk/>
+            <pc:sldMk cId="989374121" sldId="307"/>
+            <ac:picMk id="8" creationId="{AE4A23F9-E286-A494-C701-ACD7D85002B9}"/>
+          </ac:picMkLst>
+        </pc:picChg>
+        <pc:picChg chg="add mod">
+          <ac:chgData name="Joaquin Badenas" userId="5cb29fd719aebf04" providerId="LiveId" clId="{4F53BFBD-1E38-412E-AE7B-7E5D3B30168C}" dt="2024-07-28T14:14:01.158" v="7009" actId="1076"/>
+          <ac:picMkLst>
+            <pc:docMk/>
+            <pc:sldMk cId="989374121" sldId="307"/>
+            <ac:picMk id="10" creationId="{83F5D944-086F-CFA7-2B8C-85BF08E34A9C}"/>
+          </ac:picMkLst>
+        </pc:picChg>
         <pc:picChg chg="del">
           <ac:chgData name="Joaquin Badenas" userId="5cb29fd719aebf04" providerId="LiveId" clId="{4F53BFBD-1E38-412E-AE7B-7E5D3B30168C}" dt="2024-07-28T13:28:32.950" v="7001" actId="478"/>
           <ac:picMkLst>
             <pc:docMk/>
             <pc:sldMk cId="989374121" sldId="307"/>
             <ac:picMk id="11" creationId="{43ED400D-F0F9-83A6-288A-AACD04217DA4}"/>
+          </ac:picMkLst>
+        </pc:picChg>
+      </pc:sldChg>
+      <pc:sldChg chg="addSp delSp modSp add mod">
+        <pc:chgData name="Joaquin Badenas" userId="5cb29fd719aebf04" providerId="LiveId" clId="{4F53BFBD-1E38-412E-AE7B-7E5D3B30168C}" dt="2024-07-28T14:15:47.497" v="7025" actId="1076"/>
+        <pc:sldMkLst>
+          <pc:docMk/>
+          <pc:sldMk cId="1413360185" sldId="308"/>
+        </pc:sldMkLst>
+        <pc:picChg chg="del">
+          <ac:chgData name="Joaquin Badenas" userId="5cb29fd719aebf04" providerId="LiveId" clId="{4F53BFBD-1E38-412E-AE7B-7E5D3B30168C}" dt="2024-07-28T14:14:05.537" v="7011" actId="478"/>
+          <ac:picMkLst>
+            <pc:docMk/>
+            <pc:sldMk cId="1413360185" sldId="308"/>
+            <ac:picMk id="5" creationId="{25137C94-039F-3DF4-90D3-CFDE5F736E49}"/>
+          </ac:picMkLst>
+        </pc:picChg>
+        <pc:picChg chg="del">
+          <ac:chgData name="Joaquin Badenas" userId="5cb29fd719aebf04" providerId="LiveId" clId="{4F53BFBD-1E38-412E-AE7B-7E5D3B30168C}" dt="2024-07-28T14:14:06.565" v="7012" actId="478"/>
+          <ac:picMkLst>
+            <pc:docMk/>
+            <pc:sldMk cId="1413360185" sldId="308"/>
+            <ac:picMk id="6" creationId="{0650D66E-BF1A-1913-55B5-BCB5930E76F0}"/>
+          </ac:picMkLst>
+        </pc:picChg>
+        <pc:picChg chg="add mod">
+          <ac:chgData name="Joaquin Badenas" userId="5cb29fd719aebf04" providerId="LiveId" clId="{4F53BFBD-1E38-412E-AE7B-7E5D3B30168C}" dt="2024-07-28T14:15:47.497" v="7025" actId="1076"/>
+          <ac:picMkLst>
+            <pc:docMk/>
+            <pc:sldMk cId="1413360185" sldId="308"/>
+            <ac:picMk id="7" creationId="{E885503C-1D8A-00B2-9C3A-5A603CA34123}"/>
+          </ac:picMkLst>
+        </pc:picChg>
+        <pc:picChg chg="del mod">
+          <ac:chgData name="Joaquin Badenas" userId="5cb29fd719aebf04" providerId="LiveId" clId="{4F53BFBD-1E38-412E-AE7B-7E5D3B30168C}" dt="2024-07-28T14:14:16.100" v="7019" actId="478"/>
+          <ac:picMkLst>
+            <pc:docMk/>
+            <pc:sldMk cId="1413360185" sldId="308"/>
+            <ac:picMk id="8" creationId="{AE4A23F9-E286-A494-C701-ACD7D85002B9}"/>
+          </ac:picMkLst>
+        </pc:picChg>
+        <pc:picChg chg="mod ord">
+          <ac:chgData name="Joaquin Badenas" userId="5cb29fd719aebf04" providerId="LiveId" clId="{4F53BFBD-1E38-412E-AE7B-7E5D3B30168C}" dt="2024-07-28T14:14:36.652" v="7024" actId="166"/>
+          <ac:picMkLst>
+            <pc:docMk/>
+            <pc:sldMk cId="1413360185" sldId="308"/>
+            <ac:picMk id="10" creationId="{83F5D944-086F-CFA7-2B8C-85BF08E34A9C}"/>
+          </ac:picMkLst>
+        </pc:picChg>
+      </pc:sldChg>
+      <pc:sldChg chg="addSp delSp modSp add mod">
+        <pc:chgData name="Joaquin Badenas" userId="5cb29fd719aebf04" providerId="LiveId" clId="{4F53BFBD-1E38-412E-AE7B-7E5D3B30168C}" dt="2024-07-28T14:20:51.200" v="7482" actId="1076"/>
+        <pc:sldMkLst>
+          <pc:docMk/>
+          <pc:sldMk cId="2149979515" sldId="309"/>
+        </pc:sldMkLst>
+        <pc:graphicFrameChg chg="mod modGraphic">
+          <ac:chgData name="Joaquin Badenas" userId="5cb29fd719aebf04" providerId="LiveId" clId="{4F53BFBD-1E38-412E-AE7B-7E5D3B30168C}" dt="2024-07-28T14:18:08.125" v="7162" actId="1076"/>
+          <ac:graphicFrameMkLst>
+            <pc:docMk/>
+            <pc:sldMk cId="2149979515" sldId="309"/>
+            <ac:graphicFrameMk id="4" creationId="{9FA07D46-C251-4EF2-0365-B907C7DBEBCF}"/>
+          </ac:graphicFrameMkLst>
+        </pc:graphicFrameChg>
+        <pc:graphicFrameChg chg="add mod modGraphic">
+          <ac:chgData name="Joaquin Badenas" userId="5cb29fd719aebf04" providerId="LiveId" clId="{4F53BFBD-1E38-412E-AE7B-7E5D3B30168C}" dt="2024-07-28T14:20:51.200" v="7482" actId="1076"/>
+          <ac:graphicFrameMkLst>
+            <pc:docMk/>
+            <pc:sldMk cId="2149979515" sldId="309"/>
+            <ac:graphicFrameMk id="6" creationId="{86696FAE-6427-9E8F-DDE0-AC2C439DCFBF}"/>
+          </ac:graphicFrameMkLst>
+        </pc:graphicFrameChg>
+        <pc:picChg chg="add mod">
+          <ac:chgData name="Joaquin Badenas" userId="5cb29fd719aebf04" providerId="LiveId" clId="{4F53BFBD-1E38-412E-AE7B-7E5D3B30168C}" dt="2024-07-28T14:18:01.709" v="7160" actId="1076"/>
+          <ac:picMkLst>
+            <pc:docMk/>
+            <pc:sldMk cId="2149979515" sldId="309"/>
+            <ac:picMk id="5" creationId="{4571335C-5A55-0FD6-C169-7A6F2056AA21}"/>
+          </ac:picMkLst>
+        </pc:picChg>
+        <pc:picChg chg="del">
+          <ac:chgData name="Joaquin Badenas" userId="5cb29fd719aebf04" providerId="LiveId" clId="{4F53BFBD-1E38-412E-AE7B-7E5D3B30168C}" dt="2024-07-28T14:15:53.710" v="7027" actId="478"/>
+          <ac:picMkLst>
+            <pc:docMk/>
+            <pc:sldMk cId="2149979515" sldId="309"/>
+            <ac:picMk id="7" creationId="{E885503C-1D8A-00B2-9C3A-5A603CA34123}"/>
+          </ac:picMkLst>
+        </pc:picChg>
+        <pc:picChg chg="add mod">
+          <ac:chgData name="Joaquin Badenas" userId="5cb29fd719aebf04" providerId="LiveId" clId="{4F53BFBD-1E38-412E-AE7B-7E5D3B30168C}" dt="2024-07-28T14:20:47.102" v="7481" actId="1076"/>
+          <ac:picMkLst>
+            <pc:docMk/>
+            <pc:sldMk cId="2149979515" sldId="309"/>
+            <ac:picMk id="9" creationId="{65094F28-92E3-BA10-74F9-DE04098376DD}"/>
+          </ac:picMkLst>
+        </pc:picChg>
+        <pc:picChg chg="del">
+          <ac:chgData name="Joaquin Badenas" userId="5cb29fd719aebf04" providerId="LiveId" clId="{4F53BFBD-1E38-412E-AE7B-7E5D3B30168C}" dt="2024-07-28T14:15:54.111" v="7028" actId="478"/>
+          <ac:picMkLst>
+            <pc:docMk/>
+            <pc:sldMk cId="2149979515" sldId="309"/>
+            <ac:picMk id="10" creationId="{83F5D944-086F-CFA7-2B8C-85BF08E34A9C}"/>
+          </ac:picMkLst>
+        </pc:picChg>
+      </pc:sldChg>
+      <pc:sldChg chg="addSp delSp add del mod">
+        <pc:chgData name="Joaquin Badenas" userId="5cb29fd719aebf04" providerId="LiveId" clId="{4F53BFBD-1E38-412E-AE7B-7E5D3B30168C}" dt="2024-07-28T14:16:26.189" v="7154"/>
+        <pc:sldMkLst>
+          <pc:docMk/>
+          <pc:sldMk cId="1041079056" sldId="310"/>
+        </pc:sldMkLst>
+        <pc:picChg chg="add del">
+          <ac:chgData name="Joaquin Badenas" userId="5cb29fd719aebf04" providerId="LiveId" clId="{4F53BFBD-1E38-412E-AE7B-7E5D3B30168C}" dt="2024-07-28T14:16:25.922" v="7153" actId="478"/>
+          <ac:picMkLst>
+            <pc:docMk/>
+            <pc:sldMk cId="1041079056" sldId="310"/>
+            <ac:picMk id="7" creationId="{E885503C-1D8A-00B2-9C3A-5A603CA34123}"/>
+          </ac:picMkLst>
+        </pc:picChg>
+        <pc:picChg chg="add del">
+          <ac:chgData name="Joaquin Badenas" userId="5cb29fd719aebf04" providerId="LiveId" clId="{4F53BFBD-1E38-412E-AE7B-7E5D3B30168C}" dt="2024-07-28T14:16:25.568" v="7152" actId="478"/>
+          <ac:picMkLst>
+            <pc:docMk/>
+            <pc:sldMk cId="1041079056" sldId="310"/>
+            <ac:picMk id="10" creationId="{83F5D944-086F-CFA7-2B8C-85BF08E34A9C}"/>
+          </ac:picMkLst>
+        </pc:picChg>
+      </pc:sldChg>
+      <pc:sldChg chg="addSp delSp modSp add mod">
+        <pc:chgData name="Joaquin Badenas" userId="5cb29fd719aebf04" providerId="LiveId" clId="{4F53BFBD-1E38-412E-AE7B-7E5D3B30168C}" dt="2024-07-28T14:23:04.271" v="7494" actId="1076"/>
+        <pc:sldMkLst>
+          <pc:docMk/>
+          <pc:sldMk cId="3944965699" sldId="310"/>
+        </pc:sldMkLst>
+        <pc:graphicFrameChg chg="del">
+          <ac:chgData name="Joaquin Badenas" userId="5cb29fd719aebf04" providerId="LiveId" clId="{4F53BFBD-1E38-412E-AE7B-7E5D3B30168C}" dt="2024-07-28T14:20:59.276" v="7486" actId="478"/>
+          <ac:graphicFrameMkLst>
+            <pc:docMk/>
+            <pc:sldMk cId="3944965699" sldId="310"/>
+            <ac:graphicFrameMk id="4" creationId="{9FA07D46-C251-4EF2-0365-B907C7DBEBCF}"/>
+          </ac:graphicFrameMkLst>
+        </pc:graphicFrameChg>
+        <pc:graphicFrameChg chg="mod modGraphic">
+          <ac:chgData name="Joaquin Badenas" userId="5cb29fd719aebf04" providerId="LiveId" clId="{4F53BFBD-1E38-412E-AE7B-7E5D3B30168C}" dt="2024-07-28T14:22:44.826" v="7491" actId="14100"/>
+          <ac:graphicFrameMkLst>
+            <pc:docMk/>
+            <pc:sldMk cId="3944965699" sldId="310"/>
+            <ac:graphicFrameMk id="6" creationId="{86696FAE-6427-9E8F-DDE0-AC2C439DCFBF}"/>
+          </ac:graphicFrameMkLst>
+        </pc:graphicFrameChg>
+        <pc:picChg chg="del">
+          <ac:chgData name="Joaquin Badenas" userId="5cb29fd719aebf04" providerId="LiveId" clId="{4F53BFBD-1E38-412E-AE7B-7E5D3B30168C}" dt="2024-07-28T14:20:55.555" v="7484" actId="478"/>
+          <ac:picMkLst>
+            <pc:docMk/>
+            <pc:sldMk cId="3944965699" sldId="310"/>
+            <ac:picMk id="5" creationId="{4571335C-5A55-0FD6-C169-7A6F2056AA21}"/>
+          </ac:picMkLst>
+        </pc:picChg>
+        <pc:picChg chg="add mod">
+          <ac:chgData name="Joaquin Badenas" userId="5cb29fd719aebf04" providerId="LiveId" clId="{4F53BFBD-1E38-412E-AE7B-7E5D3B30168C}" dt="2024-07-28T14:23:04.271" v="7494" actId="1076"/>
+          <ac:picMkLst>
+            <pc:docMk/>
+            <pc:sldMk cId="3944965699" sldId="310"/>
+            <ac:picMk id="7" creationId="{43FDFAF8-F426-5B42-7238-F850FB35BDDC}"/>
+          </ac:picMkLst>
+        </pc:picChg>
+        <pc:picChg chg="del">
+          <ac:chgData name="Joaquin Badenas" userId="5cb29fd719aebf04" providerId="LiveId" clId="{4F53BFBD-1E38-412E-AE7B-7E5D3B30168C}" dt="2024-07-28T14:20:56.024" v="7485" actId="478"/>
+          <ac:picMkLst>
+            <pc:docMk/>
+            <pc:sldMk cId="3944965699" sldId="310"/>
+            <ac:picMk id="9" creationId="{65094F28-92E3-BA10-74F9-DE04098376DD}"/>
+          </ac:picMkLst>
+        </pc:picChg>
+      </pc:sldChg>
+      <pc:sldChg chg="addSp delSp modSp add mod">
+        <pc:chgData name="Joaquin Badenas" userId="5cb29fd719aebf04" providerId="LiveId" clId="{4F53BFBD-1E38-412E-AE7B-7E5D3B30168C}" dt="2024-07-28T14:30:52.834" v="7632" actId="1076"/>
+        <pc:sldMkLst>
+          <pc:docMk/>
+          <pc:sldMk cId="3282549244" sldId="311"/>
+        </pc:sldMkLst>
+        <pc:graphicFrameChg chg="modGraphic">
+          <ac:chgData name="Joaquin Badenas" userId="5cb29fd719aebf04" providerId="LiveId" clId="{4F53BFBD-1E38-412E-AE7B-7E5D3B30168C}" dt="2024-07-28T14:30:21.178" v="7630" actId="20577"/>
+          <ac:graphicFrameMkLst>
+            <pc:docMk/>
+            <pc:sldMk cId="3282549244" sldId="311"/>
+            <ac:graphicFrameMk id="6" creationId="{86696FAE-6427-9E8F-DDE0-AC2C439DCFBF}"/>
+          </ac:graphicFrameMkLst>
+        </pc:graphicFrameChg>
+        <pc:picChg chg="add mod">
+          <ac:chgData name="Joaquin Badenas" userId="5cb29fd719aebf04" providerId="LiveId" clId="{4F53BFBD-1E38-412E-AE7B-7E5D3B30168C}" dt="2024-07-28T14:30:52.834" v="7632" actId="1076"/>
+          <ac:picMkLst>
+            <pc:docMk/>
+            <pc:sldMk cId="3282549244" sldId="311"/>
+            <ac:picMk id="4" creationId="{7EF8CEF0-E3FC-76E4-4CCC-207E3CC3CEEA}"/>
+          </ac:picMkLst>
+        </pc:picChg>
+        <pc:picChg chg="del">
+          <ac:chgData name="Joaquin Badenas" userId="5cb29fd719aebf04" providerId="LiveId" clId="{4F53BFBD-1E38-412E-AE7B-7E5D3B30168C}" dt="2024-07-28T14:23:10.518" v="7496" actId="478"/>
+          <ac:picMkLst>
+            <pc:docMk/>
+            <pc:sldMk cId="3282549244" sldId="311"/>
+            <ac:picMk id="7" creationId="{43FDFAF8-F426-5B42-7238-F850FB35BDDC}"/>
+          </ac:picMkLst>
+        </pc:picChg>
+      </pc:sldChg>
+      <pc:sldChg chg="delSp modSp add mod">
+        <pc:chgData name="Joaquin Badenas" userId="5cb29fd719aebf04" providerId="LiveId" clId="{4F53BFBD-1E38-412E-AE7B-7E5D3B30168C}" dt="2024-07-28T14:31:08.635" v="7662" actId="20577"/>
+        <pc:sldMkLst>
+          <pc:docMk/>
+          <pc:sldMk cId="1078243187" sldId="312"/>
+        </pc:sldMkLst>
+        <pc:graphicFrameChg chg="modGraphic">
+          <ac:chgData name="Joaquin Badenas" userId="5cb29fd719aebf04" providerId="LiveId" clId="{4F53BFBD-1E38-412E-AE7B-7E5D3B30168C}" dt="2024-07-28T14:31:08.635" v="7662" actId="20577"/>
+          <ac:graphicFrameMkLst>
+            <pc:docMk/>
+            <pc:sldMk cId="1078243187" sldId="312"/>
+            <ac:graphicFrameMk id="6" creationId="{86696FAE-6427-9E8F-DDE0-AC2C439DCFBF}"/>
+          </ac:graphicFrameMkLst>
+        </pc:graphicFrameChg>
+        <pc:picChg chg="del">
+          <ac:chgData name="Joaquin Badenas" userId="5cb29fd719aebf04" providerId="LiveId" clId="{4F53BFBD-1E38-412E-AE7B-7E5D3B30168C}" dt="2024-07-28T14:31:01.216" v="7634" actId="478"/>
+          <ac:picMkLst>
+            <pc:docMk/>
+            <pc:sldMk cId="1078243187" sldId="312"/>
+            <ac:picMk id="4" creationId="{7EF8CEF0-E3FC-76E4-4CCC-207E3CC3CEEA}"/>
           </ac:picMkLst>
         </pc:picChg>
       </pc:sldChg>
@@ -11079,7 +11334,7 @@
         </p:blipFill>
         <p:spPr>
           <a:xfrm>
-            <a:off x="994467" y="1783418"/>
+            <a:off x="161954" y="1674236"/>
             <a:ext cx="5016463" cy="1292987"/>
           </a:xfrm>
           <a:prstGeom prst="rect">
@@ -11150,6 +11405,96 @@
           </a:graphicData>
         </a:graphic>
       </p:graphicFrame>
+      <p:pic>
+        <p:nvPicPr>
+          <p:cNvPr id="6" name="Picture 5">
+            <a:extLst>
+              <a:ext uri="{FF2B5EF4-FFF2-40B4-BE49-F238E27FC236}">
+                <a16:creationId xmlns:a16="http://schemas.microsoft.com/office/drawing/2014/main" id="{0650D66E-BF1A-1913-55B5-BCB5930E76F0}"/>
+              </a:ext>
+            </a:extLst>
+          </p:cNvPr>
+          <p:cNvPicPr>
+            <a:picLocks noChangeAspect="1"/>
+          </p:cNvPicPr>
+          <p:nvPr/>
+        </p:nvPicPr>
+        <p:blipFill>
+          <a:blip r:embed="rId3"/>
+          <a:stretch>
+            <a:fillRect/>
+          </a:stretch>
+        </p:blipFill>
+        <p:spPr>
+          <a:xfrm>
+            <a:off x="5178417" y="1573356"/>
+            <a:ext cx="6658904" cy="1200318"/>
+          </a:xfrm>
+          <a:prstGeom prst="rect">
+            <a:avLst/>
+          </a:prstGeom>
+        </p:spPr>
+      </p:pic>
+      <p:pic>
+        <p:nvPicPr>
+          <p:cNvPr id="8" name="Picture 7">
+            <a:extLst>
+              <a:ext uri="{FF2B5EF4-FFF2-40B4-BE49-F238E27FC236}">
+                <a16:creationId xmlns:a16="http://schemas.microsoft.com/office/drawing/2014/main" id="{AE4A23F9-E286-A494-C701-ACD7D85002B9}"/>
+              </a:ext>
+            </a:extLst>
+          </p:cNvPr>
+          <p:cNvPicPr>
+            <a:picLocks noChangeAspect="1"/>
+          </p:cNvPicPr>
+          <p:nvPr/>
+        </p:nvPicPr>
+        <p:blipFill>
+          <a:blip r:embed="rId4"/>
+          <a:stretch>
+            <a:fillRect/>
+          </a:stretch>
+        </p:blipFill>
+        <p:spPr>
+          <a:xfrm>
+            <a:off x="161954" y="3435216"/>
+            <a:ext cx="10050278" cy="3238952"/>
+          </a:xfrm>
+          <a:prstGeom prst="rect">
+            <a:avLst/>
+          </a:prstGeom>
+        </p:spPr>
+      </p:pic>
+      <p:pic>
+        <p:nvPicPr>
+          <p:cNvPr id="10" name="Picture 9">
+            <a:extLst>
+              <a:ext uri="{FF2B5EF4-FFF2-40B4-BE49-F238E27FC236}">
+                <a16:creationId xmlns:a16="http://schemas.microsoft.com/office/drawing/2014/main" id="{83F5D944-086F-CFA7-2B8C-85BF08E34A9C}"/>
+              </a:ext>
+            </a:extLst>
+          </p:cNvPr>
+          <p:cNvPicPr>
+            <a:picLocks noChangeAspect="1"/>
+          </p:cNvPicPr>
+          <p:nvPr/>
+        </p:nvPicPr>
+        <p:blipFill>
+          <a:blip r:embed="rId5"/>
+          <a:stretch>
+            <a:fillRect/>
+          </a:stretch>
+        </p:blipFill>
+        <p:spPr>
+          <a:xfrm>
+            <a:off x="3583715" y="1181963"/>
+            <a:ext cx="4505954" cy="4753638"/>
+          </a:xfrm>
+          <a:prstGeom prst="rect">
+            <a:avLst/>
+          </a:prstGeom>
+        </p:spPr>
+      </p:pic>
     </p:spTree>
     <p:extLst>
       <p:ext uri="{BB962C8B-B14F-4D97-AF65-F5344CB8AC3E}">
@@ -11164,6 +11509,1010 @@
 </file>
 
 <file path=ppt/slides/slide38.xml><?xml version="1.0" encoding="utf-8"?>
+<p:sld xmlns:a="http://schemas.openxmlformats.org/drawingml/2006/main" xmlns:r="http://schemas.openxmlformats.org/officeDocument/2006/relationships" xmlns:p="http://schemas.openxmlformats.org/presentationml/2006/main">
+  <p:cSld>
+    <p:spTree>
+      <p:nvGrpSpPr>
+        <p:cNvPr id="1" name=""/>
+        <p:cNvGrpSpPr/>
+        <p:nvPr/>
+      </p:nvGrpSpPr>
+      <p:grpSpPr>
+        <a:xfrm>
+          <a:off x="0" y="0"/>
+          <a:ext cx="0" cy="0"/>
+          <a:chOff x="0" y="0"/>
+          <a:chExt cx="0" cy="0"/>
+        </a:xfrm>
+      </p:grpSpPr>
+      <p:sp>
+        <p:nvSpPr>
+          <p:cNvPr id="2" name="Title 1"/>
+          <p:cNvSpPr>
+            <a:spLocks noGrp="1"/>
+          </p:cNvSpPr>
+          <p:nvPr>
+            <p:ph type="title"/>
+          </p:nvPr>
+        </p:nvSpPr>
+        <p:spPr>
+          <a:xfrm>
+            <a:off x="1249680" y="183832"/>
+            <a:ext cx="9692640" cy="606738"/>
+          </a:xfrm>
+        </p:spPr>
+        <p:txBody>
+          <a:bodyPr>
+            <a:normAutofit/>
+          </a:bodyPr>
+          <a:lstStyle/>
+          <a:p>
+            <a:r>
+              <a:rPr lang="en-NZ" sz="2800" dirty="0">
+                <a:latin typeface="Abadi" panose="020B0604020104020204" pitchFamily="34" charset="0"/>
+              </a:rPr>
+              <a:t>Iterative Improvement (Navbar V2)</a:t>
+            </a:r>
+          </a:p>
+        </p:txBody>
+      </p:sp>
+      <p:graphicFrame>
+        <p:nvGraphicFramePr>
+          <p:cNvPr id="4" name="Table 3">
+            <a:extLst>
+              <a:ext uri="{FF2B5EF4-FFF2-40B4-BE49-F238E27FC236}">
+                <a16:creationId xmlns:a16="http://schemas.microsoft.com/office/drawing/2014/main" id="{9FA07D46-C251-4EF2-0365-B907C7DBEBCF}"/>
+              </a:ext>
+            </a:extLst>
+          </p:cNvPr>
+          <p:cNvGraphicFramePr>
+            <a:graphicFrameLocks noGrp="1"/>
+          </p:cNvGraphicFramePr>
+          <p:nvPr/>
+        </p:nvGraphicFramePr>
+        <p:xfrm>
+          <a:off x="1249680" y="996543"/>
+          <a:ext cx="8128000" cy="370840"/>
+        </p:xfrm>
+        <a:graphic>
+          <a:graphicData uri="http://schemas.openxmlformats.org/drawingml/2006/table">
+            <a:tbl>
+              <a:tblPr firstRow="1" bandRow="1">
+                <a:tableStyleId>{5C22544A-7EE6-4342-B048-85BDC9FD1C3A}</a:tableStyleId>
+              </a:tblPr>
+              <a:tblGrid>
+                <a:gridCol w="8128000">
+                  <a:extLst>
+                    <a:ext uri="{9D8B030D-6E8A-4147-A177-3AD203B41FA5}">
+                      <a16:colId xmlns:a16="http://schemas.microsoft.com/office/drawing/2014/main" val="3661073892"/>
+                    </a:ext>
+                  </a:extLst>
+                </a:gridCol>
+              </a:tblGrid>
+              <a:tr h="370840">
+                <a:tc>
+                  <a:txBody>
+                    <a:bodyPr/>
+                    <a:lstStyle/>
+                    <a:p>
+                      <a:r>
+                        <a:rPr lang="en-NZ" dirty="0"/>
+                        <a:t>The navbar was also missing the image of the logo in the navbar. </a:t>
+                      </a:r>
+                    </a:p>
+                  </a:txBody>
+                  <a:tcPr/>
+                </a:tc>
+                <a:extLst>
+                  <a:ext uri="{0D108BD9-81ED-4DB2-BD59-A6C34878D82A}">
+                    <a16:rowId xmlns:a16="http://schemas.microsoft.com/office/drawing/2014/main" val="2220021842"/>
+                  </a:ext>
+                </a:extLst>
+              </a:tr>
+            </a:tbl>
+          </a:graphicData>
+        </a:graphic>
+      </p:graphicFrame>
+      <p:pic>
+        <p:nvPicPr>
+          <p:cNvPr id="7" name="Picture 6">
+            <a:extLst>
+              <a:ext uri="{FF2B5EF4-FFF2-40B4-BE49-F238E27FC236}">
+                <a16:creationId xmlns:a16="http://schemas.microsoft.com/office/drawing/2014/main" id="{E885503C-1D8A-00B2-9C3A-5A603CA34123}"/>
+              </a:ext>
+            </a:extLst>
+          </p:cNvPr>
+          <p:cNvPicPr>
+            <a:picLocks noChangeAspect="1"/>
+          </p:cNvPicPr>
+          <p:nvPr/>
+        </p:nvPicPr>
+        <p:blipFill>
+          <a:blip r:embed="rId2"/>
+          <a:stretch>
+            <a:fillRect/>
+          </a:stretch>
+        </p:blipFill>
+        <p:spPr>
+          <a:xfrm>
+            <a:off x="0" y="2057208"/>
+            <a:ext cx="8335538" cy="2743583"/>
+          </a:xfrm>
+          <a:prstGeom prst="rect">
+            <a:avLst/>
+          </a:prstGeom>
+        </p:spPr>
+      </p:pic>
+      <p:pic>
+        <p:nvPicPr>
+          <p:cNvPr id="10" name="Picture 9">
+            <a:extLst>
+              <a:ext uri="{FF2B5EF4-FFF2-40B4-BE49-F238E27FC236}">
+                <a16:creationId xmlns:a16="http://schemas.microsoft.com/office/drawing/2014/main" id="{83F5D944-086F-CFA7-2B8C-85BF08E34A9C}"/>
+              </a:ext>
+            </a:extLst>
+          </p:cNvPr>
+          <p:cNvPicPr>
+            <a:picLocks noChangeAspect="1"/>
+          </p:cNvPicPr>
+          <p:nvPr/>
+        </p:nvPicPr>
+        <p:blipFill>
+          <a:blip r:embed="rId3"/>
+          <a:stretch>
+            <a:fillRect/>
+          </a:stretch>
+        </p:blipFill>
+        <p:spPr>
+          <a:xfrm>
+            <a:off x="7541835" y="1576316"/>
+            <a:ext cx="4505954" cy="4753638"/>
+          </a:xfrm>
+          <a:prstGeom prst="rect">
+            <a:avLst/>
+          </a:prstGeom>
+        </p:spPr>
+      </p:pic>
+    </p:spTree>
+    <p:extLst>
+      <p:ext uri="{BB962C8B-B14F-4D97-AF65-F5344CB8AC3E}">
+        <p14:creationId xmlns:p14="http://schemas.microsoft.com/office/powerpoint/2010/main" val="1413360185"/>
+      </p:ext>
+    </p:extLst>
+  </p:cSld>
+  <p:clrMapOvr>
+    <a:masterClrMapping/>
+  </p:clrMapOvr>
+</p:sld>
+</file>
+
+<file path=ppt/slides/slide39.xml><?xml version="1.0" encoding="utf-8"?>
+<p:sld xmlns:a="http://schemas.openxmlformats.org/drawingml/2006/main" xmlns:r="http://schemas.openxmlformats.org/officeDocument/2006/relationships" xmlns:p="http://schemas.openxmlformats.org/presentationml/2006/main">
+  <p:cSld>
+    <p:spTree>
+      <p:nvGrpSpPr>
+        <p:cNvPr id="1" name=""/>
+        <p:cNvGrpSpPr/>
+        <p:nvPr/>
+      </p:nvGrpSpPr>
+      <p:grpSpPr>
+        <a:xfrm>
+          <a:off x="0" y="0"/>
+          <a:ext cx="0" cy="0"/>
+          <a:chOff x="0" y="0"/>
+          <a:chExt cx="0" cy="0"/>
+        </a:xfrm>
+      </p:grpSpPr>
+      <p:sp>
+        <p:nvSpPr>
+          <p:cNvPr id="2" name="Title 1"/>
+          <p:cNvSpPr>
+            <a:spLocks noGrp="1"/>
+          </p:cNvSpPr>
+          <p:nvPr>
+            <p:ph type="title"/>
+          </p:nvPr>
+        </p:nvSpPr>
+        <p:spPr>
+          <a:xfrm>
+            <a:off x="1249680" y="183832"/>
+            <a:ext cx="9692640" cy="606738"/>
+          </a:xfrm>
+        </p:spPr>
+        <p:txBody>
+          <a:bodyPr>
+            <a:normAutofit/>
+          </a:bodyPr>
+          <a:lstStyle/>
+          <a:p>
+            <a:r>
+              <a:rPr lang="en-NZ" sz="2800" dirty="0">
+                <a:latin typeface="Abadi" panose="020B0604020104020204" pitchFamily="34" charset="0"/>
+              </a:rPr>
+              <a:t>Iterative Improvement (Navbar V2)</a:t>
+            </a:r>
+          </a:p>
+        </p:txBody>
+      </p:sp>
+      <p:graphicFrame>
+        <p:nvGraphicFramePr>
+          <p:cNvPr id="4" name="Table 3">
+            <a:extLst>
+              <a:ext uri="{FF2B5EF4-FFF2-40B4-BE49-F238E27FC236}">
+                <a16:creationId xmlns:a16="http://schemas.microsoft.com/office/drawing/2014/main" id="{9FA07D46-C251-4EF2-0365-B907C7DBEBCF}"/>
+              </a:ext>
+            </a:extLst>
+          </p:cNvPr>
+          <p:cNvGraphicFramePr>
+            <a:graphicFrameLocks noGrp="1"/>
+          </p:cNvGraphicFramePr>
+          <p:nvPr>
+            <p:extLst>
+              <p:ext uri="{D42A27DB-BD31-4B8C-83A1-F6EECF244321}">
+                <p14:modId xmlns:p14="http://schemas.microsoft.com/office/powerpoint/2010/main" val="1400009859"/>
+              </p:ext>
+            </p:extLst>
+          </p:nvPr>
+        </p:nvGraphicFramePr>
+        <p:xfrm>
+          <a:off x="514137" y="859383"/>
+          <a:ext cx="4846320" cy="914400"/>
+        </p:xfrm>
+        <a:graphic>
+          <a:graphicData uri="http://schemas.openxmlformats.org/drawingml/2006/table">
+            <a:tbl>
+              <a:tblPr firstRow="1" bandRow="1">
+                <a:tableStyleId>{5C22544A-7EE6-4342-B048-85BDC9FD1C3A}</a:tableStyleId>
+              </a:tblPr>
+              <a:tblGrid>
+                <a:gridCol w="4846320">
+                  <a:extLst>
+                    <a:ext uri="{9D8B030D-6E8A-4147-A177-3AD203B41FA5}">
+                      <a16:colId xmlns:a16="http://schemas.microsoft.com/office/drawing/2014/main" val="3661073892"/>
+                    </a:ext>
+                  </a:extLst>
+                </a:gridCol>
+              </a:tblGrid>
+              <a:tr h="370840">
+                <a:tc>
+                  <a:txBody>
+                    <a:bodyPr/>
+                    <a:lstStyle/>
+                    <a:p>
+                      <a:r>
+                        <a:rPr lang="en-NZ" dirty="0"/>
+                        <a:t>When checking if the navbar is responsive. It does not to be </a:t>
+                      </a:r>
+                      <a:r>
+                        <a:rPr lang="en-NZ" dirty="0" err="1"/>
+                        <a:t>collapsoble</a:t>
+                      </a:r>
+                      <a:r>
+                        <a:rPr lang="en-NZ" dirty="0"/>
+                        <a:t> </a:t>
+                      </a:r>
+                    </a:p>
+                  </a:txBody>
+                  <a:tcPr/>
+                </a:tc>
+                <a:extLst>
+                  <a:ext uri="{0D108BD9-81ED-4DB2-BD59-A6C34878D82A}">
+                    <a16:rowId xmlns:a16="http://schemas.microsoft.com/office/drawing/2014/main" val="2220021842"/>
+                  </a:ext>
+                </a:extLst>
+              </a:tr>
+            </a:tbl>
+          </a:graphicData>
+        </a:graphic>
+      </p:graphicFrame>
+      <p:pic>
+        <p:nvPicPr>
+          <p:cNvPr id="5" name="Picture 4">
+            <a:extLst>
+              <a:ext uri="{FF2B5EF4-FFF2-40B4-BE49-F238E27FC236}">
+                <a16:creationId xmlns:a16="http://schemas.microsoft.com/office/drawing/2014/main" id="{4571335C-5A55-0FD6-C169-7A6F2056AA21}"/>
+              </a:ext>
+            </a:extLst>
+          </p:cNvPr>
+          <p:cNvPicPr>
+            <a:picLocks noChangeAspect="1"/>
+          </p:cNvPicPr>
+          <p:nvPr/>
+        </p:nvPicPr>
+        <p:blipFill>
+          <a:blip r:embed="rId2"/>
+          <a:stretch>
+            <a:fillRect/>
+          </a:stretch>
+        </p:blipFill>
+        <p:spPr>
+          <a:xfrm>
+            <a:off x="787021" y="1842596"/>
+            <a:ext cx="4300553" cy="5009435"/>
+          </a:xfrm>
+          <a:prstGeom prst="rect">
+            <a:avLst/>
+          </a:prstGeom>
+        </p:spPr>
+      </p:pic>
+      <p:graphicFrame>
+        <p:nvGraphicFramePr>
+          <p:cNvPr id="6" name="Table 5">
+            <a:extLst>
+              <a:ext uri="{FF2B5EF4-FFF2-40B4-BE49-F238E27FC236}">
+                <a16:creationId xmlns:a16="http://schemas.microsoft.com/office/drawing/2014/main" id="{86696FAE-6427-9E8F-DDE0-AC2C439DCFBF}"/>
+              </a:ext>
+            </a:extLst>
+          </p:cNvPr>
+          <p:cNvGraphicFramePr>
+            <a:graphicFrameLocks noGrp="1"/>
+          </p:cNvGraphicFramePr>
+          <p:nvPr>
+            <p:extLst>
+              <p:ext uri="{D42A27DB-BD31-4B8C-83A1-F6EECF244321}">
+                <p14:modId xmlns:p14="http://schemas.microsoft.com/office/powerpoint/2010/main" val="339291726"/>
+              </p:ext>
+            </p:extLst>
+          </p:nvPr>
+        </p:nvGraphicFramePr>
+        <p:xfrm>
+          <a:off x="6096000" y="653876"/>
+          <a:ext cx="4846320" cy="1188720"/>
+        </p:xfrm>
+        <a:graphic>
+          <a:graphicData uri="http://schemas.openxmlformats.org/drawingml/2006/table">
+            <a:tbl>
+              <a:tblPr firstRow="1" bandRow="1">
+                <a:tableStyleId>{5C22544A-7EE6-4342-B048-85BDC9FD1C3A}</a:tableStyleId>
+              </a:tblPr>
+              <a:tblGrid>
+                <a:gridCol w="4846320">
+                  <a:extLst>
+                    <a:ext uri="{9D8B030D-6E8A-4147-A177-3AD203B41FA5}">
+                      <a16:colId xmlns:a16="http://schemas.microsoft.com/office/drawing/2014/main" val="3661073892"/>
+                    </a:ext>
+                  </a:extLst>
+                </a:gridCol>
+              </a:tblGrid>
+              <a:tr h="370840">
+                <a:tc>
+                  <a:txBody>
+                    <a:bodyPr/>
+                    <a:lstStyle/>
+                    <a:p>
+                      <a:r>
+                        <a:rPr lang="en-NZ" dirty="0"/>
+                        <a:t>Looking at the html structure of the classes, and then making adjustments in CSS, now the </a:t>
+                      </a:r>
+                      <a:r>
+                        <a:rPr lang="en-NZ" dirty="0" err="1"/>
+                        <a:t>the</a:t>
+                      </a:r>
+                      <a:r>
+                        <a:rPr lang="en-NZ" dirty="0"/>
+                        <a:t> menu icon will appear.</a:t>
+                      </a:r>
+                    </a:p>
+                  </a:txBody>
+                  <a:tcPr/>
+                </a:tc>
+                <a:extLst>
+                  <a:ext uri="{0D108BD9-81ED-4DB2-BD59-A6C34878D82A}">
+                    <a16:rowId xmlns:a16="http://schemas.microsoft.com/office/drawing/2014/main" val="2220021842"/>
+                  </a:ext>
+                </a:extLst>
+              </a:tr>
+            </a:tbl>
+          </a:graphicData>
+        </a:graphic>
+      </p:graphicFrame>
+      <p:pic>
+        <p:nvPicPr>
+          <p:cNvPr id="9" name="Picture 8">
+            <a:extLst>
+              <a:ext uri="{FF2B5EF4-FFF2-40B4-BE49-F238E27FC236}">
+                <a16:creationId xmlns:a16="http://schemas.microsoft.com/office/drawing/2014/main" id="{65094F28-92E3-BA10-74F9-DE04098376DD}"/>
+              </a:ext>
+            </a:extLst>
+          </p:cNvPr>
+          <p:cNvPicPr>
+            <a:picLocks noChangeAspect="1"/>
+          </p:cNvPicPr>
+          <p:nvPr/>
+        </p:nvPicPr>
+        <p:blipFill>
+          <a:blip r:embed="rId3"/>
+          <a:stretch>
+            <a:fillRect/>
+          </a:stretch>
+        </p:blipFill>
+        <p:spPr>
+          <a:xfrm>
+            <a:off x="6267604" y="1842596"/>
+            <a:ext cx="4093739" cy="4868654"/>
+          </a:xfrm>
+          <a:prstGeom prst="rect">
+            <a:avLst/>
+          </a:prstGeom>
+        </p:spPr>
+      </p:pic>
+    </p:spTree>
+    <p:extLst>
+      <p:ext uri="{BB962C8B-B14F-4D97-AF65-F5344CB8AC3E}">
+        <p14:creationId xmlns:p14="http://schemas.microsoft.com/office/powerpoint/2010/main" val="2149979515"/>
+      </p:ext>
+    </p:extLst>
+  </p:cSld>
+  <p:clrMapOvr>
+    <a:masterClrMapping/>
+  </p:clrMapOvr>
+</p:sld>
+</file>
+
+<file path=ppt/slides/slide4.xml><?xml version="1.0" encoding="utf-8"?>
+<p:sld xmlns:a="http://schemas.openxmlformats.org/drawingml/2006/main" xmlns:r="http://schemas.openxmlformats.org/officeDocument/2006/relationships" xmlns:p="http://schemas.openxmlformats.org/presentationml/2006/main">
+  <p:cSld>
+    <p:spTree>
+      <p:nvGrpSpPr>
+        <p:cNvPr id="1" name=""/>
+        <p:cNvGrpSpPr/>
+        <p:nvPr/>
+      </p:nvGrpSpPr>
+      <p:grpSpPr>
+        <a:xfrm>
+          <a:off x="0" y="0"/>
+          <a:ext cx="0" cy="0"/>
+          <a:chOff x="0" y="0"/>
+          <a:chExt cx="0" cy="0"/>
+        </a:xfrm>
+      </p:grpSpPr>
+      <p:sp>
+        <p:nvSpPr>
+          <p:cNvPr id="2" name="Title 1">
+            <a:extLst>
+              <a:ext uri="{FF2B5EF4-FFF2-40B4-BE49-F238E27FC236}">
+                <a16:creationId xmlns:a16="http://schemas.microsoft.com/office/drawing/2014/main" id="{6CD09A84-FA8A-9EBA-C732-E1E1D2D9E81D}"/>
+              </a:ext>
+            </a:extLst>
+          </p:cNvPr>
+          <p:cNvSpPr>
+            <a:spLocks noGrp="1"/>
+          </p:cNvSpPr>
+          <p:nvPr>
+            <p:ph type="title"/>
+          </p:nvPr>
+        </p:nvSpPr>
+        <p:spPr/>
+        <p:txBody>
+          <a:bodyPr/>
+          <a:lstStyle/>
+          <a:p>
+            <a:r>
+              <a:rPr lang="en-NZ" dirty="0">
+                <a:latin typeface="Abadi" panose="020B0604020104020204" pitchFamily="34" charset="0"/>
+              </a:rPr>
+              <a:t>Project Management - Planning</a:t>
+            </a:r>
+          </a:p>
+        </p:txBody>
+      </p:sp>
+      <p:sp>
+        <p:nvSpPr>
+          <p:cNvPr id="3" name="Content Placeholder 2">
+            <a:extLst>
+              <a:ext uri="{FF2B5EF4-FFF2-40B4-BE49-F238E27FC236}">
+                <a16:creationId xmlns:a16="http://schemas.microsoft.com/office/drawing/2014/main" id="{3D07CEE0-AFD6-4A11-A1C8-0B47F7E844D7}"/>
+              </a:ext>
+            </a:extLst>
+          </p:cNvPr>
+          <p:cNvSpPr>
+            <a:spLocks noGrp="1"/>
+          </p:cNvSpPr>
+          <p:nvPr>
+            <p:ph idx="1"/>
+          </p:nvPr>
+        </p:nvSpPr>
+        <p:spPr/>
+        <p:txBody>
+          <a:bodyPr/>
+          <a:lstStyle/>
+          <a:p>
+            <a:r>
+              <a:rPr lang="en-NZ" dirty="0"/>
+              <a:t>Explain how you plan to manage the project</a:t>
+            </a:r>
+          </a:p>
+        </p:txBody>
+      </p:sp>
+      <p:pic>
+        <p:nvPicPr>
+          <p:cNvPr id="4" name="Picture 4" descr="Diagram&#10;&#10;Description automatically generated">
+            <a:extLst>
+              <a:ext uri="{FF2B5EF4-FFF2-40B4-BE49-F238E27FC236}">
+                <a16:creationId xmlns:a16="http://schemas.microsoft.com/office/drawing/2014/main" id="{C1601F02-FA0C-438E-1836-73C8FD35C079}"/>
+              </a:ext>
+            </a:extLst>
+          </p:cNvPr>
+          <p:cNvPicPr>
+            <a:picLocks noChangeAspect="1"/>
+          </p:cNvPicPr>
+          <p:nvPr/>
+        </p:nvPicPr>
+        <p:blipFill>
+          <a:blip r:embed="rId2"/>
+          <a:stretch>
+            <a:fillRect/>
+          </a:stretch>
+        </p:blipFill>
+        <p:spPr>
+          <a:xfrm>
+            <a:off x="224227" y="3458025"/>
+            <a:ext cx="4635485" cy="3112606"/>
+          </a:xfrm>
+          <a:prstGeom prst="rect">
+            <a:avLst/>
+          </a:prstGeom>
+        </p:spPr>
+      </p:pic>
+    </p:spTree>
+    <p:extLst>
+      <p:ext uri="{BB962C8B-B14F-4D97-AF65-F5344CB8AC3E}">
+        <p14:creationId xmlns:p14="http://schemas.microsoft.com/office/powerpoint/2010/main" val="4265713020"/>
+      </p:ext>
+    </p:extLst>
+  </p:cSld>
+  <p:clrMapOvr>
+    <a:masterClrMapping/>
+  </p:clrMapOvr>
+</p:sld>
+</file>
+
+<file path=ppt/slides/slide40.xml><?xml version="1.0" encoding="utf-8"?>
+<p:sld xmlns:a="http://schemas.openxmlformats.org/drawingml/2006/main" xmlns:r="http://schemas.openxmlformats.org/officeDocument/2006/relationships" xmlns:p="http://schemas.openxmlformats.org/presentationml/2006/main">
+  <p:cSld>
+    <p:spTree>
+      <p:nvGrpSpPr>
+        <p:cNvPr id="1" name=""/>
+        <p:cNvGrpSpPr/>
+        <p:nvPr/>
+      </p:nvGrpSpPr>
+      <p:grpSpPr>
+        <a:xfrm>
+          <a:off x="0" y="0"/>
+          <a:ext cx="0" cy="0"/>
+          <a:chOff x="0" y="0"/>
+          <a:chExt cx="0" cy="0"/>
+        </a:xfrm>
+      </p:grpSpPr>
+      <p:sp>
+        <p:nvSpPr>
+          <p:cNvPr id="2" name="Title 1"/>
+          <p:cNvSpPr>
+            <a:spLocks noGrp="1"/>
+          </p:cNvSpPr>
+          <p:nvPr>
+            <p:ph type="title"/>
+          </p:nvPr>
+        </p:nvSpPr>
+        <p:spPr>
+          <a:xfrm>
+            <a:off x="1249680" y="183832"/>
+            <a:ext cx="9692640" cy="606738"/>
+          </a:xfrm>
+        </p:spPr>
+        <p:txBody>
+          <a:bodyPr>
+            <a:normAutofit/>
+          </a:bodyPr>
+          <a:lstStyle/>
+          <a:p>
+            <a:r>
+              <a:rPr lang="en-NZ" sz="2800" dirty="0">
+                <a:latin typeface="Abadi" panose="020B0604020104020204" pitchFamily="34" charset="0"/>
+              </a:rPr>
+              <a:t>Iterative Improvement (Navbar V2)</a:t>
+            </a:r>
+          </a:p>
+        </p:txBody>
+      </p:sp>
+      <p:graphicFrame>
+        <p:nvGraphicFramePr>
+          <p:cNvPr id="6" name="Table 5">
+            <a:extLst>
+              <a:ext uri="{FF2B5EF4-FFF2-40B4-BE49-F238E27FC236}">
+                <a16:creationId xmlns:a16="http://schemas.microsoft.com/office/drawing/2014/main" id="{86696FAE-6427-9E8F-DDE0-AC2C439DCFBF}"/>
+              </a:ext>
+            </a:extLst>
+          </p:cNvPr>
+          <p:cNvGraphicFramePr>
+            <a:graphicFrameLocks noGrp="1"/>
+          </p:cNvGraphicFramePr>
+          <p:nvPr>
+            <p:extLst>
+              <p:ext uri="{D42A27DB-BD31-4B8C-83A1-F6EECF244321}">
+                <p14:modId xmlns:p14="http://schemas.microsoft.com/office/powerpoint/2010/main" val="2950826939"/>
+              </p:ext>
+            </p:extLst>
+          </p:nvPr>
+        </p:nvGraphicFramePr>
+        <p:xfrm>
+          <a:off x="1555845" y="995069"/>
+          <a:ext cx="7861110" cy="929265"/>
+        </p:xfrm>
+        <a:graphic>
+          <a:graphicData uri="http://schemas.openxmlformats.org/drawingml/2006/table">
+            <a:tbl>
+              <a:tblPr firstRow="1" bandRow="1">
+                <a:tableStyleId>{5C22544A-7EE6-4342-B048-85BDC9FD1C3A}</a:tableStyleId>
+              </a:tblPr>
+              <a:tblGrid>
+                <a:gridCol w="7861110">
+                  <a:extLst>
+                    <a:ext uri="{9D8B030D-6E8A-4147-A177-3AD203B41FA5}">
+                      <a16:colId xmlns:a16="http://schemas.microsoft.com/office/drawing/2014/main" val="3661073892"/>
+                    </a:ext>
+                  </a:extLst>
+                </a:gridCol>
+              </a:tblGrid>
+              <a:tr h="929265">
+                <a:tc>
+                  <a:txBody>
+                    <a:bodyPr/>
+                    <a:lstStyle/>
+                    <a:p>
+                      <a:r>
+                        <a:rPr lang="en-NZ" dirty="0"/>
+                        <a:t>Looking at the html structure of the classes, and then making adjustments in CSS, now the </a:t>
+                      </a:r>
+                      <a:r>
+                        <a:rPr lang="en-NZ" dirty="0" err="1"/>
+                        <a:t>the</a:t>
+                      </a:r>
+                      <a:r>
+                        <a:rPr lang="en-NZ" dirty="0"/>
+                        <a:t> menu icon will appear.</a:t>
+                      </a:r>
+                    </a:p>
+                  </a:txBody>
+                  <a:tcPr/>
+                </a:tc>
+                <a:extLst>
+                  <a:ext uri="{0D108BD9-81ED-4DB2-BD59-A6C34878D82A}">
+                    <a16:rowId xmlns:a16="http://schemas.microsoft.com/office/drawing/2014/main" val="2220021842"/>
+                  </a:ext>
+                </a:extLst>
+              </a:tr>
+            </a:tbl>
+          </a:graphicData>
+        </a:graphic>
+      </p:graphicFrame>
+      <p:pic>
+        <p:nvPicPr>
+          <p:cNvPr id="7" name="Picture 6">
+            <a:extLst>
+              <a:ext uri="{FF2B5EF4-FFF2-40B4-BE49-F238E27FC236}">
+                <a16:creationId xmlns:a16="http://schemas.microsoft.com/office/drawing/2014/main" id="{43FDFAF8-F426-5B42-7238-F850FB35BDDC}"/>
+              </a:ext>
+            </a:extLst>
+          </p:cNvPr>
+          <p:cNvPicPr>
+            <a:picLocks noChangeAspect="1"/>
+          </p:cNvPicPr>
+          <p:nvPr/>
+        </p:nvPicPr>
+        <p:blipFill>
+          <a:blip r:embed="rId2"/>
+          <a:stretch>
+            <a:fillRect/>
+          </a:stretch>
+        </p:blipFill>
+        <p:spPr>
+          <a:xfrm>
+            <a:off x="446130" y="2233436"/>
+            <a:ext cx="10659963" cy="3277057"/>
+          </a:xfrm>
+          <a:prstGeom prst="rect">
+            <a:avLst/>
+          </a:prstGeom>
+        </p:spPr>
+      </p:pic>
+    </p:spTree>
+    <p:extLst>
+      <p:ext uri="{BB962C8B-B14F-4D97-AF65-F5344CB8AC3E}">
+        <p14:creationId xmlns:p14="http://schemas.microsoft.com/office/powerpoint/2010/main" val="3944965699"/>
+      </p:ext>
+    </p:extLst>
+  </p:cSld>
+  <p:clrMapOvr>
+    <a:masterClrMapping/>
+  </p:clrMapOvr>
+</p:sld>
+</file>
+
+<file path=ppt/slides/slide41.xml><?xml version="1.0" encoding="utf-8"?>
+<p:sld xmlns:a="http://schemas.openxmlformats.org/drawingml/2006/main" xmlns:r="http://schemas.openxmlformats.org/officeDocument/2006/relationships" xmlns:p="http://schemas.openxmlformats.org/presentationml/2006/main">
+  <p:cSld>
+    <p:spTree>
+      <p:nvGrpSpPr>
+        <p:cNvPr id="1" name=""/>
+        <p:cNvGrpSpPr/>
+        <p:nvPr/>
+      </p:nvGrpSpPr>
+      <p:grpSpPr>
+        <a:xfrm>
+          <a:off x="0" y="0"/>
+          <a:ext cx="0" cy="0"/>
+          <a:chOff x="0" y="0"/>
+          <a:chExt cx="0" cy="0"/>
+        </a:xfrm>
+      </p:grpSpPr>
+      <p:sp>
+        <p:nvSpPr>
+          <p:cNvPr id="2" name="Title 1"/>
+          <p:cNvSpPr>
+            <a:spLocks noGrp="1"/>
+          </p:cNvSpPr>
+          <p:nvPr>
+            <p:ph type="title"/>
+          </p:nvPr>
+        </p:nvSpPr>
+        <p:spPr>
+          <a:xfrm>
+            <a:off x="1249680" y="183832"/>
+            <a:ext cx="9692640" cy="606738"/>
+          </a:xfrm>
+        </p:spPr>
+        <p:txBody>
+          <a:bodyPr>
+            <a:normAutofit/>
+          </a:bodyPr>
+          <a:lstStyle/>
+          <a:p>
+            <a:r>
+              <a:rPr lang="en-NZ" sz="2800" dirty="0">
+                <a:latin typeface="Abadi" panose="020B0604020104020204" pitchFamily="34" charset="0"/>
+              </a:rPr>
+              <a:t>Iterative Improvement (Navbar V2)</a:t>
+            </a:r>
+          </a:p>
+        </p:txBody>
+      </p:sp>
+      <p:graphicFrame>
+        <p:nvGraphicFramePr>
+          <p:cNvPr id="6" name="Table 5">
+            <a:extLst>
+              <a:ext uri="{FF2B5EF4-FFF2-40B4-BE49-F238E27FC236}">
+                <a16:creationId xmlns:a16="http://schemas.microsoft.com/office/drawing/2014/main" id="{86696FAE-6427-9E8F-DDE0-AC2C439DCFBF}"/>
+              </a:ext>
+            </a:extLst>
+          </p:cNvPr>
+          <p:cNvGraphicFramePr>
+            <a:graphicFrameLocks noGrp="1"/>
+          </p:cNvGraphicFramePr>
+          <p:nvPr>
+            <p:extLst>
+              <p:ext uri="{D42A27DB-BD31-4B8C-83A1-F6EECF244321}">
+                <p14:modId xmlns:p14="http://schemas.microsoft.com/office/powerpoint/2010/main" val="2469496024"/>
+              </p:ext>
+            </p:extLst>
+          </p:nvPr>
+        </p:nvGraphicFramePr>
+        <p:xfrm>
+          <a:off x="1555845" y="995069"/>
+          <a:ext cx="7861110" cy="929265"/>
+        </p:xfrm>
+        <a:graphic>
+          <a:graphicData uri="http://schemas.openxmlformats.org/drawingml/2006/table">
+            <a:tbl>
+              <a:tblPr firstRow="1" bandRow="1">
+                <a:tableStyleId>{5C22544A-7EE6-4342-B048-85BDC9FD1C3A}</a:tableStyleId>
+              </a:tblPr>
+              <a:tblGrid>
+                <a:gridCol w="7861110">
+                  <a:extLst>
+                    <a:ext uri="{9D8B030D-6E8A-4147-A177-3AD203B41FA5}">
+                      <a16:colId xmlns:a16="http://schemas.microsoft.com/office/drawing/2014/main" val="3661073892"/>
+                    </a:ext>
+                  </a:extLst>
+                </a:gridCol>
+              </a:tblGrid>
+              <a:tr h="929265">
+                <a:tc>
+                  <a:txBody>
+                    <a:bodyPr/>
+                    <a:lstStyle/>
+                    <a:p>
+                      <a:r>
+                        <a:rPr lang="en-NZ" dirty="0"/>
+                        <a:t>However pressing the toggler icon, the navbar links being underneath look off. </a:t>
+                      </a:r>
+                    </a:p>
+                  </a:txBody>
+                  <a:tcPr/>
+                </a:tc>
+                <a:extLst>
+                  <a:ext uri="{0D108BD9-81ED-4DB2-BD59-A6C34878D82A}">
+                    <a16:rowId xmlns:a16="http://schemas.microsoft.com/office/drawing/2014/main" val="2220021842"/>
+                  </a:ext>
+                </a:extLst>
+              </a:tr>
+            </a:tbl>
+          </a:graphicData>
+        </a:graphic>
+      </p:graphicFrame>
+      <p:pic>
+        <p:nvPicPr>
+          <p:cNvPr id="4" name="Picture 3">
+            <a:extLst>
+              <a:ext uri="{FF2B5EF4-FFF2-40B4-BE49-F238E27FC236}">
+                <a16:creationId xmlns:a16="http://schemas.microsoft.com/office/drawing/2014/main" id="{7EF8CEF0-E3FC-76E4-4CCC-207E3CC3CEEA}"/>
+              </a:ext>
+            </a:extLst>
+          </p:cNvPr>
+          <p:cNvPicPr>
+            <a:picLocks noChangeAspect="1"/>
+          </p:cNvPicPr>
+          <p:nvPr/>
+        </p:nvPicPr>
+        <p:blipFill>
+          <a:blip r:embed="rId2"/>
+          <a:stretch>
+            <a:fillRect/>
+          </a:stretch>
+        </p:blipFill>
+        <p:spPr>
+          <a:xfrm>
+            <a:off x="0" y="2283384"/>
+            <a:ext cx="12192000" cy="3737895"/>
+          </a:xfrm>
+          <a:prstGeom prst="rect">
+            <a:avLst/>
+          </a:prstGeom>
+        </p:spPr>
+      </p:pic>
+    </p:spTree>
+    <p:extLst>
+      <p:ext uri="{BB962C8B-B14F-4D97-AF65-F5344CB8AC3E}">
+        <p14:creationId xmlns:p14="http://schemas.microsoft.com/office/powerpoint/2010/main" val="3282549244"/>
+      </p:ext>
+    </p:extLst>
+  </p:cSld>
+  <p:clrMapOvr>
+    <a:masterClrMapping/>
+  </p:clrMapOvr>
+</p:sld>
+</file>
+
+<file path=ppt/slides/slide42.xml><?xml version="1.0" encoding="utf-8"?>
+<p:sld xmlns:a="http://schemas.openxmlformats.org/drawingml/2006/main" xmlns:r="http://schemas.openxmlformats.org/officeDocument/2006/relationships" xmlns:p="http://schemas.openxmlformats.org/presentationml/2006/main">
+  <p:cSld>
+    <p:spTree>
+      <p:nvGrpSpPr>
+        <p:cNvPr id="1" name=""/>
+        <p:cNvGrpSpPr/>
+        <p:nvPr/>
+      </p:nvGrpSpPr>
+      <p:grpSpPr>
+        <a:xfrm>
+          <a:off x="0" y="0"/>
+          <a:ext cx="0" cy="0"/>
+          <a:chOff x="0" y="0"/>
+          <a:chExt cx="0" cy="0"/>
+        </a:xfrm>
+      </p:grpSpPr>
+      <p:sp>
+        <p:nvSpPr>
+          <p:cNvPr id="2" name="Title 1"/>
+          <p:cNvSpPr>
+            <a:spLocks noGrp="1"/>
+          </p:cNvSpPr>
+          <p:nvPr>
+            <p:ph type="title"/>
+          </p:nvPr>
+        </p:nvSpPr>
+        <p:spPr>
+          <a:xfrm>
+            <a:off x="1249680" y="183832"/>
+            <a:ext cx="9692640" cy="606738"/>
+          </a:xfrm>
+        </p:spPr>
+        <p:txBody>
+          <a:bodyPr>
+            <a:normAutofit/>
+          </a:bodyPr>
+          <a:lstStyle/>
+          <a:p>
+            <a:r>
+              <a:rPr lang="en-NZ" sz="2800" dirty="0">
+                <a:latin typeface="Abadi" panose="020B0604020104020204" pitchFamily="34" charset="0"/>
+              </a:rPr>
+              <a:t>Iterative Improvement (Navbar V2)</a:t>
+            </a:r>
+          </a:p>
+        </p:txBody>
+      </p:sp>
+      <p:graphicFrame>
+        <p:nvGraphicFramePr>
+          <p:cNvPr id="6" name="Table 5">
+            <a:extLst>
+              <a:ext uri="{FF2B5EF4-FFF2-40B4-BE49-F238E27FC236}">
+                <a16:creationId xmlns:a16="http://schemas.microsoft.com/office/drawing/2014/main" id="{86696FAE-6427-9E8F-DDE0-AC2C439DCFBF}"/>
+              </a:ext>
+            </a:extLst>
+          </p:cNvPr>
+          <p:cNvGraphicFramePr>
+            <a:graphicFrameLocks noGrp="1"/>
+          </p:cNvGraphicFramePr>
+          <p:nvPr>
+            <p:extLst>
+              <p:ext uri="{D42A27DB-BD31-4B8C-83A1-F6EECF244321}">
+                <p14:modId xmlns:p14="http://schemas.microsoft.com/office/powerpoint/2010/main" val="60990511"/>
+              </p:ext>
+            </p:extLst>
+          </p:nvPr>
+        </p:nvGraphicFramePr>
+        <p:xfrm>
+          <a:off x="1555845" y="995069"/>
+          <a:ext cx="7861110" cy="929265"/>
+        </p:xfrm>
+        <a:graphic>
+          <a:graphicData uri="http://schemas.openxmlformats.org/drawingml/2006/table">
+            <a:tbl>
+              <a:tblPr firstRow="1" bandRow="1">
+                <a:tableStyleId>{5C22544A-7EE6-4342-B048-85BDC9FD1C3A}</a:tableStyleId>
+              </a:tblPr>
+              <a:tblGrid>
+                <a:gridCol w="7861110">
+                  <a:extLst>
+                    <a:ext uri="{9D8B030D-6E8A-4147-A177-3AD203B41FA5}">
+                      <a16:colId xmlns:a16="http://schemas.microsoft.com/office/drawing/2014/main" val="3661073892"/>
+                    </a:ext>
+                  </a:extLst>
+                </a:gridCol>
+              </a:tblGrid>
+              <a:tr h="929265">
+                <a:tc>
+                  <a:txBody>
+                    <a:bodyPr/>
+                    <a:lstStyle/>
+                    <a:p>
+                      <a:r>
+                        <a:rPr lang="en-NZ" dirty="0"/>
+                        <a:t>To change this </a:t>
+                      </a:r>
+                      <a:r>
+                        <a:rPr lang="en-NZ"/>
+                        <a:t>I decided to </a:t>
+                      </a:r>
+                      <a:endParaRPr lang="en-NZ" dirty="0"/>
+                    </a:p>
+                  </a:txBody>
+                  <a:tcPr/>
+                </a:tc>
+                <a:extLst>
+                  <a:ext uri="{0D108BD9-81ED-4DB2-BD59-A6C34878D82A}">
+                    <a16:rowId xmlns:a16="http://schemas.microsoft.com/office/drawing/2014/main" val="2220021842"/>
+                  </a:ext>
+                </a:extLst>
+              </a:tr>
+            </a:tbl>
+          </a:graphicData>
+        </a:graphic>
+      </p:graphicFrame>
+    </p:spTree>
+    <p:extLst>
+      <p:ext uri="{BB962C8B-B14F-4D97-AF65-F5344CB8AC3E}">
+        <p14:creationId xmlns:p14="http://schemas.microsoft.com/office/powerpoint/2010/main" val="1078243187"/>
+      </p:ext>
+    </p:extLst>
+  </p:cSld>
+  <p:clrMapOvr>
+    <a:masterClrMapping/>
+  </p:clrMapOvr>
+</p:sld>
+</file>
+
+<file path=ppt/slides/slide43.xml><?xml version="1.0" encoding="utf-8"?>
 <p:sld xmlns:a="http://schemas.openxmlformats.org/drawingml/2006/main" xmlns:r="http://schemas.openxmlformats.org/officeDocument/2006/relationships" xmlns:p="http://schemas.openxmlformats.org/presentationml/2006/main">
   <p:cSld>
     <p:spTree>
@@ -11305,7 +12654,7 @@
 </p:sld>
 </file>
 
-<file path=ppt/slides/slide39.xml><?xml version="1.0" encoding="utf-8"?>
+<file path=ppt/slides/slide44.xml><?xml version="1.0" encoding="utf-8"?>
 <p:sld xmlns:a="http://schemas.openxmlformats.org/drawingml/2006/main" xmlns:r="http://schemas.openxmlformats.org/officeDocument/2006/relationships" xmlns:p="http://schemas.openxmlformats.org/presentationml/2006/main">
   <p:cSld>
     <p:spTree>
@@ -11390,125 +12739,7 @@
 </p:sld>
 </file>
 
-<file path=ppt/slides/slide4.xml><?xml version="1.0" encoding="utf-8"?>
-<p:sld xmlns:a="http://schemas.openxmlformats.org/drawingml/2006/main" xmlns:r="http://schemas.openxmlformats.org/officeDocument/2006/relationships" xmlns:p="http://schemas.openxmlformats.org/presentationml/2006/main">
-  <p:cSld>
-    <p:spTree>
-      <p:nvGrpSpPr>
-        <p:cNvPr id="1" name=""/>
-        <p:cNvGrpSpPr/>
-        <p:nvPr/>
-      </p:nvGrpSpPr>
-      <p:grpSpPr>
-        <a:xfrm>
-          <a:off x="0" y="0"/>
-          <a:ext cx="0" cy="0"/>
-          <a:chOff x="0" y="0"/>
-          <a:chExt cx="0" cy="0"/>
-        </a:xfrm>
-      </p:grpSpPr>
-      <p:sp>
-        <p:nvSpPr>
-          <p:cNvPr id="2" name="Title 1">
-            <a:extLst>
-              <a:ext uri="{FF2B5EF4-FFF2-40B4-BE49-F238E27FC236}">
-                <a16:creationId xmlns:a16="http://schemas.microsoft.com/office/drawing/2014/main" id="{6CD09A84-FA8A-9EBA-C732-E1E1D2D9E81D}"/>
-              </a:ext>
-            </a:extLst>
-          </p:cNvPr>
-          <p:cNvSpPr>
-            <a:spLocks noGrp="1"/>
-          </p:cNvSpPr>
-          <p:nvPr>
-            <p:ph type="title"/>
-          </p:nvPr>
-        </p:nvSpPr>
-        <p:spPr/>
-        <p:txBody>
-          <a:bodyPr/>
-          <a:lstStyle/>
-          <a:p>
-            <a:r>
-              <a:rPr lang="en-NZ" dirty="0">
-                <a:latin typeface="Abadi" panose="020B0604020104020204" pitchFamily="34" charset="0"/>
-              </a:rPr>
-              <a:t>Project Management - Planning</a:t>
-            </a:r>
-          </a:p>
-        </p:txBody>
-      </p:sp>
-      <p:sp>
-        <p:nvSpPr>
-          <p:cNvPr id="3" name="Content Placeholder 2">
-            <a:extLst>
-              <a:ext uri="{FF2B5EF4-FFF2-40B4-BE49-F238E27FC236}">
-                <a16:creationId xmlns:a16="http://schemas.microsoft.com/office/drawing/2014/main" id="{3D07CEE0-AFD6-4A11-A1C8-0B47F7E844D7}"/>
-              </a:ext>
-            </a:extLst>
-          </p:cNvPr>
-          <p:cNvSpPr>
-            <a:spLocks noGrp="1"/>
-          </p:cNvSpPr>
-          <p:nvPr>
-            <p:ph idx="1"/>
-          </p:nvPr>
-        </p:nvSpPr>
-        <p:spPr/>
-        <p:txBody>
-          <a:bodyPr/>
-          <a:lstStyle/>
-          <a:p>
-            <a:r>
-              <a:rPr lang="en-NZ" dirty="0"/>
-              <a:t>Explain how you plan to manage the project</a:t>
-            </a:r>
-          </a:p>
-        </p:txBody>
-      </p:sp>
-      <p:pic>
-        <p:nvPicPr>
-          <p:cNvPr id="4" name="Picture 4" descr="Diagram&#10;&#10;Description automatically generated">
-            <a:extLst>
-              <a:ext uri="{FF2B5EF4-FFF2-40B4-BE49-F238E27FC236}">
-                <a16:creationId xmlns:a16="http://schemas.microsoft.com/office/drawing/2014/main" id="{C1601F02-FA0C-438E-1836-73C8FD35C079}"/>
-              </a:ext>
-            </a:extLst>
-          </p:cNvPr>
-          <p:cNvPicPr>
-            <a:picLocks noChangeAspect="1"/>
-          </p:cNvPicPr>
-          <p:nvPr/>
-        </p:nvPicPr>
-        <p:blipFill>
-          <a:blip r:embed="rId2"/>
-          <a:stretch>
-            <a:fillRect/>
-          </a:stretch>
-        </p:blipFill>
-        <p:spPr>
-          <a:xfrm>
-            <a:off x="224227" y="3458025"/>
-            <a:ext cx="4635485" cy="3112606"/>
-          </a:xfrm>
-          <a:prstGeom prst="rect">
-            <a:avLst/>
-          </a:prstGeom>
-        </p:spPr>
-      </p:pic>
-    </p:spTree>
-    <p:extLst>
-      <p:ext uri="{BB962C8B-B14F-4D97-AF65-F5344CB8AC3E}">
-        <p14:creationId xmlns:p14="http://schemas.microsoft.com/office/powerpoint/2010/main" val="4265713020"/>
-      </p:ext>
-    </p:extLst>
-  </p:cSld>
-  <p:clrMapOvr>
-    <a:masterClrMapping/>
-  </p:clrMapOvr>
-</p:sld>
-</file>
-
-<file path=ppt/slides/slide40.xml><?xml version="1.0" encoding="utf-8"?>
+<file path=ppt/slides/slide45.xml><?xml version="1.0" encoding="utf-8"?>
 <p:sld xmlns:a="http://schemas.openxmlformats.org/drawingml/2006/main" xmlns:r="http://schemas.openxmlformats.org/officeDocument/2006/relationships" xmlns:p="http://schemas.openxmlformats.org/presentationml/2006/main">
   <p:cSld>
     <p:spTree>
@@ -11593,7 +12824,7 @@
 </p:sld>
 </file>
 
-<file path=ppt/slides/slide41.xml><?xml version="1.0" encoding="utf-8"?>
+<file path=ppt/slides/slide46.xml><?xml version="1.0" encoding="utf-8"?>
 <p:sld xmlns:a="http://schemas.openxmlformats.org/drawingml/2006/main" xmlns:r="http://schemas.openxmlformats.org/officeDocument/2006/relationships" xmlns:p="http://schemas.openxmlformats.org/presentationml/2006/main">
   <p:cSld>
     <p:spTree>
@@ -11678,7 +12909,7 @@
 </p:sld>
 </file>
 
-<file path=ppt/slides/slide42.xml><?xml version="1.0" encoding="utf-8"?>
+<file path=ppt/slides/slide47.xml><?xml version="1.0" encoding="utf-8"?>
 <p:sld xmlns:a="http://schemas.openxmlformats.org/drawingml/2006/main" xmlns:r="http://schemas.openxmlformats.org/officeDocument/2006/relationships" xmlns:p="http://schemas.openxmlformats.org/presentationml/2006/main">
   <p:cSld>
     <p:spTree>
@@ -11777,7 +13008,7 @@
 </p:sld>
 </file>
 
-<file path=ppt/slides/slide43.xml><?xml version="1.0" encoding="utf-8"?>
+<file path=ppt/slides/slide48.xml><?xml version="1.0" encoding="utf-8"?>
 <p:sld xmlns:a="http://schemas.openxmlformats.org/drawingml/2006/main" xmlns:r="http://schemas.openxmlformats.org/officeDocument/2006/relationships" xmlns:p="http://schemas.openxmlformats.org/presentationml/2006/main">
   <p:cSld>
     <p:spTree>

</xml_diff>

<commit_message>
added spacing between links in navbar
</commit_message>
<xml_diff>
--- a/AS91903_91906_Evidence_Joaquin_Badenas.pptx
+++ b/AS91903_91906_Evidence_Joaquin_Badenas.pptx
@@ -45,14 +45,15 @@
     <p:sldId id="308" r:id="rId39"/>
     <p:sldId id="309" r:id="rId40"/>
     <p:sldId id="310" r:id="rId41"/>
-    <p:sldId id="311" r:id="rId42"/>
-    <p:sldId id="312" r:id="rId43"/>
-    <p:sldId id="301" r:id="rId44"/>
-    <p:sldId id="275" r:id="rId45"/>
-    <p:sldId id="283" r:id="rId46"/>
-    <p:sldId id="265" r:id="rId47"/>
-    <p:sldId id="269" r:id="rId48"/>
-    <p:sldId id="276" r:id="rId49"/>
+    <p:sldId id="313" r:id="rId42"/>
+    <p:sldId id="314" r:id="rId43"/>
+    <p:sldId id="315" r:id="rId44"/>
+    <p:sldId id="301" r:id="rId45"/>
+    <p:sldId id="275" r:id="rId46"/>
+    <p:sldId id="283" r:id="rId47"/>
+    <p:sldId id="265" r:id="rId48"/>
+    <p:sldId id="269" r:id="rId49"/>
+    <p:sldId id="276" r:id="rId50"/>
   </p:sldIdLst>
   <p:sldSz cx="12192000" cy="6858000"/>
   <p:notesSz cx="6858000" cy="9144000"/>
@@ -162,7 +163,7 @@
 <file path=ppt/revisionInfo.xml><?xml version="1.0" encoding="utf-8"?>
 <p1510:revInfo xmlns:a="http://schemas.openxmlformats.org/drawingml/2006/main" xmlns:r="http://schemas.openxmlformats.org/officeDocument/2006/relationships" xmlns:p1510="http://schemas.microsoft.com/office/powerpoint/2015/10/main">
   <p1510:revLst>
-    <p1510:client id="{4F53BFBD-1E38-412E-AE7B-7E5D3B30168C}" v="36" dt="2024-07-28T14:30:59.017"/>
+    <p1510:client id="{4F53BFBD-1E38-412E-AE7B-7E5D3B30168C}" v="41" dt="2024-07-28T14:40:12.046"/>
   </p1510:revLst>
 </p1510:revInfo>
 </file>
@@ -1608,7 +1609,7 @@
   <pc:docChgLst>
     <pc:chgData name="Joaquin Badenas" userId="5cb29fd719aebf04" providerId="LiveId" clId="{4F53BFBD-1E38-412E-AE7B-7E5D3B30168C}"/>
     <pc:docChg chg="undo custSel addSld delSld modSld sldOrd">
-      <pc:chgData name="Joaquin Badenas" userId="5cb29fd719aebf04" providerId="LiveId" clId="{4F53BFBD-1E38-412E-AE7B-7E5D3B30168C}" dt="2024-07-28T14:31:08.635" v="7662" actId="20577"/>
+      <pc:chgData name="Joaquin Badenas" userId="5cb29fd719aebf04" providerId="LiveId" clId="{4F53BFBD-1E38-412E-AE7B-7E5D3B30168C}" dt="2024-07-28T14:40:12.044" v="7974"/>
       <pc:docMkLst>
         <pc:docMk/>
       </pc:docMkLst>
@@ -2997,22 +2998,22 @@
           </ac:picMkLst>
         </pc:picChg>
       </pc:sldChg>
-      <pc:sldChg chg="addSp delSp modSp add mod">
-        <pc:chgData name="Joaquin Badenas" userId="5cb29fd719aebf04" providerId="LiveId" clId="{4F53BFBD-1E38-412E-AE7B-7E5D3B30168C}" dt="2024-07-28T14:30:52.834" v="7632" actId="1076"/>
+      <pc:sldChg chg="addSp delSp modSp add del mod">
+        <pc:chgData name="Joaquin Badenas" userId="5cb29fd719aebf04" providerId="LiveId" clId="{4F53BFBD-1E38-412E-AE7B-7E5D3B30168C}" dt="2024-07-28T14:39:57.517" v="7972" actId="47"/>
         <pc:sldMkLst>
           <pc:docMk/>
           <pc:sldMk cId="3282549244" sldId="311"/>
         </pc:sldMkLst>
         <pc:graphicFrameChg chg="modGraphic">
-          <ac:chgData name="Joaquin Badenas" userId="5cb29fd719aebf04" providerId="LiveId" clId="{4F53BFBD-1E38-412E-AE7B-7E5D3B30168C}" dt="2024-07-28T14:30:21.178" v="7630" actId="20577"/>
+          <ac:chgData name="Joaquin Badenas" userId="5cb29fd719aebf04" providerId="LiveId" clId="{4F53BFBD-1E38-412E-AE7B-7E5D3B30168C}" dt="2024-07-28T14:39:38.569" v="7965" actId="20577"/>
           <ac:graphicFrameMkLst>
             <pc:docMk/>
             <pc:sldMk cId="3282549244" sldId="311"/>
             <ac:graphicFrameMk id="6" creationId="{86696FAE-6427-9E8F-DDE0-AC2C439DCFBF}"/>
           </ac:graphicFrameMkLst>
         </pc:graphicFrameChg>
-        <pc:picChg chg="add mod">
-          <ac:chgData name="Joaquin Badenas" userId="5cb29fd719aebf04" providerId="LiveId" clId="{4F53BFBD-1E38-412E-AE7B-7E5D3B30168C}" dt="2024-07-28T14:30:52.834" v="7632" actId="1076"/>
+        <pc:picChg chg="add del mod">
+          <ac:chgData name="Joaquin Badenas" userId="5cb29fd719aebf04" providerId="LiveId" clId="{4F53BFBD-1E38-412E-AE7B-7E5D3B30168C}" dt="2024-07-28T14:38:50.258" v="7742" actId="478"/>
           <ac:picMkLst>
             <pc:docMk/>
             <pc:sldMk cId="3282549244" sldId="311"/>
@@ -3028,8 +3029,8 @@
           </ac:picMkLst>
         </pc:picChg>
       </pc:sldChg>
-      <pc:sldChg chg="delSp modSp add mod">
-        <pc:chgData name="Joaquin Badenas" userId="5cb29fd719aebf04" providerId="LiveId" clId="{4F53BFBD-1E38-412E-AE7B-7E5D3B30168C}" dt="2024-07-28T14:31:08.635" v="7662" actId="20577"/>
+      <pc:sldChg chg="delSp modSp add del mod">
+        <pc:chgData name="Joaquin Badenas" userId="5cb29fd719aebf04" providerId="LiveId" clId="{4F53BFBD-1E38-412E-AE7B-7E5D3B30168C}" dt="2024-07-28T14:40:09.286" v="7973" actId="47"/>
         <pc:sldMkLst>
           <pc:docMk/>
           <pc:sldMk cId="1078243187" sldId="312"/>
@@ -3050,6 +3051,58 @@
             <ac:picMk id="4" creationId="{7EF8CEF0-E3FC-76E4-4CCC-207E3CC3CEEA}"/>
           </ac:picMkLst>
         </pc:picChg>
+      </pc:sldChg>
+      <pc:sldChg chg="modSp add mod ord">
+        <pc:chgData name="Joaquin Badenas" userId="5cb29fd719aebf04" providerId="LiveId" clId="{4F53BFBD-1E38-412E-AE7B-7E5D3B30168C}" dt="2024-07-28T14:38:47.877" v="7741"/>
+        <pc:sldMkLst>
+          <pc:docMk/>
+          <pc:sldMk cId="760343678" sldId="313"/>
+        </pc:sldMkLst>
+        <pc:graphicFrameChg chg="modGraphic">
+          <ac:chgData name="Joaquin Badenas" userId="5cb29fd719aebf04" providerId="LiveId" clId="{4F53BFBD-1E38-412E-AE7B-7E5D3B30168C}" dt="2024-07-28T14:38:42.218" v="7739" actId="20577"/>
+          <ac:graphicFrameMkLst>
+            <pc:docMk/>
+            <pc:sldMk cId="760343678" sldId="313"/>
+            <ac:graphicFrameMk id="6" creationId="{86696FAE-6427-9E8F-DDE0-AC2C439DCFBF}"/>
+          </ac:graphicFrameMkLst>
+        </pc:graphicFrameChg>
+      </pc:sldChg>
+      <pc:sldChg chg="addSp delSp modSp add mod">
+        <pc:chgData name="Joaquin Badenas" userId="5cb29fd719aebf04" providerId="LiveId" clId="{4F53BFBD-1E38-412E-AE7B-7E5D3B30168C}" dt="2024-07-28T14:39:53.233" v="7971" actId="1076"/>
+        <pc:sldMkLst>
+          <pc:docMk/>
+          <pc:sldMk cId="94855052" sldId="314"/>
+        </pc:sldMkLst>
+        <pc:picChg chg="del">
+          <ac:chgData name="Joaquin Badenas" userId="5cb29fd719aebf04" providerId="LiveId" clId="{4F53BFBD-1E38-412E-AE7B-7E5D3B30168C}" dt="2024-07-28T14:39:49.943" v="7969" actId="478"/>
+          <ac:picMkLst>
+            <pc:docMk/>
+            <pc:sldMk cId="94855052" sldId="314"/>
+            <ac:picMk id="4" creationId="{7EF8CEF0-E3FC-76E4-4CCC-207E3CC3CEEA}"/>
+          </ac:picMkLst>
+        </pc:picChg>
+        <pc:picChg chg="add mod">
+          <ac:chgData name="Joaquin Badenas" userId="5cb29fd719aebf04" providerId="LiveId" clId="{4F53BFBD-1E38-412E-AE7B-7E5D3B30168C}" dt="2024-07-28T14:39:53.233" v="7971" actId="1076"/>
+          <ac:picMkLst>
+            <pc:docMk/>
+            <pc:sldMk cId="94855052" sldId="314"/>
+            <ac:picMk id="5" creationId="{931954EF-AE18-EA2B-0D51-FBAD4505C514}"/>
+          </ac:picMkLst>
+        </pc:picChg>
+      </pc:sldChg>
+      <pc:sldChg chg="add del">
+        <pc:chgData name="Joaquin Badenas" userId="5cb29fd719aebf04" providerId="LiveId" clId="{4F53BFBD-1E38-412E-AE7B-7E5D3B30168C}" dt="2024-07-28T14:39:41.841" v="7967"/>
+        <pc:sldMkLst>
+          <pc:docMk/>
+          <pc:sldMk cId="1654309245" sldId="314"/>
+        </pc:sldMkLst>
+      </pc:sldChg>
+      <pc:sldChg chg="add">
+        <pc:chgData name="Joaquin Badenas" userId="5cb29fd719aebf04" providerId="LiveId" clId="{4F53BFBD-1E38-412E-AE7B-7E5D3B30168C}" dt="2024-07-28T14:40:12.044" v="7974"/>
+        <pc:sldMkLst>
+          <pc:docMk/>
+          <pc:sldMk cId="3662683977" sldId="315"/>
+        </pc:sldMkLst>
       </pc:sldChg>
     </pc:docChg>
   </pc:docChgLst>
@@ -12292,7 +12345,7 @@
           <p:nvPr>
             <p:extLst>
               <p:ext uri="{D42A27DB-BD31-4B8C-83A1-F6EECF244321}">
-                <p14:modId xmlns:p14="http://schemas.microsoft.com/office/powerpoint/2010/main" val="2469496024"/>
+                <p14:modId xmlns:p14="http://schemas.microsoft.com/office/powerpoint/2010/main" val="1481848200"/>
               </p:ext>
             </p:extLst>
           </p:nvPr>
@@ -12324,7 +12377,15 @@
                     <a:p>
                       <a:r>
                         <a:rPr lang="en-NZ" dirty="0"/>
-                        <a:t>However pressing the toggler icon, the navbar links being underneath look off. </a:t>
+                        <a:t>However pressing the toggler icon, the navbar links being underneath look off. The home </a:t>
+                      </a:r>
+                      <a:r>
+                        <a:rPr lang="en-NZ" dirty="0" err="1"/>
+                        <a:t>navlink</a:t>
+                      </a:r>
+                      <a:r>
+                        <a:rPr lang="en-NZ" dirty="0"/>
+                        <a:t> seems too close to the logo.</a:t>
                       </a:r>
                     </a:p>
                   </a:txBody>
@@ -12373,7 +12434,7 @@
     </p:spTree>
     <p:extLst>
       <p:ext uri="{BB962C8B-B14F-4D97-AF65-F5344CB8AC3E}">
-        <p14:creationId xmlns:p14="http://schemas.microsoft.com/office/powerpoint/2010/main" val="3282549244"/>
+        <p14:creationId xmlns:p14="http://schemas.microsoft.com/office/powerpoint/2010/main" val="760343678"/>
       </p:ext>
     </p:extLst>
   </p:cSld>
@@ -12443,13 +12504,7 @@
           <p:cNvGraphicFramePr>
             <a:graphicFrameLocks noGrp="1"/>
           </p:cNvGraphicFramePr>
-          <p:nvPr>
-            <p:extLst>
-              <p:ext uri="{D42A27DB-BD31-4B8C-83A1-F6EECF244321}">
-                <p14:modId xmlns:p14="http://schemas.microsoft.com/office/powerpoint/2010/main" val="60990511"/>
-              </p:ext>
-            </p:extLst>
-          </p:nvPr>
+          <p:nvPr/>
         </p:nvGraphicFramePr>
         <p:xfrm>
           <a:off x="1555845" y="995069"/>
@@ -12478,13 +12533,8 @@
                     <a:p>
                       <a:r>
                         <a:rPr lang="en-NZ" dirty="0"/>
-                        <a:t>To change this </a:t>
+                        <a:t>However pressing the toggler icon, the navbar links being underneath look off. </a:t>
                       </a:r>
-                      <a:r>
-                        <a:rPr lang="en-NZ"/>
-                        <a:t>I decided to </a:t>
-                      </a:r>
-                      <a:endParaRPr lang="en-NZ" dirty="0"/>
                     </a:p>
                   </a:txBody>
                   <a:tcPr/>
@@ -12499,10 +12549,40 @@
           </a:graphicData>
         </a:graphic>
       </p:graphicFrame>
+      <p:pic>
+        <p:nvPicPr>
+          <p:cNvPr id="5" name="Picture 4">
+            <a:extLst>
+              <a:ext uri="{FF2B5EF4-FFF2-40B4-BE49-F238E27FC236}">
+                <a16:creationId xmlns:a16="http://schemas.microsoft.com/office/drawing/2014/main" id="{931954EF-AE18-EA2B-0D51-FBAD4505C514}"/>
+              </a:ext>
+            </a:extLst>
+          </p:cNvPr>
+          <p:cNvPicPr>
+            <a:picLocks noChangeAspect="1"/>
+          </p:cNvPicPr>
+          <p:nvPr/>
+        </p:nvPicPr>
+        <p:blipFill>
+          <a:blip r:embed="rId2"/>
+          <a:stretch>
+            <a:fillRect/>
+          </a:stretch>
+        </p:blipFill>
+        <p:spPr>
+          <a:xfrm>
+            <a:off x="136477" y="1924334"/>
+            <a:ext cx="12192000" cy="4257964"/>
+          </a:xfrm>
+          <a:prstGeom prst="rect">
+            <a:avLst/>
+          </a:prstGeom>
+        </p:spPr>
+      </p:pic>
     </p:spTree>
     <p:extLst>
       <p:ext uri="{BB962C8B-B14F-4D97-AF65-F5344CB8AC3E}">
-        <p14:creationId xmlns:p14="http://schemas.microsoft.com/office/powerpoint/2010/main" val="1078243187"/>
+        <p14:creationId xmlns:p14="http://schemas.microsoft.com/office/powerpoint/2010/main" val="94855052"/>
       </p:ext>
     </p:extLst>
   </p:cSld>
@@ -12513,6 +12593,154 @@
 </file>
 
 <file path=ppt/slides/slide43.xml><?xml version="1.0" encoding="utf-8"?>
+<p:sld xmlns:a="http://schemas.openxmlformats.org/drawingml/2006/main" xmlns:r="http://schemas.openxmlformats.org/officeDocument/2006/relationships" xmlns:p="http://schemas.openxmlformats.org/presentationml/2006/main">
+  <p:cSld>
+    <p:spTree>
+      <p:nvGrpSpPr>
+        <p:cNvPr id="1" name=""/>
+        <p:cNvGrpSpPr/>
+        <p:nvPr/>
+      </p:nvGrpSpPr>
+      <p:grpSpPr>
+        <a:xfrm>
+          <a:off x="0" y="0"/>
+          <a:ext cx="0" cy="0"/>
+          <a:chOff x="0" y="0"/>
+          <a:chExt cx="0" cy="0"/>
+        </a:xfrm>
+      </p:grpSpPr>
+      <p:sp>
+        <p:nvSpPr>
+          <p:cNvPr id="2" name="Title 1"/>
+          <p:cNvSpPr>
+            <a:spLocks noGrp="1"/>
+          </p:cNvSpPr>
+          <p:nvPr>
+            <p:ph type="title"/>
+          </p:nvPr>
+        </p:nvSpPr>
+        <p:spPr>
+          <a:xfrm>
+            <a:off x="1249680" y="183832"/>
+            <a:ext cx="9692640" cy="606738"/>
+          </a:xfrm>
+        </p:spPr>
+        <p:txBody>
+          <a:bodyPr>
+            <a:normAutofit/>
+          </a:bodyPr>
+          <a:lstStyle/>
+          <a:p>
+            <a:r>
+              <a:rPr lang="en-NZ" sz="2800" dirty="0">
+                <a:latin typeface="Abadi" panose="020B0604020104020204" pitchFamily="34" charset="0"/>
+              </a:rPr>
+              <a:t>Iterative Improvement (Navbar V2)</a:t>
+            </a:r>
+          </a:p>
+        </p:txBody>
+      </p:sp>
+      <p:graphicFrame>
+        <p:nvGraphicFramePr>
+          <p:cNvPr id="6" name="Table 5">
+            <a:extLst>
+              <a:ext uri="{FF2B5EF4-FFF2-40B4-BE49-F238E27FC236}">
+                <a16:creationId xmlns:a16="http://schemas.microsoft.com/office/drawing/2014/main" id="{86696FAE-6427-9E8F-DDE0-AC2C439DCFBF}"/>
+              </a:ext>
+            </a:extLst>
+          </p:cNvPr>
+          <p:cNvGraphicFramePr>
+            <a:graphicFrameLocks noGrp="1"/>
+          </p:cNvGraphicFramePr>
+          <p:nvPr/>
+        </p:nvGraphicFramePr>
+        <p:xfrm>
+          <a:off x="1555845" y="995069"/>
+          <a:ext cx="7861110" cy="929265"/>
+        </p:xfrm>
+        <a:graphic>
+          <a:graphicData uri="http://schemas.openxmlformats.org/drawingml/2006/table">
+            <a:tbl>
+              <a:tblPr firstRow="1" bandRow="1">
+                <a:tableStyleId>{5C22544A-7EE6-4342-B048-85BDC9FD1C3A}</a:tableStyleId>
+              </a:tblPr>
+              <a:tblGrid>
+                <a:gridCol w="7861110">
+                  <a:extLst>
+                    <a:ext uri="{9D8B030D-6E8A-4147-A177-3AD203B41FA5}">
+                      <a16:colId xmlns:a16="http://schemas.microsoft.com/office/drawing/2014/main" val="3661073892"/>
+                    </a:ext>
+                  </a:extLst>
+                </a:gridCol>
+              </a:tblGrid>
+              <a:tr h="929265">
+                <a:tc>
+                  <a:txBody>
+                    <a:bodyPr/>
+                    <a:lstStyle/>
+                    <a:p>
+                      <a:r>
+                        <a:rPr lang="en-NZ" dirty="0"/>
+                        <a:t>However pressing the toggler icon, the navbar links being underneath look off. </a:t>
+                      </a:r>
+                    </a:p>
+                  </a:txBody>
+                  <a:tcPr/>
+                </a:tc>
+                <a:extLst>
+                  <a:ext uri="{0D108BD9-81ED-4DB2-BD59-A6C34878D82A}">
+                    <a16:rowId xmlns:a16="http://schemas.microsoft.com/office/drawing/2014/main" val="2220021842"/>
+                  </a:ext>
+                </a:extLst>
+              </a:tr>
+            </a:tbl>
+          </a:graphicData>
+        </a:graphic>
+      </p:graphicFrame>
+      <p:pic>
+        <p:nvPicPr>
+          <p:cNvPr id="5" name="Picture 4">
+            <a:extLst>
+              <a:ext uri="{FF2B5EF4-FFF2-40B4-BE49-F238E27FC236}">
+                <a16:creationId xmlns:a16="http://schemas.microsoft.com/office/drawing/2014/main" id="{931954EF-AE18-EA2B-0D51-FBAD4505C514}"/>
+              </a:ext>
+            </a:extLst>
+          </p:cNvPr>
+          <p:cNvPicPr>
+            <a:picLocks noChangeAspect="1"/>
+          </p:cNvPicPr>
+          <p:nvPr/>
+        </p:nvPicPr>
+        <p:blipFill>
+          <a:blip r:embed="rId2"/>
+          <a:stretch>
+            <a:fillRect/>
+          </a:stretch>
+        </p:blipFill>
+        <p:spPr>
+          <a:xfrm>
+            <a:off x="136477" y="1924334"/>
+            <a:ext cx="12192000" cy="4257964"/>
+          </a:xfrm>
+          <a:prstGeom prst="rect">
+            <a:avLst/>
+          </a:prstGeom>
+        </p:spPr>
+      </p:pic>
+    </p:spTree>
+    <p:extLst>
+      <p:ext uri="{BB962C8B-B14F-4D97-AF65-F5344CB8AC3E}">
+        <p14:creationId xmlns:p14="http://schemas.microsoft.com/office/powerpoint/2010/main" val="3662683977"/>
+      </p:ext>
+    </p:extLst>
+  </p:cSld>
+  <p:clrMapOvr>
+    <a:masterClrMapping/>
+  </p:clrMapOvr>
+</p:sld>
+</file>
+
+<file path=ppt/slides/slide44.xml><?xml version="1.0" encoding="utf-8"?>
 <p:sld xmlns:a="http://schemas.openxmlformats.org/drawingml/2006/main" xmlns:r="http://schemas.openxmlformats.org/officeDocument/2006/relationships" xmlns:p="http://schemas.openxmlformats.org/presentationml/2006/main">
   <p:cSld>
     <p:spTree>
@@ -12654,91 +12882,6 @@
 </p:sld>
 </file>
 
-<file path=ppt/slides/slide44.xml><?xml version="1.0" encoding="utf-8"?>
-<p:sld xmlns:a="http://schemas.openxmlformats.org/drawingml/2006/main" xmlns:r="http://schemas.openxmlformats.org/officeDocument/2006/relationships" xmlns:p="http://schemas.openxmlformats.org/presentationml/2006/main">
-  <p:cSld>
-    <p:spTree>
-      <p:nvGrpSpPr>
-        <p:cNvPr id="1" name=""/>
-        <p:cNvGrpSpPr/>
-        <p:nvPr/>
-      </p:nvGrpSpPr>
-      <p:grpSpPr>
-        <a:xfrm>
-          <a:off x="0" y="0"/>
-          <a:ext cx="0" cy="0"/>
-          <a:chOff x="0" y="0"/>
-          <a:chExt cx="0" cy="0"/>
-        </a:xfrm>
-      </p:grpSpPr>
-      <p:sp>
-        <p:nvSpPr>
-          <p:cNvPr id="2" name="Title 1"/>
-          <p:cNvSpPr>
-            <a:spLocks noGrp="1"/>
-          </p:cNvSpPr>
-          <p:nvPr>
-            <p:ph type="title"/>
-          </p:nvPr>
-        </p:nvSpPr>
-        <p:spPr/>
-        <p:txBody>
-          <a:bodyPr>
-            <a:normAutofit/>
-          </a:bodyPr>
-          <a:lstStyle/>
-          <a:p>
-            <a:r>
-              <a:rPr lang="en-NZ" sz="2800" dirty="0">
-                <a:latin typeface="Abadi" panose="020B0604020104020204" pitchFamily="34" charset="0"/>
-              </a:rPr>
-              <a:t>Version Control</a:t>
-            </a:r>
-          </a:p>
-        </p:txBody>
-      </p:sp>
-      <p:sp>
-        <p:nvSpPr>
-          <p:cNvPr id="3" name="Content Placeholder 2"/>
-          <p:cNvSpPr>
-            <a:spLocks noGrp="1"/>
-          </p:cNvSpPr>
-          <p:nvPr>
-            <p:ph idx="1"/>
-          </p:nvPr>
-        </p:nvSpPr>
-        <p:spPr/>
-        <p:txBody>
-          <a:bodyPr>
-            <a:normAutofit/>
-          </a:bodyPr>
-          <a:lstStyle/>
-          <a:p>
-            <a:pPr marL="0" indent="0">
-              <a:buNone/>
-            </a:pPr>
-            <a:r>
-              <a:rPr lang="en-NZ" sz="2000" dirty="0">
-                <a:latin typeface="Abadi" panose="020B0604020104020204" pitchFamily="34" charset="0"/>
-              </a:rPr>
-              <a:t>Show how you have used version control throughout the design, development, and testing process.</a:t>
-            </a:r>
-          </a:p>
-        </p:txBody>
-      </p:sp>
-    </p:spTree>
-    <p:extLst>
-      <p:ext uri="{BB962C8B-B14F-4D97-AF65-F5344CB8AC3E}">
-        <p14:creationId xmlns:p14="http://schemas.microsoft.com/office/powerpoint/2010/main" val="2812247241"/>
-      </p:ext>
-    </p:extLst>
-  </p:cSld>
-  <p:clrMapOvr>
-    <a:masterClrMapping/>
-  </p:clrMapOvr>
-</p:sld>
-</file>
-
 <file path=ppt/slides/slide45.xml><?xml version="1.0" encoding="utf-8"?>
 <p:sld xmlns:a="http://schemas.openxmlformats.org/drawingml/2006/main" xmlns:r="http://schemas.openxmlformats.org/officeDocument/2006/relationships" xmlns:p="http://schemas.openxmlformats.org/presentationml/2006/main">
   <p:cSld>
@@ -12777,7 +12920,7 @@
               <a:rPr lang="en-NZ" sz="2800" dirty="0">
                 <a:latin typeface="Abadi" panose="020B0604020104020204" pitchFamily="34" charset="0"/>
               </a:rPr>
-              <a:t>GitHub Commits</a:t>
+              <a:t>Version Control</a:t>
             </a:r>
           </a:p>
         </p:txBody>
@@ -12806,7 +12949,7 @@
               <a:rPr lang="en-NZ" sz="2000" dirty="0">
                 <a:latin typeface="Abadi" panose="020B0604020104020204" pitchFamily="34" charset="0"/>
               </a:rPr>
-              <a:t>Show how you have used GitHub throughout the design, development, and testing process.</a:t>
+              <a:t>Show how you have used version control throughout the design, development, and testing process.</a:t>
             </a:r>
           </a:p>
         </p:txBody>
@@ -12814,7 +12957,7 @@
     </p:spTree>
     <p:extLst>
       <p:ext uri="{BB962C8B-B14F-4D97-AF65-F5344CB8AC3E}">
-        <p14:creationId xmlns:p14="http://schemas.microsoft.com/office/powerpoint/2010/main" val="1865976428"/>
+        <p14:creationId xmlns:p14="http://schemas.microsoft.com/office/powerpoint/2010/main" val="2812247241"/>
       </p:ext>
     </p:extLst>
   </p:cSld>
@@ -12862,6 +13005,91 @@
               <a:rPr lang="en-NZ" sz="2800" dirty="0">
                 <a:latin typeface="Abadi" panose="020B0604020104020204" pitchFamily="34" charset="0"/>
               </a:rPr>
+              <a:t>GitHub Commits</a:t>
+            </a:r>
+          </a:p>
+        </p:txBody>
+      </p:sp>
+      <p:sp>
+        <p:nvSpPr>
+          <p:cNvPr id="3" name="Content Placeholder 2"/>
+          <p:cNvSpPr>
+            <a:spLocks noGrp="1"/>
+          </p:cNvSpPr>
+          <p:nvPr>
+            <p:ph idx="1"/>
+          </p:nvPr>
+        </p:nvSpPr>
+        <p:spPr/>
+        <p:txBody>
+          <a:bodyPr>
+            <a:normAutofit/>
+          </a:bodyPr>
+          <a:lstStyle/>
+          <a:p>
+            <a:pPr marL="0" indent="0">
+              <a:buNone/>
+            </a:pPr>
+            <a:r>
+              <a:rPr lang="en-NZ" sz="2000" dirty="0">
+                <a:latin typeface="Abadi" panose="020B0604020104020204" pitchFamily="34" charset="0"/>
+              </a:rPr>
+              <a:t>Show how you have used GitHub throughout the design, development, and testing process.</a:t>
+            </a:r>
+          </a:p>
+        </p:txBody>
+      </p:sp>
+    </p:spTree>
+    <p:extLst>
+      <p:ext uri="{BB962C8B-B14F-4D97-AF65-F5344CB8AC3E}">
+        <p14:creationId xmlns:p14="http://schemas.microsoft.com/office/powerpoint/2010/main" val="1865976428"/>
+      </p:ext>
+    </p:extLst>
+  </p:cSld>
+  <p:clrMapOvr>
+    <a:masterClrMapping/>
+  </p:clrMapOvr>
+</p:sld>
+</file>
+
+<file path=ppt/slides/slide47.xml><?xml version="1.0" encoding="utf-8"?>
+<p:sld xmlns:a="http://schemas.openxmlformats.org/drawingml/2006/main" xmlns:r="http://schemas.openxmlformats.org/officeDocument/2006/relationships" xmlns:p="http://schemas.openxmlformats.org/presentationml/2006/main">
+  <p:cSld>
+    <p:spTree>
+      <p:nvGrpSpPr>
+        <p:cNvPr id="1" name=""/>
+        <p:cNvGrpSpPr/>
+        <p:nvPr/>
+      </p:nvGrpSpPr>
+      <p:grpSpPr>
+        <a:xfrm>
+          <a:off x="0" y="0"/>
+          <a:ext cx="0" cy="0"/>
+          <a:chOff x="0" y="0"/>
+          <a:chExt cx="0" cy="0"/>
+        </a:xfrm>
+      </p:grpSpPr>
+      <p:sp>
+        <p:nvSpPr>
+          <p:cNvPr id="2" name="Title 1"/>
+          <p:cNvSpPr>
+            <a:spLocks noGrp="1"/>
+          </p:cNvSpPr>
+          <p:nvPr>
+            <p:ph type="title"/>
+          </p:nvPr>
+        </p:nvSpPr>
+        <p:spPr/>
+        <p:txBody>
+          <a:bodyPr>
+            <a:normAutofit/>
+          </a:bodyPr>
+          <a:lstStyle/>
+          <a:p>
+            <a:r>
+              <a:rPr lang="en-NZ" sz="2800" dirty="0">
+                <a:latin typeface="Abadi" panose="020B0604020104020204" pitchFamily="34" charset="0"/>
+              </a:rPr>
               <a:t>Addressing Relevant Implications</a:t>
             </a:r>
           </a:p>
@@ -12909,7 +13137,7 @@
 </p:sld>
 </file>
 
-<file path=ppt/slides/slide47.xml><?xml version="1.0" encoding="utf-8"?>
+<file path=ppt/slides/slide48.xml><?xml version="1.0" encoding="utf-8"?>
 <p:sld xmlns:a="http://schemas.openxmlformats.org/drawingml/2006/main" xmlns:r="http://schemas.openxmlformats.org/officeDocument/2006/relationships" xmlns:p="http://schemas.openxmlformats.org/presentationml/2006/main">
   <p:cSld>
     <p:spTree>
@@ -13008,7 +13236,7 @@
 </p:sld>
 </file>
 
-<file path=ppt/slides/slide48.xml><?xml version="1.0" encoding="utf-8"?>
+<file path=ppt/slides/slide49.xml><?xml version="1.0" encoding="utf-8"?>
 <p:sld xmlns:a="http://schemas.openxmlformats.org/drawingml/2006/main" xmlns:r="http://schemas.openxmlformats.org/officeDocument/2006/relationships" xmlns:p="http://schemas.openxmlformats.org/presentationml/2006/main">
   <p:cSld>
     <p:spTree>

</xml_diff>

<commit_message>
Rearranged place where navlinks are
</commit_message>
<xml_diff>
--- a/AS91903_91906_Evidence_Joaquin_Badenas.pptx
+++ b/AS91903_91906_Evidence_Joaquin_Badenas.pptx
@@ -48,12 +48,13 @@
     <p:sldId id="313" r:id="rId42"/>
     <p:sldId id="314" r:id="rId43"/>
     <p:sldId id="315" r:id="rId44"/>
-    <p:sldId id="301" r:id="rId45"/>
-    <p:sldId id="275" r:id="rId46"/>
-    <p:sldId id="283" r:id="rId47"/>
-    <p:sldId id="265" r:id="rId48"/>
-    <p:sldId id="269" r:id="rId49"/>
-    <p:sldId id="276" r:id="rId50"/>
+    <p:sldId id="316" r:id="rId45"/>
+    <p:sldId id="301" r:id="rId46"/>
+    <p:sldId id="275" r:id="rId47"/>
+    <p:sldId id="283" r:id="rId48"/>
+    <p:sldId id="265" r:id="rId49"/>
+    <p:sldId id="269" r:id="rId50"/>
+    <p:sldId id="276" r:id="rId51"/>
   </p:sldIdLst>
   <p:sldSz cx="12192000" cy="6858000"/>
   <p:notesSz cx="6858000" cy="9144000"/>
@@ -163,7 +164,7 @@
 <file path=ppt/revisionInfo.xml><?xml version="1.0" encoding="utf-8"?>
 <p1510:revInfo xmlns:a="http://schemas.openxmlformats.org/drawingml/2006/main" xmlns:r="http://schemas.openxmlformats.org/officeDocument/2006/relationships" xmlns:p1510="http://schemas.microsoft.com/office/powerpoint/2015/10/main">
   <p1510:revLst>
-    <p1510:client id="{4F53BFBD-1E38-412E-AE7B-7E5D3B30168C}" v="41" dt="2024-07-28T14:40:12.046"/>
+    <p1510:client id="{4F53BFBD-1E38-412E-AE7B-7E5D3B30168C}" v="44" dt="2024-07-28T15:08:46.003"/>
   </p1510:revLst>
 </p1510:revInfo>
 </file>
@@ -1609,7 +1610,7 @@
   <pc:docChgLst>
     <pc:chgData name="Joaquin Badenas" userId="5cb29fd719aebf04" providerId="LiveId" clId="{4F53BFBD-1E38-412E-AE7B-7E5D3B30168C}"/>
     <pc:docChg chg="undo custSel addSld delSld modSld sldOrd">
-      <pc:chgData name="Joaquin Badenas" userId="5cb29fd719aebf04" providerId="LiveId" clId="{4F53BFBD-1E38-412E-AE7B-7E5D3B30168C}" dt="2024-07-28T14:40:12.044" v="7974"/>
+      <pc:chgData name="Joaquin Badenas" userId="5cb29fd719aebf04" providerId="LiveId" clId="{4F53BFBD-1E38-412E-AE7B-7E5D3B30168C}" dt="2024-07-28T15:10:05.402" v="8329" actId="20577"/>
       <pc:docMkLst>
         <pc:docMk/>
       </pc:docMkLst>
@@ -2756,7 +2757,7 @@
         </pc:sldMkLst>
       </pc:sldChg>
       <pc:sldChg chg="addSp delSp modSp add mod">
-        <pc:chgData name="Joaquin Badenas" userId="5cb29fd719aebf04" providerId="LiveId" clId="{4F53BFBD-1E38-412E-AE7B-7E5D3B30168C}" dt="2024-07-28T14:14:01.158" v="7009" actId="1076"/>
+        <pc:chgData name="Joaquin Badenas" userId="5cb29fd719aebf04" providerId="LiveId" clId="{4F53BFBD-1E38-412E-AE7B-7E5D3B30168C}" dt="2024-07-28T15:03:29.481" v="7979" actId="1076"/>
         <pc:sldMkLst>
           <pc:docMk/>
           <pc:sldMk cId="989374121" sldId="307"/>
@@ -2778,7 +2779,7 @@
           </ac:graphicFrameMkLst>
         </pc:graphicFrameChg>
         <pc:picChg chg="mod">
-          <ac:chgData name="Joaquin Badenas" userId="5cb29fd719aebf04" providerId="LiveId" clId="{4F53BFBD-1E38-412E-AE7B-7E5D3B30168C}" dt="2024-07-28T14:13:25.630" v="7004" actId="1076"/>
+          <ac:chgData name="Joaquin Badenas" userId="5cb29fd719aebf04" providerId="LiveId" clId="{4F53BFBD-1E38-412E-AE7B-7E5D3B30168C}" dt="2024-07-28T15:03:28.871" v="7978" actId="1076"/>
           <ac:picMkLst>
             <pc:docMk/>
             <pc:sldMk cId="989374121" sldId="307"/>
@@ -2786,7 +2787,7 @@
           </ac:picMkLst>
         </pc:picChg>
         <pc:picChg chg="add mod">
-          <ac:chgData name="Joaquin Badenas" userId="5cb29fd719aebf04" providerId="LiveId" clId="{4F53BFBD-1E38-412E-AE7B-7E5D3B30168C}" dt="2024-07-28T14:13:27.583" v="7005" actId="1076"/>
+          <ac:chgData name="Joaquin Badenas" userId="5cb29fd719aebf04" providerId="LiveId" clId="{4F53BFBD-1E38-412E-AE7B-7E5D3B30168C}" dt="2024-07-28T15:03:29.481" v="7979" actId="1076"/>
           <ac:picMkLst>
             <pc:docMk/>
             <pc:sldMk cId="989374121" sldId="307"/>
@@ -2801,16 +2802,16 @@
             <ac:picMk id="7" creationId="{DD785A3E-D8A0-F7B2-EE57-F1EC629879CF}"/>
           </ac:picMkLst>
         </pc:picChg>
-        <pc:picChg chg="add mod">
-          <ac:chgData name="Joaquin Badenas" userId="5cb29fd719aebf04" providerId="LiveId" clId="{4F53BFBD-1E38-412E-AE7B-7E5D3B30168C}" dt="2024-07-28T14:13:51.122" v="7007" actId="1076"/>
+        <pc:picChg chg="add del mod">
+          <ac:chgData name="Joaquin Badenas" userId="5cb29fd719aebf04" providerId="LiveId" clId="{4F53BFBD-1E38-412E-AE7B-7E5D3B30168C}" dt="2024-07-28T15:03:22.006" v="7976" actId="478"/>
           <ac:picMkLst>
             <pc:docMk/>
             <pc:sldMk cId="989374121" sldId="307"/>
             <ac:picMk id="8" creationId="{AE4A23F9-E286-A494-C701-ACD7D85002B9}"/>
           </ac:picMkLst>
         </pc:picChg>
-        <pc:picChg chg="add mod">
-          <ac:chgData name="Joaquin Badenas" userId="5cb29fd719aebf04" providerId="LiveId" clId="{4F53BFBD-1E38-412E-AE7B-7E5D3B30168C}" dt="2024-07-28T14:14:01.158" v="7009" actId="1076"/>
+        <pc:picChg chg="add del mod">
+          <ac:chgData name="Joaquin Badenas" userId="5cb29fd719aebf04" providerId="LiveId" clId="{4F53BFBD-1E38-412E-AE7B-7E5D3B30168C}" dt="2024-07-28T15:03:21.519" v="7975" actId="478"/>
           <ac:picMkLst>
             <pc:docMk/>
             <pc:sldMk cId="989374121" sldId="307"/>
@@ -3097,12 +3098,107 @@
           <pc:sldMk cId="1654309245" sldId="314"/>
         </pc:sldMkLst>
       </pc:sldChg>
-      <pc:sldChg chg="add">
-        <pc:chgData name="Joaquin Badenas" userId="5cb29fd719aebf04" providerId="LiveId" clId="{4F53BFBD-1E38-412E-AE7B-7E5D3B30168C}" dt="2024-07-28T14:40:12.044" v="7974"/>
+      <pc:sldChg chg="addSp delSp modSp add mod">
+        <pc:chgData name="Joaquin Badenas" userId="5cb29fd719aebf04" providerId="LiveId" clId="{4F53BFBD-1E38-412E-AE7B-7E5D3B30168C}" dt="2024-07-28T15:09:38.981" v="8194" actId="20577"/>
         <pc:sldMkLst>
           <pc:docMk/>
           <pc:sldMk cId="3662683977" sldId="315"/>
         </pc:sldMkLst>
+        <pc:graphicFrameChg chg="modGraphic">
+          <ac:chgData name="Joaquin Badenas" userId="5cb29fd719aebf04" providerId="LiveId" clId="{4F53BFBD-1E38-412E-AE7B-7E5D3B30168C}" dt="2024-07-28T15:09:38.981" v="8194" actId="20577"/>
+          <ac:graphicFrameMkLst>
+            <pc:docMk/>
+            <pc:sldMk cId="3662683977" sldId="315"/>
+            <ac:graphicFrameMk id="6" creationId="{86696FAE-6427-9E8F-DDE0-AC2C439DCFBF}"/>
+          </ac:graphicFrameMkLst>
+        </pc:graphicFrameChg>
+        <pc:picChg chg="add mod">
+          <ac:chgData name="Joaquin Badenas" userId="5cb29fd719aebf04" providerId="LiveId" clId="{4F53BFBD-1E38-412E-AE7B-7E5D3B30168C}" dt="2024-07-28T15:04:44.469" v="8143" actId="1076"/>
+          <ac:picMkLst>
+            <pc:docMk/>
+            <pc:sldMk cId="3662683977" sldId="315"/>
+            <ac:picMk id="3" creationId="{A1015963-8AEC-1DAC-7015-11D3B9874D65}"/>
+          </ac:picMkLst>
+        </pc:picChg>
+        <pc:picChg chg="del">
+          <ac:chgData name="Joaquin Badenas" userId="5cb29fd719aebf04" providerId="LiveId" clId="{4F53BFBD-1E38-412E-AE7B-7E5D3B30168C}" dt="2024-07-28T15:03:42.973" v="7980" actId="478"/>
+          <ac:picMkLst>
+            <pc:docMk/>
+            <pc:sldMk cId="3662683977" sldId="315"/>
+            <ac:picMk id="5" creationId="{931954EF-AE18-EA2B-0D51-FBAD4505C514}"/>
+          </ac:picMkLst>
+        </pc:picChg>
+        <pc:picChg chg="add mod">
+          <ac:chgData name="Joaquin Badenas" userId="5cb29fd719aebf04" providerId="LiveId" clId="{4F53BFBD-1E38-412E-AE7B-7E5D3B30168C}" dt="2024-07-28T15:04:46.575" v="8144" actId="1076"/>
+          <ac:picMkLst>
+            <pc:docMk/>
+            <pc:sldMk cId="3662683977" sldId="315"/>
+            <ac:picMk id="7" creationId="{71CBA416-7FC0-D8C4-96EE-7635ADA86FC6}"/>
+          </ac:picMkLst>
+        </pc:picChg>
+        <pc:picChg chg="add mod">
+          <ac:chgData name="Joaquin Badenas" userId="5cb29fd719aebf04" providerId="LiveId" clId="{4F53BFBD-1E38-412E-AE7B-7E5D3B30168C}" dt="2024-07-28T15:08:50.607" v="8159" actId="1076"/>
+          <ac:picMkLst>
+            <pc:docMk/>
+            <pc:sldMk cId="3662683977" sldId="315"/>
+            <ac:picMk id="8" creationId="{4D058E62-B07A-93E5-E35A-4272B9B9E120}"/>
+          </ac:picMkLst>
+        </pc:picChg>
+      </pc:sldChg>
+      <pc:sldChg chg="addSp delSp modSp add mod">
+        <pc:chgData name="Joaquin Badenas" userId="5cb29fd719aebf04" providerId="LiveId" clId="{4F53BFBD-1E38-412E-AE7B-7E5D3B30168C}" dt="2024-07-28T15:10:05.402" v="8329" actId="20577"/>
+        <pc:sldMkLst>
+          <pc:docMk/>
+          <pc:sldMk cId="1340966395" sldId="316"/>
+        </pc:sldMkLst>
+        <pc:graphicFrameChg chg="modGraphic">
+          <ac:chgData name="Joaquin Badenas" userId="5cb29fd719aebf04" providerId="LiveId" clId="{4F53BFBD-1E38-412E-AE7B-7E5D3B30168C}" dt="2024-07-28T15:10:05.402" v="8329" actId="20577"/>
+          <ac:graphicFrameMkLst>
+            <pc:docMk/>
+            <pc:sldMk cId="1340966395" sldId="316"/>
+            <ac:graphicFrameMk id="6" creationId="{86696FAE-6427-9E8F-DDE0-AC2C439DCFBF}"/>
+          </ac:graphicFrameMkLst>
+        </pc:graphicFrameChg>
+        <pc:picChg chg="del">
+          <ac:chgData name="Joaquin Badenas" userId="5cb29fd719aebf04" providerId="LiveId" clId="{4F53BFBD-1E38-412E-AE7B-7E5D3B30168C}" dt="2024-07-28T15:06:02.689" v="8146" actId="478"/>
+          <ac:picMkLst>
+            <pc:docMk/>
+            <pc:sldMk cId="1340966395" sldId="316"/>
+            <ac:picMk id="3" creationId="{A1015963-8AEC-1DAC-7015-11D3B9874D65}"/>
+          </ac:picMkLst>
+        </pc:picChg>
+        <pc:picChg chg="add mod">
+          <ac:chgData name="Joaquin Badenas" userId="5cb29fd719aebf04" providerId="LiveId" clId="{4F53BFBD-1E38-412E-AE7B-7E5D3B30168C}" dt="2024-07-28T15:09:20.839" v="8163" actId="1076"/>
+          <ac:picMkLst>
+            <pc:docMk/>
+            <pc:sldMk cId="1340966395" sldId="316"/>
+            <ac:picMk id="5" creationId="{4C190BFD-BA5B-BF16-2BFD-899A84FB4016}"/>
+          </ac:picMkLst>
+        </pc:picChg>
+        <pc:picChg chg="del">
+          <ac:chgData name="Joaquin Badenas" userId="5cb29fd719aebf04" providerId="LiveId" clId="{4F53BFBD-1E38-412E-AE7B-7E5D3B30168C}" dt="2024-07-28T15:06:03.228" v="8147" actId="478"/>
+          <ac:picMkLst>
+            <pc:docMk/>
+            <pc:sldMk cId="1340966395" sldId="316"/>
+            <ac:picMk id="7" creationId="{71CBA416-7FC0-D8C4-96EE-7635ADA86FC6}"/>
+          </ac:picMkLst>
+        </pc:picChg>
+        <pc:picChg chg="add del mod">
+          <ac:chgData name="Joaquin Badenas" userId="5cb29fd719aebf04" providerId="LiveId" clId="{4F53BFBD-1E38-412E-AE7B-7E5D3B30168C}" dt="2024-07-28T15:08:43.454" v="8157" actId="478"/>
+          <ac:picMkLst>
+            <pc:docMk/>
+            <pc:sldMk cId="1340966395" sldId="316"/>
+            <ac:picMk id="9" creationId="{4A95EC7B-E64D-889B-B8E7-D5F8FBF4C191}"/>
+          </ac:picMkLst>
+        </pc:picChg>
+        <pc:picChg chg="add mod">
+          <ac:chgData name="Joaquin Badenas" userId="5cb29fd719aebf04" providerId="LiveId" clId="{4F53BFBD-1E38-412E-AE7B-7E5D3B30168C}" dt="2024-07-28T15:09:23.340" v="8164" actId="1076"/>
+          <ac:picMkLst>
+            <pc:docMk/>
+            <pc:sldMk cId="1340966395" sldId="316"/>
+            <ac:picMk id="11" creationId="{1DE9DC09-2AC1-5E72-D1AD-09DD0277EC38}"/>
+          </ac:picMkLst>
+        </pc:picChg>
       </pc:sldChg>
     </pc:docChg>
   </pc:docChgLst>
@@ -11387,7 +11483,7 @@
         </p:blipFill>
         <p:spPr>
           <a:xfrm>
-            <a:off x="161954" y="1674236"/>
+            <a:off x="2591255" y="2136013"/>
             <a:ext cx="5016463" cy="1292987"/>
           </a:xfrm>
           <a:prstGeom prst="rect">
@@ -11480,68 +11576,8 @@
         </p:blipFill>
         <p:spPr>
           <a:xfrm>
-            <a:off x="5178417" y="1573356"/>
+            <a:off x="2766548" y="4466681"/>
             <a:ext cx="6658904" cy="1200318"/>
-          </a:xfrm>
-          <a:prstGeom prst="rect">
-            <a:avLst/>
-          </a:prstGeom>
-        </p:spPr>
-      </p:pic>
-      <p:pic>
-        <p:nvPicPr>
-          <p:cNvPr id="8" name="Picture 7">
-            <a:extLst>
-              <a:ext uri="{FF2B5EF4-FFF2-40B4-BE49-F238E27FC236}">
-                <a16:creationId xmlns:a16="http://schemas.microsoft.com/office/drawing/2014/main" id="{AE4A23F9-E286-A494-C701-ACD7D85002B9}"/>
-              </a:ext>
-            </a:extLst>
-          </p:cNvPr>
-          <p:cNvPicPr>
-            <a:picLocks noChangeAspect="1"/>
-          </p:cNvPicPr>
-          <p:nvPr/>
-        </p:nvPicPr>
-        <p:blipFill>
-          <a:blip r:embed="rId4"/>
-          <a:stretch>
-            <a:fillRect/>
-          </a:stretch>
-        </p:blipFill>
-        <p:spPr>
-          <a:xfrm>
-            <a:off x="161954" y="3435216"/>
-            <a:ext cx="10050278" cy="3238952"/>
-          </a:xfrm>
-          <a:prstGeom prst="rect">
-            <a:avLst/>
-          </a:prstGeom>
-        </p:spPr>
-      </p:pic>
-      <p:pic>
-        <p:nvPicPr>
-          <p:cNvPr id="10" name="Picture 9">
-            <a:extLst>
-              <a:ext uri="{FF2B5EF4-FFF2-40B4-BE49-F238E27FC236}">
-                <a16:creationId xmlns:a16="http://schemas.microsoft.com/office/drawing/2014/main" id="{83F5D944-086F-CFA7-2B8C-85BF08E34A9C}"/>
-              </a:ext>
-            </a:extLst>
-          </p:cNvPr>
-          <p:cNvPicPr>
-            <a:picLocks noChangeAspect="1"/>
-          </p:cNvPicPr>
-          <p:nvPr/>
-        </p:nvPicPr>
-        <p:blipFill>
-          <a:blip r:embed="rId5"/>
-          <a:stretch>
-            <a:fillRect/>
-          </a:stretch>
-        </p:blipFill>
-        <p:spPr>
-          <a:xfrm>
-            <a:off x="3583715" y="1181963"/>
-            <a:ext cx="4505954" cy="4753638"/>
           </a:xfrm>
           <a:prstGeom prst="rect">
             <a:avLst/>
@@ -12652,7 +12688,13 @@
           <p:cNvGraphicFramePr>
             <a:graphicFrameLocks noGrp="1"/>
           </p:cNvGraphicFramePr>
-          <p:nvPr/>
+          <p:nvPr>
+            <p:extLst>
+              <p:ext uri="{D42A27DB-BD31-4B8C-83A1-F6EECF244321}">
+                <p14:modId xmlns:p14="http://schemas.microsoft.com/office/powerpoint/2010/main" val="2745310407"/>
+              </p:ext>
+            </p:extLst>
+          </p:nvPr>
         </p:nvGraphicFramePr>
         <p:xfrm>
           <a:off x="1555845" y="995069"/>
@@ -12681,7 +12723,7 @@
                     <a:p>
                       <a:r>
                         <a:rPr lang="en-NZ" dirty="0"/>
-                        <a:t>However pressing the toggler icon, the navbar links being underneath look off. </a:t>
+                        <a:t>But having the toggler icon be on the right and then the nav links appear on the left also felt off</a:t>
                       </a:r>
                     </a:p>
                   </a:txBody>
@@ -12699,10 +12741,10 @@
       </p:graphicFrame>
       <p:pic>
         <p:nvPicPr>
-          <p:cNvPr id="5" name="Picture 4">
+          <p:cNvPr id="3" name="Picture 2">
             <a:extLst>
               <a:ext uri="{FF2B5EF4-FFF2-40B4-BE49-F238E27FC236}">
-                <a16:creationId xmlns:a16="http://schemas.microsoft.com/office/drawing/2014/main" id="{931954EF-AE18-EA2B-0D51-FBAD4505C514}"/>
+                <a16:creationId xmlns:a16="http://schemas.microsoft.com/office/drawing/2014/main" id="{A1015963-8AEC-1DAC-7015-11D3B9874D65}"/>
               </a:ext>
             </a:extLst>
           </p:cNvPr>
@@ -12719,8 +12761,68 @@
         </p:blipFill>
         <p:spPr>
           <a:xfrm>
-            <a:off x="136477" y="1924334"/>
-            <a:ext cx="12192000" cy="4257964"/>
+            <a:off x="1719616" y="1722496"/>
+            <a:ext cx="6883021" cy="2403843"/>
+          </a:xfrm>
+          <a:prstGeom prst="rect">
+            <a:avLst/>
+          </a:prstGeom>
+        </p:spPr>
+      </p:pic>
+      <p:pic>
+        <p:nvPicPr>
+          <p:cNvPr id="7" name="Picture 6">
+            <a:extLst>
+              <a:ext uri="{FF2B5EF4-FFF2-40B4-BE49-F238E27FC236}">
+                <a16:creationId xmlns:a16="http://schemas.microsoft.com/office/drawing/2014/main" id="{71CBA416-7FC0-D8C4-96EE-7635ADA86FC6}"/>
+              </a:ext>
+            </a:extLst>
+          </p:cNvPr>
+          <p:cNvPicPr>
+            <a:picLocks noChangeAspect="1"/>
+          </p:cNvPicPr>
+          <p:nvPr/>
+        </p:nvPicPr>
+        <p:blipFill>
+          <a:blip r:embed="rId3"/>
+          <a:stretch>
+            <a:fillRect/>
+          </a:stretch>
+        </p:blipFill>
+        <p:spPr>
+          <a:xfrm>
+            <a:off x="1719616" y="4334055"/>
+            <a:ext cx="7237863" cy="2523945"/>
+          </a:xfrm>
+          <a:prstGeom prst="rect">
+            <a:avLst/>
+          </a:prstGeom>
+        </p:spPr>
+      </p:pic>
+      <p:pic>
+        <p:nvPicPr>
+          <p:cNvPr id="8" name="Picture 7">
+            <a:extLst>
+              <a:ext uri="{FF2B5EF4-FFF2-40B4-BE49-F238E27FC236}">
+                <a16:creationId xmlns:a16="http://schemas.microsoft.com/office/drawing/2014/main" id="{4D058E62-B07A-93E5-E35A-4272B9B9E120}"/>
+              </a:ext>
+            </a:extLst>
+          </p:cNvPr>
+          <p:cNvPicPr>
+            <a:picLocks noChangeAspect="1"/>
+          </p:cNvPicPr>
+          <p:nvPr/>
+        </p:nvPicPr>
+        <p:blipFill>
+          <a:blip r:embed="rId4"/>
+          <a:stretch>
+            <a:fillRect/>
+          </a:stretch>
+        </p:blipFill>
+        <p:spPr>
+          <a:xfrm>
+            <a:off x="3054248" y="4853766"/>
+            <a:ext cx="3696780" cy="1766604"/>
           </a:xfrm>
           <a:prstGeom prst="rect">
             <a:avLst/>
@@ -12741,6 +12843,195 @@
 </file>
 
 <file path=ppt/slides/slide44.xml><?xml version="1.0" encoding="utf-8"?>
+<p:sld xmlns:a="http://schemas.openxmlformats.org/drawingml/2006/main" xmlns:r="http://schemas.openxmlformats.org/officeDocument/2006/relationships" xmlns:p="http://schemas.openxmlformats.org/presentationml/2006/main">
+  <p:cSld>
+    <p:spTree>
+      <p:nvGrpSpPr>
+        <p:cNvPr id="1" name=""/>
+        <p:cNvGrpSpPr/>
+        <p:nvPr/>
+      </p:nvGrpSpPr>
+      <p:grpSpPr>
+        <a:xfrm>
+          <a:off x="0" y="0"/>
+          <a:ext cx="0" cy="0"/>
+          <a:chOff x="0" y="0"/>
+          <a:chExt cx="0" cy="0"/>
+        </a:xfrm>
+      </p:grpSpPr>
+      <p:sp>
+        <p:nvSpPr>
+          <p:cNvPr id="2" name="Title 1"/>
+          <p:cNvSpPr>
+            <a:spLocks noGrp="1"/>
+          </p:cNvSpPr>
+          <p:nvPr>
+            <p:ph type="title"/>
+          </p:nvPr>
+        </p:nvSpPr>
+        <p:spPr>
+          <a:xfrm>
+            <a:off x="1249680" y="183832"/>
+            <a:ext cx="9692640" cy="606738"/>
+          </a:xfrm>
+        </p:spPr>
+        <p:txBody>
+          <a:bodyPr>
+            <a:normAutofit/>
+          </a:bodyPr>
+          <a:lstStyle/>
+          <a:p>
+            <a:r>
+              <a:rPr lang="en-NZ" sz="2800" dirty="0">
+                <a:latin typeface="Abadi" panose="020B0604020104020204" pitchFamily="34" charset="0"/>
+              </a:rPr>
+              <a:t>Iterative Improvement (Navbar V2)</a:t>
+            </a:r>
+          </a:p>
+        </p:txBody>
+      </p:sp>
+      <p:graphicFrame>
+        <p:nvGraphicFramePr>
+          <p:cNvPr id="6" name="Table 5">
+            <a:extLst>
+              <a:ext uri="{FF2B5EF4-FFF2-40B4-BE49-F238E27FC236}">
+                <a16:creationId xmlns:a16="http://schemas.microsoft.com/office/drawing/2014/main" id="{86696FAE-6427-9E8F-DDE0-AC2C439DCFBF}"/>
+              </a:ext>
+            </a:extLst>
+          </p:cNvPr>
+          <p:cNvGraphicFramePr>
+            <a:graphicFrameLocks noGrp="1"/>
+          </p:cNvGraphicFramePr>
+          <p:nvPr>
+            <p:extLst>
+              <p:ext uri="{D42A27DB-BD31-4B8C-83A1-F6EECF244321}">
+                <p14:modId xmlns:p14="http://schemas.microsoft.com/office/powerpoint/2010/main" val="1692627675"/>
+              </p:ext>
+            </p:extLst>
+          </p:nvPr>
+        </p:nvGraphicFramePr>
+        <p:xfrm>
+          <a:off x="1555845" y="995069"/>
+          <a:ext cx="7861110" cy="929265"/>
+        </p:xfrm>
+        <a:graphic>
+          <a:graphicData uri="http://schemas.openxmlformats.org/drawingml/2006/table">
+            <a:tbl>
+              <a:tblPr firstRow="1" bandRow="1">
+                <a:tableStyleId>{5C22544A-7EE6-4342-B048-85BDC9FD1C3A}</a:tableStyleId>
+              </a:tblPr>
+              <a:tblGrid>
+                <a:gridCol w="7861110">
+                  <a:extLst>
+                    <a:ext uri="{9D8B030D-6E8A-4147-A177-3AD203B41FA5}">
+                      <a16:colId xmlns:a16="http://schemas.microsoft.com/office/drawing/2014/main" val="3661073892"/>
+                    </a:ext>
+                  </a:extLst>
+                </a:gridCol>
+              </a:tblGrid>
+              <a:tr h="929265">
+                <a:tc>
+                  <a:txBody>
+                    <a:bodyPr/>
+                    <a:lstStyle/>
+                    <a:p>
+                      <a:r>
+                        <a:rPr lang="en-NZ" dirty="0"/>
+                        <a:t>As a result, it made sense to always be on the right while the logo stayed on </a:t>
+                      </a:r>
+                      <a:r>
+                        <a:rPr lang="en-NZ"/>
+                        <a:t>the right. </a:t>
+                      </a:r>
+                      <a:endParaRPr lang="en-NZ" dirty="0"/>
+                    </a:p>
+                  </a:txBody>
+                  <a:tcPr/>
+                </a:tc>
+                <a:extLst>
+                  <a:ext uri="{0D108BD9-81ED-4DB2-BD59-A6C34878D82A}">
+                    <a16:rowId xmlns:a16="http://schemas.microsoft.com/office/drawing/2014/main" val="2220021842"/>
+                  </a:ext>
+                </a:extLst>
+              </a:tr>
+            </a:tbl>
+          </a:graphicData>
+        </a:graphic>
+      </p:graphicFrame>
+      <p:pic>
+        <p:nvPicPr>
+          <p:cNvPr id="5" name="Picture 4">
+            <a:extLst>
+              <a:ext uri="{FF2B5EF4-FFF2-40B4-BE49-F238E27FC236}">
+                <a16:creationId xmlns:a16="http://schemas.microsoft.com/office/drawing/2014/main" id="{4C190BFD-BA5B-BF16-2BFD-899A84FB4016}"/>
+              </a:ext>
+            </a:extLst>
+          </p:cNvPr>
+          <p:cNvPicPr>
+            <a:picLocks noChangeAspect="1"/>
+          </p:cNvPicPr>
+          <p:nvPr/>
+        </p:nvPicPr>
+        <p:blipFill>
+          <a:blip r:embed="rId2"/>
+          <a:stretch>
+            <a:fillRect/>
+          </a:stretch>
+        </p:blipFill>
+        <p:spPr>
+          <a:xfrm>
+            <a:off x="0" y="1767586"/>
+            <a:ext cx="12192000" cy="1303314"/>
+          </a:xfrm>
+          <a:prstGeom prst="rect">
+            <a:avLst/>
+          </a:prstGeom>
+        </p:spPr>
+      </p:pic>
+      <p:pic>
+        <p:nvPicPr>
+          <p:cNvPr id="11" name="Picture 10">
+            <a:extLst>
+              <a:ext uri="{FF2B5EF4-FFF2-40B4-BE49-F238E27FC236}">
+                <a16:creationId xmlns:a16="http://schemas.microsoft.com/office/drawing/2014/main" id="{1DE9DC09-2AC1-5E72-D1AD-09DD0277EC38}"/>
+              </a:ext>
+            </a:extLst>
+          </p:cNvPr>
+          <p:cNvPicPr>
+            <a:picLocks noChangeAspect="1"/>
+          </p:cNvPicPr>
+          <p:nvPr/>
+        </p:nvPicPr>
+        <p:blipFill>
+          <a:blip r:embed="rId3"/>
+          <a:stretch>
+            <a:fillRect/>
+          </a:stretch>
+        </p:blipFill>
+        <p:spPr>
+          <a:xfrm>
+            <a:off x="601604" y="2771205"/>
+            <a:ext cx="10688542" cy="4086795"/>
+          </a:xfrm>
+          <a:prstGeom prst="rect">
+            <a:avLst/>
+          </a:prstGeom>
+        </p:spPr>
+      </p:pic>
+    </p:spTree>
+    <p:extLst>
+      <p:ext uri="{BB962C8B-B14F-4D97-AF65-F5344CB8AC3E}">
+        <p14:creationId xmlns:p14="http://schemas.microsoft.com/office/powerpoint/2010/main" val="1340966395"/>
+      </p:ext>
+    </p:extLst>
+  </p:cSld>
+  <p:clrMapOvr>
+    <a:masterClrMapping/>
+  </p:clrMapOvr>
+</p:sld>
+</file>
+
+<file path=ppt/slides/slide45.xml><?xml version="1.0" encoding="utf-8"?>
 <p:sld xmlns:a="http://schemas.openxmlformats.org/drawingml/2006/main" xmlns:r="http://schemas.openxmlformats.org/officeDocument/2006/relationships" xmlns:p="http://schemas.openxmlformats.org/presentationml/2006/main">
   <p:cSld>
     <p:spTree>
@@ -12882,91 +13173,6 @@
 </p:sld>
 </file>
 
-<file path=ppt/slides/slide45.xml><?xml version="1.0" encoding="utf-8"?>
-<p:sld xmlns:a="http://schemas.openxmlformats.org/drawingml/2006/main" xmlns:r="http://schemas.openxmlformats.org/officeDocument/2006/relationships" xmlns:p="http://schemas.openxmlformats.org/presentationml/2006/main">
-  <p:cSld>
-    <p:spTree>
-      <p:nvGrpSpPr>
-        <p:cNvPr id="1" name=""/>
-        <p:cNvGrpSpPr/>
-        <p:nvPr/>
-      </p:nvGrpSpPr>
-      <p:grpSpPr>
-        <a:xfrm>
-          <a:off x="0" y="0"/>
-          <a:ext cx="0" cy="0"/>
-          <a:chOff x="0" y="0"/>
-          <a:chExt cx="0" cy="0"/>
-        </a:xfrm>
-      </p:grpSpPr>
-      <p:sp>
-        <p:nvSpPr>
-          <p:cNvPr id="2" name="Title 1"/>
-          <p:cNvSpPr>
-            <a:spLocks noGrp="1"/>
-          </p:cNvSpPr>
-          <p:nvPr>
-            <p:ph type="title"/>
-          </p:nvPr>
-        </p:nvSpPr>
-        <p:spPr/>
-        <p:txBody>
-          <a:bodyPr>
-            <a:normAutofit/>
-          </a:bodyPr>
-          <a:lstStyle/>
-          <a:p>
-            <a:r>
-              <a:rPr lang="en-NZ" sz="2800" dirty="0">
-                <a:latin typeface="Abadi" panose="020B0604020104020204" pitchFamily="34" charset="0"/>
-              </a:rPr>
-              <a:t>Version Control</a:t>
-            </a:r>
-          </a:p>
-        </p:txBody>
-      </p:sp>
-      <p:sp>
-        <p:nvSpPr>
-          <p:cNvPr id="3" name="Content Placeholder 2"/>
-          <p:cNvSpPr>
-            <a:spLocks noGrp="1"/>
-          </p:cNvSpPr>
-          <p:nvPr>
-            <p:ph idx="1"/>
-          </p:nvPr>
-        </p:nvSpPr>
-        <p:spPr/>
-        <p:txBody>
-          <a:bodyPr>
-            <a:normAutofit/>
-          </a:bodyPr>
-          <a:lstStyle/>
-          <a:p>
-            <a:pPr marL="0" indent="0">
-              <a:buNone/>
-            </a:pPr>
-            <a:r>
-              <a:rPr lang="en-NZ" sz="2000" dirty="0">
-                <a:latin typeface="Abadi" panose="020B0604020104020204" pitchFamily="34" charset="0"/>
-              </a:rPr>
-              <a:t>Show how you have used version control throughout the design, development, and testing process.</a:t>
-            </a:r>
-          </a:p>
-        </p:txBody>
-      </p:sp>
-    </p:spTree>
-    <p:extLst>
-      <p:ext uri="{BB962C8B-B14F-4D97-AF65-F5344CB8AC3E}">
-        <p14:creationId xmlns:p14="http://schemas.microsoft.com/office/powerpoint/2010/main" val="2812247241"/>
-      </p:ext>
-    </p:extLst>
-  </p:cSld>
-  <p:clrMapOvr>
-    <a:masterClrMapping/>
-  </p:clrMapOvr>
-</p:sld>
-</file>
-
 <file path=ppt/slides/slide46.xml><?xml version="1.0" encoding="utf-8"?>
 <p:sld xmlns:a="http://schemas.openxmlformats.org/drawingml/2006/main" xmlns:r="http://schemas.openxmlformats.org/officeDocument/2006/relationships" xmlns:p="http://schemas.openxmlformats.org/presentationml/2006/main">
   <p:cSld>
@@ -13005,7 +13211,7 @@
               <a:rPr lang="en-NZ" sz="2800" dirty="0">
                 <a:latin typeface="Abadi" panose="020B0604020104020204" pitchFamily="34" charset="0"/>
               </a:rPr>
-              <a:t>GitHub Commits</a:t>
+              <a:t>Version Control</a:t>
             </a:r>
           </a:p>
         </p:txBody>
@@ -13034,7 +13240,7 @@
               <a:rPr lang="en-NZ" sz="2000" dirty="0">
                 <a:latin typeface="Abadi" panose="020B0604020104020204" pitchFamily="34" charset="0"/>
               </a:rPr>
-              <a:t>Show how you have used GitHub throughout the design, development, and testing process.</a:t>
+              <a:t>Show how you have used version control throughout the design, development, and testing process.</a:t>
             </a:r>
           </a:p>
         </p:txBody>
@@ -13042,7 +13248,7 @@
     </p:spTree>
     <p:extLst>
       <p:ext uri="{BB962C8B-B14F-4D97-AF65-F5344CB8AC3E}">
-        <p14:creationId xmlns:p14="http://schemas.microsoft.com/office/powerpoint/2010/main" val="1865976428"/>
+        <p14:creationId xmlns:p14="http://schemas.microsoft.com/office/powerpoint/2010/main" val="2812247241"/>
       </p:ext>
     </p:extLst>
   </p:cSld>
@@ -13090,6 +13296,91 @@
               <a:rPr lang="en-NZ" sz="2800" dirty="0">
                 <a:latin typeface="Abadi" panose="020B0604020104020204" pitchFamily="34" charset="0"/>
               </a:rPr>
+              <a:t>GitHub Commits</a:t>
+            </a:r>
+          </a:p>
+        </p:txBody>
+      </p:sp>
+      <p:sp>
+        <p:nvSpPr>
+          <p:cNvPr id="3" name="Content Placeholder 2"/>
+          <p:cNvSpPr>
+            <a:spLocks noGrp="1"/>
+          </p:cNvSpPr>
+          <p:nvPr>
+            <p:ph idx="1"/>
+          </p:nvPr>
+        </p:nvSpPr>
+        <p:spPr/>
+        <p:txBody>
+          <a:bodyPr>
+            <a:normAutofit/>
+          </a:bodyPr>
+          <a:lstStyle/>
+          <a:p>
+            <a:pPr marL="0" indent="0">
+              <a:buNone/>
+            </a:pPr>
+            <a:r>
+              <a:rPr lang="en-NZ" sz="2000" dirty="0">
+                <a:latin typeface="Abadi" panose="020B0604020104020204" pitchFamily="34" charset="0"/>
+              </a:rPr>
+              <a:t>Show how you have used GitHub throughout the design, development, and testing process.</a:t>
+            </a:r>
+          </a:p>
+        </p:txBody>
+      </p:sp>
+    </p:spTree>
+    <p:extLst>
+      <p:ext uri="{BB962C8B-B14F-4D97-AF65-F5344CB8AC3E}">
+        <p14:creationId xmlns:p14="http://schemas.microsoft.com/office/powerpoint/2010/main" val="1865976428"/>
+      </p:ext>
+    </p:extLst>
+  </p:cSld>
+  <p:clrMapOvr>
+    <a:masterClrMapping/>
+  </p:clrMapOvr>
+</p:sld>
+</file>
+
+<file path=ppt/slides/slide48.xml><?xml version="1.0" encoding="utf-8"?>
+<p:sld xmlns:a="http://schemas.openxmlformats.org/drawingml/2006/main" xmlns:r="http://schemas.openxmlformats.org/officeDocument/2006/relationships" xmlns:p="http://schemas.openxmlformats.org/presentationml/2006/main">
+  <p:cSld>
+    <p:spTree>
+      <p:nvGrpSpPr>
+        <p:cNvPr id="1" name=""/>
+        <p:cNvGrpSpPr/>
+        <p:nvPr/>
+      </p:nvGrpSpPr>
+      <p:grpSpPr>
+        <a:xfrm>
+          <a:off x="0" y="0"/>
+          <a:ext cx="0" cy="0"/>
+          <a:chOff x="0" y="0"/>
+          <a:chExt cx="0" cy="0"/>
+        </a:xfrm>
+      </p:grpSpPr>
+      <p:sp>
+        <p:nvSpPr>
+          <p:cNvPr id="2" name="Title 1"/>
+          <p:cNvSpPr>
+            <a:spLocks noGrp="1"/>
+          </p:cNvSpPr>
+          <p:nvPr>
+            <p:ph type="title"/>
+          </p:nvPr>
+        </p:nvSpPr>
+        <p:spPr/>
+        <p:txBody>
+          <a:bodyPr>
+            <a:normAutofit/>
+          </a:bodyPr>
+          <a:lstStyle/>
+          <a:p>
+            <a:r>
+              <a:rPr lang="en-NZ" sz="2800" dirty="0">
+                <a:latin typeface="Abadi" panose="020B0604020104020204" pitchFamily="34" charset="0"/>
+              </a:rPr>
               <a:t>Addressing Relevant Implications</a:t>
             </a:r>
           </a:p>
@@ -13137,7 +13428,7 @@
 </p:sld>
 </file>
 
-<file path=ppt/slides/slide48.xml><?xml version="1.0" encoding="utf-8"?>
+<file path=ppt/slides/slide49.xml><?xml version="1.0" encoding="utf-8"?>
 <p:sld xmlns:a="http://schemas.openxmlformats.org/drawingml/2006/main" xmlns:r="http://schemas.openxmlformats.org/officeDocument/2006/relationships" xmlns:p="http://schemas.openxmlformats.org/presentationml/2006/main">
   <p:cSld>
     <p:spTree>
@@ -13236,7 +13527,125 @@
 </p:sld>
 </file>
 
-<file path=ppt/slides/slide49.xml><?xml version="1.0" encoding="utf-8"?>
+<file path=ppt/slides/slide5.xml><?xml version="1.0" encoding="utf-8"?>
+<p:sld xmlns:a="http://schemas.openxmlformats.org/drawingml/2006/main" xmlns:r="http://schemas.openxmlformats.org/officeDocument/2006/relationships" xmlns:p="http://schemas.openxmlformats.org/presentationml/2006/main">
+  <p:cSld>
+    <p:spTree>
+      <p:nvGrpSpPr>
+        <p:cNvPr id="1" name=""/>
+        <p:cNvGrpSpPr/>
+        <p:nvPr/>
+      </p:nvGrpSpPr>
+      <p:grpSpPr>
+        <a:xfrm>
+          <a:off x="0" y="0"/>
+          <a:ext cx="0" cy="0"/>
+          <a:chOff x="0" y="0"/>
+          <a:chExt cx="0" cy="0"/>
+        </a:xfrm>
+      </p:grpSpPr>
+      <p:sp>
+        <p:nvSpPr>
+          <p:cNvPr id="2" name="Title 1"/>
+          <p:cNvSpPr>
+            <a:spLocks noGrp="1"/>
+          </p:cNvSpPr>
+          <p:nvPr>
+            <p:ph type="title"/>
+          </p:nvPr>
+        </p:nvSpPr>
+        <p:spPr/>
+        <p:txBody>
+          <a:bodyPr>
+            <a:normAutofit/>
+          </a:bodyPr>
+          <a:lstStyle/>
+          <a:p>
+            <a:r>
+              <a:rPr lang="en-NZ" sz="3100" dirty="0">
+                <a:latin typeface="Abadi" panose="020B0604020104020204" pitchFamily="34" charset="0"/>
+              </a:rPr>
+              <a:t>Describe the purpose and target audience of your website</a:t>
+            </a:r>
+            <a:br>
+              <a:rPr lang="en-NZ" dirty="0">
+                <a:latin typeface="Abadi" panose="020B0604020104020204" pitchFamily="34" charset="0"/>
+              </a:rPr>
+            </a:br>
+            <a:endParaRPr lang="en-NZ" dirty="0">
+              <a:latin typeface="Abadi" panose="020B0604020104020204" pitchFamily="34" charset="0"/>
+            </a:endParaRPr>
+          </a:p>
+        </p:txBody>
+      </p:sp>
+      <p:sp>
+        <p:nvSpPr>
+          <p:cNvPr id="3" name="Content Placeholder 2"/>
+          <p:cNvSpPr>
+            <a:spLocks noGrp="1"/>
+          </p:cNvSpPr>
+          <p:nvPr>
+            <p:ph idx="1"/>
+          </p:nvPr>
+        </p:nvSpPr>
+        <p:spPr/>
+        <p:txBody>
+          <a:bodyPr/>
+          <a:lstStyle/>
+          <a:p>
+            <a:pPr marL="0" indent="0">
+              <a:buNone/>
+            </a:pPr>
+            <a:r>
+              <a:rPr lang="en-NZ" dirty="0">
+                <a:latin typeface="Abadi" panose="020B0604020104020204" pitchFamily="34" charset="0"/>
+              </a:rPr>
+              <a:t>Purpose of my website is for people to be able to post their reviews and thoughts on Jollibee. This type of website will be most beneficial to current and possible future consumers. Additionally, it is also beneficial for the fast food restaurant Jollibee. It will serve as free marketing and can attract new consumers that will be influenced by the users reviews. </a:t>
+            </a:r>
+          </a:p>
+          <a:p>
+            <a:pPr marL="0" indent="0">
+              <a:buNone/>
+            </a:pPr>
+            <a:r>
+              <a:rPr lang="en-NZ" sz="2000" dirty="0">
+                <a:latin typeface="Abadi" panose="020B0604020104020204" pitchFamily="34" charset="0"/>
+              </a:rPr>
+              <a:t>(also to potentially bring Jollibee to NZ)</a:t>
+            </a:r>
+          </a:p>
+          <a:p>
+            <a:pPr marL="0" indent="0">
+              <a:buNone/>
+            </a:pPr>
+            <a:endParaRPr lang="en-NZ" sz="2000" dirty="0">
+              <a:latin typeface="Abadi" panose="020B0604020104020204" pitchFamily="34" charset="0"/>
+            </a:endParaRPr>
+          </a:p>
+          <a:p>
+            <a:pPr marL="0" indent="0">
+              <a:buNone/>
+            </a:pPr>
+            <a:endParaRPr lang="en-NZ" dirty="0">
+              <a:latin typeface="Abadi" panose="020B0604020104020204" pitchFamily="34" charset="0"/>
+            </a:endParaRPr>
+          </a:p>
+        </p:txBody>
+      </p:sp>
+    </p:spTree>
+    <p:extLst>
+      <p:ext uri="{BB962C8B-B14F-4D97-AF65-F5344CB8AC3E}">
+        <p14:creationId xmlns:p14="http://schemas.microsoft.com/office/powerpoint/2010/main" val="202757184"/>
+      </p:ext>
+    </p:extLst>
+  </p:cSld>
+  <p:clrMapOvr>
+    <a:masterClrMapping/>
+  </p:clrMapOvr>
+</p:sld>
+</file>
+
+<file path=ppt/slides/slide50.xml><?xml version="1.0" encoding="utf-8"?>
 <p:sld xmlns:a="http://schemas.openxmlformats.org/drawingml/2006/main" xmlns:r="http://schemas.openxmlformats.org/officeDocument/2006/relationships" xmlns:p="http://schemas.openxmlformats.org/presentationml/2006/main">
   <p:cSld>
     <p:spTree>
@@ -13326,124 +13735,6 @@
     <p:extLst>
       <p:ext uri="{BB962C8B-B14F-4D97-AF65-F5344CB8AC3E}">
         <p14:creationId xmlns:p14="http://schemas.microsoft.com/office/powerpoint/2010/main" val="3878584299"/>
-      </p:ext>
-    </p:extLst>
-  </p:cSld>
-  <p:clrMapOvr>
-    <a:masterClrMapping/>
-  </p:clrMapOvr>
-</p:sld>
-</file>
-
-<file path=ppt/slides/slide5.xml><?xml version="1.0" encoding="utf-8"?>
-<p:sld xmlns:a="http://schemas.openxmlformats.org/drawingml/2006/main" xmlns:r="http://schemas.openxmlformats.org/officeDocument/2006/relationships" xmlns:p="http://schemas.openxmlformats.org/presentationml/2006/main">
-  <p:cSld>
-    <p:spTree>
-      <p:nvGrpSpPr>
-        <p:cNvPr id="1" name=""/>
-        <p:cNvGrpSpPr/>
-        <p:nvPr/>
-      </p:nvGrpSpPr>
-      <p:grpSpPr>
-        <a:xfrm>
-          <a:off x="0" y="0"/>
-          <a:ext cx="0" cy="0"/>
-          <a:chOff x="0" y="0"/>
-          <a:chExt cx="0" cy="0"/>
-        </a:xfrm>
-      </p:grpSpPr>
-      <p:sp>
-        <p:nvSpPr>
-          <p:cNvPr id="2" name="Title 1"/>
-          <p:cNvSpPr>
-            <a:spLocks noGrp="1"/>
-          </p:cNvSpPr>
-          <p:nvPr>
-            <p:ph type="title"/>
-          </p:nvPr>
-        </p:nvSpPr>
-        <p:spPr/>
-        <p:txBody>
-          <a:bodyPr>
-            <a:normAutofit/>
-          </a:bodyPr>
-          <a:lstStyle/>
-          <a:p>
-            <a:r>
-              <a:rPr lang="en-NZ" sz="3100" dirty="0">
-                <a:latin typeface="Abadi" panose="020B0604020104020204" pitchFamily="34" charset="0"/>
-              </a:rPr>
-              <a:t>Describe the purpose and target audience of your website</a:t>
-            </a:r>
-            <a:br>
-              <a:rPr lang="en-NZ" dirty="0">
-                <a:latin typeface="Abadi" panose="020B0604020104020204" pitchFamily="34" charset="0"/>
-              </a:rPr>
-            </a:br>
-            <a:endParaRPr lang="en-NZ" dirty="0">
-              <a:latin typeface="Abadi" panose="020B0604020104020204" pitchFamily="34" charset="0"/>
-            </a:endParaRPr>
-          </a:p>
-        </p:txBody>
-      </p:sp>
-      <p:sp>
-        <p:nvSpPr>
-          <p:cNvPr id="3" name="Content Placeholder 2"/>
-          <p:cNvSpPr>
-            <a:spLocks noGrp="1"/>
-          </p:cNvSpPr>
-          <p:nvPr>
-            <p:ph idx="1"/>
-          </p:nvPr>
-        </p:nvSpPr>
-        <p:spPr/>
-        <p:txBody>
-          <a:bodyPr/>
-          <a:lstStyle/>
-          <a:p>
-            <a:pPr marL="0" indent="0">
-              <a:buNone/>
-            </a:pPr>
-            <a:r>
-              <a:rPr lang="en-NZ" dirty="0">
-                <a:latin typeface="Abadi" panose="020B0604020104020204" pitchFamily="34" charset="0"/>
-              </a:rPr>
-              <a:t>Purpose of my website is for people to be able to post their reviews and thoughts on Jollibee. This type of website will be most beneficial to current and possible future consumers. Additionally, it is also beneficial for the fast food restaurant Jollibee. It will serve as free marketing and can attract new consumers that will be influenced by the users reviews. </a:t>
-            </a:r>
-          </a:p>
-          <a:p>
-            <a:pPr marL="0" indent="0">
-              <a:buNone/>
-            </a:pPr>
-            <a:r>
-              <a:rPr lang="en-NZ" sz="2000" dirty="0">
-                <a:latin typeface="Abadi" panose="020B0604020104020204" pitchFamily="34" charset="0"/>
-              </a:rPr>
-              <a:t>(also to potentially bring Jollibee to NZ)</a:t>
-            </a:r>
-          </a:p>
-          <a:p>
-            <a:pPr marL="0" indent="0">
-              <a:buNone/>
-            </a:pPr>
-            <a:endParaRPr lang="en-NZ" sz="2000" dirty="0">
-              <a:latin typeface="Abadi" panose="020B0604020104020204" pitchFamily="34" charset="0"/>
-            </a:endParaRPr>
-          </a:p>
-          <a:p>
-            <a:pPr marL="0" indent="0">
-              <a:buNone/>
-            </a:pPr>
-            <a:endParaRPr lang="en-NZ" dirty="0">
-              <a:latin typeface="Abadi" panose="020B0604020104020204" pitchFamily="34" charset="0"/>
-            </a:endParaRPr>
-          </a:p>
-        </p:txBody>
-      </p:sp>
-    </p:spTree>
-    <p:extLst>
-      <p:ext uri="{BB962C8B-B14F-4D97-AF65-F5344CB8AC3E}">
-        <p14:creationId xmlns:p14="http://schemas.microsoft.com/office/powerpoint/2010/main" val="202757184"/>
       </p:ext>
     </p:extLst>
   </p:cSld>

</xml_diff>

<commit_message>
Added placeholder banner and fixed indenting
</commit_message>
<xml_diff>
--- a/AS91903_91906_Evidence_Joaquin_Badenas.pptx
+++ b/AS91903_91906_Evidence_Joaquin_Badenas.pptx
@@ -1610,7 +1610,7 @@
   <pc:docChgLst>
     <pc:chgData name="Joaquin Badenas" userId="5cb29fd719aebf04" providerId="LiveId" clId="{4F53BFBD-1E38-412E-AE7B-7E5D3B30168C}"/>
     <pc:docChg chg="undo custSel addSld delSld modSld sldOrd">
-      <pc:chgData name="Joaquin Badenas" userId="5cb29fd719aebf04" providerId="LiveId" clId="{4F53BFBD-1E38-412E-AE7B-7E5D3B30168C}" dt="2024-07-28T15:10:05.402" v="8329" actId="20577"/>
+      <pc:chgData name="Joaquin Badenas" userId="5cb29fd719aebf04" providerId="LiveId" clId="{4F53BFBD-1E38-412E-AE7B-7E5D3B30168C}" dt="2024-07-28T15:19:24.177" v="8417" actId="14100"/>
       <pc:docMkLst>
         <pc:docMk/>
       </pc:docMkLst>
@@ -2540,8 +2540,8 @@
           </ac:picMkLst>
         </pc:picChg>
       </pc:sldChg>
-      <pc:sldChg chg="delSp modSp add mod">
-        <pc:chgData name="Joaquin Badenas" userId="5cb29fd719aebf04" providerId="LiveId" clId="{4F53BFBD-1E38-412E-AE7B-7E5D3B30168C}" dt="2024-07-28T13:21:23.679" v="6743" actId="20577"/>
+      <pc:sldChg chg="addSp delSp modSp add mod">
+        <pc:chgData name="Joaquin Badenas" userId="5cb29fd719aebf04" providerId="LiveId" clId="{4F53BFBD-1E38-412E-AE7B-7E5D3B30168C}" dt="2024-07-28T15:19:24.177" v="8417" actId="14100"/>
         <pc:sldMkLst>
           <pc:docMk/>
           <pc:sldMk cId="3154286637" sldId="301"/>
@@ -2554,14 +2554,22 @@
             <ac:spMk id="2" creationId="{00000000-0000-0000-0000-000000000000}"/>
           </ac:spMkLst>
         </pc:spChg>
-        <pc:graphicFrameChg chg="modGraphic">
-          <ac:chgData name="Joaquin Badenas" userId="5cb29fd719aebf04" providerId="LiveId" clId="{4F53BFBD-1E38-412E-AE7B-7E5D3B30168C}" dt="2024-07-28T13:21:23.679" v="6743" actId="20577"/>
+        <pc:graphicFrameChg chg="mod modGraphic">
+          <ac:chgData name="Joaquin Badenas" userId="5cb29fd719aebf04" providerId="LiveId" clId="{4F53BFBD-1E38-412E-AE7B-7E5D3B30168C}" dt="2024-07-28T15:19:01.720" v="8408" actId="14100"/>
           <ac:graphicFrameMkLst>
             <pc:docMk/>
             <pc:sldMk cId="3154286637" sldId="301"/>
             <ac:graphicFrameMk id="3" creationId="{1A9023FA-33FD-5552-47F6-6A8D6E948421}"/>
           </ac:graphicFrameMkLst>
         </pc:graphicFrameChg>
+        <pc:picChg chg="add mod">
+          <ac:chgData name="Joaquin Badenas" userId="5cb29fd719aebf04" providerId="LiveId" clId="{4F53BFBD-1E38-412E-AE7B-7E5D3B30168C}" dt="2024-07-28T15:19:24.177" v="8417" actId="14100"/>
+          <ac:picMkLst>
+            <pc:docMk/>
+            <pc:sldMk cId="3154286637" sldId="301"/>
+            <ac:picMk id="5" creationId="{8518C3C2-C3C0-54E2-0631-E5B561198C23}"/>
+          </ac:picMkLst>
+        </pc:picChg>
         <pc:picChg chg="del">
           <ac:chgData name="Joaquin Badenas" userId="5cb29fd719aebf04" providerId="LiveId" clId="{4F53BFBD-1E38-412E-AE7B-7E5D3B30168C}" dt="2024-07-26T03:11:19.762" v="4638" actId="478"/>
           <ac:picMkLst>
@@ -3099,7 +3107,7 @@
         </pc:sldMkLst>
       </pc:sldChg>
       <pc:sldChg chg="addSp delSp modSp add mod">
-        <pc:chgData name="Joaquin Badenas" userId="5cb29fd719aebf04" providerId="LiveId" clId="{4F53BFBD-1E38-412E-AE7B-7E5D3B30168C}" dt="2024-07-28T15:09:38.981" v="8194" actId="20577"/>
+        <pc:chgData name="Joaquin Badenas" userId="5cb29fd719aebf04" providerId="LiveId" clId="{4F53BFBD-1E38-412E-AE7B-7E5D3B30168C}" dt="2024-07-28T15:18:18.703" v="8332" actId="1076"/>
         <pc:sldMkLst>
           <pc:docMk/>
           <pc:sldMk cId="3662683977" sldId="315"/>
@@ -3129,7 +3137,7 @@
           </ac:picMkLst>
         </pc:picChg>
         <pc:picChg chg="add mod">
-          <ac:chgData name="Joaquin Badenas" userId="5cb29fd719aebf04" providerId="LiveId" clId="{4F53BFBD-1E38-412E-AE7B-7E5D3B30168C}" dt="2024-07-28T15:04:46.575" v="8144" actId="1076"/>
+          <ac:chgData name="Joaquin Badenas" userId="5cb29fd719aebf04" providerId="LiveId" clId="{4F53BFBD-1E38-412E-AE7B-7E5D3B30168C}" dt="2024-07-28T15:18:16.415" v="8331" actId="1076"/>
           <ac:picMkLst>
             <pc:docMk/>
             <pc:sldMk cId="3662683977" sldId="315"/>
@@ -3137,7 +3145,7 @@
           </ac:picMkLst>
         </pc:picChg>
         <pc:picChg chg="add mod">
-          <ac:chgData name="Joaquin Badenas" userId="5cb29fd719aebf04" providerId="LiveId" clId="{4F53BFBD-1E38-412E-AE7B-7E5D3B30168C}" dt="2024-07-28T15:08:50.607" v="8159" actId="1076"/>
+          <ac:chgData name="Joaquin Badenas" userId="5cb29fd719aebf04" providerId="LiveId" clId="{4F53BFBD-1E38-412E-AE7B-7E5D3B30168C}" dt="2024-07-28T15:18:18.703" v="8332" actId="1076"/>
           <ac:picMkLst>
             <pc:docMk/>
             <pc:sldMk cId="3662683977" sldId="315"/>
@@ -12791,7 +12799,7 @@
         </p:blipFill>
         <p:spPr>
           <a:xfrm>
-            <a:off x="1719616" y="4334055"/>
+            <a:off x="-150127" y="4334055"/>
             <a:ext cx="7237863" cy="2523945"/>
           </a:xfrm>
           <a:prstGeom prst="rect">
@@ -12821,7 +12829,7 @@
         </p:blipFill>
         <p:spPr>
           <a:xfrm>
-            <a:off x="3054248" y="4853766"/>
+            <a:off x="7347043" y="4765057"/>
             <a:ext cx="3696780" cy="1766604"/>
           </a:xfrm>
           <a:prstGeom prst="rect">
@@ -13094,14 +13102,14 @@
           <p:nvPr>
             <p:extLst>
               <p:ext uri="{D42A27DB-BD31-4B8C-83A1-F6EECF244321}">
-                <p14:modId xmlns:p14="http://schemas.microsoft.com/office/powerpoint/2010/main" val="3015092751"/>
+                <p14:modId xmlns:p14="http://schemas.microsoft.com/office/powerpoint/2010/main" val="1720724235"/>
               </p:ext>
             </p:extLst>
           </p:nvPr>
         </p:nvGraphicFramePr>
         <p:xfrm>
-          <a:off x="1249680" y="1031751"/>
-          <a:ext cx="9430604" cy="1861575"/>
+          <a:off x="1249679" y="1031751"/>
+          <a:ext cx="8726833" cy="606739"/>
         </p:xfrm>
         <a:graphic>
           <a:graphicData uri="http://schemas.openxmlformats.org/drawingml/2006/table">
@@ -13110,42 +13118,26 @@
                 <a:tableStyleId>{5C22544A-7EE6-4342-B048-85BDC9FD1C3A}</a:tableStyleId>
               </a:tblPr>
               <a:tblGrid>
-                <a:gridCol w="4715302">
+                <a:gridCol w="8726833">
                   <a:extLst>
                     <a:ext uri="{9D8B030D-6E8A-4147-A177-3AD203B41FA5}">
                       <a16:colId xmlns:a16="http://schemas.microsoft.com/office/drawing/2014/main" val="2104603021"/>
                     </a:ext>
                   </a:extLst>
                 </a:gridCol>
-                <a:gridCol w="4715302">
-                  <a:extLst>
-                    <a:ext uri="{9D8B030D-6E8A-4147-A177-3AD203B41FA5}">
-                      <a16:colId xmlns:a16="http://schemas.microsoft.com/office/drawing/2014/main" val="2097243175"/>
-                    </a:ext>
-                  </a:extLst>
-                </a:gridCol>
               </a:tblGrid>
-              <a:tr h="1861575">
+              <a:tr h="606739">
                 <a:tc>
                   <a:txBody>
                     <a:bodyPr/>
                     <a:lstStyle/>
                     <a:p>
-                      <a:endParaRPr lang="en-NZ" dirty="0">
-                        <a:latin typeface="Abadi" panose="020B0604020104020204" pitchFamily="34" charset="0"/>
-                      </a:endParaRPr>
-                    </a:p>
-                  </a:txBody>
-                  <a:tcPr/>
-                </a:tc>
-                <a:tc>
-                  <a:txBody>
-                    <a:bodyPr/>
-                    <a:lstStyle/>
-                    <a:p>
-                      <a:endParaRPr lang="en-NZ" dirty="0">
-                        <a:latin typeface="Abadi" panose="020B0604020104020204" pitchFamily="34" charset="0"/>
-                      </a:endParaRPr>
+                      <a:r>
+                        <a:rPr lang="en-NZ" dirty="0">
+                          <a:latin typeface="Abadi" panose="020B0604020104020204" pitchFamily="34" charset="0"/>
+                        </a:rPr>
+                        <a:t>For the home page it was fitting to add a banner image</a:t>
+                      </a:r>
                     </a:p>
                   </a:txBody>
                   <a:tcPr/>
@@ -13160,6 +13152,36 @@
           </a:graphicData>
         </a:graphic>
       </p:graphicFrame>
+      <p:pic>
+        <p:nvPicPr>
+          <p:cNvPr id="5" name="Picture 4">
+            <a:extLst>
+              <a:ext uri="{FF2B5EF4-FFF2-40B4-BE49-F238E27FC236}">
+                <a16:creationId xmlns:a16="http://schemas.microsoft.com/office/drawing/2014/main" id="{8518C3C2-C3C0-54E2-0631-E5B561198C23}"/>
+              </a:ext>
+            </a:extLst>
+          </p:cNvPr>
+          <p:cNvPicPr>
+            <a:picLocks noChangeAspect="1"/>
+          </p:cNvPicPr>
+          <p:nvPr/>
+        </p:nvPicPr>
+        <p:blipFill>
+          <a:blip r:embed="rId2"/>
+          <a:stretch>
+            <a:fillRect/>
+          </a:stretch>
+        </p:blipFill>
+        <p:spPr>
+          <a:xfrm>
+            <a:off x="286602" y="1879671"/>
+            <a:ext cx="7990099" cy="3784150"/>
+          </a:xfrm>
+          <a:prstGeom prst="rect">
+            <a:avLst/>
+          </a:prstGeom>
+        </p:spPr>
+      </p:pic>
     </p:spTree>
     <p:extLst>
       <p:ext uri="{BB962C8B-B14F-4D97-AF65-F5344CB8AC3E}">

</xml_diff>

<commit_message>
Readjusted for smoother collapse sticky animation
</commit_message>
<xml_diff>
--- a/AS91903_91906_Evidence_Joaquin_Badenas.pptx
+++ b/AS91903_91906_Evidence_Joaquin_Badenas.pptx
@@ -1610,7 +1610,7 @@
   <pc:docChgLst>
     <pc:chgData name="Joaquin Badenas" userId="5cb29fd719aebf04" providerId="LiveId" clId="{4F53BFBD-1E38-412E-AE7B-7E5D3B30168C}"/>
     <pc:docChg chg="undo custSel addSld delSld modSld sldOrd">
-      <pc:chgData name="Joaquin Badenas" userId="5cb29fd719aebf04" providerId="LiveId" clId="{4F53BFBD-1E38-412E-AE7B-7E5D3B30168C}" dt="2024-07-28T15:19:24.177" v="8417" actId="14100"/>
+      <pc:chgData name="Joaquin Badenas" userId="5cb29fd719aebf04" providerId="LiveId" clId="{4F53BFBD-1E38-412E-AE7B-7E5D3B30168C}" dt="2024-07-28T22:10:03.621" v="8418" actId="1036"/>
       <pc:docMkLst>
         <pc:docMk/>
       </pc:docMkLst>
@@ -2226,7 +2226,7 @@
         </pc:picChg>
       </pc:sldChg>
       <pc:sldChg chg="addSp delSp modSp add mod">
-        <pc:chgData name="Joaquin Badenas" userId="5cb29fd719aebf04" providerId="LiveId" clId="{4F53BFBD-1E38-412E-AE7B-7E5D3B30168C}" dt="2024-07-25T22:26:54.101" v="3483" actId="20577"/>
+        <pc:chgData name="Joaquin Badenas" userId="5cb29fd719aebf04" providerId="LiveId" clId="{4F53BFBD-1E38-412E-AE7B-7E5D3B30168C}" dt="2024-07-28T22:10:03.621" v="8418" actId="1036"/>
         <pc:sldMkLst>
           <pc:docMk/>
           <pc:sldMk cId="2521655467" sldId="296"/>
@@ -2256,7 +2256,7 @@
           </ac:picMkLst>
         </pc:picChg>
         <pc:picChg chg="add mod">
-          <ac:chgData name="Joaquin Badenas" userId="5cb29fd719aebf04" providerId="LiveId" clId="{4F53BFBD-1E38-412E-AE7B-7E5D3B30168C}" dt="2024-07-25T22:25:17.904" v="3456" actId="1076"/>
+          <ac:chgData name="Joaquin Badenas" userId="5cb29fd719aebf04" providerId="LiveId" clId="{4F53BFBD-1E38-412E-AE7B-7E5D3B30168C}" dt="2024-07-28T22:10:03.621" v="8418" actId="1036"/>
           <ac:picMkLst>
             <pc:docMk/>
             <pc:sldMk cId="2521655467" sldId="296"/>
@@ -9714,7 +9714,7 @@
         </p:blipFill>
         <p:spPr>
           <a:xfrm>
-            <a:off x="1965278" y="2631836"/>
+            <a:off x="1965278" y="2645484"/>
             <a:ext cx="7561086" cy="4042332"/>
           </a:xfrm>
           <a:prstGeom prst="rect">

</xml_diff>